<commit_message>
refs #180 updated a model and bugfixed a usecase.
・ユースケースの自己位置推定の脅威への矢印が逆でした。
・1ページ目のユースケース周りの作成を行っています。(作成中)
</commit_message>
<xml_diff>
--- a/docs/design/Deliverable/cliffedge_No130_model2015.pptx
+++ b/docs/design/Deliverable/cliffedge_No130_model2015.pptx
@@ -15,7 +15,7 @@
     <p:sldId id="263" r:id="rId6"/>
   </p:sldIdLst>
   <p:sldSz cx="12801600" cy="9601200" type="A3"/>
-  <p:notesSz cx="6888163" cy="10018713"/>
+  <p:notesSz cx="9866313" cy="14295438"/>
   <p:defaultTextStyle>
     <a:defPPr>
       <a:defRPr lang="ja-JP"/>
@@ -500,11 +500,11 @@
           <c:showPercent val="0"/>
           <c:showBubbleSize val="0"/>
         </c:dLbls>
-        <c:axId val="1374584"/>
-        <c:axId val="1374976"/>
+        <c:axId val="249463008"/>
+        <c:axId val="249463400"/>
       </c:scatterChart>
       <c:valAx>
-        <c:axId val="1374584"/>
+        <c:axId val="249463008"/>
         <c:scaling>
           <c:orientation val="minMax"/>
           <c:max val="800"/>
@@ -526,12 +526,12 @@
             <a:endParaRPr lang="ja-JP"/>
           </a:p>
         </c:txPr>
-        <c:crossAx val="1374976"/>
+        <c:crossAx val="249463400"/>
         <c:crosses val="autoZero"/>
         <c:crossBetween val="midCat"/>
       </c:valAx>
       <c:valAx>
-        <c:axId val="1374976"/>
+        <c:axId val="249463400"/>
         <c:scaling>
           <c:orientation val="minMax"/>
         </c:scaling>
@@ -552,7 +552,7 @@
             <a:endParaRPr lang="ja-JP"/>
           </a:p>
         </c:txPr>
-        <c:crossAx val="1374584"/>
+        <c:crossAx val="249463008"/>
         <c:crosses val="autoZero"/>
         <c:crossBetween val="midCat"/>
       </c:valAx>
@@ -607,18 +607,9 @@
     </p:extLst>
   </p:cm>
   <p:cm authorId="1" dt="2015-07-15T12:20:43.910" idx="5">
-    <p:pos x="3629" y="4883"/>
+    <p:pos x="1351" y="5434"/>
     <p:text>ここのコメントがすごく微妙</p:text>
-    <p:extLst>
-      <p:ext uri="{C676402C-5697-4E1C-873F-D02D1690AC5C}">
-        <p15:threadingInfo xmlns:p15="http://schemas.microsoft.com/office/powerpoint/2012/main" timeZoneBias="-540"/>
-      </p:ext>
-    </p:extLst>
-  </p:cm>
-  <p:cm authorId="1" dt="2015-07-15T12:20:59.726" idx="6">
-    <p:pos x="5152" y="3856"/>
-    <p:text>概念モデルは、このままでもいいんですが、大西さんの案を採用するのならば、大西さんに作っていただきたいです。</p:text>
-    <p:extLst>
+    <p:extLst mod="1">
       <p:ext uri="{C676402C-5697-4E1C-873F-D02D1690AC5C}">
         <p15:threadingInfo xmlns:p15="http://schemas.microsoft.com/office/powerpoint/2012/main" timeZoneBias="-540"/>
       </p:ext>
@@ -800,18 +791,18 @@
         </p:nvSpPr>
         <p:spPr>
           <a:xfrm>
-            <a:off x="0" y="0"/>
-            <a:ext cx="2984500" cy="501650"/>
+            <a:off x="0" y="1"/>
+            <a:ext cx="4274871" cy="715791"/>
           </a:xfrm>
           <a:prstGeom prst="rect">
             <a:avLst/>
           </a:prstGeom>
         </p:spPr>
         <p:txBody>
-          <a:bodyPr vert="horz" lIns="91440" tIns="45720" rIns="91440" bIns="45720" rtlCol="0"/>
+          <a:bodyPr vert="horz" lIns="130664" tIns="65331" rIns="130664" bIns="65331" rtlCol="0"/>
           <a:lstStyle>
             <a:lvl1pPr algn="l">
-              <a:defRPr sz="1200"/>
+              <a:defRPr sz="1700"/>
             </a:lvl1pPr>
           </a:lstStyle>
           <a:p>
@@ -831,24 +822,24 @@
         </p:nvSpPr>
         <p:spPr>
           <a:xfrm>
-            <a:off x="3902075" y="0"/>
-            <a:ext cx="2984500" cy="501650"/>
+            <a:off x="5589167" y="1"/>
+            <a:ext cx="4274871" cy="715791"/>
           </a:xfrm>
           <a:prstGeom prst="rect">
             <a:avLst/>
           </a:prstGeom>
         </p:spPr>
         <p:txBody>
-          <a:bodyPr vert="horz" lIns="91440" tIns="45720" rIns="91440" bIns="45720" rtlCol="0"/>
+          <a:bodyPr vert="horz" lIns="130664" tIns="65331" rIns="130664" bIns="65331" rtlCol="0"/>
           <a:lstStyle>
             <a:lvl1pPr algn="r">
-              <a:defRPr sz="1200"/>
+              <a:defRPr sz="1700"/>
             </a:lvl1pPr>
           </a:lstStyle>
           <a:p>
             <a:fld id="{20DEA7AF-5BE1-40D9-B563-34B581AF3C5C}" type="datetimeFigureOut">
               <a:rPr kumimoji="1" lang="ja-JP" altLang="en-US" smtClean="0"/>
-              <a:t>2015/7/21</a:t>
+              <a:t>2015/7/22</a:t>
             </a:fld>
             <a:endParaRPr kumimoji="1" lang="ja-JP" altLang="en-US"/>
           </a:p>
@@ -866,8 +857,8 @@
         </p:nvSpPr>
         <p:spPr>
           <a:xfrm>
-            <a:off x="939800" y="750888"/>
-            <a:ext cx="5008563" cy="3757612"/>
+            <a:off x="1357313" y="1071563"/>
+            <a:ext cx="7151687" cy="5362575"/>
           </a:xfrm>
           <a:prstGeom prst="rect">
             <a:avLst/>
@@ -880,7 +871,7 @@
           </a:ln>
         </p:spPr>
         <p:txBody>
-          <a:bodyPr vert="horz" lIns="91440" tIns="45720" rIns="91440" bIns="45720" rtlCol="0" anchor="ctr"/>
+          <a:bodyPr vert="horz" lIns="130664" tIns="65331" rIns="130664" bIns="65331" rtlCol="0" anchor="ctr"/>
           <a:lstStyle/>
           <a:p>
             <a:endParaRPr lang="ja-JP" altLang="en-US"/>
@@ -899,15 +890,15 @@
         </p:nvSpPr>
         <p:spPr>
           <a:xfrm>
-            <a:off x="688975" y="4759325"/>
-            <a:ext cx="5510213" cy="4508500"/>
+            <a:off x="986859" y="6790956"/>
+            <a:ext cx="7892596" cy="6433060"/>
           </a:xfrm>
           <a:prstGeom prst="rect">
             <a:avLst/>
           </a:prstGeom>
         </p:spPr>
         <p:txBody>
-          <a:bodyPr vert="horz" lIns="91440" tIns="45720" rIns="91440" bIns="45720" rtlCol="0"/>
+          <a:bodyPr vert="horz" lIns="130664" tIns="65331" rIns="130664" bIns="65331" rtlCol="0"/>
           <a:lstStyle/>
           <a:p>
             <a:pPr lvl="0"/>
@@ -991,18 +982,18 @@
         </p:nvSpPr>
         <p:spPr>
           <a:xfrm>
-            <a:off x="0" y="9515475"/>
-            <a:ext cx="2984500" cy="501650"/>
+            <a:off x="0" y="13577382"/>
+            <a:ext cx="4274871" cy="715791"/>
           </a:xfrm>
           <a:prstGeom prst="rect">
             <a:avLst/>
           </a:prstGeom>
         </p:spPr>
         <p:txBody>
-          <a:bodyPr vert="horz" lIns="91440" tIns="45720" rIns="91440" bIns="45720" rtlCol="0" anchor="b"/>
+          <a:bodyPr vert="horz" lIns="130664" tIns="65331" rIns="130664" bIns="65331" rtlCol="0" anchor="b"/>
           <a:lstStyle>
             <a:lvl1pPr algn="l">
-              <a:defRPr sz="1200"/>
+              <a:defRPr sz="1700"/>
             </a:lvl1pPr>
           </a:lstStyle>
           <a:p>
@@ -1022,18 +1013,18 @@
         </p:nvSpPr>
         <p:spPr>
           <a:xfrm>
-            <a:off x="3902075" y="9515475"/>
-            <a:ext cx="2984500" cy="501650"/>
+            <a:off x="5589167" y="13577382"/>
+            <a:ext cx="4274871" cy="715791"/>
           </a:xfrm>
           <a:prstGeom prst="rect">
             <a:avLst/>
           </a:prstGeom>
         </p:spPr>
         <p:txBody>
-          <a:bodyPr vert="horz" lIns="91440" tIns="45720" rIns="91440" bIns="45720" rtlCol="0" anchor="b"/>
+          <a:bodyPr vert="horz" lIns="130664" tIns="65331" rIns="130664" bIns="65331" rtlCol="0" anchor="b"/>
           <a:lstStyle>
             <a:lvl1pPr algn="r">
-              <a:defRPr sz="1200"/>
+              <a:defRPr sz="1700"/>
             </a:lvl1pPr>
           </a:lstStyle>
           <a:p>
@@ -1413,7 +1404,7 @@
           <a:p>
             <a:fld id="{41079119-3171-4BC9-A6EB-D7FA4532BD2E}" type="datetimeFigureOut">
               <a:rPr kumimoji="1" lang="ja-JP" altLang="en-US" smtClean="0"/>
-              <a:t>2015/7/21</a:t>
+              <a:t>2015/7/22</a:t>
             </a:fld>
             <a:endParaRPr kumimoji="1" lang="ja-JP" altLang="en-US"/>
           </a:p>
@@ -1615,7 +1606,7 @@
           <a:p>
             <a:fld id="{41079119-3171-4BC9-A6EB-D7FA4532BD2E}" type="datetimeFigureOut">
               <a:rPr kumimoji="1" lang="ja-JP" altLang="en-US" smtClean="0"/>
-              <a:t>2015/7/21</a:t>
+              <a:t>2015/7/22</a:t>
             </a:fld>
             <a:endParaRPr kumimoji="1" lang="ja-JP" altLang="en-US"/>
           </a:p>
@@ -1827,7 +1818,7 @@
           <a:p>
             <a:fld id="{41079119-3171-4BC9-A6EB-D7FA4532BD2E}" type="datetimeFigureOut">
               <a:rPr kumimoji="1" lang="ja-JP" altLang="en-US" smtClean="0"/>
-              <a:t>2015/7/21</a:t>
+              <a:t>2015/7/22</a:t>
             </a:fld>
             <a:endParaRPr kumimoji="1" lang="ja-JP" altLang="en-US"/>
           </a:p>
@@ -2029,7 +2020,7 @@
           <a:p>
             <a:fld id="{41079119-3171-4BC9-A6EB-D7FA4532BD2E}" type="datetimeFigureOut">
               <a:rPr kumimoji="1" lang="ja-JP" altLang="en-US" smtClean="0"/>
-              <a:t>2015/7/21</a:t>
+              <a:t>2015/7/22</a:t>
             </a:fld>
             <a:endParaRPr kumimoji="1" lang="ja-JP" altLang="en-US"/>
           </a:p>
@@ -2275,7 +2266,7 @@
           <a:p>
             <a:fld id="{41079119-3171-4BC9-A6EB-D7FA4532BD2E}" type="datetimeFigureOut">
               <a:rPr kumimoji="1" lang="ja-JP" altLang="en-US" smtClean="0"/>
-              <a:t>2015/7/21</a:t>
+              <a:t>2015/7/22</a:t>
             </a:fld>
             <a:endParaRPr kumimoji="1" lang="ja-JP" altLang="en-US"/>
           </a:p>
@@ -2627,7 +2618,7 @@
           <a:p>
             <a:fld id="{41079119-3171-4BC9-A6EB-D7FA4532BD2E}" type="datetimeFigureOut">
               <a:rPr kumimoji="1" lang="ja-JP" altLang="en-US" smtClean="0"/>
-              <a:t>2015/7/21</a:t>
+              <a:t>2015/7/22</a:t>
             </a:fld>
             <a:endParaRPr kumimoji="1" lang="ja-JP" altLang="en-US"/>
           </a:p>
@@ -3118,7 +3109,7 @@
           <a:p>
             <a:fld id="{41079119-3171-4BC9-A6EB-D7FA4532BD2E}" type="datetimeFigureOut">
               <a:rPr kumimoji="1" lang="ja-JP" altLang="en-US" smtClean="0"/>
-              <a:t>2015/7/21</a:t>
+              <a:t>2015/7/22</a:t>
             </a:fld>
             <a:endParaRPr kumimoji="1" lang="ja-JP" altLang="en-US"/>
           </a:p>
@@ -3236,7 +3227,7 @@
           <a:p>
             <a:fld id="{41079119-3171-4BC9-A6EB-D7FA4532BD2E}" type="datetimeFigureOut">
               <a:rPr kumimoji="1" lang="ja-JP" altLang="en-US" smtClean="0"/>
-              <a:t>2015/7/21</a:t>
+              <a:t>2015/7/22</a:t>
             </a:fld>
             <a:endParaRPr kumimoji="1" lang="ja-JP" altLang="en-US"/>
           </a:p>
@@ -3331,7 +3322,7 @@
           <a:p>
             <a:fld id="{41079119-3171-4BC9-A6EB-D7FA4532BD2E}" type="datetimeFigureOut">
               <a:rPr kumimoji="1" lang="ja-JP" altLang="en-US" smtClean="0"/>
-              <a:t>2015/7/21</a:t>
+              <a:t>2015/7/22</a:t>
             </a:fld>
             <a:endParaRPr kumimoji="1" lang="ja-JP" altLang="en-US"/>
           </a:p>
@@ -3640,7 +3631,7 @@
           <a:p>
             <a:fld id="{41079119-3171-4BC9-A6EB-D7FA4532BD2E}" type="datetimeFigureOut">
               <a:rPr kumimoji="1" lang="ja-JP" altLang="en-US" smtClean="0"/>
-              <a:t>2015/7/21</a:t>
+              <a:t>2015/7/22</a:t>
             </a:fld>
             <a:endParaRPr kumimoji="1" lang="ja-JP" altLang="en-US"/>
           </a:p>
@@ -3893,7 +3884,7 @@
           <a:p>
             <a:fld id="{41079119-3171-4BC9-A6EB-D7FA4532BD2E}" type="datetimeFigureOut">
               <a:rPr kumimoji="1" lang="ja-JP" altLang="en-US" smtClean="0"/>
-              <a:t>2015/7/21</a:t>
+              <a:t>2015/7/22</a:t>
             </a:fld>
             <a:endParaRPr kumimoji="1" lang="ja-JP" altLang="en-US"/>
           </a:p>
@@ -4138,7 +4129,7 @@
           <a:p>
             <a:fld id="{41079119-3171-4BC9-A6EB-D7FA4532BD2E}" type="datetimeFigureOut">
               <a:rPr kumimoji="1" lang="ja-JP" altLang="en-US" smtClean="0"/>
-              <a:t>2015/7/21</a:t>
+              <a:t>2015/7/22</a:t>
             </a:fld>
             <a:endParaRPr kumimoji="1" lang="ja-JP" altLang="en-US"/>
           </a:p>
@@ -4957,8 +4948,8 @@
         </p:nvSpPr>
         <p:spPr>
           <a:xfrm>
-            <a:off x="0" y="533669"/>
-            <a:ext cx="4968815" cy="1224536"/>
+            <a:off x="0" y="541915"/>
+            <a:ext cx="5677731" cy="1216289"/>
           </a:xfrm>
           <a:prstGeom prst="rect">
             <a:avLst/>
@@ -5008,7 +4999,7 @@
         </p:nvGrpSpPr>
         <p:grpSpPr>
           <a:xfrm>
-            <a:off x="0" y="532869"/>
+            <a:off x="0" y="543143"/>
             <a:ext cx="1415719" cy="289332"/>
             <a:chOff x="108961" y="835133"/>
             <a:chExt cx="775390" cy="289332"/>
@@ -5121,8 +5112,8 @@
         </p:nvSpPr>
         <p:spPr>
           <a:xfrm>
-            <a:off x="4968815" y="540014"/>
-            <a:ext cx="7832785" cy="5611099"/>
+            <a:off x="5681682" y="540014"/>
+            <a:ext cx="7119918" cy="9052799"/>
           </a:xfrm>
           <a:prstGeom prst="rect">
             <a:avLst/>
@@ -5272,7 +5263,7 @@
         <p:spPr>
           <a:xfrm>
             <a:off x="1395" y="1758206"/>
-            <a:ext cx="4967420" cy="4401294"/>
+            <a:ext cx="5676336" cy="4401294"/>
           </a:xfrm>
           <a:prstGeom prst="rect">
             <a:avLst/>
@@ -5322,7 +5313,7 @@
         </p:nvGrpSpPr>
         <p:grpSpPr>
           <a:xfrm>
-            <a:off x="12988" y="1758950"/>
+            <a:off x="2714" y="1758950"/>
             <a:ext cx="1402731" cy="289332"/>
             <a:chOff x="108961" y="835133"/>
             <a:chExt cx="585874" cy="289332"/>
@@ -5435,7 +5426,7 @@
         </p:nvSpPr>
         <p:spPr>
           <a:xfrm>
-            <a:off x="141590" y="975896"/>
+            <a:off x="347070" y="955348"/>
             <a:ext cx="4685635" cy="719034"/>
           </a:xfrm>
           <a:prstGeom prst="rect">
@@ -5484,7 +5475,7 @@
         </p:nvSpPr>
         <p:spPr>
           <a:xfrm>
-            <a:off x="177866" y="2210774"/>
+            <a:off x="383346" y="2364884"/>
             <a:ext cx="4704685" cy="795978"/>
           </a:xfrm>
           <a:prstGeom prst="rect">
@@ -5607,7 +5598,7 @@
         </p:nvSpPr>
         <p:spPr>
           <a:xfrm>
-            <a:off x="177866" y="3080724"/>
+            <a:off x="383346" y="3234834"/>
             <a:ext cx="4704686" cy="795978"/>
           </a:xfrm>
           <a:prstGeom prst="rect">
@@ -5793,7 +5784,7 @@
         </p:nvCxnSpPr>
         <p:spPr>
           <a:xfrm flipV="1">
-            <a:off x="210572" y="4574016"/>
+            <a:off x="416052" y="4728126"/>
             <a:ext cx="4457992" cy="27347"/>
           </a:xfrm>
           <a:prstGeom prst="line">
@@ -5833,7 +5824,7 @@
         </p:nvSpPr>
         <p:spPr>
           <a:xfrm>
-            <a:off x="172166" y="4787821"/>
+            <a:off x="377646" y="4941931"/>
             <a:ext cx="4604525" cy="634395"/>
           </a:xfrm>
           <a:prstGeom prst="rect">
@@ -5888,7 +5879,7 @@
               <a:t> </a:t>
             </a:r>
             <a:r>
-              <a:rPr lang="en-US" altLang="ja-JP" sz="1050" b="1" u="sng" dirty="0" smtClean="0">
+              <a:rPr lang="en-US" altLang="ja-JP" sz="1050" b="1" u="sng" smtClean="0">
                 <a:solidFill>
                   <a:srgbClr val="0000CC"/>
                 </a:solidFill>
@@ -5898,14 +5889,34 @@
               <a:t>:</a:t>
             </a:r>
             <a:r>
-              <a:rPr lang="ja-JP" altLang="en-US" sz="1050" b="1" u="sng" dirty="0" smtClean="0">
+              <a:rPr lang="ja-JP" altLang="en-US" sz="1050" b="1" u="sng" smtClean="0">
                 <a:solidFill>
                   <a:srgbClr val="0000CC"/>
                 </a:solidFill>
                 <a:latin typeface="HG丸ｺﾞｼｯｸM-PRO" panose="020F0600000000000000" pitchFamily="50" charset="-128"/>
                 <a:ea typeface="HG丸ｺﾞｼｯｸM-PRO" panose="020F0600000000000000" pitchFamily="50" charset="-128"/>
               </a:rPr>
-              <a:t>  振る舞いの記述の容易化</a:t>
+              <a:t>  </a:t>
+            </a:r>
+            <a:r>
+              <a:rPr lang="ja-JP" altLang="en-US" sz="1050" b="1" u="sng">
+                <a:solidFill>
+                  <a:srgbClr val="0000CC"/>
+                </a:solidFill>
+                <a:latin typeface="HG丸ｺﾞｼｯｸM-PRO" panose="020F0600000000000000" pitchFamily="50" charset="-128"/>
+                <a:ea typeface="HG丸ｺﾞｼｯｸM-PRO" panose="020F0600000000000000" pitchFamily="50" charset="-128"/>
+              </a:rPr>
+              <a:t>一般的</a:t>
+            </a:r>
+            <a:r>
+              <a:rPr lang="ja-JP" altLang="en-US" sz="1050" b="1" u="sng" smtClean="0">
+                <a:solidFill>
+                  <a:srgbClr val="0000CC"/>
+                </a:solidFill>
+                <a:latin typeface="HG丸ｺﾞｼｯｸM-PRO" panose="020F0600000000000000" pitchFamily="50" charset="-128"/>
+                <a:ea typeface="HG丸ｺﾞｼｯｸM-PRO" panose="020F0600000000000000" pitchFamily="50" charset="-128"/>
+              </a:rPr>
+              <a:t>な概念を使い、わかりやすく記述する</a:t>
             </a:r>
             <a:endParaRPr lang="en-US" altLang="ja-JP" sz="1050" b="1" u="sng" dirty="0" smtClean="0">
               <a:solidFill>
@@ -5928,14 +5939,21 @@
                 <a:latin typeface="HG丸ｺﾞｼｯｸM-PRO" panose="020F0600000000000000" pitchFamily="50" charset="-128"/>
                 <a:ea typeface="HG丸ｺﾞｼｯｸM-PRO" panose="020F0600000000000000" pitchFamily="50" charset="-128"/>
               </a:rPr>
-              <a:t>振る舞い</a:t>
-            </a:r>
-            <a:r>
-              <a:rPr lang="ja-JP" altLang="en-US" sz="1050" dirty="0" smtClean="0">
-                <a:latin typeface="HG丸ｺﾞｼｯｸM-PRO" panose="020F0600000000000000" pitchFamily="50" charset="-128"/>
-                <a:ea typeface="HG丸ｺﾞｼｯｸM-PRO" panose="020F0600000000000000" pitchFamily="50" charset="-128"/>
-              </a:rPr>
-              <a:t>の記述を容易にし、デバッグおよびチューニング作業の負荷を低下させる。</a:t>
+              <a:t>ステート</a:t>
+            </a:r>
+            <a:r>
+              <a:rPr lang="ja-JP" altLang="en-US" sz="1050">
+                <a:latin typeface="HG丸ｺﾞｼｯｸM-PRO" panose="020F0600000000000000" pitchFamily="50" charset="-128"/>
+                <a:ea typeface="HG丸ｺﾞｼｯｸM-PRO" panose="020F0600000000000000" pitchFamily="50" charset="-128"/>
+              </a:rPr>
+              <a:t>マシン</a:t>
+            </a:r>
+            <a:r>
+              <a:rPr lang="ja-JP" altLang="en-US" sz="1050" smtClean="0">
+                <a:latin typeface="HG丸ｺﾞｼｯｸM-PRO" panose="020F0600000000000000" pitchFamily="50" charset="-128"/>
+                <a:ea typeface="HG丸ｺﾞｼｯｸM-PRO" panose="020F0600000000000000" pitchFamily="50" charset="-128"/>
+              </a:rPr>
+              <a:t>を利用して振る舞いを記述することで、モデル図を簡単にわかりやすくする。</a:t>
             </a:r>
             <a:endParaRPr kumimoji="1" lang="ja-JP" altLang="en-US" sz="1050" dirty="0">
               <a:latin typeface="HG丸ｺﾞｼｯｸM-PRO" panose="020F0600000000000000" pitchFamily="50" charset="-128"/>
@@ -5952,7 +5970,7 @@
         </p:nvGrpSpPr>
         <p:grpSpPr>
           <a:xfrm>
-            <a:off x="4968815" y="532578"/>
+            <a:off x="5677732" y="542852"/>
             <a:ext cx="1646827" cy="289332"/>
             <a:chOff x="103657" y="822433"/>
             <a:chExt cx="455058" cy="289332"/>
@@ -6065,7 +6083,7 @@
         </p:nvSpPr>
         <p:spPr>
           <a:xfrm>
-            <a:off x="6781861" y="578924"/>
+            <a:off x="7418854" y="578924"/>
             <a:ext cx="5277861" cy="234286"/>
           </a:xfrm>
           <a:prstGeom prst="rect">
@@ -6116,7 +6134,7 @@
         <p:spPr>
           <a:xfrm>
             <a:off x="-5127" y="6151113"/>
-            <a:ext cx="6743396" cy="3441700"/>
+            <a:ext cx="5686809" cy="3441700"/>
           </a:xfrm>
           <a:prstGeom prst="rect">
             <a:avLst/>
@@ -6166,7 +6184,7 @@
         </p:nvSpPr>
         <p:spPr>
           <a:xfrm>
-            <a:off x="403162" y="7923271"/>
+            <a:off x="174931" y="7387666"/>
             <a:ext cx="2512024" cy="395869"/>
           </a:xfrm>
           <a:prstGeom prst="rect">
@@ -6234,7 +6252,7 @@
         </p:nvSpPr>
         <p:spPr>
           <a:xfrm>
-            <a:off x="403162" y="8385174"/>
+            <a:off x="174931" y="7932190"/>
             <a:ext cx="2512024" cy="557451"/>
           </a:xfrm>
           <a:prstGeom prst="rect">
@@ -6309,7 +6327,7 @@
         </p:nvSpPr>
         <p:spPr>
           <a:xfrm>
-            <a:off x="398334" y="8987922"/>
+            <a:off x="2865158" y="8410392"/>
             <a:ext cx="2488021" cy="395869"/>
           </a:xfrm>
           <a:prstGeom prst="rect">
@@ -6510,7 +6528,7 @@
         </p:nvSpPr>
         <p:spPr>
           <a:xfrm>
-            <a:off x="177866" y="3996686"/>
+            <a:off x="383346" y="4150796"/>
             <a:ext cx="4455240" cy="472813"/>
           </a:xfrm>
           <a:prstGeom prst="rect">
@@ -6606,170 +6624,6 @@
       </p:sp>
       <p:sp>
         <p:nvSpPr>
-          <p:cNvPr id="91" name="正方形/長方形 90"/>
-          <p:cNvSpPr/>
-          <p:nvPr/>
-        </p:nvSpPr>
-        <p:spPr>
-          <a:xfrm>
-            <a:off x="6750969" y="6150874"/>
-            <a:ext cx="6050632" cy="3441699"/>
-          </a:xfrm>
-          <a:prstGeom prst="rect">
-            <a:avLst/>
-          </a:prstGeom>
-          <a:solidFill>
-            <a:schemeClr val="bg1"/>
-          </a:solidFill>
-          <a:ln w="19050">
-            <a:solidFill>
-              <a:schemeClr val="accent3">
-                <a:lumMod val="75000"/>
-              </a:schemeClr>
-            </a:solidFill>
-          </a:ln>
-          <a:effectLst/>
-        </p:spPr>
-        <p:style>
-          <a:lnRef idx="1">
-            <a:schemeClr val="accent6"/>
-          </a:lnRef>
-          <a:fillRef idx="2">
-            <a:schemeClr val="accent6"/>
-          </a:fillRef>
-          <a:effectRef idx="1">
-            <a:schemeClr val="accent6"/>
-          </a:effectRef>
-          <a:fontRef idx="minor">
-            <a:schemeClr val="dk1"/>
-          </a:fontRef>
-        </p:style>
-        <p:txBody>
-          <a:bodyPr lIns="91428" tIns="45714" rIns="91428" bIns="45714" rtlCol="0" anchor="ctr"/>
-          <a:lstStyle/>
-          <a:p>
-            <a:endParaRPr kumimoji="1" lang="ja-JP" altLang="en-US" sz="2400" dirty="0">
-              <a:latin typeface="HG丸ｺﾞｼｯｸM-PRO" panose="020F0600000000000000" pitchFamily="50" charset="-128"/>
-              <a:ea typeface="HG丸ｺﾞｼｯｸM-PRO" panose="020F0600000000000000" pitchFamily="50" charset="-128"/>
-            </a:endParaRPr>
-          </a:p>
-        </p:txBody>
-      </p:sp>
-      <p:grpSp>
-        <p:nvGrpSpPr>
-          <p:cNvPr id="88" name="グループ化 87"/>
-          <p:cNvGrpSpPr/>
-          <p:nvPr/>
-        </p:nvGrpSpPr>
-        <p:grpSpPr>
-          <a:xfrm>
-            <a:off x="6750969" y="6153879"/>
-            <a:ext cx="1731068" cy="289332"/>
-            <a:chOff x="108961" y="822433"/>
-            <a:chExt cx="323624" cy="289332"/>
-          </a:xfrm>
-        </p:grpSpPr>
-        <p:sp>
-          <p:nvSpPr>
-            <p:cNvPr id="89" name="正方形/長方形 88"/>
-            <p:cNvSpPr/>
-            <p:nvPr/>
-          </p:nvSpPr>
-          <p:spPr>
-            <a:xfrm>
-              <a:off x="108961" y="822433"/>
-              <a:ext cx="311480" cy="289332"/>
-            </a:xfrm>
-            <a:prstGeom prst="rect">
-              <a:avLst/>
-            </a:prstGeom>
-            <a:ln w="19050">
-              <a:solidFill>
-                <a:schemeClr val="accent3">
-                  <a:lumMod val="75000"/>
-                </a:schemeClr>
-              </a:solidFill>
-            </a:ln>
-          </p:spPr>
-          <p:style>
-            <a:lnRef idx="1">
-              <a:schemeClr val="accent3"/>
-            </a:lnRef>
-            <a:fillRef idx="2">
-              <a:schemeClr val="accent3"/>
-            </a:fillRef>
-            <a:effectRef idx="1">
-              <a:schemeClr val="accent3"/>
-            </a:effectRef>
-            <a:fontRef idx="minor">
-              <a:schemeClr val="dk1"/>
-            </a:fontRef>
-          </p:style>
-          <p:txBody>
-            <a:bodyPr lIns="91428" tIns="45714" rIns="91428" bIns="45714" rtlCol="0" anchor="ctr"/>
-            <a:lstStyle/>
-            <a:p>
-              <a:pPr algn="ctr"/>
-              <a:endParaRPr kumimoji="1" lang="ja-JP" altLang="en-US" sz="2400" dirty="0">
-                <a:latin typeface="HG丸ｺﾞｼｯｸM-PRO" panose="020F0600000000000000" pitchFamily="50" charset="-128"/>
-                <a:ea typeface="HG丸ｺﾞｼｯｸM-PRO" panose="020F0600000000000000" pitchFamily="50" charset="-128"/>
-              </a:endParaRPr>
-            </a:p>
-          </p:txBody>
-        </p:sp>
-        <p:sp>
-          <p:nvSpPr>
-            <p:cNvPr id="90" name="テキスト ボックス 89"/>
-            <p:cNvSpPr txBox="1"/>
-            <p:nvPr/>
-          </p:nvSpPr>
-          <p:spPr>
-            <a:xfrm>
-              <a:off x="113109" y="878200"/>
-              <a:ext cx="319476" cy="215444"/>
-            </a:xfrm>
-            <a:prstGeom prst="rect">
-              <a:avLst/>
-            </a:prstGeom>
-            <a:noFill/>
-          </p:spPr>
-          <p:txBody>
-            <a:bodyPr wrap="square" lIns="0" tIns="0" rIns="0" bIns="0" rtlCol="0">
-              <a:spAutoFit/>
-            </a:bodyPr>
-            <a:lstStyle/>
-            <a:p>
-              <a:r>
-                <a:rPr kumimoji="1" lang="ja-JP" altLang="en-US" sz="1400" dirty="0" smtClean="0">
-                  <a:latin typeface="HG丸ｺﾞｼｯｸM-PRO" panose="020F0600000000000000" pitchFamily="50" charset="-128"/>
-                  <a:ea typeface="HG丸ｺﾞｼｯｸM-PRO" panose="020F0600000000000000" pitchFamily="50" charset="-128"/>
-                </a:rPr>
-                <a:t>　</a:t>
-              </a:r>
-              <a:r>
-                <a:rPr kumimoji="1" lang="en-US" altLang="ja-JP" sz="1400" dirty="0" smtClean="0">
-                  <a:latin typeface="HG丸ｺﾞｼｯｸM-PRO" panose="020F0600000000000000" pitchFamily="50" charset="-128"/>
-                  <a:ea typeface="HG丸ｺﾞｼｯｸM-PRO" panose="020F0600000000000000" pitchFamily="50" charset="-128"/>
-                </a:rPr>
-                <a:t>1.5</a:t>
-              </a:r>
-              <a:r>
-                <a:rPr kumimoji="1" lang="ja-JP" altLang="en-US" sz="1400" dirty="0" smtClean="0">
-                  <a:latin typeface="HG丸ｺﾞｼｯｸM-PRO" panose="020F0600000000000000" pitchFamily="50" charset="-128"/>
-                  <a:ea typeface="HG丸ｺﾞｼｯｸM-PRO" panose="020F0600000000000000" pitchFamily="50" charset="-128"/>
-                </a:rPr>
-                <a:t> 概念モデル</a:t>
-              </a:r>
-              <a:endParaRPr kumimoji="1" lang="ja-JP" altLang="en-US" sz="1400" dirty="0">
-                <a:latin typeface="HG丸ｺﾞｼｯｸM-PRO" panose="020F0600000000000000" pitchFamily="50" charset="-128"/>
-                <a:ea typeface="HG丸ｺﾞｼｯｸM-PRO" panose="020F0600000000000000" pitchFamily="50" charset="-128"/>
-              </a:endParaRPr>
-            </a:p>
-          </p:txBody>
-        </p:sp>
-      </p:grpSp>
-      <p:sp>
-        <p:nvSpPr>
           <p:cNvPr id="94" name="テキスト ボックス 93"/>
           <p:cNvSpPr txBox="1"/>
           <p:nvPr/>
@@ -6777,7 +6631,7 @@
         <p:spPr>
           <a:xfrm>
             <a:off x="1907324" y="6190389"/>
-            <a:ext cx="4703746" cy="234286"/>
+            <a:ext cx="3430503" cy="395869"/>
           </a:xfrm>
           <a:prstGeom prst="rect">
             <a:avLst/>
@@ -6796,7 +6650,42 @@
                 <a:latin typeface="HG丸ｺﾞｼｯｸM-PRO" panose="020F0600000000000000" pitchFamily="50" charset="-128"/>
                 <a:ea typeface="HG丸ｺﾞｼｯｸM-PRO" panose="020F0600000000000000" pitchFamily="50" charset="-128"/>
               </a:rPr>
-              <a:t>走行目標の実現およびリスク回避のために必要な機能をリストアップした。</a:t>
+              <a:t>走行目標の実現およびリスク回避の</a:t>
+            </a:r>
+            <a:r>
+              <a:rPr lang="ja-JP" altLang="en-US" sz="1050" smtClean="0">
+                <a:latin typeface="HG丸ｺﾞｼｯｸM-PRO" panose="020F0600000000000000" pitchFamily="50" charset="-128"/>
+                <a:ea typeface="HG丸ｺﾞｼｯｸM-PRO" panose="020F0600000000000000" pitchFamily="50" charset="-128"/>
+              </a:rPr>
+              <a:t>ため</a:t>
+            </a:r>
+            <a:r>
+              <a:rPr lang="ja-JP" altLang="en-US" sz="1050" smtClean="0">
+                <a:latin typeface="HG丸ｺﾞｼｯｸM-PRO" panose="020F0600000000000000" pitchFamily="50" charset="-128"/>
+                <a:ea typeface="HG丸ｺﾞｼｯｸM-PRO" panose="020F0600000000000000" pitchFamily="50" charset="-128"/>
+              </a:rPr>
+              <a:t>に</a:t>
+            </a:r>
+            <a:endParaRPr lang="en-US" altLang="ja-JP" sz="1050">
+              <a:latin typeface="HG丸ｺﾞｼｯｸM-PRO" panose="020F0600000000000000" pitchFamily="50" charset="-128"/>
+              <a:ea typeface="HG丸ｺﾞｼｯｸM-PRO" panose="020F0600000000000000" pitchFamily="50" charset="-128"/>
+            </a:endParaRPr>
+          </a:p>
+          <a:p>
+            <a:pPr marL="177800"/>
+            <a:r>
+              <a:rPr lang="ja-JP" altLang="en-US" sz="1050" smtClean="0">
+                <a:latin typeface="HG丸ｺﾞｼｯｸM-PRO" panose="020F0600000000000000" pitchFamily="50" charset="-128"/>
+                <a:ea typeface="HG丸ｺﾞｼｯｸM-PRO" panose="020F0600000000000000" pitchFamily="50" charset="-128"/>
+              </a:rPr>
+              <a:t>必要</a:t>
+            </a:r>
+            <a:r>
+              <a:rPr lang="ja-JP" altLang="en-US" sz="1050" dirty="0" smtClean="0">
+                <a:latin typeface="HG丸ｺﾞｼｯｸM-PRO" panose="020F0600000000000000" pitchFamily="50" charset="-128"/>
+                <a:ea typeface="HG丸ｺﾞｼｯｸM-PRO" panose="020F0600000000000000" pitchFamily="50" charset="-128"/>
+              </a:rPr>
+              <a:t>な機能をリストアップした。</a:t>
             </a:r>
             <a:endParaRPr kumimoji="1" lang="ja-JP" altLang="en-US" sz="1050" dirty="0">
               <a:latin typeface="HG丸ｺﾞｼｯｸM-PRO" panose="020F0600000000000000" pitchFamily="50" charset="-128"/>
@@ -6813,7 +6702,7 @@
         </p:nvSpPr>
         <p:spPr>
           <a:xfrm>
-            <a:off x="3541873" y="6652121"/>
+            <a:off x="189839" y="8634941"/>
             <a:ext cx="2496616" cy="719034"/>
           </a:xfrm>
           <a:prstGeom prst="rect">
@@ -6891,7 +6780,7 @@
         </p:nvSpPr>
         <p:spPr>
           <a:xfrm>
-            <a:off x="3555704" y="7464843"/>
+            <a:off x="2860667" y="6686430"/>
             <a:ext cx="2482785" cy="719034"/>
           </a:xfrm>
           <a:prstGeom prst="rect">
@@ -6970,81 +6859,13 @@
       </p:sp>
       <p:sp>
         <p:nvSpPr>
-          <p:cNvPr id="143" name="テキスト ボックス 142"/>
-          <p:cNvSpPr txBox="1"/>
-          <p:nvPr/>
-        </p:nvSpPr>
-        <p:spPr>
-          <a:xfrm>
-            <a:off x="403162" y="6652617"/>
-            <a:ext cx="2512024" cy="557451"/>
-          </a:xfrm>
-          <a:prstGeom prst="rect">
-            <a:avLst/>
-          </a:prstGeom>
-          <a:noFill/>
-          <a:ln w="19050">
-            <a:solidFill>
-              <a:schemeClr val="accent6"/>
-            </a:solidFill>
-          </a:ln>
-        </p:spPr>
-        <p:txBody>
-          <a:bodyPr wrap="square" lIns="36000" tIns="36000" rIns="36000" bIns="36000" rtlCol="0">
-            <a:spAutoFit/>
-          </a:bodyPr>
-          <a:lstStyle/>
-          <a:p>
-            <a:r>
-              <a:rPr lang="en-US" altLang="ja-JP" sz="1050" b="1" smtClean="0">
-                <a:solidFill>
-                  <a:srgbClr val="0000CC"/>
-                </a:solidFill>
-                <a:latin typeface="HG丸ｺﾞｼｯｸM-PRO" panose="020F0600000000000000" pitchFamily="50" charset="-128"/>
-                <a:ea typeface="HG丸ｺﾞｼｯｸM-PRO" panose="020F0600000000000000" pitchFamily="50" charset="-128"/>
-              </a:rPr>
-              <a:t>1.</a:t>
-            </a:r>
-            <a:r>
-              <a:rPr lang="ja-JP" altLang="en-US" sz="1050" b="1" smtClean="0">
-                <a:solidFill>
-                  <a:srgbClr val="0000CC"/>
-                </a:solidFill>
-                <a:latin typeface="HG丸ｺﾞｼｯｸM-PRO" panose="020F0600000000000000" pitchFamily="50" charset="-128"/>
-                <a:ea typeface="HG丸ｺﾞｼｯｸM-PRO" panose="020F0600000000000000" pitchFamily="50" charset="-128"/>
-              </a:rPr>
-              <a:t>スタートラインに自動で立つ</a:t>
-            </a:r>
-            <a:endParaRPr lang="en-US" altLang="ja-JP" sz="500" dirty="0" smtClean="0">
-              <a:latin typeface="HG丸ｺﾞｼｯｸM-PRO" panose="020F0600000000000000" pitchFamily="50" charset="-128"/>
-              <a:ea typeface="HG丸ｺﾞｼｯｸM-PRO" panose="020F0600000000000000" pitchFamily="50" charset="-128"/>
-            </a:endParaRPr>
-          </a:p>
-          <a:p>
-            <a:pPr marL="177800"/>
-            <a:r>
-              <a:rPr lang="ja-JP" altLang="en-US" sz="1050" smtClean="0">
-                <a:latin typeface="HG丸ｺﾞｼｯｸM-PRO" panose="020F0600000000000000" pitchFamily="50" charset="-128"/>
-                <a:ea typeface="HG丸ｺﾞｼｯｸM-PRO" panose="020F0600000000000000" pitchFamily="50" charset="-128"/>
-              </a:rPr>
-              <a:t>競技者はコースに置くだけでスタート位置に自動でつくようにする</a:t>
-            </a:r>
-            <a:endParaRPr kumimoji="1" lang="ja-JP" altLang="en-US" sz="1050" dirty="0">
-              <a:latin typeface="HG丸ｺﾞｼｯｸM-PRO" panose="020F0600000000000000" pitchFamily="50" charset="-128"/>
-              <a:ea typeface="HG丸ｺﾞｼｯｸM-PRO" panose="020F0600000000000000" pitchFamily="50" charset="-128"/>
-            </a:endParaRPr>
-          </a:p>
-        </p:txBody>
-      </p:sp>
-      <p:sp>
-        <p:nvSpPr>
           <p:cNvPr id="144" name="テキスト ボックス 143"/>
           <p:cNvSpPr txBox="1"/>
           <p:nvPr/>
         </p:nvSpPr>
         <p:spPr>
           <a:xfrm>
-            <a:off x="403570" y="7294933"/>
+            <a:off x="172166" y="6689157"/>
             <a:ext cx="2511208" cy="557451"/>
           </a:xfrm>
           <a:prstGeom prst="rect">
@@ -7098,2544 +6919,6 @@
               <a:t>競技者にスタート時の最適な初期位置をブザーで通知する</a:t>
             </a:r>
             <a:endParaRPr kumimoji="1" lang="ja-JP" altLang="en-US" sz="1050" dirty="0">
-              <a:latin typeface="HG丸ｺﾞｼｯｸM-PRO" panose="020F0600000000000000" pitchFamily="50" charset="-128"/>
-              <a:ea typeface="HG丸ｺﾞｼｯｸM-PRO" panose="020F0600000000000000" pitchFamily="50" charset="-128"/>
-            </a:endParaRPr>
-          </a:p>
-        </p:txBody>
-      </p:sp>
-      <p:grpSp>
-        <p:nvGrpSpPr>
-          <p:cNvPr id="243" name="グループ化 242"/>
-          <p:cNvGrpSpPr/>
-          <p:nvPr/>
-        </p:nvGrpSpPr>
-        <p:grpSpPr>
-          <a:xfrm>
-            <a:off x="6941844" y="8522041"/>
-            <a:ext cx="3782899" cy="770955"/>
-            <a:chOff x="8040347" y="6683250"/>
-            <a:chExt cx="3782899" cy="770955"/>
-          </a:xfrm>
-        </p:grpSpPr>
-        <p:sp>
-          <p:nvSpPr>
-            <p:cNvPr id="220" name="テキスト ボックス 219"/>
-            <p:cNvSpPr txBox="1"/>
-            <p:nvPr/>
-          </p:nvSpPr>
-          <p:spPr>
-            <a:xfrm>
-              <a:off x="8040347" y="6694713"/>
-              <a:ext cx="449555" cy="149647"/>
-            </a:xfrm>
-            <a:prstGeom prst="rect">
-              <a:avLst/>
-            </a:prstGeom>
-            <a:solidFill>
-              <a:schemeClr val="accent6">
-                <a:lumMod val="60000"/>
-                <a:lumOff val="40000"/>
-              </a:schemeClr>
-            </a:solidFill>
-            <a:ln w="9525">
-              <a:solidFill>
-                <a:schemeClr val="tx1"/>
-              </a:solidFill>
-            </a:ln>
-          </p:spPr>
-          <p:txBody>
-            <a:bodyPr wrap="square" lIns="36000" tIns="36000" rIns="36000" bIns="36000" rtlCol="0">
-              <a:spAutoFit/>
-            </a:bodyPr>
-            <a:lstStyle/>
-            <a:p>
-              <a:pPr algn="ctr"/>
-              <a:r>
-                <a:rPr kumimoji="1" lang="ja-JP" altLang="en-US" sz="500" dirty="0" smtClean="0">
-                  <a:latin typeface="HG丸ｺﾞｼｯｸM-PRO" panose="020F0600000000000000" pitchFamily="50" charset="-128"/>
-                  <a:ea typeface="HG丸ｺﾞｼｯｸM-PRO" panose="020F0600000000000000" pitchFamily="50" charset="-128"/>
-                </a:rPr>
-                <a:t>走行方法</a:t>
-              </a:r>
-              <a:endParaRPr kumimoji="1" lang="ja-JP" altLang="en-US" sz="500" dirty="0">
-                <a:latin typeface="HG丸ｺﾞｼｯｸM-PRO" panose="020F0600000000000000" pitchFamily="50" charset="-128"/>
-                <a:ea typeface="HG丸ｺﾞｼｯｸM-PRO" panose="020F0600000000000000" pitchFamily="50" charset="-128"/>
-              </a:endParaRPr>
-            </a:p>
-          </p:txBody>
-        </p:sp>
-        <p:sp>
-          <p:nvSpPr>
-            <p:cNvPr id="221" name="テキスト ボックス 220"/>
-            <p:cNvSpPr txBox="1"/>
-            <p:nvPr/>
-          </p:nvSpPr>
-          <p:spPr>
-            <a:xfrm>
-              <a:off x="8554823" y="6683250"/>
-              <a:ext cx="3268423" cy="195814"/>
-            </a:xfrm>
-            <a:prstGeom prst="rect">
-              <a:avLst/>
-            </a:prstGeom>
-            <a:noFill/>
-          </p:spPr>
-          <p:txBody>
-            <a:bodyPr wrap="square" lIns="36000" tIns="36000" rIns="36000" bIns="36000" rtlCol="0">
-              <a:spAutoFit/>
-            </a:bodyPr>
-            <a:lstStyle/>
-            <a:p>
-              <a:r>
-                <a:rPr lang="ja-JP" altLang="en-US" sz="800" dirty="0">
-                  <a:latin typeface="HG丸ｺﾞｼｯｸM-PRO" panose="020F0600000000000000" pitchFamily="50" charset="-128"/>
-                  <a:ea typeface="HG丸ｺﾞｼｯｸM-PRO" panose="020F0600000000000000" pitchFamily="50" charset="-128"/>
-                </a:rPr>
-                <a:t>走行</a:t>
-              </a:r>
-              <a:r>
-                <a:rPr lang="ja-JP" altLang="en-US" sz="800" dirty="0" smtClean="0">
-                  <a:latin typeface="HG丸ｺﾞｼｯｸM-PRO" panose="020F0600000000000000" pitchFamily="50" charset="-128"/>
-                  <a:ea typeface="HG丸ｺﾞｼｯｸM-PRO" panose="020F0600000000000000" pitchFamily="50" charset="-128"/>
-                </a:rPr>
-                <a:t>体の状態から各モーターの操作量を決定する。</a:t>
-              </a:r>
-              <a:endParaRPr lang="en-US" altLang="ja-JP" sz="800" dirty="0" smtClean="0">
-                <a:latin typeface="HG丸ｺﾞｼｯｸM-PRO" panose="020F0600000000000000" pitchFamily="50" charset="-128"/>
-                <a:ea typeface="HG丸ｺﾞｼｯｸM-PRO" panose="020F0600000000000000" pitchFamily="50" charset="-128"/>
-              </a:endParaRPr>
-            </a:p>
-          </p:txBody>
-        </p:sp>
-        <p:sp>
-          <p:nvSpPr>
-            <p:cNvPr id="223" name="テキスト ボックス 222"/>
-            <p:cNvSpPr txBox="1"/>
-            <p:nvPr/>
-          </p:nvSpPr>
-          <p:spPr>
-            <a:xfrm>
-              <a:off x="8040347" y="6928881"/>
-              <a:ext cx="449556" cy="149647"/>
-            </a:xfrm>
-            <a:prstGeom prst="rect">
-              <a:avLst/>
-            </a:prstGeom>
-            <a:solidFill>
-              <a:srgbClr val="CCFFCC"/>
-            </a:solidFill>
-            <a:ln w="9525">
-              <a:solidFill>
-                <a:schemeClr val="tx1"/>
-              </a:solidFill>
-            </a:ln>
-          </p:spPr>
-          <p:txBody>
-            <a:bodyPr wrap="square" lIns="36000" tIns="36000" rIns="36000" bIns="36000" rtlCol="0">
-              <a:spAutoFit/>
-            </a:bodyPr>
-            <a:lstStyle/>
-            <a:p>
-              <a:pPr algn="ctr"/>
-              <a:r>
-                <a:rPr lang="ja-JP" altLang="en-US" sz="500" dirty="0" smtClean="0">
-                  <a:latin typeface="HG丸ｺﾞｼｯｸM-PRO" panose="020F0600000000000000" pitchFamily="50" charset="-128"/>
-                  <a:ea typeface="HG丸ｺﾞｼｯｸM-PRO" panose="020F0600000000000000" pitchFamily="50" charset="-128"/>
-                </a:rPr>
-                <a:t>切換え条件</a:t>
-              </a:r>
-              <a:endParaRPr kumimoji="1" lang="ja-JP" altLang="en-US" sz="500" dirty="0">
-                <a:latin typeface="HG丸ｺﾞｼｯｸM-PRO" panose="020F0600000000000000" pitchFamily="50" charset="-128"/>
-                <a:ea typeface="HG丸ｺﾞｼｯｸM-PRO" panose="020F0600000000000000" pitchFamily="50" charset="-128"/>
-              </a:endParaRPr>
-            </a:p>
-          </p:txBody>
-        </p:sp>
-        <p:sp>
-          <p:nvSpPr>
-            <p:cNvPr id="224" name="テキスト ボックス 223"/>
-            <p:cNvSpPr txBox="1"/>
-            <p:nvPr/>
-          </p:nvSpPr>
-          <p:spPr>
-            <a:xfrm>
-              <a:off x="8561173" y="6922531"/>
-              <a:ext cx="1894331" cy="195814"/>
-            </a:xfrm>
-            <a:prstGeom prst="rect">
-              <a:avLst/>
-            </a:prstGeom>
-            <a:noFill/>
-          </p:spPr>
-          <p:txBody>
-            <a:bodyPr wrap="square" lIns="36000" tIns="36000" rIns="36000" bIns="36000" rtlCol="0">
-              <a:spAutoFit/>
-            </a:bodyPr>
-            <a:lstStyle/>
-            <a:p>
-              <a:r>
-                <a:rPr lang="ja-JP" altLang="en-US" sz="800" dirty="0">
-                  <a:latin typeface="HG丸ｺﾞｼｯｸM-PRO" panose="020F0600000000000000" pitchFamily="50" charset="-128"/>
-                  <a:ea typeface="HG丸ｺﾞｼｯｸM-PRO" panose="020F0600000000000000" pitchFamily="50" charset="-128"/>
-                </a:rPr>
-                <a:t>次</a:t>
-              </a:r>
-              <a:r>
-                <a:rPr lang="ja-JP" altLang="en-US" sz="800" dirty="0" smtClean="0">
-                  <a:latin typeface="HG丸ｺﾞｼｯｸM-PRO" panose="020F0600000000000000" pitchFamily="50" charset="-128"/>
-                  <a:ea typeface="HG丸ｺﾞｼｯｸM-PRO" panose="020F0600000000000000" pitchFamily="50" charset="-128"/>
-                </a:rPr>
-                <a:t>の走行戦術へ切り替えるための条件。</a:t>
-              </a:r>
-              <a:endParaRPr kumimoji="1" lang="ja-JP" altLang="en-US" sz="800" dirty="0">
-                <a:latin typeface="HG丸ｺﾞｼｯｸM-PRO" panose="020F0600000000000000" pitchFamily="50" charset="-128"/>
-                <a:ea typeface="HG丸ｺﾞｼｯｸM-PRO" panose="020F0600000000000000" pitchFamily="50" charset="-128"/>
-              </a:endParaRPr>
-            </a:p>
-          </p:txBody>
-        </p:sp>
-        <p:sp>
-          <p:nvSpPr>
-            <p:cNvPr id="226" name="テキスト ボックス 225"/>
-            <p:cNvSpPr txBox="1"/>
-            <p:nvPr/>
-          </p:nvSpPr>
-          <p:spPr>
-            <a:xfrm>
-              <a:off x="8554823" y="7135281"/>
-              <a:ext cx="2410365" cy="318924"/>
-            </a:xfrm>
-            <a:prstGeom prst="rect">
-              <a:avLst/>
-            </a:prstGeom>
-            <a:noFill/>
-          </p:spPr>
-          <p:txBody>
-            <a:bodyPr wrap="square" lIns="36000" tIns="36000" rIns="36000" bIns="36000" rtlCol="0">
-              <a:spAutoFit/>
-            </a:bodyPr>
-            <a:lstStyle/>
-            <a:p>
-              <a:r>
-                <a:rPr kumimoji="1" lang="ja-JP" altLang="en-US" sz="800" b="1" dirty="0" smtClean="0">
-                  <a:latin typeface="HG丸ｺﾞｼｯｸM-PRO" panose="020F0600000000000000" pitchFamily="50" charset="-128"/>
-                  <a:ea typeface="HG丸ｺﾞｼｯｸM-PRO" panose="020F0600000000000000" pitchFamily="50" charset="-128"/>
-                </a:rPr>
-                <a:t>走行戦術</a:t>
-              </a:r>
-              <a:r>
-                <a:rPr kumimoji="1" lang="en-US" altLang="ja-JP" sz="800" dirty="0" smtClean="0">
-                  <a:latin typeface="HG丸ｺﾞｼｯｸM-PRO" panose="020F0600000000000000" pitchFamily="50" charset="-128"/>
-                  <a:ea typeface="HG丸ｺﾞｼｯｸM-PRO" panose="020F0600000000000000" pitchFamily="50" charset="-128"/>
-                </a:rPr>
-                <a:t>…</a:t>
-              </a:r>
-              <a:r>
-                <a:rPr kumimoji="1" lang="ja-JP" altLang="en-US" sz="800" dirty="0" smtClean="0">
-                  <a:latin typeface="HG丸ｺﾞｼｯｸM-PRO" panose="020F0600000000000000" pitchFamily="50" charset="-128"/>
-                  <a:ea typeface="HG丸ｺﾞｼｯｸM-PRO" panose="020F0600000000000000" pitchFamily="50" charset="-128"/>
-                </a:rPr>
-                <a:t>走行方法と切換え条件との対からなる。</a:t>
-              </a:r>
-              <a:endParaRPr kumimoji="1" lang="en-US" altLang="ja-JP" sz="800" dirty="0" smtClean="0">
-                <a:latin typeface="HG丸ｺﾞｼｯｸM-PRO" panose="020F0600000000000000" pitchFamily="50" charset="-128"/>
-                <a:ea typeface="HG丸ｺﾞｼｯｸM-PRO" panose="020F0600000000000000" pitchFamily="50" charset="-128"/>
-              </a:endParaRPr>
-            </a:p>
-            <a:p>
-              <a:r>
-                <a:rPr lang="ja-JP" altLang="en-US" sz="800" dirty="0" smtClean="0">
-                  <a:latin typeface="HG丸ｺﾞｼｯｸM-PRO" panose="020F0600000000000000" pitchFamily="50" charset="-128"/>
-                  <a:ea typeface="HG丸ｺﾞｼｯｸM-PRO" panose="020F0600000000000000" pitchFamily="50" charset="-128"/>
-                </a:rPr>
-                <a:t>               </a:t>
-              </a:r>
-              <a:r>
-                <a:rPr lang="ja-JP" altLang="en-US" sz="800" b="1" dirty="0" smtClean="0">
-                  <a:latin typeface="HG丸ｺﾞｼｯｸM-PRO" panose="020F0600000000000000" pitchFamily="50" charset="-128"/>
-                  <a:ea typeface="HG丸ｺﾞｼｯｸM-PRO" panose="020F0600000000000000" pitchFamily="50" charset="-128"/>
-                </a:rPr>
-                <a:t>走行戦略</a:t>
-              </a:r>
-              <a:r>
-                <a:rPr lang="ja-JP" altLang="en-US" sz="800" dirty="0" smtClean="0">
-                  <a:latin typeface="HG丸ｺﾞｼｯｸM-PRO" panose="020F0600000000000000" pitchFamily="50" charset="-128"/>
-                  <a:ea typeface="HG丸ｺﾞｼｯｸM-PRO" panose="020F0600000000000000" pitchFamily="50" charset="-128"/>
-                </a:rPr>
-                <a:t>の構成単位。</a:t>
-              </a:r>
-              <a:endParaRPr kumimoji="1" lang="ja-JP" altLang="en-US" sz="800" dirty="0">
-                <a:latin typeface="HG丸ｺﾞｼｯｸM-PRO" panose="020F0600000000000000" pitchFamily="50" charset="-128"/>
-                <a:ea typeface="HG丸ｺﾞｼｯｸM-PRO" panose="020F0600000000000000" pitchFamily="50" charset="-128"/>
-              </a:endParaRPr>
-            </a:p>
-          </p:txBody>
-        </p:sp>
-        <p:pic>
-          <p:nvPicPr>
-            <p:cNvPr id="231" name="Picture 8"/>
-            <p:cNvPicPr>
-              <a:picLocks noChangeAspect="1" noChangeArrowheads="1"/>
-            </p:cNvPicPr>
-            <p:nvPr/>
-          </p:nvPicPr>
-          <p:blipFill>
-            <a:blip r:embed="rId3" cstate="print">
-              <a:extLst>
-                <a:ext uri="{28A0092B-C50C-407E-A947-70E740481C1C}">
-                  <a14:useLocalDpi xmlns:a14="http://schemas.microsoft.com/office/drawing/2010/main" val="0"/>
-                </a:ext>
-              </a:extLst>
-            </a:blip>
-            <a:srcRect/>
-            <a:stretch>
-              <a:fillRect/>
-            </a:stretch>
-          </p:blipFill>
-          <p:spPr bwMode="auto">
-            <a:xfrm>
-              <a:off x="8078034" y="7142781"/>
-              <a:ext cx="374181" cy="258792"/>
-            </a:xfrm>
-            <a:prstGeom prst="rect">
-              <a:avLst/>
-            </a:prstGeom>
-            <a:noFill/>
-            <a:ln>
-              <a:noFill/>
-            </a:ln>
-            <a:effectLst/>
-            <a:extLst>
-              <a:ext uri="{909E8E84-426E-40DD-AFC4-6F175D3DCCD1}">
-                <a14:hiddenFill xmlns:a14="http://schemas.microsoft.com/office/drawing/2010/main">
-                  <a:solidFill>
-                    <a:schemeClr val="accent1"/>
-                  </a:solidFill>
-                </a14:hiddenFill>
-              </a:ext>
-              <a:ext uri="{91240B29-F687-4F45-9708-019B960494DF}">
-                <a14:hiddenLine xmlns:a14="http://schemas.microsoft.com/office/drawing/2010/main" w="9525">
-                  <a:solidFill>
-                    <a:schemeClr val="tx1"/>
-                  </a:solidFill>
-                  <a:miter lim="800000"/>
-                  <a:headEnd/>
-                  <a:tailEnd/>
-                </a14:hiddenLine>
-              </a:ext>
-              <a:ext uri="{AF507438-7753-43E0-B8FC-AC1667EBCBE1}">
-                <a14:hiddenEffects xmlns:a14="http://schemas.microsoft.com/office/drawing/2010/main">
-                  <a:effectLst>
-                    <a:outerShdw dist="35921" dir="2700000" algn="ctr" rotWithShape="0">
-                      <a:schemeClr val="bg2"/>
-                    </a:outerShdw>
-                  </a:effectLst>
-                </a14:hiddenEffects>
-              </a:ext>
-            </a:extLst>
-          </p:spPr>
-        </p:pic>
-      </p:grpSp>
-      <p:sp>
-        <p:nvSpPr>
-          <p:cNvPr id="183" name="角丸四角形 182"/>
-          <p:cNvSpPr/>
-          <p:nvPr/>
-        </p:nvSpPr>
-        <p:spPr>
-          <a:xfrm>
-            <a:off x="6890869" y="7483837"/>
-            <a:ext cx="2603500" cy="958850"/>
-          </a:xfrm>
-          <a:prstGeom prst="roundRect">
-            <a:avLst/>
-          </a:prstGeom>
-          <a:ln/>
-        </p:spPr>
-        <p:style>
-          <a:lnRef idx="2">
-            <a:schemeClr val="accent3"/>
-          </a:lnRef>
-          <a:fillRef idx="1">
-            <a:schemeClr val="lt1"/>
-          </a:fillRef>
-          <a:effectRef idx="0">
-            <a:schemeClr val="accent3"/>
-          </a:effectRef>
-          <a:fontRef idx="minor">
-            <a:schemeClr val="dk1"/>
-          </a:fontRef>
-        </p:style>
-        <p:txBody>
-          <a:bodyPr rot="0" spcFirstLastPara="0" vertOverflow="overflow" horzOverflow="overflow" vert="horz" wrap="square" lIns="91428" tIns="45714" rIns="91428" bIns="45714" numCol="1" spcCol="0" rtlCol="0" fromWordArt="0" anchor="ctr" anchorCtr="0" forceAA="0" compatLnSpc="1">
-            <a:prstTxWarp prst="textNoShape">
-              <a:avLst/>
-            </a:prstTxWarp>
-            <a:noAutofit/>
-          </a:bodyPr>
-          <a:lstStyle/>
-          <a:p>
-            <a:pPr algn="ctr"/>
-            <a:endParaRPr kumimoji="1" lang="ja-JP" altLang="en-US" sz="2400" dirty="0">
-              <a:latin typeface="HG丸ｺﾞｼｯｸM-PRO" panose="020F0600000000000000" pitchFamily="50" charset="-128"/>
-              <a:ea typeface="HG丸ｺﾞｼｯｸM-PRO" panose="020F0600000000000000" pitchFamily="50" charset="-128"/>
-            </a:endParaRPr>
-          </a:p>
-        </p:txBody>
-      </p:sp>
-      <p:pic>
-        <p:nvPicPr>
-          <p:cNvPr id="178" name="Picture 8"/>
-          <p:cNvPicPr>
-            <a:picLocks noChangeAspect="1" noChangeArrowheads="1"/>
-          </p:cNvPicPr>
-          <p:nvPr/>
-        </p:nvPicPr>
-        <p:blipFill>
-          <a:blip r:embed="rId3" cstate="print">
-            <a:extLst>
-              <a:ext uri="{28A0092B-C50C-407E-A947-70E740481C1C}">
-                <a14:useLocalDpi xmlns:a14="http://schemas.microsoft.com/office/drawing/2010/main" val="0"/>
-              </a:ext>
-            </a:extLst>
-          </a:blip>
-          <a:srcRect/>
-          <a:stretch>
-            <a:fillRect/>
-          </a:stretch>
-        </p:blipFill>
-        <p:spPr bwMode="auto">
-          <a:xfrm>
-            <a:off x="7232561" y="7936742"/>
-            <a:ext cx="463130" cy="320311"/>
-          </a:xfrm>
-          <a:prstGeom prst="rect">
-            <a:avLst/>
-          </a:prstGeom>
-          <a:noFill/>
-          <a:ln>
-            <a:noFill/>
-          </a:ln>
-          <a:effectLst/>
-          <a:extLst>
-            <a:ext uri="{909E8E84-426E-40DD-AFC4-6F175D3DCCD1}">
-              <a14:hiddenFill xmlns:a14="http://schemas.microsoft.com/office/drawing/2010/main">
-                <a:solidFill>
-                  <a:schemeClr val="accent1"/>
-                </a:solidFill>
-              </a14:hiddenFill>
-            </a:ext>
-            <a:ext uri="{91240B29-F687-4F45-9708-019B960494DF}">
-              <a14:hiddenLine xmlns:a14="http://schemas.microsoft.com/office/drawing/2010/main" w="9525">
-                <a:solidFill>
-                  <a:schemeClr val="tx1"/>
-                </a:solidFill>
-                <a:miter lim="800000"/>
-                <a:headEnd/>
-                <a:tailEnd/>
-              </a14:hiddenLine>
-            </a:ext>
-            <a:ext uri="{AF507438-7753-43E0-B8FC-AC1667EBCBE1}">
-              <a14:hiddenEffects xmlns:a14="http://schemas.microsoft.com/office/drawing/2010/main">
-                <a:effectLst>
-                  <a:outerShdw dist="35921" dir="2700000" algn="ctr" rotWithShape="0">
-                    <a:schemeClr val="bg2"/>
-                  </a:outerShdw>
-                </a:effectLst>
-              </a14:hiddenEffects>
-            </a:ext>
-          </a:extLst>
-        </p:spPr>
-      </p:pic>
-      <p:pic>
-        <p:nvPicPr>
-          <p:cNvPr id="228" name="Picture 8"/>
-          <p:cNvPicPr>
-            <a:picLocks noChangeAspect="1" noChangeArrowheads="1"/>
-          </p:cNvPicPr>
-          <p:nvPr/>
-        </p:nvPicPr>
-        <p:blipFill>
-          <a:blip r:embed="rId3" cstate="print">
-            <a:extLst>
-              <a:ext uri="{28A0092B-C50C-407E-A947-70E740481C1C}">
-                <a14:useLocalDpi xmlns:a14="http://schemas.microsoft.com/office/drawing/2010/main" val="0"/>
-              </a:ext>
-            </a:extLst>
-          </a:blip>
-          <a:srcRect/>
-          <a:stretch>
-            <a:fillRect/>
-          </a:stretch>
-        </p:blipFill>
-        <p:spPr bwMode="auto">
-          <a:xfrm>
-            <a:off x="7695971" y="7936742"/>
-            <a:ext cx="463130" cy="320311"/>
-          </a:xfrm>
-          <a:prstGeom prst="rect">
-            <a:avLst/>
-          </a:prstGeom>
-          <a:noFill/>
-          <a:ln>
-            <a:noFill/>
-          </a:ln>
-          <a:effectLst/>
-          <a:extLst>
-            <a:ext uri="{909E8E84-426E-40DD-AFC4-6F175D3DCCD1}">
-              <a14:hiddenFill xmlns:a14="http://schemas.microsoft.com/office/drawing/2010/main">
-                <a:solidFill>
-                  <a:schemeClr val="accent1"/>
-                </a:solidFill>
-              </a14:hiddenFill>
-            </a:ext>
-            <a:ext uri="{91240B29-F687-4F45-9708-019B960494DF}">
-              <a14:hiddenLine xmlns:a14="http://schemas.microsoft.com/office/drawing/2010/main" w="9525">
-                <a:solidFill>
-                  <a:schemeClr val="tx1"/>
-                </a:solidFill>
-                <a:miter lim="800000"/>
-                <a:headEnd/>
-                <a:tailEnd/>
-              </a14:hiddenLine>
-            </a:ext>
-            <a:ext uri="{AF507438-7753-43E0-B8FC-AC1667EBCBE1}">
-              <a14:hiddenEffects xmlns:a14="http://schemas.microsoft.com/office/drawing/2010/main">
-                <a:effectLst>
-                  <a:outerShdw dist="35921" dir="2700000" algn="ctr" rotWithShape="0">
-                    <a:schemeClr val="bg2"/>
-                  </a:outerShdw>
-                </a:effectLst>
-              </a14:hiddenEffects>
-            </a:ext>
-          </a:extLst>
-        </p:spPr>
-      </p:pic>
-      <p:pic>
-        <p:nvPicPr>
-          <p:cNvPr id="229" name="Picture 8"/>
-          <p:cNvPicPr>
-            <a:picLocks noChangeAspect="1" noChangeArrowheads="1"/>
-          </p:cNvPicPr>
-          <p:nvPr/>
-        </p:nvPicPr>
-        <p:blipFill>
-          <a:blip r:embed="rId3" cstate="print">
-            <a:extLst>
-              <a:ext uri="{28A0092B-C50C-407E-A947-70E740481C1C}">
-                <a14:useLocalDpi xmlns:a14="http://schemas.microsoft.com/office/drawing/2010/main" val="0"/>
-              </a:ext>
-            </a:extLst>
-          </a:blip>
-          <a:srcRect/>
-          <a:stretch>
-            <a:fillRect/>
-          </a:stretch>
-        </p:blipFill>
-        <p:spPr bwMode="auto">
-          <a:xfrm>
-            <a:off x="8159381" y="7936742"/>
-            <a:ext cx="463130" cy="320311"/>
-          </a:xfrm>
-          <a:prstGeom prst="rect">
-            <a:avLst/>
-          </a:prstGeom>
-          <a:noFill/>
-          <a:ln>
-            <a:noFill/>
-          </a:ln>
-          <a:effectLst/>
-          <a:extLst>
-            <a:ext uri="{909E8E84-426E-40DD-AFC4-6F175D3DCCD1}">
-              <a14:hiddenFill xmlns:a14="http://schemas.microsoft.com/office/drawing/2010/main">
-                <a:solidFill>
-                  <a:schemeClr val="accent1"/>
-                </a:solidFill>
-              </a14:hiddenFill>
-            </a:ext>
-            <a:ext uri="{91240B29-F687-4F45-9708-019B960494DF}">
-              <a14:hiddenLine xmlns:a14="http://schemas.microsoft.com/office/drawing/2010/main" w="9525">
-                <a:solidFill>
-                  <a:schemeClr val="tx1"/>
-                </a:solidFill>
-                <a:miter lim="800000"/>
-                <a:headEnd/>
-                <a:tailEnd/>
-              </a14:hiddenLine>
-            </a:ext>
-            <a:ext uri="{AF507438-7753-43E0-B8FC-AC1667EBCBE1}">
-              <a14:hiddenEffects xmlns:a14="http://schemas.microsoft.com/office/drawing/2010/main">
-                <a:effectLst>
-                  <a:outerShdw dist="35921" dir="2700000" algn="ctr" rotWithShape="0">
-                    <a:schemeClr val="bg2"/>
-                  </a:outerShdw>
-                </a:effectLst>
-              </a14:hiddenEffects>
-            </a:ext>
-          </a:extLst>
-        </p:spPr>
-      </p:pic>
-      <p:pic>
-        <p:nvPicPr>
-          <p:cNvPr id="230" name="Picture 8"/>
-          <p:cNvPicPr>
-            <a:picLocks noChangeAspect="1" noChangeArrowheads="1"/>
-          </p:cNvPicPr>
-          <p:nvPr/>
-        </p:nvPicPr>
-        <p:blipFill>
-          <a:blip r:embed="rId3" cstate="print">
-            <a:extLst>
-              <a:ext uri="{28A0092B-C50C-407E-A947-70E740481C1C}">
-                <a14:useLocalDpi xmlns:a14="http://schemas.microsoft.com/office/drawing/2010/main" val="0"/>
-              </a:ext>
-            </a:extLst>
-          </a:blip>
-          <a:srcRect/>
-          <a:stretch>
-            <a:fillRect/>
-          </a:stretch>
-        </p:blipFill>
-        <p:spPr bwMode="auto">
-          <a:xfrm>
-            <a:off x="8622791" y="7936742"/>
-            <a:ext cx="463130" cy="320311"/>
-          </a:xfrm>
-          <a:prstGeom prst="rect">
-            <a:avLst/>
-          </a:prstGeom>
-          <a:noFill/>
-          <a:ln>
-            <a:noFill/>
-          </a:ln>
-          <a:effectLst/>
-          <a:extLst>
-            <a:ext uri="{909E8E84-426E-40DD-AFC4-6F175D3DCCD1}">
-              <a14:hiddenFill xmlns:a14="http://schemas.microsoft.com/office/drawing/2010/main">
-                <a:solidFill>
-                  <a:schemeClr val="accent1"/>
-                </a:solidFill>
-              </a14:hiddenFill>
-            </a:ext>
-            <a:ext uri="{91240B29-F687-4F45-9708-019B960494DF}">
-              <a14:hiddenLine xmlns:a14="http://schemas.microsoft.com/office/drawing/2010/main" w="9525">
-                <a:solidFill>
-                  <a:schemeClr val="tx1"/>
-                </a:solidFill>
-                <a:miter lim="800000"/>
-                <a:headEnd/>
-                <a:tailEnd/>
-              </a14:hiddenLine>
-            </a:ext>
-            <a:ext uri="{AF507438-7753-43E0-B8FC-AC1667EBCBE1}">
-              <a14:hiddenEffects xmlns:a14="http://schemas.microsoft.com/office/drawing/2010/main">
-                <a:effectLst>
-                  <a:outerShdw dist="35921" dir="2700000" algn="ctr" rotWithShape="0">
-                    <a:schemeClr val="bg2"/>
-                  </a:outerShdw>
-                </a:effectLst>
-              </a14:hiddenEffects>
-            </a:ext>
-          </a:extLst>
-        </p:spPr>
-      </p:pic>
-      <p:cxnSp>
-        <p:nvCxnSpPr>
-          <p:cNvPr id="181" name="直線コネクタ 180"/>
-          <p:cNvCxnSpPr/>
-          <p:nvPr/>
-        </p:nvCxnSpPr>
-        <p:spPr>
-          <a:xfrm>
-            <a:off x="6969348" y="8096897"/>
-            <a:ext cx="241195" cy="0"/>
-          </a:xfrm>
-          <a:prstGeom prst="line">
-            <a:avLst/>
-          </a:prstGeom>
-          <a:ln w="19050">
-            <a:solidFill>
-              <a:schemeClr val="tx1"/>
-            </a:solidFill>
-            <a:prstDash val="sysDot"/>
-          </a:ln>
-        </p:spPr>
-        <p:style>
-          <a:lnRef idx="1">
-            <a:schemeClr val="accent1"/>
-          </a:lnRef>
-          <a:fillRef idx="0">
-            <a:schemeClr val="accent1"/>
-          </a:fillRef>
-          <a:effectRef idx="0">
-            <a:schemeClr val="accent1"/>
-          </a:effectRef>
-          <a:fontRef idx="minor">
-            <a:schemeClr val="tx1"/>
-          </a:fontRef>
-        </p:style>
-      </p:cxnSp>
-      <p:cxnSp>
-        <p:nvCxnSpPr>
-          <p:cNvPr id="237" name="直線コネクタ 236"/>
-          <p:cNvCxnSpPr/>
-          <p:nvPr/>
-        </p:nvCxnSpPr>
-        <p:spPr>
-          <a:xfrm>
-            <a:off x="9115807" y="8096897"/>
-            <a:ext cx="241195" cy="0"/>
-          </a:xfrm>
-          <a:prstGeom prst="line">
-            <a:avLst/>
-          </a:prstGeom>
-          <a:ln w="19050">
-            <a:solidFill>
-              <a:schemeClr val="tx1"/>
-            </a:solidFill>
-            <a:prstDash val="sysDot"/>
-          </a:ln>
-        </p:spPr>
-        <p:style>
-          <a:lnRef idx="1">
-            <a:schemeClr val="accent1"/>
-          </a:lnRef>
-          <a:fillRef idx="0">
-            <a:schemeClr val="accent1"/>
-          </a:fillRef>
-          <a:effectRef idx="0">
-            <a:schemeClr val="accent1"/>
-          </a:effectRef>
-          <a:fontRef idx="minor">
-            <a:schemeClr val="tx1"/>
-          </a:fontRef>
-        </p:style>
-      </p:cxnSp>
-      <p:sp>
-        <p:nvSpPr>
-          <p:cNvPr id="241" name="下矢印吹き出し 240"/>
-          <p:cNvSpPr/>
-          <p:nvPr/>
-        </p:nvSpPr>
-        <p:spPr>
-          <a:xfrm>
-            <a:off x="8121141" y="7621021"/>
-            <a:ext cx="453057" cy="282791"/>
-          </a:xfrm>
-          <a:prstGeom prst="downArrowCallout">
-            <a:avLst>
-              <a:gd name="adj1" fmla="val 32338"/>
-              <a:gd name="adj2" fmla="val 16169"/>
-              <a:gd name="adj3" fmla="val 25000"/>
-              <a:gd name="adj4" fmla="val 73808"/>
-            </a:avLst>
-          </a:prstGeom>
-          <a:solidFill>
-            <a:srgbClr val="66FF99"/>
-          </a:solidFill>
-          <a:ln w="9525">
-            <a:solidFill>
-              <a:schemeClr val="tx1"/>
-            </a:solidFill>
-          </a:ln>
-          <a:effectLst/>
-        </p:spPr>
-        <p:style>
-          <a:lnRef idx="1">
-            <a:schemeClr val="accent6"/>
-          </a:lnRef>
-          <a:fillRef idx="2">
-            <a:schemeClr val="accent6"/>
-          </a:fillRef>
-          <a:effectRef idx="1">
-            <a:schemeClr val="accent6"/>
-          </a:effectRef>
-          <a:fontRef idx="minor">
-            <a:schemeClr val="dk1"/>
-          </a:fontRef>
-        </p:style>
-        <p:txBody>
-          <a:bodyPr rot="0" spcFirstLastPara="0" vertOverflow="overflow" horzOverflow="overflow" vert="horz" wrap="square" lIns="36000" tIns="36000" rIns="36000" bIns="36000" numCol="1" spcCol="0" rtlCol="0" fromWordArt="0" anchor="ctr" anchorCtr="0" forceAA="0" compatLnSpc="1">
-            <a:prstTxWarp prst="textNoShape">
-              <a:avLst/>
-            </a:prstTxWarp>
-            <a:noAutofit/>
-          </a:bodyPr>
-          <a:lstStyle/>
-          <a:p>
-            <a:pPr algn="ctr"/>
-            <a:r>
-              <a:rPr kumimoji="1" lang="ja-JP" altLang="en-US" sz="500" dirty="0" smtClean="0">
-                <a:latin typeface="HG丸ｺﾞｼｯｸM-PRO" panose="020F0600000000000000" pitchFamily="50" charset="-128"/>
-                <a:ea typeface="HG丸ｺﾞｼｯｸM-PRO" panose="020F0600000000000000" pitchFamily="50" charset="-128"/>
-              </a:rPr>
-              <a:t>イテレーター</a:t>
-            </a:r>
-            <a:endParaRPr kumimoji="1" lang="ja-JP" altLang="en-US" sz="500" dirty="0">
-              <a:latin typeface="HG丸ｺﾞｼｯｸM-PRO" panose="020F0600000000000000" pitchFamily="50" charset="-128"/>
-              <a:ea typeface="HG丸ｺﾞｼｯｸM-PRO" panose="020F0600000000000000" pitchFamily="50" charset="-128"/>
-            </a:endParaRPr>
-          </a:p>
-        </p:txBody>
-      </p:sp>
-      <p:sp>
-        <p:nvSpPr>
-          <p:cNvPr id="242" name="右矢印 241"/>
-          <p:cNvSpPr/>
-          <p:nvPr/>
-        </p:nvSpPr>
-        <p:spPr>
-          <a:xfrm>
-            <a:off x="8604172" y="7652772"/>
-            <a:ext cx="228600" cy="135945"/>
-          </a:xfrm>
-          <a:prstGeom prst="rightArrow">
-            <a:avLst/>
-          </a:prstGeom>
-          <a:solidFill>
-            <a:srgbClr val="FF0000"/>
-          </a:solidFill>
-          <a:ln w="9525">
-            <a:solidFill>
-              <a:schemeClr val="tx1"/>
-            </a:solidFill>
-          </a:ln>
-          <a:effectLst/>
-        </p:spPr>
-        <p:style>
-          <a:lnRef idx="1">
-            <a:schemeClr val="accent6"/>
-          </a:lnRef>
-          <a:fillRef idx="2">
-            <a:schemeClr val="accent6"/>
-          </a:fillRef>
-          <a:effectRef idx="1">
-            <a:schemeClr val="accent6"/>
-          </a:effectRef>
-          <a:fontRef idx="minor">
-            <a:schemeClr val="dk1"/>
-          </a:fontRef>
-        </p:style>
-        <p:txBody>
-          <a:bodyPr rot="0" spcFirstLastPara="0" vertOverflow="overflow" horzOverflow="overflow" vert="horz" wrap="square" lIns="91428" tIns="45714" rIns="91428" bIns="45714" numCol="1" spcCol="0" rtlCol="0" fromWordArt="0" anchor="ctr" anchorCtr="0" forceAA="0" compatLnSpc="1">
-            <a:prstTxWarp prst="textNoShape">
-              <a:avLst/>
-            </a:prstTxWarp>
-            <a:noAutofit/>
-          </a:bodyPr>
-          <a:lstStyle/>
-          <a:p>
-            <a:pPr algn="ctr"/>
-            <a:endParaRPr kumimoji="1" lang="ja-JP" altLang="en-US" sz="2400" dirty="0">
-              <a:latin typeface="HG丸ｺﾞｼｯｸM-PRO" panose="020F0600000000000000" pitchFamily="50" charset="-128"/>
-              <a:ea typeface="HG丸ｺﾞｼｯｸM-PRO" panose="020F0600000000000000" pitchFamily="50" charset="-128"/>
-            </a:endParaRPr>
-          </a:p>
-        </p:txBody>
-      </p:sp>
-      <p:sp>
-        <p:nvSpPr>
-          <p:cNvPr id="255" name="テキスト ボックス 254"/>
-          <p:cNvSpPr txBox="1"/>
-          <p:nvPr/>
-        </p:nvSpPr>
-        <p:spPr>
-          <a:xfrm>
-            <a:off x="8080005" y="8264324"/>
-            <a:ext cx="686230" cy="180425"/>
-          </a:xfrm>
-          <a:prstGeom prst="rect">
-            <a:avLst/>
-          </a:prstGeom>
-          <a:noFill/>
-        </p:spPr>
-        <p:txBody>
-          <a:bodyPr wrap="square" lIns="36000" tIns="36000" rIns="36000" bIns="36000" rtlCol="0">
-            <a:spAutoFit/>
-          </a:bodyPr>
-          <a:lstStyle/>
-          <a:p>
-            <a:r>
-              <a:rPr lang="ja-JP" altLang="en-US" sz="700" dirty="0" smtClean="0">
-                <a:latin typeface="HG丸ｺﾞｼｯｸM-PRO" panose="020F0600000000000000" pitchFamily="50" charset="-128"/>
-                <a:ea typeface="HG丸ｺﾞｼｯｸM-PRO" panose="020F0600000000000000" pitchFamily="50" charset="-128"/>
-              </a:rPr>
-              <a:t>実行中の戦術</a:t>
-            </a:r>
-            <a:endParaRPr kumimoji="1" lang="ja-JP" altLang="en-US" sz="700" dirty="0">
-              <a:latin typeface="HG丸ｺﾞｼｯｸM-PRO" panose="020F0600000000000000" pitchFamily="50" charset="-128"/>
-              <a:ea typeface="HG丸ｺﾞｼｯｸM-PRO" panose="020F0600000000000000" pitchFamily="50" charset="-128"/>
-            </a:endParaRPr>
-          </a:p>
-        </p:txBody>
-      </p:sp>
-      <p:sp>
-        <p:nvSpPr>
-          <p:cNvPr id="256" name="テキスト ボックス 255"/>
-          <p:cNvSpPr txBox="1"/>
-          <p:nvPr/>
-        </p:nvSpPr>
-        <p:spPr>
-          <a:xfrm>
-            <a:off x="7052557" y="7490067"/>
-            <a:ext cx="533466" cy="288147"/>
-          </a:xfrm>
-          <a:prstGeom prst="rect">
-            <a:avLst/>
-          </a:prstGeom>
-          <a:noFill/>
-        </p:spPr>
-        <p:txBody>
-          <a:bodyPr wrap="square" lIns="36000" tIns="36000" rIns="36000" bIns="36000" rtlCol="0">
-            <a:spAutoFit/>
-          </a:bodyPr>
-          <a:lstStyle/>
-          <a:p>
-            <a:r>
-              <a:rPr lang="ja-JP" altLang="en-US" sz="700" b="1" dirty="0" smtClean="0">
-                <a:latin typeface="HG丸ｺﾞｼｯｸM-PRO" panose="020F0600000000000000" pitchFamily="50" charset="-128"/>
-                <a:ea typeface="HG丸ｺﾞｼｯｸM-PRO" panose="020F0600000000000000" pitchFamily="50" charset="-128"/>
-              </a:rPr>
-              <a:t>コース戦略 </a:t>
-            </a:r>
-            <a:r>
-              <a:rPr lang="ja-JP" altLang="en-US" sz="700" dirty="0" smtClean="0">
-                <a:latin typeface="HG丸ｺﾞｼｯｸM-PRO" panose="020F0600000000000000" pitchFamily="50" charset="-128"/>
-                <a:ea typeface="HG丸ｺﾞｼｯｸM-PRO" panose="020F0600000000000000" pitchFamily="50" charset="-128"/>
-              </a:rPr>
-              <a:t>（正常系）</a:t>
-            </a:r>
-            <a:endParaRPr kumimoji="1" lang="ja-JP" altLang="en-US" sz="700" dirty="0">
-              <a:latin typeface="HG丸ｺﾞｼｯｸM-PRO" panose="020F0600000000000000" pitchFamily="50" charset="-128"/>
-              <a:ea typeface="HG丸ｺﾞｼｯｸM-PRO" panose="020F0600000000000000" pitchFamily="50" charset="-128"/>
-            </a:endParaRPr>
-          </a:p>
-        </p:txBody>
-      </p:sp>
-      <p:grpSp>
-        <p:nvGrpSpPr>
-          <p:cNvPr id="279" name="グループ化 278"/>
-          <p:cNvGrpSpPr/>
-          <p:nvPr/>
-        </p:nvGrpSpPr>
-        <p:grpSpPr>
-          <a:xfrm>
-            <a:off x="10056423" y="7420285"/>
-            <a:ext cx="2603500" cy="959413"/>
-            <a:chOff x="10033790" y="7057769"/>
-            <a:chExt cx="2603500" cy="959413"/>
-          </a:xfrm>
-        </p:grpSpPr>
-        <p:sp>
-          <p:nvSpPr>
-            <p:cNvPr id="257" name="角丸四角形 256"/>
-            <p:cNvSpPr/>
-            <p:nvPr/>
-          </p:nvSpPr>
-          <p:spPr>
-            <a:xfrm>
-              <a:off x="10033790" y="7058332"/>
-              <a:ext cx="2603500" cy="958850"/>
-            </a:xfrm>
-            <a:prstGeom prst="roundRect">
-              <a:avLst/>
-            </a:prstGeom>
-            <a:ln/>
-          </p:spPr>
-          <p:style>
-            <a:lnRef idx="2">
-              <a:schemeClr val="accent5"/>
-            </a:lnRef>
-            <a:fillRef idx="1">
-              <a:schemeClr val="lt1"/>
-            </a:fillRef>
-            <a:effectRef idx="0">
-              <a:schemeClr val="accent5"/>
-            </a:effectRef>
-            <a:fontRef idx="minor">
-              <a:schemeClr val="dk1"/>
-            </a:fontRef>
-          </p:style>
-          <p:txBody>
-            <a:bodyPr rot="0" spcFirstLastPara="0" vertOverflow="overflow" horzOverflow="overflow" vert="horz" wrap="square" lIns="91428" tIns="45714" rIns="91428" bIns="45714" numCol="1" spcCol="0" rtlCol="0" fromWordArt="0" anchor="ctr" anchorCtr="0" forceAA="0" compatLnSpc="1">
-              <a:prstTxWarp prst="textNoShape">
-                <a:avLst/>
-              </a:prstTxWarp>
-              <a:noAutofit/>
-            </a:bodyPr>
-            <a:lstStyle/>
-            <a:p>
-              <a:pPr algn="ctr"/>
-              <a:endParaRPr kumimoji="1" lang="ja-JP" altLang="en-US" sz="2400" dirty="0">
-                <a:latin typeface="HG丸ｺﾞｼｯｸM-PRO" panose="020F0600000000000000" pitchFamily="50" charset="-128"/>
-                <a:ea typeface="HG丸ｺﾞｼｯｸM-PRO" panose="020F0600000000000000" pitchFamily="50" charset="-128"/>
-              </a:endParaRPr>
-            </a:p>
-          </p:txBody>
-        </p:sp>
-        <p:pic>
-          <p:nvPicPr>
-            <p:cNvPr id="258" name="Picture 8"/>
-            <p:cNvPicPr>
-              <a:picLocks noChangeAspect="1" noChangeArrowheads="1"/>
-            </p:cNvPicPr>
-            <p:nvPr/>
-          </p:nvPicPr>
-          <p:blipFill>
-            <a:blip r:embed="rId3" cstate="print">
-              <a:extLst>
-                <a:ext uri="{28A0092B-C50C-407E-A947-70E740481C1C}">
-                  <a14:useLocalDpi xmlns:a14="http://schemas.microsoft.com/office/drawing/2010/main" val="0"/>
-                </a:ext>
-              </a:extLst>
-            </a:blip>
-            <a:srcRect/>
-            <a:stretch>
-              <a:fillRect/>
-            </a:stretch>
-          </p:blipFill>
-          <p:spPr bwMode="auto">
-            <a:xfrm>
-              <a:off x="10115132" y="7504887"/>
-              <a:ext cx="463130" cy="320311"/>
-            </a:xfrm>
-            <a:prstGeom prst="rect">
-              <a:avLst/>
-            </a:prstGeom>
-            <a:noFill/>
-            <a:ln>
-              <a:noFill/>
-            </a:ln>
-            <a:effectLst/>
-            <a:extLst>
-              <a:ext uri="{909E8E84-426E-40DD-AFC4-6F175D3DCCD1}">
-                <a14:hiddenFill xmlns:a14="http://schemas.microsoft.com/office/drawing/2010/main">
-                  <a:solidFill>
-                    <a:schemeClr val="accent1"/>
-                  </a:solidFill>
-                </a14:hiddenFill>
-              </a:ext>
-              <a:ext uri="{91240B29-F687-4F45-9708-019B960494DF}">
-                <a14:hiddenLine xmlns:a14="http://schemas.microsoft.com/office/drawing/2010/main" w="9525">
-                  <a:solidFill>
-                    <a:schemeClr val="tx1"/>
-                  </a:solidFill>
-                  <a:miter lim="800000"/>
-                  <a:headEnd/>
-                  <a:tailEnd/>
-                </a14:hiddenLine>
-              </a:ext>
-              <a:ext uri="{AF507438-7753-43E0-B8FC-AC1667EBCBE1}">
-                <a14:hiddenEffects xmlns:a14="http://schemas.microsoft.com/office/drawing/2010/main">
-                  <a:effectLst>
-                    <a:outerShdw dist="35921" dir="2700000" algn="ctr" rotWithShape="0">
-                      <a:schemeClr val="bg2"/>
-                    </a:outerShdw>
-                  </a:effectLst>
-                </a14:hiddenEffects>
-              </a:ext>
-            </a:extLst>
-          </p:spPr>
-        </p:pic>
-        <p:pic>
-          <p:nvPicPr>
-            <p:cNvPr id="259" name="Picture 8"/>
-            <p:cNvPicPr>
-              <a:picLocks noChangeAspect="1" noChangeArrowheads="1"/>
-            </p:cNvPicPr>
-            <p:nvPr/>
-          </p:nvPicPr>
-          <p:blipFill>
-            <a:blip r:embed="rId3" cstate="print">
-              <a:extLst>
-                <a:ext uri="{28A0092B-C50C-407E-A947-70E740481C1C}">
-                  <a14:useLocalDpi xmlns:a14="http://schemas.microsoft.com/office/drawing/2010/main" val="0"/>
-                </a:ext>
-              </a:extLst>
-            </a:blip>
-            <a:srcRect/>
-            <a:stretch>
-              <a:fillRect/>
-            </a:stretch>
-          </p:blipFill>
-          <p:spPr bwMode="auto">
-            <a:xfrm>
-              <a:off x="10578542" y="7504887"/>
-              <a:ext cx="463130" cy="320311"/>
-            </a:xfrm>
-            <a:prstGeom prst="rect">
-              <a:avLst/>
-            </a:prstGeom>
-            <a:noFill/>
-            <a:ln>
-              <a:noFill/>
-            </a:ln>
-            <a:effectLst/>
-            <a:extLst>
-              <a:ext uri="{909E8E84-426E-40DD-AFC4-6F175D3DCCD1}">
-                <a14:hiddenFill xmlns:a14="http://schemas.microsoft.com/office/drawing/2010/main">
-                  <a:solidFill>
-                    <a:schemeClr val="accent1"/>
-                  </a:solidFill>
-                </a14:hiddenFill>
-              </a:ext>
-              <a:ext uri="{91240B29-F687-4F45-9708-019B960494DF}">
-                <a14:hiddenLine xmlns:a14="http://schemas.microsoft.com/office/drawing/2010/main" w="9525">
-                  <a:solidFill>
-                    <a:schemeClr val="tx1"/>
-                  </a:solidFill>
-                  <a:miter lim="800000"/>
-                  <a:headEnd/>
-                  <a:tailEnd/>
-                </a14:hiddenLine>
-              </a:ext>
-              <a:ext uri="{AF507438-7753-43E0-B8FC-AC1667EBCBE1}">
-                <a14:hiddenEffects xmlns:a14="http://schemas.microsoft.com/office/drawing/2010/main">
-                  <a:effectLst>
-                    <a:outerShdw dist="35921" dir="2700000" algn="ctr" rotWithShape="0">
-                      <a:schemeClr val="bg2"/>
-                    </a:outerShdw>
-                  </a:effectLst>
-                </a14:hiddenEffects>
-              </a:ext>
-            </a:extLst>
-          </p:spPr>
-        </p:pic>
-        <p:pic>
-          <p:nvPicPr>
-            <p:cNvPr id="260" name="Picture 8"/>
-            <p:cNvPicPr>
-              <a:picLocks noChangeAspect="1" noChangeArrowheads="1"/>
-            </p:cNvPicPr>
-            <p:nvPr/>
-          </p:nvPicPr>
-          <p:blipFill>
-            <a:blip r:embed="rId3" cstate="print">
-              <a:extLst>
-                <a:ext uri="{28A0092B-C50C-407E-A947-70E740481C1C}">
-                  <a14:useLocalDpi xmlns:a14="http://schemas.microsoft.com/office/drawing/2010/main" val="0"/>
-                </a:ext>
-              </a:extLst>
-            </a:blip>
-            <a:srcRect/>
-            <a:stretch>
-              <a:fillRect/>
-            </a:stretch>
-          </p:blipFill>
-          <p:spPr bwMode="auto">
-            <a:xfrm>
-              <a:off x="11041952" y="7504887"/>
-              <a:ext cx="463130" cy="320311"/>
-            </a:xfrm>
-            <a:prstGeom prst="rect">
-              <a:avLst/>
-            </a:prstGeom>
-            <a:noFill/>
-            <a:ln>
-              <a:noFill/>
-            </a:ln>
-            <a:effectLst/>
-            <a:extLst>
-              <a:ext uri="{909E8E84-426E-40DD-AFC4-6F175D3DCCD1}">
-                <a14:hiddenFill xmlns:a14="http://schemas.microsoft.com/office/drawing/2010/main">
-                  <a:solidFill>
-                    <a:schemeClr val="accent1"/>
-                  </a:solidFill>
-                </a14:hiddenFill>
-              </a:ext>
-              <a:ext uri="{91240B29-F687-4F45-9708-019B960494DF}">
-                <a14:hiddenLine xmlns:a14="http://schemas.microsoft.com/office/drawing/2010/main" w="9525">
-                  <a:solidFill>
-                    <a:schemeClr val="tx1"/>
-                  </a:solidFill>
-                  <a:miter lim="800000"/>
-                  <a:headEnd/>
-                  <a:tailEnd/>
-                </a14:hiddenLine>
-              </a:ext>
-              <a:ext uri="{AF507438-7753-43E0-B8FC-AC1667EBCBE1}">
-                <a14:hiddenEffects xmlns:a14="http://schemas.microsoft.com/office/drawing/2010/main">
-                  <a:effectLst>
-                    <a:outerShdw dist="35921" dir="2700000" algn="ctr" rotWithShape="0">
-                      <a:schemeClr val="bg2"/>
-                    </a:outerShdw>
-                  </a:effectLst>
-                </a14:hiddenEffects>
-              </a:ext>
-            </a:extLst>
-          </p:spPr>
-        </p:pic>
-        <p:pic>
-          <p:nvPicPr>
-            <p:cNvPr id="261" name="Picture 8"/>
-            <p:cNvPicPr>
-              <a:picLocks noChangeAspect="1" noChangeArrowheads="1"/>
-            </p:cNvPicPr>
-            <p:nvPr/>
-          </p:nvPicPr>
-          <p:blipFill>
-            <a:blip r:embed="rId3" cstate="print">
-              <a:extLst>
-                <a:ext uri="{28A0092B-C50C-407E-A947-70E740481C1C}">
-                  <a14:useLocalDpi xmlns:a14="http://schemas.microsoft.com/office/drawing/2010/main" val="0"/>
-                </a:ext>
-              </a:extLst>
-            </a:blip>
-            <a:srcRect/>
-            <a:stretch>
-              <a:fillRect/>
-            </a:stretch>
-          </p:blipFill>
-          <p:spPr bwMode="auto">
-            <a:xfrm>
-              <a:off x="11505362" y="7504887"/>
-              <a:ext cx="463130" cy="320311"/>
-            </a:xfrm>
-            <a:prstGeom prst="rect">
-              <a:avLst/>
-            </a:prstGeom>
-            <a:noFill/>
-            <a:ln>
-              <a:noFill/>
-            </a:ln>
-            <a:effectLst/>
-            <a:extLst>
-              <a:ext uri="{909E8E84-426E-40DD-AFC4-6F175D3DCCD1}">
-                <a14:hiddenFill xmlns:a14="http://schemas.microsoft.com/office/drawing/2010/main">
-                  <a:solidFill>
-                    <a:schemeClr val="accent1"/>
-                  </a:solidFill>
-                </a14:hiddenFill>
-              </a:ext>
-              <a:ext uri="{91240B29-F687-4F45-9708-019B960494DF}">
-                <a14:hiddenLine xmlns:a14="http://schemas.microsoft.com/office/drawing/2010/main" w="9525">
-                  <a:solidFill>
-                    <a:schemeClr val="tx1"/>
-                  </a:solidFill>
-                  <a:miter lim="800000"/>
-                  <a:headEnd/>
-                  <a:tailEnd/>
-                </a14:hiddenLine>
-              </a:ext>
-              <a:ext uri="{AF507438-7753-43E0-B8FC-AC1667EBCBE1}">
-                <a14:hiddenEffects xmlns:a14="http://schemas.microsoft.com/office/drawing/2010/main">
-                  <a:effectLst>
-                    <a:outerShdw dist="35921" dir="2700000" algn="ctr" rotWithShape="0">
-                      <a:schemeClr val="bg2"/>
-                    </a:outerShdw>
-                  </a:effectLst>
-                </a14:hiddenEffects>
-              </a:ext>
-            </a:extLst>
-          </p:spPr>
-        </p:pic>
-        <p:cxnSp>
-          <p:nvCxnSpPr>
-            <p:cNvPr id="263" name="直線コネクタ 262"/>
-            <p:cNvCxnSpPr/>
-            <p:nvPr/>
-          </p:nvCxnSpPr>
-          <p:spPr>
-            <a:xfrm>
-              <a:off x="11998378" y="7665042"/>
-              <a:ext cx="241195" cy="0"/>
-            </a:xfrm>
-            <a:prstGeom prst="line">
-              <a:avLst/>
-            </a:prstGeom>
-            <a:ln w="19050">
-              <a:solidFill>
-                <a:schemeClr val="tx1"/>
-              </a:solidFill>
-              <a:prstDash val="sysDot"/>
-            </a:ln>
-          </p:spPr>
-          <p:style>
-            <a:lnRef idx="1">
-              <a:schemeClr val="accent1"/>
-            </a:lnRef>
-            <a:fillRef idx="0">
-              <a:schemeClr val="accent1"/>
-            </a:fillRef>
-            <a:effectRef idx="0">
-              <a:schemeClr val="accent1"/>
-            </a:effectRef>
-            <a:fontRef idx="minor">
-              <a:schemeClr val="tx1"/>
-            </a:fontRef>
-          </p:style>
-        </p:cxnSp>
-        <p:sp>
-          <p:nvSpPr>
-            <p:cNvPr id="264" name="下矢印吹き出し 263"/>
-            <p:cNvSpPr/>
-            <p:nvPr/>
-          </p:nvSpPr>
-          <p:spPr>
-            <a:xfrm>
-              <a:off x="10159162" y="7189166"/>
-              <a:ext cx="453057" cy="282791"/>
-            </a:xfrm>
-            <a:prstGeom prst="downArrowCallout">
-              <a:avLst>
-                <a:gd name="adj1" fmla="val 32338"/>
-                <a:gd name="adj2" fmla="val 16169"/>
-                <a:gd name="adj3" fmla="val 25000"/>
-                <a:gd name="adj4" fmla="val 73808"/>
-              </a:avLst>
-            </a:prstGeom>
-            <a:solidFill>
-              <a:srgbClr val="66FF99"/>
-            </a:solidFill>
-            <a:ln w="9525">
-              <a:solidFill>
-                <a:schemeClr val="tx1"/>
-              </a:solidFill>
-            </a:ln>
-            <a:effectLst/>
-          </p:spPr>
-          <p:style>
-            <a:lnRef idx="1">
-              <a:schemeClr val="accent6"/>
-            </a:lnRef>
-            <a:fillRef idx="2">
-              <a:schemeClr val="accent6"/>
-            </a:fillRef>
-            <a:effectRef idx="1">
-              <a:schemeClr val="accent6"/>
-            </a:effectRef>
-            <a:fontRef idx="minor">
-              <a:schemeClr val="dk1"/>
-            </a:fontRef>
-          </p:style>
-          <p:txBody>
-            <a:bodyPr rot="0" spcFirstLastPara="0" vertOverflow="overflow" horzOverflow="overflow" vert="horz" wrap="square" lIns="36000" tIns="36000" rIns="36000" bIns="36000" numCol="1" spcCol="0" rtlCol="0" fromWordArt="0" anchor="ctr" anchorCtr="0" forceAA="0" compatLnSpc="1">
-              <a:prstTxWarp prst="textNoShape">
-                <a:avLst/>
-              </a:prstTxWarp>
-              <a:noAutofit/>
-            </a:bodyPr>
-            <a:lstStyle/>
-            <a:p>
-              <a:pPr algn="ctr"/>
-              <a:r>
-                <a:rPr kumimoji="1" lang="ja-JP" altLang="en-US" sz="500" dirty="0" smtClean="0">
-                  <a:latin typeface="HG丸ｺﾞｼｯｸM-PRO" panose="020F0600000000000000" pitchFamily="50" charset="-128"/>
-                  <a:ea typeface="HG丸ｺﾞｼｯｸM-PRO" panose="020F0600000000000000" pitchFamily="50" charset="-128"/>
-                </a:rPr>
-                <a:t>イテレーター</a:t>
-              </a:r>
-              <a:endParaRPr kumimoji="1" lang="ja-JP" altLang="en-US" sz="500" dirty="0">
-                <a:latin typeface="HG丸ｺﾞｼｯｸM-PRO" panose="020F0600000000000000" pitchFamily="50" charset="-128"/>
-                <a:ea typeface="HG丸ｺﾞｼｯｸM-PRO" panose="020F0600000000000000" pitchFamily="50" charset="-128"/>
-              </a:endParaRPr>
-            </a:p>
-          </p:txBody>
-        </p:sp>
-        <p:sp>
-          <p:nvSpPr>
-            <p:cNvPr id="265" name="右矢印 264"/>
-            <p:cNvSpPr/>
-            <p:nvPr/>
-          </p:nvSpPr>
-          <p:spPr>
-            <a:xfrm>
-              <a:off x="10642193" y="7220917"/>
-              <a:ext cx="228600" cy="135945"/>
-            </a:xfrm>
-            <a:prstGeom prst="rightArrow">
-              <a:avLst/>
-            </a:prstGeom>
-            <a:solidFill>
-              <a:srgbClr val="FF0000"/>
-            </a:solidFill>
-            <a:ln w="9525">
-              <a:solidFill>
-                <a:schemeClr val="tx1"/>
-              </a:solidFill>
-            </a:ln>
-            <a:effectLst/>
-          </p:spPr>
-          <p:style>
-            <a:lnRef idx="1">
-              <a:schemeClr val="accent6"/>
-            </a:lnRef>
-            <a:fillRef idx="2">
-              <a:schemeClr val="accent6"/>
-            </a:fillRef>
-            <a:effectRef idx="1">
-              <a:schemeClr val="accent6"/>
-            </a:effectRef>
-            <a:fontRef idx="minor">
-              <a:schemeClr val="dk1"/>
-            </a:fontRef>
-          </p:style>
-          <p:txBody>
-            <a:bodyPr rot="0" spcFirstLastPara="0" vertOverflow="overflow" horzOverflow="overflow" vert="horz" wrap="square" lIns="91428" tIns="45714" rIns="91428" bIns="45714" numCol="1" spcCol="0" rtlCol="0" fromWordArt="0" anchor="ctr" anchorCtr="0" forceAA="0" compatLnSpc="1">
-              <a:prstTxWarp prst="textNoShape">
-                <a:avLst/>
-              </a:prstTxWarp>
-              <a:noAutofit/>
-            </a:bodyPr>
-            <a:lstStyle/>
-            <a:p>
-              <a:pPr algn="ctr"/>
-              <a:endParaRPr kumimoji="1" lang="ja-JP" altLang="en-US" sz="2400" dirty="0">
-                <a:latin typeface="HG丸ｺﾞｼｯｸM-PRO" panose="020F0600000000000000" pitchFamily="50" charset="-128"/>
-                <a:ea typeface="HG丸ｺﾞｼｯｸM-PRO" panose="020F0600000000000000" pitchFamily="50" charset="-128"/>
-              </a:endParaRPr>
-            </a:p>
-          </p:txBody>
-        </p:sp>
-        <p:sp>
-          <p:nvSpPr>
-            <p:cNvPr id="266" name="テキスト ボックス 265"/>
-            <p:cNvSpPr txBox="1"/>
-            <p:nvPr/>
-          </p:nvSpPr>
-          <p:spPr>
-            <a:xfrm>
-              <a:off x="10115132" y="7836757"/>
-              <a:ext cx="686230" cy="180425"/>
-            </a:xfrm>
-            <a:prstGeom prst="rect">
-              <a:avLst/>
-            </a:prstGeom>
-            <a:noFill/>
-          </p:spPr>
-          <p:txBody>
-            <a:bodyPr wrap="square" lIns="36000" tIns="36000" rIns="36000" bIns="36000" rtlCol="0">
-              <a:spAutoFit/>
-            </a:bodyPr>
-            <a:lstStyle/>
-            <a:p>
-              <a:r>
-                <a:rPr lang="ja-JP" altLang="en-US" sz="700" dirty="0" smtClean="0">
-                  <a:latin typeface="HG丸ｺﾞｼｯｸM-PRO" panose="020F0600000000000000" pitchFamily="50" charset="-128"/>
-                  <a:ea typeface="HG丸ｺﾞｼｯｸM-PRO" panose="020F0600000000000000" pitchFamily="50" charset="-128"/>
-                </a:rPr>
-                <a:t>実行中の戦術</a:t>
-              </a:r>
-              <a:endParaRPr kumimoji="1" lang="ja-JP" altLang="en-US" sz="700" dirty="0">
-                <a:latin typeface="HG丸ｺﾞｼｯｸM-PRO" panose="020F0600000000000000" pitchFamily="50" charset="-128"/>
-                <a:ea typeface="HG丸ｺﾞｼｯｸM-PRO" panose="020F0600000000000000" pitchFamily="50" charset="-128"/>
-              </a:endParaRPr>
-            </a:p>
-          </p:txBody>
-        </p:sp>
-        <p:sp>
-          <p:nvSpPr>
-            <p:cNvPr id="267" name="テキスト ボックス 266"/>
-            <p:cNvSpPr txBox="1"/>
-            <p:nvPr/>
-          </p:nvSpPr>
-          <p:spPr>
-            <a:xfrm>
-              <a:off x="11621290" y="7057769"/>
-              <a:ext cx="736599" cy="288147"/>
-            </a:xfrm>
-            <a:prstGeom prst="rect">
-              <a:avLst/>
-            </a:prstGeom>
-            <a:noFill/>
-          </p:spPr>
-          <p:txBody>
-            <a:bodyPr wrap="square" lIns="36000" tIns="36000" rIns="36000" bIns="36000" rtlCol="0">
-              <a:spAutoFit/>
-            </a:bodyPr>
-            <a:lstStyle/>
-            <a:p>
-              <a:r>
-                <a:rPr lang="ja-JP" altLang="en-US" sz="700" b="1" dirty="0" smtClean="0">
-                  <a:latin typeface="HG丸ｺﾞｼｯｸM-PRO" panose="020F0600000000000000" pitchFamily="50" charset="-128"/>
-                  <a:ea typeface="HG丸ｺﾞｼｯｸM-PRO" panose="020F0600000000000000" pitchFamily="50" charset="-128"/>
-                </a:rPr>
-                <a:t>コース復帰戦略</a:t>
-              </a:r>
-              <a:endParaRPr lang="en-US" altLang="ja-JP" sz="700" b="1" dirty="0" smtClean="0">
-                <a:latin typeface="HG丸ｺﾞｼｯｸM-PRO" panose="020F0600000000000000" pitchFamily="50" charset="-128"/>
-                <a:ea typeface="HG丸ｺﾞｼｯｸM-PRO" panose="020F0600000000000000" pitchFamily="50" charset="-128"/>
-              </a:endParaRPr>
-            </a:p>
-            <a:p>
-              <a:r>
-                <a:rPr kumimoji="1" lang="ja-JP" altLang="en-US" sz="700" b="1" dirty="0" smtClean="0">
-                  <a:latin typeface="HG丸ｺﾞｼｯｸM-PRO" panose="020F0600000000000000" pitchFamily="50" charset="-128"/>
-                  <a:ea typeface="HG丸ｺﾞｼｯｸM-PRO" panose="020F0600000000000000" pitchFamily="50" charset="-128"/>
-                </a:rPr>
-                <a:t> </a:t>
-              </a:r>
-              <a:r>
-                <a:rPr kumimoji="1" lang="ja-JP" altLang="en-US" sz="700" dirty="0" smtClean="0">
-                  <a:latin typeface="HG丸ｺﾞｼｯｸM-PRO" panose="020F0600000000000000" pitchFamily="50" charset="-128"/>
-                  <a:ea typeface="HG丸ｺﾞｼｯｸM-PRO" panose="020F0600000000000000" pitchFamily="50" charset="-128"/>
-                </a:rPr>
-                <a:t>（準正常系）</a:t>
-              </a:r>
-              <a:endParaRPr kumimoji="1" lang="ja-JP" altLang="en-US" sz="700" dirty="0">
-                <a:latin typeface="HG丸ｺﾞｼｯｸM-PRO" panose="020F0600000000000000" pitchFamily="50" charset="-128"/>
-                <a:ea typeface="HG丸ｺﾞｼｯｸM-PRO" panose="020F0600000000000000" pitchFamily="50" charset="-128"/>
-              </a:endParaRPr>
-            </a:p>
-          </p:txBody>
-        </p:sp>
-      </p:grpSp>
-      <p:sp>
-        <p:nvSpPr>
-          <p:cNvPr id="268" name="角丸四角形 267"/>
-          <p:cNvSpPr/>
-          <p:nvPr/>
-        </p:nvSpPr>
-        <p:spPr>
-          <a:xfrm>
-            <a:off x="10056423" y="8508497"/>
-            <a:ext cx="2603500" cy="958850"/>
-          </a:xfrm>
-          <a:prstGeom prst="roundRect">
-            <a:avLst/>
-          </a:prstGeom>
-          <a:ln/>
-        </p:spPr>
-        <p:style>
-          <a:lnRef idx="2">
-            <a:schemeClr val="accent6"/>
-          </a:lnRef>
-          <a:fillRef idx="1">
-            <a:schemeClr val="lt1"/>
-          </a:fillRef>
-          <a:effectRef idx="0">
-            <a:schemeClr val="accent6"/>
-          </a:effectRef>
-          <a:fontRef idx="minor">
-            <a:schemeClr val="dk1"/>
-          </a:fontRef>
-        </p:style>
-        <p:txBody>
-          <a:bodyPr rot="0" spcFirstLastPara="0" vertOverflow="overflow" horzOverflow="overflow" vert="horz" wrap="square" lIns="91428" tIns="45714" rIns="91428" bIns="45714" numCol="1" spcCol="0" rtlCol="0" fromWordArt="0" anchor="ctr" anchorCtr="0" forceAA="0" compatLnSpc="1">
-            <a:prstTxWarp prst="textNoShape">
-              <a:avLst/>
-            </a:prstTxWarp>
-            <a:noAutofit/>
-          </a:bodyPr>
-          <a:lstStyle/>
-          <a:p>
-            <a:pPr algn="ctr"/>
-            <a:endParaRPr kumimoji="1" lang="ja-JP" altLang="en-US" sz="2400" dirty="0">
-              <a:latin typeface="HG丸ｺﾞｼｯｸM-PRO" panose="020F0600000000000000" pitchFamily="50" charset="-128"/>
-              <a:ea typeface="HG丸ｺﾞｼｯｸM-PRO" panose="020F0600000000000000" pitchFamily="50" charset="-128"/>
-            </a:endParaRPr>
-          </a:p>
-        </p:txBody>
-      </p:sp>
-      <p:pic>
-        <p:nvPicPr>
-          <p:cNvPr id="269" name="Picture 8"/>
-          <p:cNvPicPr>
-            <a:picLocks noChangeAspect="1" noChangeArrowheads="1"/>
-          </p:cNvPicPr>
-          <p:nvPr/>
-        </p:nvPicPr>
-        <p:blipFill>
-          <a:blip r:embed="rId3" cstate="print">
-            <a:extLst>
-              <a:ext uri="{28A0092B-C50C-407E-A947-70E740481C1C}">
-                <a14:useLocalDpi xmlns:a14="http://schemas.microsoft.com/office/drawing/2010/main" val="0"/>
-              </a:ext>
-            </a:extLst>
-          </a:blip>
-          <a:srcRect/>
-          <a:stretch>
-            <a:fillRect/>
-          </a:stretch>
-        </p:blipFill>
-        <p:spPr bwMode="auto">
-          <a:xfrm>
-            <a:off x="10153232" y="8957333"/>
-            <a:ext cx="463130" cy="320311"/>
-          </a:xfrm>
-          <a:prstGeom prst="rect">
-            <a:avLst/>
-          </a:prstGeom>
-          <a:noFill/>
-          <a:ln>
-            <a:noFill/>
-          </a:ln>
-          <a:effectLst/>
-          <a:extLst>
-            <a:ext uri="{909E8E84-426E-40DD-AFC4-6F175D3DCCD1}">
-              <a14:hiddenFill xmlns:a14="http://schemas.microsoft.com/office/drawing/2010/main">
-                <a:solidFill>
-                  <a:schemeClr val="accent1"/>
-                </a:solidFill>
-              </a14:hiddenFill>
-            </a:ext>
-            <a:ext uri="{91240B29-F687-4F45-9708-019B960494DF}">
-              <a14:hiddenLine xmlns:a14="http://schemas.microsoft.com/office/drawing/2010/main" w="9525">
-                <a:solidFill>
-                  <a:schemeClr val="tx1"/>
-                </a:solidFill>
-                <a:miter lim="800000"/>
-                <a:headEnd/>
-                <a:tailEnd/>
-              </a14:hiddenLine>
-            </a:ext>
-            <a:ext uri="{AF507438-7753-43E0-B8FC-AC1667EBCBE1}">
-              <a14:hiddenEffects xmlns:a14="http://schemas.microsoft.com/office/drawing/2010/main">
-                <a:effectLst>
-                  <a:outerShdw dist="35921" dir="2700000" algn="ctr" rotWithShape="0">
-                    <a:schemeClr val="bg2"/>
-                  </a:outerShdw>
-                </a:effectLst>
-              </a14:hiddenEffects>
-            </a:ext>
-          </a:extLst>
-        </p:spPr>
-      </p:pic>
-      <p:pic>
-        <p:nvPicPr>
-          <p:cNvPr id="270" name="Picture 8"/>
-          <p:cNvPicPr>
-            <a:picLocks noChangeAspect="1" noChangeArrowheads="1"/>
-          </p:cNvPicPr>
-          <p:nvPr/>
-        </p:nvPicPr>
-        <p:blipFill>
-          <a:blip r:embed="rId3" cstate="print">
-            <a:extLst>
-              <a:ext uri="{28A0092B-C50C-407E-A947-70E740481C1C}">
-                <a14:useLocalDpi xmlns:a14="http://schemas.microsoft.com/office/drawing/2010/main" val="0"/>
-              </a:ext>
-            </a:extLst>
-          </a:blip>
-          <a:srcRect/>
-          <a:stretch>
-            <a:fillRect/>
-          </a:stretch>
-        </p:blipFill>
-        <p:spPr bwMode="auto">
-          <a:xfrm>
-            <a:off x="10616642" y="8957333"/>
-            <a:ext cx="463130" cy="320311"/>
-          </a:xfrm>
-          <a:prstGeom prst="rect">
-            <a:avLst/>
-          </a:prstGeom>
-          <a:noFill/>
-          <a:ln>
-            <a:noFill/>
-          </a:ln>
-          <a:effectLst/>
-          <a:extLst>
-            <a:ext uri="{909E8E84-426E-40DD-AFC4-6F175D3DCCD1}">
-              <a14:hiddenFill xmlns:a14="http://schemas.microsoft.com/office/drawing/2010/main">
-                <a:solidFill>
-                  <a:schemeClr val="accent1"/>
-                </a:solidFill>
-              </a14:hiddenFill>
-            </a:ext>
-            <a:ext uri="{91240B29-F687-4F45-9708-019B960494DF}">
-              <a14:hiddenLine xmlns:a14="http://schemas.microsoft.com/office/drawing/2010/main" w="9525">
-                <a:solidFill>
-                  <a:schemeClr val="tx1"/>
-                </a:solidFill>
-                <a:miter lim="800000"/>
-                <a:headEnd/>
-                <a:tailEnd/>
-              </a14:hiddenLine>
-            </a:ext>
-            <a:ext uri="{AF507438-7753-43E0-B8FC-AC1667EBCBE1}">
-              <a14:hiddenEffects xmlns:a14="http://schemas.microsoft.com/office/drawing/2010/main">
-                <a:effectLst>
-                  <a:outerShdw dist="35921" dir="2700000" algn="ctr" rotWithShape="0">
-                    <a:schemeClr val="bg2"/>
-                  </a:outerShdw>
-                </a:effectLst>
-              </a14:hiddenEffects>
-            </a:ext>
-          </a:extLst>
-        </p:spPr>
-      </p:pic>
-      <p:pic>
-        <p:nvPicPr>
-          <p:cNvPr id="271" name="Picture 8"/>
-          <p:cNvPicPr>
-            <a:picLocks noChangeAspect="1" noChangeArrowheads="1"/>
-          </p:cNvPicPr>
-          <p:nvPr/>
-        </p:nvPicPr>
-        <p:blipFill>
-          <a:blip r:embed="rId3" cstate="print">
-            <a:extLst>
-              <a:ext uri="{28A0092B-C50C-407E-A947-70E740481C1C}">
-                <a14:useLocalDpi xmlns:a14="http://schemas.microsoft.com/office/drawing/2010/main" val="0"/>
-              </a:ext>
-            </a:extLst>
-          </a:blip>
-          <a:srcRect/>
-          <a:stretch>
-            <a:fillRect/>
-          </a:stretch>
-        </p:blipFill>
-        <p:spPr bwMode="auto">
-          <a:xfrm>
-            <a:off x="11080052" y="8957333"/>
-            <a:ext cx="463130" cy="320311"/>
-          </a:xfrm>
-          <a:prstGeom prst="rect">
-            <a:avLst/>
-          </a:prstGeom>
-          <a:noFill/>
-          <a:ln>
-            <a:noFill/>
-          </a:ln>
-          <a:effectLst/>
-          <a:extLst>
-            <a:ext uri="{909E8E84-426E-40DD-AFC4-6F175D3DCCD1}">
-              <a14:hiddenFill xmlns:a14="http://schemas.microsoft.com/office/drawing/2010/main">
-                <a:solidFill>
-                  <a:schemeClr val="accent1"/>
-                </a:solidFill>
-              </a14:hiddenFill>
-            </a:ext>
-            <a:ext uri="{91240B29-F687-4F45-9708-019B960494DF}">
-              <a14:hiddenLine xmlns:a14="http://schemas.microsoft.com/office/drawing/2010/main" w="9525">
-                <a:solidFill>
-                  <a:schemeClr val="tx1"/>
-                </a:solidFill>
-                <a:miter lim="800000"/>
-                <a:headEnd/>
-                <a:tailEnd/>
-              </a14:hiddenLine>
-            </a:ext>
-            <a:ext uri="{AF507438-7753-43E0-B8FC-AC1667EBCBE1}">
-              <a14:hiddenEffects xmlns:a14="http://schemas.microsoft.com/office/drawing/2010/main">
-                <a:effectLst>
-                  <a:outerShdw dist="35921" dir="2700000" algn="ctr" rotWithShape="0">
-                    <a:schemeClr val="bg2"/>
-                  </a:outerShdw>
-                </a:effectLst>
-              </a14:hiddenEffects>
-            </a:ext>
-          </a:extLst>
-        </p:spPr>
-      </p:pic>
-      <p:pic>
-        <p:nvPicPr>
-          <p:cNvPr id="272" name="Picture 8"/>
-          <p:cNvPicPr>
-            <a:picLocks noChangeAspect="1" noChangeArrowheads="1"/>
-          </p:cNvPicPr>
-          <p:nvPr/>
-        </p:nvPicPr>
-        <p:blipFill>
-          <a:blip r:embed="rId3" cstate="print">
-            <a:extLst>
-              <a:ext uri="{28A0092B-C50C-407E-A947-70E740481C1C}">
-                <a14:useLocalDpi xmlns:a14="http://schemas.microsoft.com/office/drawing/2010/main" val="0"/>
-              </a:ext>
-            </a:extLst>
-          </a:blip>
-          <a:srcRect/>
-          <a:stretch>
-            <a:fillRect/>
-          </a:stretch>
-        </p:blipFill>
-        <p:spPr bwMode="auto">
-          <a:xfrm>
-            <a:off x="11543462" y="8957333"/>
-            <a:ext cx="463130" cy="320311"/>
-          </a:xfrm>
-          <a:prstGeom prst="rect">
-            <a:avLst/>
-          </a:prstGeom>
-          <a:noFill/>
-          <a:ln>
-            <a:noFill/>
-          </a:ln>
-          <a:effectLst/>
-          <a:extLst>
-            <a:ext uri="{909E8E84-426E-40DD-AFC4-6F175D3DCCD1}">
-              <a14:hiddenFill xmlns:a14="http://schemas.microsoft.com/office/drawing/2010/main">
-                <a:solidFill>
-                  <a:schemeClr val="accent1"/>
-                </a:solidFill>
-              </a14:hiddenFill>
-            </a:ext>
-            <a:ext uri="{91240B29-F687-4F45-9708-019B960494DF}">
-              <a14:hiddenLine xmlns:a14="http://schemas.microsoft.com/office/drawing/2010/main" w="9525">
-                <a:solidFill>
-                  <a:schemeClr val="tx1"/>
-                </a:solidFill>
-                <a:miter lim="800000"/>
-                <a:headEnd/>
-                <a:tailEnd/>
-              </a14:hiddenLine>
-            </a:ext>
-            <a:ext uri="{AF507438-7753-43E0-B8FC-AC1667EBCBE1}">
-              <a14:hiddenEffects xmlns:a14="http://schemas.microsoft.com/office/drawing/2010/main">
-                <a:effectLst>
-                  <a:outerShdw dist="35921" dir="2700000" algn="ctr" rotWithShape="0">
-                    <a:schemeClr val="bg2"/>
-                  </a:outerShdw>
-                </a:effectLst>
-              </a14:hiddenEffects>
-            </a:ext>
-          </a:extLst>
-        </p:spPr>
-      </p:pic>
-      <p:sp>
-        <p:nvSpPr>
-          <p:cNvPr id="274" name="下矢印吹き出し 273"/>
-          <p:cNvSpPr/>
-          <p:nvPr/>
-        </p:nvSpPr>
-        <p:spPr>
-          <a:xfrm>
-            <a:off x="10197262" y="8654312"/>
-            <a:ext cx="453057" cy="282791"/>
-          </a:xfrm>
-          <a:prstGeom prst="downArrowCallout">
-            <a:avLst>
-              <a:gd name="adj1" fmla="val 32338"/>
-              <a:gd name="adj2" fmla="val 16169"/>
-              <a:gd name="adj3" fmla="val 25000"/>
-              <a:gd name="adj4" fmla="val 73808"/>
-            </a:avLst>
-          </a:prstGeom>
-          <a:solidFill>
-            <a:srgbClr val="66FF99"/>
-          </a:solidFill>
-          <a:ln w="9525">
-            <a:solidFill>
-              <a:schemeClr val="tx1"/>
-            </a:solidFill>
-          </a:ln>
-          <a:effectLst/>
-        </p:spPr>
-        <p:style>
-          <a:lnRef idx="1">
-            <a:schemeClr val="accent6"/>
-          </a:lnRef>
-          <a:fillRef idx="2">
-            <a:schemeClr val="accent6"/>
-          </a:fillRef>
-          <a:effectRef idx="1">
-            <a:schemeClr val="accent6"/>
-          </a:effectRef>
-          <a:fontRef idx="minor">
-            <a:schemeClr val="dk1"/>
-          </a:fontRef>
-        </p:style>
-        <p:txBody>
-          <a:bodyPr rot="0" spcFirstLastPara="0" vertOverflow="overflow" horzOverflow="overflow" vert="horz" wrap="square" lIns="36000" tIns="36000" rIns="36000" bIns="36000" numCol="1" spcCol="0" rtlCol="0" fromWordArt="0" anchor="ctr" anchorCtr="0" forceAA="0" compatLnSpc="1">
-            <a:prstTxWarp prst="textNoShape">
-              <a:avLst/>
-            </a:prstTxWarp>
-            <a:noAutofit/>
-          </a:bodyPr>
-          <a:lstStyle/>
-          <a:p>
-            <a:pPr algn="ctr"/>
-            <a:r>
-              <a:rPr kumimoji="1" lang="ja-JP" altLang="en-US" sz="500" dirty="0" smtClean="0">
-                <a:latin typeface="HG丸ｺﾞｼｯｸM-PRO" panose="020F0600000000000000" pitchFamily="50" charset="-128"/>
-                <a:ea typeface="HG丸ｺﾞｼｯｸM-PRO" panose="020F0600000000000000" pitchFamily="50" charset="-128"/>
-              </a:rPr>
-              <a:t>イテレーター</a:t>
-            </a:r>
-            <a:endParaRPr kumimoji="1" lang="ja-JP" altLang="en-US" sz="500" dirty="0">
-              <a:latin typeface="HG丸ｺﾞｼｯｸM-PRO" panose="020F0600000000000000" pitchFamily="50" charset="-128"/>
-              <a:ea typeface="HG丸ｺﾞｼｯｸM-PRO" panose="020F0600000000000000" pitchFamily="50" charset="-128"/>
-            </a:endParaRPr>
-          </a:p>
-        </p:txBody>
-      </p:sp>
-      <p:sp>
-        <p:nvSpPr>
-          <p:cNvPr id="275" name="右矢印 274"/>
-          <p:cNvSpPr/>
-          <p:nvPr/>
-        </p:nvSpPr>
-        <p:spPr>
-          <a:xfrm>
-            <a:off x="10680293" y="8686063"/>
-            <a:ext cx="228600" cy="135945"/>
-          </a:xfrm>
-          <a:prstGeom prst="rightArrow">
-            <a:avLst/>
-          </a:prstGeom>
-          <a:solidFill>
-            <a:srgbClr val="FF0000"/>
-          </a:solidFill>
-          <a:ln w="9525">
-            <a:solidFill>
-              <a:schemeClr val="tx1"/>
-            </a:solidFill>
-          </a:ln>
-          <a:effectLst/>
-        </p:spPr>
-        <p:style>
-          <a:lnRef idx="1">
-            <a:schemeClr val="accent6"/>
-          </a:lnRef>
-          <a:fillRef idx="2">
-            <a:schemeClr val="accent6"/>
-          </a:fillRef>
-          <a:effectRef idx="1">
-            <a:schemeClr val="accent6"/>
-          </a:effectRef>
-          <a:fontRef idx="minor">
-            <a:schemeClr val="dk1"/>
-          </a:fontRef>
-        </p:style>
-        <p:txBody>
-          <a:bodyPr rot="0" spcFirstLastPara="0" vertOverflow="overflow" horzOverflow="overflow" vert="horz" wrap="square" lIns="91428" tIns="45714" rIns="91428" bIns="45714" numCol="1" spcCol="0" rtlCol="0" fromWordArt="0" anchor="ctr" anchorCtr="0" forceAA="0" compatLnSpc="1">
-            <a:prstTxWarp prst="textNoShape">
-              <a:avLst/>
-            </a:prstTxWarp>
-            <a:noAutofit/>
-          </a:bodyPr>
-          <a:lstStyle/>
-          <a:p>
-            <a:pPr algn="ctr"/>
-            <a:endParaRPr kumimoji="1" lang="ja-JP" altLang="en-US" sz="2400" dirty="0">
-              <a:latin typeface="HG丸ｺﾞｼｯｸM-PRO" panose="020F0600000000000000" pitchFamily="50" charset="-128"/>
-              <a:ea typeface="HG丸ｺﾞｼｯｸM-PRO" panose="020F0600000000000000" pitchFamily="50" charset="-128"/>
-            </a:endParaRPr>
-          </a:p>
-        </p:txBody>
-      </p:sp>
-      <p:sp>
-        <p:nvSpPr>
-          <p:cNvPr id="276" name="テキスト ボックス 275"/>
-          <p:cNvSpPr txBox="1"/>
-          <p:nvPr/>
-        </p:nvSpPr>
-        <p:spPr>
-          <a:xfrm>
-            <a:off x="10153232" y="9289203"/>
-            <a:ext cx="686230" cy="180425"/>
-          </a:xfrm>
-          <a:prstGeom prst="rect">
-            <a:avLst/>
-          </a:prstGeom>
-          <a:noFill/>
-        </p:spPr>
-        <p:txBody>
-          <a:bodyPr wrap="square" lIns="36000" tIns="36000" rIns="36000" bIns="36000" rtlCol="0">
-            <a:spAutoFit/>
-          </a:bodyPr>
-          <a:lstStyle/>
-          <a:p>
-            <a:r>
-              <a:rPr lang="ja-JP" altLang="en-US" sz="700" dirty="0" smtClean="0">
-                <a:latin typeface="HG丸ｺﾞｼｯｸM-PRO" panose="020F0600000000000000" pitchFamily="50" charset="-128"/>
-                <a:ea typeface="HG丸ｺﾞｼｯｸM-PRO" panose="020F0600000000000000" pitchFamily="50" charset="-128"/>
-              </a:rPr>
-              <a:t>実行中の戦術</a:t>
-            </a:r>
-            <a:endParaRPr kumimoji="1" lang="ja-JP" altLang="en-US" sz="700" dirty="0">
-              <a:latin typeface="HG丸ｺﾞｼｯｸM-PRO" panose="020F0600000000000000" pitchFamily="50" charset="-128"/>
-              <a:ea typeface="HG丸ｺﾞｼｯｸM-PRO" panose="020F0600000000000000" pitchFamily="50" charset="-128"/>
-            </a:endParaRPr>
-          </a:p>
-        </p:txBody>
-      </p:sp>
-      <p:sp>
-        <p:nvSpPr>
-          <p:cNvPr id="277" name="テキスト ボックス 276"/>
-          <p:cNvSpPr txBox="1"/>
-          <p:nvPr/>
-        </p:nvSpPr>
-        <p:spPr>
-          <a:xfrm>
-            <a:off x="11659390" y="8510215"/>
-            <a:ext cx="736599" cy="288147"/>
-          </a:xfrm>
-          <a:prstGeom prst="rect">
-            <a:avLst/>
-          </a:prstGeom>
-          <a:noFill/>
-        </p:spPr>
-        <p:txBody>
-          <a:bodyPr wrap="square" lIns="36000" tIns="36000" rIns="36000" bIns="36000" rtlCol="0">
-            <a:spAutoFit/>
-          </a:bodyPr>
-          <a:lstStyle/>
-          <a:p>
-            <a:r>
-              <a:rPr lang="ja-JP" altLang="en-US" sz="700" b="1" dirty="0">
-                <a:latin typeface="HG丸ｺﾞｼｯｸM-PRO" panose="020F0600000000000000" pitchFamily="50" charset="-128"/>
-                <a:ea typeface="HG丸ｺﾞｼｯｸM-PRO" panose="020F0600000000000000" pitchFamily="50" charset="-128"/>
-              </a:rPr>
-              <a:t>緊急</a:t>
-            </a:r>
-            <a:r>
-              <a:rPr lang="ja-JP" altLang="en-US" sz="700" b="1" dirty="0" smtClean="0">
-                <a:latin typeface="HG丸ｺﾞｼｯｸM-PRO" panose="020F0600000000000000" pitchFamily="50" charset="-128"/>
-                <a:ea typeface="HG丸ｺﾞｼｯｸM-PRO" panose="020F0600000000000000" pitchFamily="50" charset="-128"/>
-              </a:rPr>
-              <a:t>停止戦略</a:t>
-            </a:r>
-            <a:endParaRPr lang="en-US" altLang="ja-JP" sz="700" b="1" dirty="0" smtClean="0">
-              <a:latin typeface="HG丸ｺﾞｼｯｸM-PRO" panose="020F0600000000000000" pitchFamily="50" charset="-128"/>
-              <a:ea typeface="HG丸ｺﾞｼｯｸM-PRO" panose="020F0600000000000000" pitchFamily="50" charset="-128"/>
-            </a:endParaRPr>
-          </a:p>
-          <a:p>
-            <a:r>
-              <a:rPr kumimoji="1" lang="ja-JP" altLang="en-US" sz="700" dirty="0" smtClean="0">
-                <a:latin typeface="HG丸ｺﾞｼｯｸM-PRO" panose="020F0600000000000000" pitchFamily="50" charset="-128"/>
-                <a:ea typeface="HG丸ｺﾞｼｯｸM-PRO" panose="020F0600000000000000" pitchFamily="50" charset="-128"/>
-              </a:rPr>
-              <a:t>   （異常系）</a:t>
-            </a:r>
-            <a:endParaRPr kumimoji="1" lang="ja-JP" altLang="en-US" sz="700" dirty="0">
-              <a:latin typeface="HG丸ｺﾞｼｯｸM-PRO" panose="020F0600000000000000" pitchFamily="50" charset="-128"/>
-              <a:ea typeface="HG丸ｺﾞｼｯｸM-PRO" panose="020F0600000000000000" pitchFamily="50" charset="-128"/>
-            </a:endParaRPr>
-          </a:p>
-        </p:txBody>
-      </p:sp>
-      <p:cxnSp>
-        <p:nvCxnSpPr>
-          <p:cNvPr id="247" name="直線矢印コネクタ 246"/>
-          <p:cNvCxnSpPr>
-            <a:endCxn id="264" idx="1"/>
-          </p:cNvCxnSpPr>
-          <p:nvPr/>
-        </p:nvCxnSpPr>
-        <p:spPr>
-          <a:xfrm>
-            <a:off x="8622791" y="7621031"/>
-            <a:ext cx="1559004" cy="35012"/>
-          </a:xfrm>
-          <a:prstGeom prst="straightConnector1">
-            <a:avLst/>
-          </a:prstGeom>
-          <a:ln w="12700">
-            <a:solidFill>
-              <a:srgbClr val="0000CC"/>
-            </a:solidFill>
-            <a:prstDash val="sysDash"/>
-            <a:tailEnd type="arrow"/>
-          </a:ln>
-        </p:spPr>
-        <p:style>
-          <a:lnRef idx="1">
-            <a:schemeClr val="accent1"/>
-          </a:lnRef>
-          <a:fillRef idx="0">
-            <a:schemeClr val="accent1"/>
-          </a:fillRef>
-          <a:effectRef idx="0">
-            <a:schemeClr val="accent1"/>
-          </a:effectRef>
-          <a:fontRef idx="minor">
-            <a:schemeClr val="tx1"/>
-          </a:fontRef>
-        </p:style>
-      </p:cxnSp>
-      <p:cxnSp>
-        <p:nvCxnSpPr>
-          <p:cNvPr id="285" name="直線矢印コネクタ 284"/>
-          <p:cNvCxnSpPr/>
-          <p:nvPr/>
-        </p:nvCxnSpPr>
-        <p:spPr>
-          <a:xfrm>
-            <a:off x="8642367" y="7797648"/>
-            <a:ext cx="1619233" cy="802779"/>
-          </a:xfrm>
-          <a:prstGeom prst="straightConnector1">
-            <a:avLst/>
-          </a:prstGeom>
-          <a:ln w="12700">
-            <a:solidFill>
-              <a:srgbClr val="0000CC"/>
-            </a:solidFill>
-            <a:prstDash val="sysDash"/>
-            <a:tailEnd type="arrow"/>
-          </a:ln>
-        </p:spPr>
-        <p:style>
-          <a:lnRef idx="1">
-            <a:schemeClr val="accent1"/>
-          </a:lnRef>
-          <a:fillRef idx="0">
-            <a:schemeClr val="accent1"/>
-          </a:fillRef>
-          <a:effectRef idx="0">
-            <a:schemeClr val="accent1"/>
-          </a:effectRef>
-          <a:fontRef idx="minor">
-            <a:schemeClr val="tx1"/>
-          </a:fontRef>
-        </p:style>
-      </p:cxnSp>
-      <p:sp>
-        <p:nvSpPr>
-          <p:cNvPr id="290" name="テキスト ボックス 289"/>
-          <p:cNvSpPr txBox="1"/>
-          <p:nvPr/>
-        </p:nvSpPr>
-        <p:spPr>
-          <a:xfrm>
-            <a:off x="9500175" y="7632365"/>
-            <a:ext cx="601297" cy="257369"/>
-          </a:xfrm>
-          <a:prstGeom prst="rect">
-            <a:avLst/>
-          </a:prstGeom>
-          <a:noFill/>
-        </p:spPr>
-        <p:txBody>
-          <a:bodyPr wrap="square" lIns="36000" tIns="36000" rIns="36000" bIns="36000" rtlCol="0">
-            <a:spAutoFit/>
-          </a:bodyPr>
-          <a:lstStyle/>
-          <a:p>
-            <a:r>
-              <a:rPr lang="en-US" altLang="ja-JP" sz="600" b="1" dirty="0" smtClean="0">
-                <a:solidFill>
-                  <a:srgbClr val="FF0000"/>
-                </a:solidFill>
-                <a:latin typeface="HG丸ｺﾞｼｯｸM-PRO" panose="020F0600000000000000" pitchFamily="50" charset="-128"/>
-                <a:ea typeface="HG丸ｺﾞｼｯｸM-PRO" panose="020F0600000000000000" pitchFamily="50" charset="-128"/>
-              </a:rPr>
-              <a:t>&lt;&lt;</a:t>
-            </a:r>
-            <a:r>
-              <a:rPr lang="ja-JP" altLang="en-US" sz="600" b="1" dirty="0" smtClean="0">
-                <a:solidFill>
-                  <a:srgbClr val="FF0000"/>
-                </a:solidFill>
-                <a:latin typeface="HG丸ｺﾞｼｯｸM-PRO" panose="020F0600000000000000" pitchFamily="50" charset="-128"/>
-                <a:ea typeface="HG丸ｺﾞｼｯｸM-PRO" panose="020F0600000000000000" pitchFamily="50" charset="-128"/>
-              </a:rPr>
-              <a:t>イベント</a:t>
-            </a:r>
-            <a:r>
-              <a:rPr lang="en-US" altLang="ja-JP" sz="600" b="1" dirty="0" smtClean="0">
-                <a:solidFill>
-                  <a:srgbClr val="FF0000"/>
-                </a:solidFill>
-                <a:latin typeface="HG丸ｺﾞｼｯｸM-PRO" panose="020F0600000000000000" pitchFamily="50" charset="-128"/>
-                <a:ea typeface="HG丸ｺﾞｼｯｸM-PRO" panose="020F0600000000000000" pitchFamily="50" charset="-128"/>
-              </a:rPr>
-              <a:t>&gt;&gt;</a:t>
-            </a:r>
-          </a:p>
-          <a:p>
-            <a:r>
-              <a:rPr lang="ja-JP" altLang="en-US" sz="600" b="1" dirty="0" smtClean="0">
-                <a:solidFill>
-                  <a:srgbClr val="FF0000"/>
-                </a:solidFill>
-                <a:latin typeface="HG丸ｺﾞｼｯｸM-PRO" panose="020F0600000000000000" pitchFamily="50" charset="-128"/>
-                <a:ea typeface="HG丸ｺﾞｼｯｸM-PRO" panose="020F0600000000000000" pitchFamily="50" charset="-128"/>
-              </a:rPr>
-              <a:t>コースアウト</a:t>
-            </a:r>
-            <a:endParaRPr lang="en-US" altLang="ja-JP" sz="600" b="1" dirty="0" smtClean="0">
-              <a:solidFill>
-                <a:srgbClr val="FF0000"/>
-              </a:solidFill>
-              <a:latin typeface="HG丸ｺﾞｼｯｸM-PRO" panose="020F0600000000000000" pitchFamily="50" charset="-128"/>
-              <a:ea typeface="HG丸ｺﾞｼｯｸM-PRO" panose="020F0600000000000000" pitchFamily="50" charset="-128"/>
-            </a:endParaRPr>
-          </a:p>
-        </p:txBody>
-      </p:sp>
-      <p:sp>
-        <p:nvSpPr>
-          <p:cNvPr id="291" name="テキスト ボックス 290"/>
-          <p:cNvSpPr txBox="1"/>
-          <p:nvPr/>
-        </p:nvSpPr>
-        <p:spPr>
-          <a:xfrm rot="1757710">
-            <a:off x="9497738" y="8104608"/>
-            <a:ext cx="601297" cy="257369"/>
-          </a:xfrm>
-          <a:prstGeom prst="rect">
-            <a:avLst/>
-          </a:prstGeom>
-          <a:noFill/>
-        </p:spPr>
-        <p:txBody>
-          <a:bodyPr wrap="square" lIns="36000" tIns="36000" rIns="36000" bIns="36000" rtlCol="0">
-            <a:spAutoFit/>
-          </a:bodyPr>
-          <a:lstStyle/>
-          <a:p>
-            <a:pPr algn="ctr"/>
-            <a:r>
-              <a:rPr lang="en-US" altLang="ja-JP" sz="600" b="1" dirty="0" smtClean="0">
-                <a:solidFill>
-                  <a:srgbClr val="FF0000"/>
-                </a:solidFill>
-                <a:latin typeface="HG丸ｺﾞｼｯｸM-PRO" panose="020F0600000000000000" pitchFamily="50" charset="-128"/>
-                <a:ea typeface="HG丸ｺﾞｼｯｸM-PRO" panose="020F0600000000000000" pitchFamily="50" charset="-128"/>
-              </a:rPr>
-              <a:t>&lt;&lt;</a:t>
-            </a:r>
-            <a:r>
-              <a:rPr lang="ja-JP" altLang="en-US" sz="600" b="1" dirty="0" smtClean="0">
-                <a:solidFill>
-                  <a:srgbClr val="FF0000"/>
-                </a:solidFill>
-                <a:latin typeface="HG丸ｺﾞｼｯｸM-PRO" panose="020F0600000000000000" pitchFamily="50" charset="-128"/>
-                <a:ea typeface="HG丸ｺﾞｼｯｸM-PRO" panose="020F0600000000000000" pitchFamily="50" charset="-128"/>
-              </a:rPr>
-              <a:t>イベント</a:t>
-            </a:r>
-            <a:r>
-              <a:rPr lang="en-US" altLang="ja-JP" sz="600" b="1" dirty="0" smtClean="0">
-                <a:solidFill>
-                  <a:srgbClr val="FF0000"/>
-                </a:solidFill>
-                <a:latin typeface="HG丸ｺﾞｼｯｸM-PRO" panose="020F0600000000000000" pitchFamily="50" charset="-128"/>
-                <a:ea typeface="HG丸ｺﾞｼｯｸM-PRO" panose="020F0600000000000000" pitchFamily="50" charset="-128"/>
-              </a:rPr>
-              <a:t>&gt;&gt;</a:t>
-            </a:r>
-          </a:p>
-          <a:p>
-            <a:pPr algn="ctr"/>
-            <a:r>
-              <a:rPr lang="ja-JP" altLang="en-US" sz="600" b="1" dirty="0">
-                <a:solidFill>
-                  <a:srgbClr val="FF0000"/>
-                </a:solidFill>
-                <a:latin typeface="HG丸ｺﾞｼｯｸM-PRO" panose="020F0600000000000000" pitchFamily="50" charset="-128"/>
-                <a:ea typeface="HG丸ｺﾞｼｯｸM-PRO" panose="020F0600000000000000" pitchFamily="50" charset="-128"/>
-              </a:rPr>
-              <a:t>転倒</a:t>
-            </a:r>
-            <a:endParaRPr lang="en-US" altLang="ja-JP" sz="600" b="1" dirty="0" smtClean="0">
-              <a:solidFill>
-                <a:srgbClr val="FF0000"/>
-              </a:solidFill>
-              <a:latin typeface="HG丸ｺﾞｼｯｸM-PRO" panose="020F0600000000000000" pitchFamily="50" charset="-128"/>
-              <a:ea typeface="HG丸ｺﾞｼｯｸM-PRO" panose="020F0600000000000000" pitchFamily="50" charset="-128"/>
-            </a:endParaRPr>
-          </a:p>
-        </p:txBody>
-      </p:sp>
-      <p:pic>
-        <p:nvPicPr>
-          <p:cNvPr id="254" name="Picture 9"/>
-          <p:cNvPicPr>
-            <a:picLocks noChangeAspect="1" noChangeArrowheads="1"/>
-          </p:cNvPicPr>
-          <p:nvPr/>
-        </p:nvPicPr>
-        <p:blipFill>
-          <a:blip r:embed="rId4">
-            <a:extLst>
-              <a:ext uri="{28A0092B-C50C-407E-A947-70E740481C1C}">
-                <a14:useLocalDpi xmlns:a14="http://schemas.microsoft.com/office/drawing/2010/main" val="0"/>
-              </a:ext>
-            </a:extLst>
-          </a:blip>
-          <a:srcRect/>
-          <a:stretch>
-            <a:fillRect/>
-          </a:stretch>
-        </p:blipFill>
-        <p:spPr bwMode="auto">
-          <a:xfrm>
-            <a:off x="6969348" y="9275073"/>
-            <a:ext cx="422052" cy="268060"/>
-          </a:xfrm>
-          <a:prstGeom prst="rect">
-            <a:avLst/>
-          </a:prstGeom>
-          <a:noFill/>
-          <a:ln>
-            <a:noFill/>
-          </a:ln>
-          <a:effectLst/>
-          <a:extLst>
-            <a:ext uri="{909E8E84-426E-40DD-AFC4-6F175D3DCCD1}">
-              <a14:hiddenFill xmlns:a14="http://schemas.microsoft.com/office/drawing/2010/main">
-                <a:solidFill>
-                  <a:schemeClr val="accent1"/>
-                </a:solidFill>
-              </a14:hiddenFill>
-            </a:ext>
-            <a:ext uri="{91240B29-F687-4F45-9708-019B960494DF}">
-              <a14:hiddenLine xmlns:a14="http://schemas.microsoft.com/office/drawing/2010/main" w="9525">
-                <a:solidFill>
-                  <a:schemeClr val="tx1"/>
-                </a:solidFill>
-                <a:miter lim="800000"/>
-                <a:headEnd/>
-                <a:tailEnd/>
-              </a14:hiddenLine>
-            </a:ext>
-            <a:ext uri="{AF507438-7753-43E0-B8FC-AC1667EBCBE1}">
-              <a14:hiddenEffects xmlns:a14="http://schemas.microsoft.com/office/drawing/2010/main">
-                <a:effectLst>
-                  <a:outerShdw dist="35921" dir="2700000" algn="ctr" rotWithShape="0">
-                    <a:schemeClr val="bg2"/>
-                  </a:outerShdw>
-                </a:effectLst>
-              </a14:hiddenEffects>
-            </a:ext>
-          </a:extLst>
-        </p:spPr>
-      </p:pic>
-      <p:sp>
-        <p:nvSpPr>
-          <p:cNvPr id="295" name="テキスト ボックス 294"/>
-          <p:cNvSpPr txBox="1"/>
-          <p:nvPr/>
-        </p:nvSpPr>
-        <p:spPr>
-          <a:xfrm>
-            <a:off x="7469020" y="9262972"/>
-            <a:ext cx="2481430" cy="318924"/>
-          </a:xfrm>
-          <a:prstGeom prst="rect">
-            <a:avLst/>
-          </a:prstGeom>
-          <a:noFill/>
-        </p:spPr>
-        <p:txBody>
-          <a:bodyPr wrap="square" lIns="36000" tIns="36000" rIns="36000" bIns="36000" rtlCol="0">
-            <a:spAutoFit/>
-          </a:bodyPr>
-          <a:lstStyle/>
-          <a:p>
-            <a:r>
-              <a:rPr lang="ja-JP" altLang="en-US" sz="800" dirty="0" smtClean="0">
-                <a:latin typeface="HG丸ｺﾞｼｯｸM-PRO" panose="020F0600000000000000" pitchFamily="50" charset="-128"/>
-                <a:ea typeface="HG丸ｺﾞｼｯｸM-PRO" panose="020F0600000000000000" pitchFamily="50" charset="-128"/>
-              </a:rPr>
-              <a:t>指している走行戦術を</a:t>
-            </a:r>
-            <a:r>
-              <a:rPr lang="ja-JP" altLang="en-US" sz="800" b="1" dirty="0" smtClean="0">
-                <a:latin typeface="HG丸ｺﾞｼｯｸM-PRO" panose="020F0600000000000000" pitchFamily="50" charset="-128"/>
-                <a:ea typeface="HG丸ｺﾞｼｯｸM-PRO" panose="020F0600000000000000" pitchFamily="50" charset="-128"/>
-              </a:rPr>
-              <a:t>切換え条件が満たされるまで</a:t>
-            </a:r>
-            <a:r>
-              <a:rPr lang="ja-JP" altLang="en-US" sz="800" dirty="0" smtClean="0">
-                <a:latin typeface="HG丸ｺﾞｼｯｸM-PRO" panose="020F0600000000000000" pitchFamily="50" charset="-128"/>
-                <a:ea typeface="HG丸ｺﾞｼｯｸM-PRO" panose="020F0600000000000000" pitchFamily="50" charset="-128"/>
-              </a:rPr>
-              <a:t>実行する。</a:t>
-            </a:r>
-            <a:endParaRPr kumimoji="1" lang="ja-JP" altLang="en-US" sz="800" dirty="0">
-              <a:latin typeface="HG丸ｺﾞｼｯｸM-PRO" panose="020F0600000000000000" pitchFamily="50" charset="-128"/>
-              <a:ea typeface="HG丸ｺﾞｼｯｸM-PRO" panose="020F0600000000000000" pitchFamily="50" charset="-128"/>
-            </a:endParaRPr>
-          </a:p>
-        </p:txBody>
-      </p:sp>
-      <p:sp>
-        <p:nvSpPr>
-          <p:cNvPr id="301" name="テキスト ボックス 300"/>
-          <p:cNvSpPr txBox="1"/>
-          <p:nvPr/>
-        </p:nvSpPr>
-        <p:spPr>
-          <a:xfrm>
-            <a:off x="8456291" y="6174825"/>
-            <a:ext cx="3336732" cy="234286"/>
-          </a:xfrm>
-          <a:prstGeom prst="rect">
-            <a:avLst/>
-          </a:prstGeom>
-          <a:noFill/>
-        </p:spPr>
-        <p:txBody>
-          <a:bodyPr wrap="square" lIns="36000" tIns="36000" rIns="36000" bIns="36000" rtlCol="0">
-            <a:spAutoFit/>
-          </a:bodyPr>
-          <a:lstStyle/>
-          <a:p>
-            <a:r>
-              <a:rPr kumimoji="1" lang="ja-JP" altLang="en-US" sz="1050" dirty="0" smtClean="0">
-                <a:latin typeface="HG丸ｺﾞｼｯｸM-PRO" panose="020F0600000000000000" pitchFamily="50" charset="-128"/>
-                <a:ea typeface="HG丸ｺﾞｼｯｸM-PRO" panose="020F0600000000000000" pitchFamily="50" charset="-128"/>
-              </a:rPr>
-              <a:t>設計の基礎となる以下のような概念モデルを構築した。</a:t>
-            </a:r>
-            <a:endParaRPr kumimoji="1" lang="ja-JP" altLang="en-US" sz="1050" dirty="0">
-              <a:latin typeface="HG丸ｺﾞｼｯｸM-PRO" panose="020F0600000000000000" pitchFamily="50" charset="-128"/>
-              <a:ea typeface="HG丸ｺﾞｼｯｸM-PRO" panose="020F0600000000000000" pitchFamily="50" charset="-128"/>
-            </a:endParaRPr>
-          </a:p>
-        </p:txBody>
-      </p:sp>
-      <p:sp>
-        <p:nvSpPr>
-          <p:cNvPr id="302" name="テキスト ボックス 301"/>
-          <p:cNvSpPr txBox="1"/>
-          <p:nvPr/>
-        </p:nvSpPr>
-        <p:spPr>
-          <a:xfrm>
-            <a:off x="6810598" y="6571267"/>
-            <a:ext cx="5029645" cy="695951"/>
-          </a:xfrm>
-          <a:prstGeom prst="rect">
-            <a:avLst/>
-          </a:prstGeom>
-          <a:noFill/>
-        </p:spPr>
-        <p:txBody>
-          <a:bodyPr wrap="square" lIns="36000" tIns="36000" rIns="36000" bIns="36000" rtlCol="0">
-            <a:spAutoFit/>
-          </a:bodyPr>
-          <a:lstStyle/>
-          <a:p>
-            <a:pPr>
-              <a:lnSpc>
-                <a:spcPct val="150000"/>
-              </a:lnSpc>
-            </a:pPr>
-            <a:r>
-              <a:rPr kumimoji="1" lang="ja-JP" altLang="en-US" sz="900" dirty="0" smtClean="0">
-                <a:latin typeface="HG丸ｺﾞｼｯｸM-PRO" panose="020F0600000000000000" pitchFamily="50" charset="-128"/>
-                <a:ea typeface="HG丸ｺﾞｼｯｸM-PRO" panose="020F0600000000000000" pitchFamily="50" charset="-128"/>
-              </a:rPr>
-              <a:t>・振る舞いの最小単位を</a:t>
-            </a:r>
-            <a:r>
-              <a:rPr kumimoji="1" lang="ja-JP" altLang="en-US" sz="900" b="1" dirty="0" smtClean="0">
-                <a:latin typeface="HG丸ｺﾞｼｯｸM-PRO" panose="020F0600000000000000" pitchFamily="50" charset="-128"/>
-                <a:ea typeface="HG丸ｺﾞｼｯｸM-PRO" panose="020F0600000000000000" pitchFamily="50" charset="-128"/>
-              </a:rPr>
-              <a:t>走行方法</a:t>
-            </a:r>
-            <a:r>
-              <a:rPr kumimoji="1" lang="ja-JP" altLang="en-US" sz="900" dirty="0" smtClean="0">
-                <a:latin typeface="HG丸ｺﾞｼｯｸM-PRO" panose="020F0600000000000000" pitchFamily="50" charset="-128"/>
-                <a:ea typeface="HG丸ｺﾞｼｯｸM-PRO" panose="020F0600000000000000" pitchFamily="50" charset="-128"/>
-              </a:rPr>
-              <a:t>と</a:t>
-            </a:r>
-            <a:r>
-              <a:rPr kumimoji="1" lang="ja-JP" altLang="en-US" sz="900" b="1" dirty="0" smtClean="0">
-                <a:latin typeface="HG丸ｺﾞｼｯｸM-PRO" panose="020F0600000000000000" pitchFamily="50" charset="-128"/>
-                <a:ea typeface="HG丸ｺﾞｼｯｸM-PRO" panose="020F0600000000000000" pitchFamily="50" charset="-128"/>
-              </a:rPr>
-              <a:t>切換え条件</a:t>
-            </a:r>
-            <a:r>
-              <a:rPr kumimoji="1" lang="ja-JP" altLang="en-US" sz="900" dirty="0" smtClean="0">
-                <a:latin typeface="HG丸ｺﾞｼｯｸM-PRO" panose="020F0600000000000000" pitchFamily="50" charset="-128"/>
-                <a:ea typeface="HG丸ｺﾞｼｯｸM-PRO" panose="020F0600000000000000" pitchFamily="50" charset="-128"/>
-              </a:rPr>
-              <a:t>の対（</a:t>
-            </a:r>
-            <a:r>
-              <a:rPr kumimoji="1" lang="ja-JP" altLang="en-US" sz="900" b="1" dirty="0" smtClean="0">
-                <a:latin typeface="HG丸ｺﾞｼｯｸM-PRO" panose="020F0600000000000000" pitchFamily="50" charset="-128"/>
-                <a:ea typeface="HG丸ｺﾞｼｯｸM-PRO" panose="020F0600000000000000" pitchFamily="50" charset="-128"/>
-              </a:rPr>
-              <a:t>走行戦術</a:t>
-            </a:r>
-            <a:r>
-              <a:rPr kumimoji="1" lang="ja-JP" altLang="en-US" sz="900" dirty="0" smtClean="0">
-                <a:latin typeface="HG丸ｺﾞｼｯｸM-PRO" panose="020F0600000000000000" pitchFamily="50" charset="-128"/>
-                <a:ea typeface="HG丸ｺﾞｼｯｸM-PRO" panose="020F0600000000000000" pitchFamily="50" charset="-128"/>
-              </a:rPr>
-              <a:t>）として記述。</a:t>
-            </a:r>
-            <a:endParaRPr kumimoji="1" lang="en-US" altLang="ja-JP" sz="900" dirty="0" smtClean="0">
-              <a:latin typeface="HG丸ｺﾞｼｯｸM-PRO" panose="020F0600000000000000" pitchFamily="50" charset="-128"/>
-              <a:ea typeface="HG丸ｺﾞｼｯｸM-PRO" panose="020F0600000000000000" pitchFamily="50" charset="-128"/>
-            </a:endParaRPr>
-          </a:p>
-          <a:p>
-            <a:pPr>
-              <a:lnSpc>
-                <a:spcPct val="150000"/>
-              </a:lnSpc>
-            </a:pPr>
-            <a:r>
-              <a:rPr kumimoji="1" lang="ja-JP" altLang="en-US" sz="900" dirty="0" smtClean="0">
-                <a:latin typeface="HG丸ｺﾞｼｯｸM-PRO" panose="020F0600000000000000" pitchFamily="50" charset="-128"/>
-                <a:ea typeface="HG丸ｺﾞｼｯｸM-PRO" panose="020F0600000000000000" pitchFamily="50" charset="-128"/>
-              </a:rPr>
-              <a:t>・正常系、準正常系、異常系を</a:t>
-            </a:r>
-            <a:r>
-              <a:rPr kumimoji="1" lang="ja-JP" altLang="en-US" sz="900" b="1" dirty="0" smtClean="0">
-                <a:latin typeface="HG丸ｺﾞｼｯｸM-PRO" panose="020F0600000000000000" pitchFamily="50" charset="-128"/>
-                <a:ea typeface="HG丸ｺﾞｼｯｸM-PRO" panose="020F0600000000000000" pitchFamily="50" charset="-128"/>
-              </a:rPr>
-              <a:t>走行戦術</a:t>
-            </a:r>
-            <a:r>
-              <a:rPr kumimoji="1" lang="ja-JP" altLang="en-US" sz="900" dirty="0" smtClean="0">
-                <a:latin typeface="HG丸ｺﾞｼｯｸM-PRO" panose="020F0600000000000000" pitchFamily="50" charset="-128"/>
-                <a:ea typeface="HG丸ｺﾞｼｯｸM-PRO" panose="020F0600000000000000" pitchFamily="50" charset="-128"/>
-              </a:rPr>
-              <a:t>の単方向リスト（</a:t>
-            </a:r>
-            <a:r>
-              <a:rPr kumimoji="1" lang="en-US" altLang="ja-JP" sz="900" dirty="0" smtClean="0">
-                <a:latin typeface="HG丸ｺﾞｼｯｸM-PRO" panose="020F0600000000000000" pitchFamily="50" charset="-128"/>
-                <a:ea typeface="HG丸ｺﾞｼｯｸM-PRO" panose="020F0600000000000000" pitchFamily="50" charset="-128"/>
-              </a:rPr>
-              <a:t>=</a:t>
-            </a:r>
-            <a:r>
-              <a:rPr kumimoji="1" lang="ja-JP" altLang="en-US" sz="900" b="1" dirty="0" smtClean="0">
-                <a:latin typeface="HG丸ｺﾞｼｯｸM-PRO" panose="020F0600000000000000" pitchFamily="50" charset="-128"/>
-                <a:ea typeface="HG丸ｺﾞｼｯｸM-PRO" panose="020F0600000000000000" pitchFamily="50" charset="-128"/>
-              </a:rPr>
-              <a:t>戦略</a:t>
-            </a:r>
-            <a:r>
-              <a:rPr kumimoji="1" lang="ja-JP" altLang="en-US" sz="900" dirty="0" smtClean="0">
-                <a:latin typeface="HG丸ｺﾞｼｯｸM-PRO" panose="020F0600000000000000" pitchFamily="50" charset="-128"/>
-                <a:ea typeface="HG丸ｺﾞｼｯｸM-PRO" panose="020F0600000000000000" pitchFamily="50" charset="-128"/>
-              </a:rPr>
-              <a:t>）として記述。</a:t>
-            </a:r>
-            <a:endParaRPr lang="en-US" altLang="ja-JP" sz="900" dirty="0" smtClean="0">
-              <a:latin typeface="HG丸ｺﾞｼｯｸM-PRO" panose="020F0600000000000000" pitchFamily="50" charset="-128"/>
-              <a:ea typeface="HG丸ｺﾞｼｯｸM-PRO" panose="020F0600000000000000" pitchFamily="50" charset="-128"/>
-            </a:endParaRPr>
-          </a:p>
-          <a:p>
-            <a:pPr>
-              <a:lnSpc>
-                <a:spcPct val="150000"/>
-              </a:lnSpc>
-            </a:pPr>
-            <a:r>
-              <a:rPr lang="ja-JP" altLang="en-US" sz="900" dirty="0" smtClean="0">
-                <a:latin typeface="HG丸ｺﾞｼｯｸM-PRO" panose="020F0600000000000000" pitchFamily="50" charset="-128"/>
-                <a:ea typeface="HG丸ｺﾞｼｯｸM-PRO" panose="020F0600000000000000" pitchFamily="50" charset="-128"/>
-              </a:rPr>
-              <a:t>・走行戦略の切換えは</a:t>
-            </a:r>
-            <a:r>
-              <a:rPr lang="ja-JP" altLang="en-US" sz="900" b="1" dirty="0" smtClean="0">
-                <a:latin typeface="HG丸ｺﾞｼｯｸM-PRO" panose="020F0600000000000000" pitchFamily="50" charset="-128"/>
-                <a:ea typeface="HG丸ｺﾞｼｯｸM-PRO" panose="020F0600000000000000" pitchFamily="50" charset="-128"/>
-              </a:rPr>
-              <a:t>イテレーター</a:t>
-            </a:r>
-            <a:r>
-              <a:rPr lang="ja-JP" altLang="en-US" sz="900" dirty="0" smtClean="0">
-                <a:latin typeface="HG丸ｺﾞｼｯｸM-PRO" panose="020F0600000000000000" pitchFamily="50" charset="-128"/>
-                <a:ea typeface="HG丸ｺﾞｼｯｸM-PRO" panose="020F0600000000000000" pitchFamily="50" charset="-128"/>
-              </a:rPr>
-              <a:t>の指す先を変更して実現。</a:t>
-            </a:r>
-            <a:endParaRPr lang="en-US" altLang="ja-JP" sz="900" dirty="0" smtClean="0">
               <a:latin typeface="HG丸ｺﾞｼｯｸM-PRO" panose="020F0600000000000000" pitchFamily="50" charset="-128"/>
               <a:ea typeface="HG丸ｺﾞｼｯｸM-PRO" panose="020F0600000000000000" pitchFamily="50" charset="-128"/>
             </a:endParaRPr>
@@ -9712,30 +6995,6 @@
           </a:p>
         </p:txBody>
       </p:sp>
-      <p:pic>
-        <p:nvPicPr>
-          <p:cNvPr id="9" name="図 8"/>
-          <p:cNvPicPr>
-            <a:picLocks noChangeAspect="1"/>
-          </p:cNvPicPr>
-          <p:nvPr/>
-        </p:nvPicPr>
-        <p:blipFill>
-          <a:blip r:embed="rId5"/>
-          <a:stretch>
-            <a:fillRect/>
-          </a:stretch>
-        </p:blipFill>
-        <p:spPr>
-          <a:xfrm>
-            <a:off x="5398713" y="920314"/>
-            <a:ext cx="6822530" cy="5179147"/>
-          </a:xfrm>
-          <a:prstGeom prst="rect">
-            <a:avLst/>
-          </a:prstGeom>
-        </p:spPr>
-      </p:pic>
       <p:sp>
         <p:nvSpPr>
           <p:cNvPr id="95" name="テキスト ボックス 94"/>
@@ -9744,7 +7003,7 @@
         </p:nvSpPr>
         <p:spPr>
           <a:xfrm>
-            <a:off x="3544843" y="8295390"/>
+            <a:off x="2855042" y="7553804"/>
             <a:ext cx="2482785" cy="719034"/>
           </a:xfrm>
           <a:prstGeom prst="rect">
@@ -9814,6 +7073,649 @@
           </a:p>
         </p:txBody>
       </p:sp>
+      <p:graphicFrame>
+        <p:nvGraphicFramePr>
+          <p:cNvPr id="11" name="表 10"/>
+          <p:cNvGraphicFramePr>
+            <a:graphicFrameLocks noGrp="1"/>
+          </p:cNvGraphicFramePr>
+          <p:nvPr>
+            <p:extLst>
+              <p:ext uri="{D42A27DB-BD31-4B8C-83A1-F6EECF244321}">
+                <p14:modId xmlns:p14="http://schemas.microsoft.com/office/powerpoint/2010/main" val="3667208940"/>
+              </p:ext>
+            </p:extLst>
+          </p:nvPr>
+        </p:nvGraphicFramePr>
+        <p:xfrm>
+          <a:off x="5793624" y="5508033"/>
+          <a:ext cx="6874436" cy="2702830"/>
+        </p:xfrm>
+        <a:graphic>
+          <a:graphicData uri="http://schemas.openxmlformats.org/drawingml/2006/table">
+            <a:tbl>
+              <a:tblPr firstRow="1" bandRow="1">
+                <a:tableStyleId>{21E4AEA4-8DFA-4A89-87EB-49C32662AFE0}</a:tableStyleId>
+              </a:tblPr>
+              <a:tblGrid>
+                <a:gridCol w="1000876"/>
+                <a:gridCol w="2882900"/>
+                <a:gridCol w="2990660"/>
+              </a:tblGrid>
+              <a:tr h="325390">
+                <a:tc>
+                  <a:txBody>
+                    <a:bodyPr/>
+                    <a:lstStyle/>
+                    <a:p>
+                      <a:pPr algn="ctr"/>
+                      <a:r>
+                        <a:rPr kumimoji="1" lang="ja-JP" altLang="en-US" sz="900" smtClean="0">
+                          <a:latin typeface="HG丸ｺﾞｼｯｸM-PRO" panose="020F0600000000000000" pitchFamily="50" charset="-128"/>
+                          <a:ea typeface="HG丸ｺﾞｼｯｸM-PRO" panose="020F0600000000000000" pitchFamily="50" charset="-128"/>
+                        </a:rPr>
+                        <a:t>リスク因子</a:t>
+                      </a:r>
+                      <a:endParaRPr kumimoji="1" lang="ja-JP" altLang="en-US" sz="900">
+                        <a:latin typeface="HG丸ｺﾞｼｯｸM-PRO" panose="020F0600000000000000" pitchFamily="50" charset="-128"/>
+                        <a:ea typeface="HG丸ｺﾞｼｯｸM-PRO" panose="020F0600000000000000" pitchFamily="50" charset="-128"/>
+                      </a:endParaRPr>
+                    </a:p>
+                  </a:txBody>
+                  <a:tcPr anchor="ctr"/>
+                </a:tc>
+                <a:tc>
+                  <a:txBody>
+                    <a:bodyPr/>
+                    <a:lstStyle/>
+                    <a:p>
+                      <a:pPr algn="ctr"/>
+                      <a:r>
+                        <a:rPr kumimoji="1" lang="ja-JP" altLang="en-US" sz="900" smtClean="0">
+                          <a:latin typeface="HG丸ｺﾞｼｯｸM-PRO" panose="020F0600000000000000" pitchFamily="50" charset="-128"/>
+                          <a:ea typeface="HG丸ｺﾞｼｯｸM-PRO" panose="020F0600000000000000" pitchFamily="50" charset="-128"/>
+                        </a:rPr>
+                        <a:t>脅威の内容</a:t>
+                      </a:r>
+                      <a:endParaRPr kumimoji="1" lang="ja-JP" altLang="en-US" sz="900">
+                        <a:latin typeface="HG丸ｺﾞｼｯｸM-PRO" panose="020F0600000000000000" pitchFamily="50" charset="-128"/>
+                        <a:ea typeface="HG丸ｺﾞｼｯｸM-PRO" panose="020F0600000000000000" pitchFamily="50" charset="-128"/>
+                      </a:endParaRPr>
+                    </a:p>
+                  </a:txBody>
+                  <a:tcPr anchor="ctr"/>
+                </a:tc>
+                <a:tc>
+                  <a:txBody>
+                    <a:bodyPr/>
+                    <a:lstStyle/>
+                    <a:p>
+                      <a:pPr algn="ctr"/>
+                      <a:r>
+                        <a:rPr kumimoji="1" lang="ja-JP" altLang="en-US" sz="900" smtClean="0">
+                          <a:latin typeface="HG丸ｺﾞｼｯｸM-PRO" panose="020F0600000000000000" pitchFamily="50" charset="-128"/>
+                          <a:ea typeface="HG丸ｺﾞｼｯｸM-PRO" panose="020F0600000000000000" pitchFamily="50" charset="-128"/>
+                        </a:rPr>
+                        <a:t>緩和策</a:t>
+                      </a:r>
+                      <a:endParaRPr kumimoji="1" lang="ja-JP" altLang="en-US" sz="900">
+                        <a:latin typeface="HG丸ｺﾞｼｯｸM-PRO" panose="020F0600000000000000" pitchFamily="50" charset="-128"/>
+                        <a:ea typeface="HG丸ｺﾞｼｯｸM-PRO" panose="020F0600000000000000" pitchFamily="50" charset="-128"/>
+                      </a:endParaRPr>
+                    </a:p>
+                  </a:txBody>
+                  <a:tcPr anchor="ctr"/>
+                </a:tc>
+              </a:tr>
+              <a:tr h="325390">
+                <a:tc>
+                  <a:txBody>
+                    <a:bodyPr/>
+                    <a:lstStyle/>
+                    <a:p>
+                      <a:pPr algn="just"/>
+                      <a:r>
+                        <a:rPr kumimoji="1" lang="ja-JP" altLang="en-US" sz="900" smtClean="0">
+                          <a:latin typeface="HG丸ｺﾞｼｯｸM-PRO" panose="020F0600000000000000" pitchFamily="50" charset="-128"/>
+                          <a:ea typeface="HG丸ｺﾞｼｯｸM-PRO" panose="020F0600000000000000" pitchFamily="50" charset="-128"/>
+                        </a:rPr>
+                        <a:t>不適切な</a:t>
+                      </a:r>
+                      <a:endParaRPr kumimoji="1" lang="en-US" altLang="ja-JP" sz="900" smtClean="0">
+                        <a:latin typeface="HG丸ｺﾞｼｯｸM-PRO" panose="020F0600000000000000" pitchFamily="50" charset="-128"/>
+                        <a:ea typeface="HG丸ｺﾞｼｯｸM-PRO" panose="020F0600000000000000" pitchFamily="50" charset="-128"/>
+                      </a:endParaRPr>
+                    </a:p>
+                    <a:p>
+                      <a:pPr algn="just"/>
+                      <a:r>
+                        <a:rPr kumimoji="1" lang="ja-JP" altLang="en-US" sz="900" smtClean="0">
+                          <a:latin typeface="HG丸ｺﾞｼｯｸM-PRO" panose="020F0600000000000000" pitchFamily="50" charset="-128"/>
+                          <a:ea typeface="HG丸ｺﾞｼｯｸM-PRO" panose="020F0600000000000000" pitchFamily="50" charset="-128"/>
+                        </a:rPr>
+                        <a:t>走行体の配置</a:t>
+                      </a:r>
+                      <a:endParaRPr kumimoji="1" lang="ja-JP" altLang="en-US" sz="900">
+                        <a:latin typeface="HG丸ｺﾞｼｯｸM-PRO" panose="020F0600000000000000" pitchFamily="50" charset="-128"/>
+                        <a:ea typeface="HG丸ｺﾞｼｯｸM-PRO" panose="020F0600000000000000" pitchFamily="50" charset="-128"/>
+                      </a:endParaRPr>
+                    </a:p>
+                  </a:txBody>
+                  <a:tcPr anchor="ctr"/>
+                </a:tc>
+                <a:tc>
+                  <a:txBody>
+                    <a:bodyPr/>
+                    <a:lstStyle/>
+                    <a:p>
+                      <a:pPr algn="just"/>
+                      <a:r>
+                        <a:rPr kumimoji="1" lang="ja-JP" altLang="en-US" sz="900" smtClean="0">
+                          <a:latin typeface="HG丸ｺﾞｼｯｸM-PRO" panose="020F0600000000000000" pitchFamily="50" charset="-128"/>
+                          <a:ea typeface="HG丸ｺﾞｼｯｸM-PRO" panose="020F0600000000000000" pitchFamily="50" charset="-128"/>
+                        </a:rPr>
+                        <a:t>いつもと違う環境でスタート位置に走行体を配置しようとして、置こうと思っていたところに置けず、スタート時にラインを見失ってしまう。</a:t>
+                      </a:r>
+                      <a:endParaRPr kumimoji="1" lang="ja-JP" altLang="en-US" sz="900">
+                        <a:latin typeface="HG丸ｺﾞｼｯｸM-PRO" panose="020F0600000000000000" pitchFamily="50" charset="-128"/>
+                        <a:ea typeface="HG丸ｺﾞｼｯｸM-PRO" panose="020F0600000000000000" pitchFamily="50" charset="-128"/>
+                      </a:endParaRPr>
+                    </a:p>
+                  </a:txBody>
+                  <a:tcPr anchor="ctr"/>
+                </a:tc>
+                <a:tc>
+                  <a:txBody>
+                    <a:bodyPr/>
+                    <a:lstStyle/>
+                    <a:p>
+                      <a:pPr algn="just"/>
+                      <a:r>
+                        <a:rPr kumimoji="1" lang="ja-JP" altLang="en-US" sz="900" smtClean="0">
+                          <a:latin typeface="HG丸ｺﾞｼｯｸM-PRO" panose="020F0600000000000000" pitchFamily="50" charset="-128"/>
+                          <a:ea typeface="HG丸ｺﾞｼｯｸM-PRO" panose="020F0600000000000000" pitchFamily="50" charset="-128"/>
+                        </a:rPr>
+                        <a:t>走行体自身が、スタート位置として適切な場所にいるかを検知して、競技者に知らせる。</a:t>
+                      </a:r>
+                      <a:endParaRPr kumimoji="1" lang="ja-JP" altLang="en-US" sz="900">
+                        <a:latin typeface="HG丸ｺﾞｼｯｸM-PRO" panose="020F0600000000000000" pitchFamily="50" charset="-128"/>
+                        <a:ea typeface="HG丸ｺﾞｼｯｸM-PRO" panose="020F0600000000000000" pitchFamily="50" charset="-128"/>
+                      </a:endParaRPr>
+                    </a:p>
+                  </a:txBody>
+                  <a:tcPr anchor="ctr"/>
+                </a:tc>
+              </a:tr>
+              <a:tr h="325390">
+                <a:tc>
+                  <a:txBody>
+                    <a:bodyPr/>
+                    <a:lstStyle/>
+                    <a:p>
+                      <a:pPr algn="just"/>
+                      <a:r>
+                        <a:rPr kumimoji="1" lang="en-US" altLang="ja-JP" sz="900" smtClean="0">
+                          <a:latin typeface="HG丸ｺﾞｼｯｸM-PRO" panose="020F0600000000000000" pitchFamily="50" charset="-128"/>
+                          <a:ea typeface="HG丸ｺﾞｼｯｸM-PRO" panose="020F0600000000000000" pitchFamily="50" charset="-128"/>
+                        </a:rPr>
+                        <a:t>PC/</a:t>
+                      </a:r>
+                      <a:r>
+                        <a:rPr kumimoji="1" lang="ja-JP" altLang="en-US" sz="900" smtClean="0">
+                          <a:latin typeface="HG丸ｺﾞｼｯｸM-PRO" panose="020F0600000000000000" pitchFamily="50" charset="-128"/>
+                          <a:ea typeface="HG丸ｺﾞｼｯｸM-PRO" panose="020F0600000000000000" pitchFamily="50" charset="-128"/>
+                        </a:rPr>
+                        <a:t>無線機器の</a:t>
+                      </a:r>
+                      <a:endParaRPr kumimoji="1" lang="en-US" altLang="ja-JP" sz="900" smtClean="0">
+                        <a:latin typeface="HG丸ｺﾞｼｯｸM-PRO" panose="020F0600000000000000" pitchFamily="50" charset="-128"/>
+                        <a:ea typeface="HG丸ｺﾞｼｯｸM-PRO" panose="020F0600000000000000" pitchFamily="50" charset="-128"/>
+                      </a:endParaRPr>
+                    </a:p>
+                    <a:p>
+                      <a:pPr algn="just"/>
+                      <a:r>
+                        <a:rPr kumimoji="1" lang="ja-JP" altLang="en-US" sz="900" smtClean="0">
+                          <a:latin typeface="HG丸ｺﾞｼｯｸM-PRO" panose="020F0600000000000000" pitchFamily="50" charset="-128"/>
+                          <a:ea typeface="HG丸ｺﾞｼｯｸM-PRO" panose="020F0600000000000000" pitchFamily="50" charset="-128"/>
+                        </a:rPr>
+                        <a:t>不具合</a:t>
+                      </a:r>
+                      <a:endParaRPr kumimoji="1" lang="ja-JP" altLang="en-US" sz="900">
+                        <a:latin typeface="HG丸ｺﾞｼｯｸM-PRO" panose="020F0600000000000000" pitchFamily="50" charset="-128"/>
+                        <a:ea typeface="HG丸ｺﾞｼｯｸM-PRO" panose="020F0600000000000000" pitchFamily="50" charset="-128"/>
+                      </a:endParaRPr>
+                    </a:p>
+                  </a:txBody>
+                  <a:tcPr anchor="ctr"/>
+                </a:tc>
+                <a:tc>
+                  <a:txBody>
+                    <a:bodyPr/>
+                    <a:lstStyle/>
+                    <a:p>
+                      <a:pPr algn="just"/>
+                      <a:r>
+                        <a:rPr kumimoji="1" lang="en-US" altLang="ja-JP" sz="900" smtClean="0">
+                          <a:latin typeface="HG丸ｺﾞｼｯｸM-PRO" panose="020F0600000000000000" pitchFamily="50" charset="-128"/>
+                          <a:ea typeface="HG丸ｺﾞｼｯｸM-PRO" panose="020F0600000000000000" pitchFamily="50" charset="-128"/>
+                        </a:rPr>
+                        <a:t>Bluetooth</a:t>
+                      </a:r>
+                      <a:r>
+                        <a:rPr kumimoji="1" lang="ja-JP" altLang="en-US" sz="900" smtClean="0">
+                          <a:latin typeface="HG丸ｺﾞｼｯｸM-PRO" panose="020F0600000000000000" pitchFamily="50" charset="-128"/>
+                          <a:ea typeface="HG丸ｺﾞｼｯｸM-PRO" panose="020F0600000000000000" pitchFamily="50" charset="-128"/>
+                        </a:rPr>
+                        <a:t>通信ができず、リモートスタートできなくなる。</a:t>
+                      </a:r>
+                      <a:endParaRPr kumimoji="1" lang="ja-JP" altLang="en-US" sz="900">
+                        <a:latin typeface="HG丸ｺﾞｼｯｸM-PRO" panose="020F0600000000000000" pitchFamily="50" charset="-128"/>
+                        <a:ea typeface="HG丸ｺﾞｼｯｸM-PRO" panose="020F0600000000000000" pitchFamily="50" charset="-128"/>
+                      </a:endParaRPr>
+                    </a:p>
+                  </a:txBody>
+                  <a:tcPr anchor="ctr"/>
+                </a:tc>
+                <a:tc>
+                  <a:txBody>
+                    <a:bodyPr/>
+                    <a:lstStyle/>
+                    <a:p>
+                      <a:pPr algn="just"/>
+                      <a:r>
+                        <a:rPr kumimoji="1" lang="ja-JP" altLang="en-US" sz="900" smtClean="0">
+                          <a:latin typeface="HG丸ｺﾞｼｯｸM-PRO" panose="020F0600000000000000" pitchFamily="50" charset="-128"/>
+                          <a:ea typeface="HG丸ｺﾞｼｯｸM-PRO" panose="020F0600000000000000" pitchFamily="50" charset="-128"/>
+                        </a:rPr>
+                        <a:t>タッチセンサーを使用して、手動スタートを可能にする。</a:t>
+                      </a:r>
+                      <a:endParaRPr kumimoji="1" lang="ja-JP" altLang="en-US" sz="900">
+                        <a:latin typeface="HG丸ｺﾞｼｯｸM-PRO" panose="020F0600000000000000" pitchFamily="50" charset="-128"/>
+                        <a:ea typeface="HG丸ｺﾞｼｯｸM-PRO" panose="020F0600000000000000" pitchFamily="50" charset="-128"/>
+                      </a:endParaRPr>
+                    </a:p>
+                  </a:txBody>
+                  <a:tcPr anchor="ctr"/>
+                </a:tc>
+              </a:tr>
+              <a:tr h="325390">
+                <a:tc>
+                  <a:txBody>
+                    <a:bodyPr/>
+                    <a:lstStyle/>
+                    <a:p>
+                      <a:pPr algn="just"/>
+                      <a:r>
+                        <a:rPr kumimoji="1" lang="ja-JP" altLang="en-US" sz="900" smtClean="0">
+                          <a:latin typeface="HG丸ｺﾞｼｯｸM-PRO" panose="020F0600000000000000" pitchFamily="50" charset="-128"/>
+                          <a:ea typeface="HG丸ｺﾞｼｯｸM-PRO" panose="020F0600000000000000" pitchFamily="50" charset="-128"/>
+                        </a:rPr>
+                        <a:t>急カーブ</a:t>
+                      </a:r>
+                      <a:endParaRPr kumimoji="1" lang="ja-JP" altLang="en-US" sz="900">
+                        <a:latin typeface="HG丸ｺﾞｼｯｸM-PRO" panose="020F0600000000000000" pitchFamily="50" charset="-128"/>
+                        <a:ea typeface="HG丸ｺﾞｼｯｸM-PRO" panose="020F0600000000000000" pitchFamily="50" charset="-128"/>
+                      </a:endParaRPr>
+                    </a:p>
+                  </a:txBody>
+                  <a:tcPr anchor="ctr"/>
+                </a:tc>
+                <a:tc>
+                  <a:txBody>
+                    <a:bodyPr/>
+                    <a:lstStyle/>
+                    <a:p>
+                      <a:pPr algn="just"/>
+                      <a:r>
+                        <a:rPr kumimoji="1" lang="ja-JP" altLang="en-US" sz="900" smtClean="0">
+                          <a:latin typeface="HG丸ｺﾞｼｯｸM-PRO" panose="020F0600000000000000" pitchFamily="50" charset="-128"/>
+                          <a:ea typeface="HG丸ｺﾞｼｯｸM-PRO" panose="020F0600000000000000" pitchFamily="50" charset="-128"/>
+                        </a:rPr>
+                        <a:t>曲がりきれずコースアウトする。</a:t>
+                      </a:r>
+                      <a:endParaRPr kumimoji="1" lang="en-US" altLang="ja-JP" sz="900" smtClean="0">
+                        <a:latin typeface="HG丸ｺﾞｼｯｸM-PRO" panose="020F0600000000000000" pitchFamily="50" charset="-128"/>
+                        <a:ea typeface="HG丸ｺﾞｼｯｸM-PRO" panose="020F0600000000000000" pitchFamily="50" charset="-128"/>
+                      </a:endParaRPr>
+                    </a:p>
+                  </a:txBody>
+                  <a:tcPr anchor="ctr"/>
+                </a:tc>
+                <a:tc>
+                  <a:txBody>
+                    <a:bodyPr/>
+                    <a:lstStyle/>
+                    <a:p>
+                      <a:pPr algn="just"/>
+                      <a:r>
+                        <a:rPr kumimoji="1" lang="ja-JP" altLang="en-US" sz="900" smtClean="0">
+                          <a:latin typeface="HG丸ｺﾞｼｯｸM-PRO" panose="020F0600000000000000" pitchFamily="50" charset="-128"/>
+                          <a:ea typeface="HG丸ｺﾞｼｯｸM-PRO" panose="020F0600000000000000" pitchFamily="50" charset="-128"/>
+                        </a:rPr>
+                        <a:t>自己位置推定により、カーブを検出し、曲率に合わせて左右のモーターの速度を調節し、ロスのない走行を行う。</a:t>
+                      </a:r>
+                      <a:endParaRPr kumimoji="1" lang="ja-JP" altLang="en-US" sz="900">
+                        <a:latin typeface="HG丸ｺﾞｼｯｸM-PRO" panose="020F0600000000000000" pitchFamily="50" charset="-128"/>
+                        <a:ea typeface="HG丸ｺﾞｼｯｸM-PRO" panose="020F0600000000000000" pitchFamily="50" charset="-128"/>
+                      </a:endParaRPr>
+                    </a:p>
+                  </a:txBody>
+                  <a:tcPr anchor="ctr"/>
+                </a:tc>
+              </a:tr>
+              <a:tr h="325390">
+                <a:tc>
+                  <a:txBody>
+                    <a:bodyPr/>
+                    <a:lstStyle/>
+                    <a:p>
+                      <a:pPr algn="just"/>
+                      <a:r>
+                        <a:rPr kumimoji="1" lang="ja-JP" altLang="en-US" sz="900" smtClean="0">
+                          <a:latin typeface="HG丸ｺﾞｼｯｸM-PRO" panose="020F0600000000000000" pitchFamily="50" charset="-128"/>
+                          <a:ea typeface="HG丸ｺﾞｼｯｸM-PRO" panose="020F0600000000000000" pitchFamily="50" charset="-128"/>
+                        </a:rPr>
+                        <a:t>走行体・</a:t>
+                      </a:r>
+                      <a:endParaRPr kumimoji="1" lang="en-US" altLang="ja-JP" sz="900" smtClean="0">
+                        <a:latin typeface="HG丸ｺﾞｼｯｸM-PRO" panose="020F0600000000000000" pitchFamily="50" charset="-128"/>
+                        <a:ea typeface="HG丸ｺﾞｼｯｸM-PRO" panose="020F0600000000000000" pitchFamily="50" charset="-128"/>
+                      </a:endParaRPr>
+                    </a:p>
+                    <a:p>
+                      <a:pPr algn="just"/>
+                      <a:r>
+                        <a:rPr kumimoji="1" lang="ja-JP" altLang="en-US" sz="900" smtClean="0">
+                          <a:latin typeface="HG丸ｺﾞｼｯｸM-PRO" panose="020F0600000000000000" pitchFamily="50" charset="-128"/>
+                          <a:ea typeface="HG丸ｺﾞｼｯｸM-PRO" panose="020F0600000000000000" pitchFamily="50" charset="-128"/>
+                        </a:rPr>
+                        <a:t>部品の個体差</a:t>
+                      </a:r>
+                      <a:endParaRPr kumimoji="1" lang="ja-JP" altLang="en-US" sz="900">
+                        <a:latin typeface="HG丸ｺﾞｼｯｸM-PRO" panose="020F0600000000000000" pitchFamily="50" charset="-128"/>
+                        <a:ea typeface="HG丸ｺﾞｼｯｸM-PRO" panose="020F0600000000000000" pitchFamily="50" charset="-128"/>
+                      </a:endParaRPr>
+                    </a:p>
+                  </a:txBody>
+                  <a:tcPr anchor="ctr"/>
+                </a:tc>
+                <a:tc>
+                  <a:txBody>
+                    <a:bodyPr/>
+                    <a:lstStyle/>
+                    <a:p>
+                      <a:pPr algn="just"/>
+                      <a:r>
+                        <a:rPr kumimoji="1" lang="ja-JP" altLang="en-US" sz="900" smtClean="0">
+                          <a:latin typeface="HG丸ｺﾞｼｯｸM-PRO" panose="020F0600000000000000" pitchFamily="50" charset="-128"/>
+                          <a:ea typeface="HG丸ｺﾞｼｯｸM-PRO" panose="020F0600000000000000" pitchFamily="50" charset="-128"/>
+                        </a:rPr>
+                        <a:t>光センサの値がずれる。</a:t>
+                      </a:r>
+                      <a:endParaRPr kumimoji="1" lang="en-US" altLang="ja-JP" sz="900" smtClean="0">
+                        <a:latin typeface="HG丸ｺﾞｼｯｸM-PRO" panose="020F0600000000000000" pitchFamily="50" charset="-128"/>
+                        <a:ea typeface="HG丸ｺﾞｼｯｸM-PRO" panose="020F0600000000000000" pitchFamily="50" charset="-128"/>
+                      </a:endParaRPr>
+                    </a:p>
+                    <a:p>
+                      <a:pPr algn="just"/>
+                      <a:r>
+                        <a:rPr kumimoji="1" lang="ja-JP" altLang="en-US" sz="900" smtClean="0">
+                          <a:latin typeface="HG丸ｺﾞｼｯｸM-PRO" panose="020F0600000000000000" pitchFamily="50" charset="-128"/>
+                          <a:ea typeface="HG丸ｺﾞｼｯｸM-PRO" panose="020F0600000000000000" pitchFamily="50" charset="-128"/>
+                        </a:rPr>
+                        <a:t>左右のモーターの出力が一致しないため、まっすぐ走りたくても、ずれた方向に進んでしまう。</a:t>
+                      </a:r>
+                      <a:endParaRPr kumimoji="1" lang="en-US" altLang="ja-JP" sz="900" smtClean="0">
+                        <a:latin typeface="HG丸ｺﾞｼｯｸM-PRO" panose="020F0600000000000000" pitchFamily="50" charset="-128"/>
+                        <a:ea typeface="HG丸ｺﾞｼｯｸM-PRO" panose="020F0600000000000000" pitchFamily="50" charset="-128"/>
+                      </a:endParaRPr>
+                    </a:p>
+                  </a:txBody>
+                  <a:tcPr anchor="ctr"/>
+                </a:tc>
+                <a:tc>
+                  <a:txBody>
+                    <a:bodyPr/>
+                    <a:lstStyle/>
+                    <a:p>
+                      <a:pPr algn="just"/>
+                      <a:r>
+                        <a:rPr kumimoji="1" lang="ja-JP" altLang="en-US" sz="900" smtClean="0">
+                          <a:latin typeface="HG丸ｺﾞｼｯｸM-PRO" panose="020F0600000000000000" pitchFamily="50" charset="-128"/>
+                          <a:ea typeface="HG丸ｺﾞｼｯｸM-PRO" panose="020F0600000000000000" pitchFamily="50" charset="-128"/>
+                        </a:rPr>
+                        <a:t>事前のキャリブレーションで、センサー、モーターの個体値を取得し、それをもとに補正する。</a:t>
+                      </a:r>
+                      <a:endParaRPr kumimoji="1" lang="ja-JP" altLang="en-US" sz="900">
+                        <a:latin typeface="HG丸ｺﾞｼｯｸM-PRO" panose="020F0600000000000000" pitchFamily="50" charset="-128"/>
+                        <a:ea typeface="HG丸ｺﾞｼｯｸM-PRO" panose="020F0600000000000000" pitchFamily="50" charset="-128"/>
+                      </a:endParaRPr>
+                    </a:p>
+                  </a:txBody>
+                  <a:tcPr anchor="ctr"/>
+                </a:tc>
+              </a:tr>
+              <a:tr h="325390">
+                <a:tc>
+                  <a:txBody>
+                    <a:bodyPr/>
+                    <a:lstStyle/>
+                    <a:p>
+                      <a:pPr algn="just"/>
+                      <a:r>
+                        <a:rPr kumimoji="1" lang="ja-JP" altLang="en-US" sz="900" smtClean="0">
+                          <a:latin typeface="HG丸ｺﾞｼｯｸM-PRO" panose="020F0600000000000000" pitchFamily="50" charset="-128"/>
+                          <a:ea typeface="HG丸ｺﾞｼｯｸM-PRO" panose="020F0600000000000000" pitchFamily="50" charset="-128"/>
+                        </a:rPr>
+                        <a:t>速度の出しすぎ</a:t>
+                      </a:r>
+                      <a:endParaRPr kumimoji="1" lang="ja-JP" altLang="en-US" sz="900">
+                        <a:latin typeface="HG丸ｺﾞｼｯｸM-PRO" panose="020F0600000000000000" pitchFamily="50" charset="-128"/>
+                        <a:ea typeface="HG丸ｺﾞｼｯｸM-PRO" panose="020F0600000000000000" pitchFamily="50" charset="-128"/>
+                      </a:endParaRPr>
+                    </a:p>
+                  </a:txBody>
+                  <a:tcPr anchor="ctr"/>
+                </a:tc>
+                <a:tc>
+                  <a:txBody>
+                    <a:bodyPr/>
+                    <a:lstStyle/>
+                    <a:p>
+                      <a:pPr algn="just"/>
+                      <a:r>
+                        <a:rPr kumimoji="1" lang="ja-JP" altLang="en-US" sz="900" smtClean="0">
+                          <a:latin typeface="HG丸ｺﾞｼｯｸM-PRO" panose="020F0600000000000000" pitchFamily="50" charset="-128"/>
+                          <a:ea typeface="HG丸ｺﾞｼｯｸM-PRO" panose="020F0600000000000000" pitchFamily="50" charset="-128"/>
+                        </a:rPr>
+                        <a:t>曲がりきれずコースアウトする。</a:t>
+                      </a:r>
+                      <a:endParaRPr kumimoji="1" lang="en-US" altLang="ja-JP" sz="900" smtClean="0">
+                        <a:latin typeface="HG丸ｺﾞｼｯｸM-PRO" panose="020F0600000000000000" pitchFamily="50" charset="-128"/>
+                        <a:ea typeface="HG丸ｺﾞｼｯｸM-PRO" panose="020F0600000000000000" pitchFamily="50" charset="-128"/>
+                      </a:endParaRPr>
+                    </a:p>
+                    <a:p>
+                      <a:pPr algn="just"/>
+                      <a:r>
+                        <a:rPr kumimoji="1" lang="ja-JP" altLang="en-US" sz="900" smtClean="0">
+                          <a:latin typeface="HG丸ｺﾞｼｯｸM-PRO" panose="020F0600000000000000" pitchFamily="50" charset="-128"/>
+                          <a:ea typeface="HG丸ｺﾞｼｯｸM-PRO" panose="020F0600000000000000" pitchFamily="50" charset="-128"/>
+                        </a:rPr>
+                        <a:t>光センサがノイズを拾ったときに、大きく反応してしまう。</a:t>
+                      </a:r>
+                      <a:endParaRPr kumimoji="1" lang="ja-JP" altLang="en-US" sz="900">
+                        <a:latin typeface="HG丸ｺﾞｼｯｸM-PRO" panose="020F0600000000000000" pitchFamily="50" charset="-128"/>
+                        <a:ea typeface="HG丸ｺﾞｼｯｸM-PRO" panose="020F0600000000000000" pitchFamily="50" charset="-128"/>
+                      </a:endParaRPr>
+                    </a:p>
+                  </a:txBody>
+                  <a:tcPr anchor="ctr"/>
+                </a:tc>
+                <a:tc>
+                  <a:txBody>
+                    <a:bodyPr/>
+                    <a:lstStyle/>
+                    <a:p>
+                      <a:pPr algn="just"/>
+                      <a:r>
+                        <a:rPr kumimoji="1" lang="ja-JP" altLang="en-US" sz="900" smtClean="0">
+                          <a:latin typeface="HG丸ｺﾞｼｯｸM-PRO" panose="020F0600000000000000" pitchFamily="50" charset="-128"/>
+                          <a:ea typeface="HG丸ｺﾞｼｯｸM-PRO" panose="020F0600000000000000" pitchFamily="50" charset="-128"/>
+                        </a:rPr>
+                        <a:t>自己位置推定により、走行体のいる位置を検知し、コースの形に合わせて速度、</a:t>
+                      </a:r>
+                      <a:r>
+                        <a:rPr kumimoji="1" lang="en-US" altLang="ja-JP" sz="900" smtClean="0">
+                          <a:latin typeface="HG丸ｺﾞｼｯｸM-PRO" panose="020F0600000000000000" pitchFamily="50" charset="-128"/>
+                          <a:ea typeface="HG丸ｺﾞｼｯｸM-PRO" panose="020F0600000000000000" pitchFamily="50" charset="-128"/>
+                        </a:rPr>
+                        <a:t>PID</a:t>
+                      </a:r>
+                      <a:r>
+                        <a:rPr kumimoji="1" lang="ja-JP" altLang="en-US" sz="900" smtClean="0">
+                          <a:latin typeface="HG丸ｺﾞｼｯｸM-PRO" panose="020F0600000000000000" pitchFamily="50" charset="-128"/>
+                          <a:ea typeface="HG丸ｺﾞｼｯｸM-PRO" panose="020F0600000000000000" pitchFamily="50" charset="-128"/>
+                        </a:rPr>
+                        <a:t>値を調整する。</a:t>
+                      </a:r>
+                      <a:endParaRPr kumimoji="1" lang="en-US" altLang="ja-JP" sz="900" smtClean="0">
+                        <a:latin typeface="HG丸ｺﾞｼｯｸM-PRO" panose="020F0600000000000000" pitchFamily="50" charset="-128"/>
+                        <a:ea typeface="HG丸ｺﾞｼｯｸM-PRO" panose="020F0600000000000000" pitchFamily="50" charset="-128"/>
+                      </a:endParaRPr>
+                    </a:p>
+                    <a:p>
+                      <a:pPr algn="just"/>
+                      <a:r>
+                        <a:rPr kumimoji="1" lang="ja-JP" altLang="en-US" sz="900" smtClean="0">
+                          <a:latin typeface="HG丸ｺﾞｼｯｸM-PRO" panose="020F0600000000000000" pitchFamily="50" charset="-128"/>
+                          <a:ea typeface="HG丸ｺﾞｼｯｸM-PRO" panose="020F0600000000000000" pitchFamily="50" charset="-128"/>
+                        </a:rPr>
+                        <a:t>ローパスフィルターを用いて、ノイズを軽減する。</a:t>
+                      </a:r>
+                      <a:endParaRPr kumimoji="1" lang="en-US" altLang="ja-JP" sz="900" smtClean="0">
+                        <a:latin typeface="HG丸ｺﾞｼｯｸM-PRO" panose="020F0600000000000000" pitchFamily="50" charset="-128"/>
+                        <a:ea typeface="HG丸ｺﾞｼｯｸM-PRO" panose="020F0600000000000000" pitchFamily="50" charset="-128"/>
+                      </a:endParaRPr>
+                    </a:p>
+                  </a:txBody>
+                  <a:tcPr anchor="ctr"/>
+                </a:tc>
+              </a:tr>
+            </a:tbl>
+          </a:graphicData>
+        </a:graphic>
+      </p:graphicFrame>
+      <p:sp>
+        <p:nvSpPr>
+          <p:cNvPr id="98" name="テキスト ボックス 97"/>
+          <p:cNvSpPr txBox="1"/>
+          <p:nvPr/>
+        </p:nvSpPr>
+        <p:spPr>
+          <a:xfrm>
+            <a:off x="9242760" y="9365223"/>
+            <a:ext cx="3606543" cy="165036"/>
+          </a:xfrm>
+          <a:prstGeom prst="rect">
+            <a:avLst/>
+          </a:prstGeom>
+          <a:noFill/>
+        </p:spPr>
+        <p:txBody>
+          <a:bodyPr wrap="square" lIns="36000" tIns="36000" rIns="36000" bIns="36000" rtlCol="0">
+            <a:spAutoFit/>
+          </a:bodyPr>
+          <a:lstStyle/>
+          <a:p>
+            <a:r>
+              <a:rPr kumimoji="1" lang="en-US" altLang="ja-JP" sz="600" dirty="0" smtClean="0">
+                <a:latin typeface="HG丸ｺﾞｼｯｸM-PRO" panose="020F0600000000000000" pitchFamily="50" charset="-128"/>
+                <a:ea typeface="HG丸ｺﾞｼｯｸM-PRO" panose="020F0600000000000000" pitchFamily="50" charset="-128"/>
+              </a:rPr>
+              <a:t>※</a:t>
+            </a:r>
+            <a:r>
+              <a:rPr kumimoji="1" lang="ja-JP" altLang="en-US" sz="600" dirty="0" smtClean="0">
+                <a:latin typeface="HG丸ｺﾞｼｯｸM-PRO" panose="020F0600000000000000" pitchFamily="50" charset="-128"/>
+                <a:ea typeface="HG丸ｺﾞｼｯｸM-PRO" panose="020F0600000000000000" pitchFamily="50" charset="-128"/>
+              </a:rPr>
+              <a:t>まいまい</a:t>
+            </a:r>
+            <a:r>
+              <a:rPr lang="ja-JP" altLang="en-US" sz="600" dirty="0" smtClean="0">
+                <a:latin typeface="HG丸ｺﾞｼｯｸM-PRO" panose="020F0600000000000000" pitchFamily="50" charset="-128"/>
+                <a:ea typeface="HG丸ｺﾞｼｯｸM-PRO" panose="020F0600000000000000" pitchFamily="50" charset="-128"/>
+              </a:rPr>
+              <a:t>式 </a:t>
+            </a:r>
+            <a:r>
+              <a:rPr lang="en-US" altLang="ja-JP" sz="600" dirty="0" smtClean="0">
+                <a:latin typeface="HG丸ｺﾞｼｯｸM-PRO" panose="020F0600000000000000" pitchFamily="50" charset="-128"/>
+                <a:ea typeface="HG丸ｺﾞｼｯｸM-PRO" panose="020F0600000000000000" pitchFamily="50" charset="-128"/>
+              </a:rPr>
+              <a:t>:</a:t>
+            </a:r>
+            <a:r>
+              <a:rPr lang="ja-JP" altLang="en-US" sz="600" dirty="0" smtClean="0">
+                <a:latin typeface="HG丸ｺﾞｼｯｸM-PRO" panose="020F0600000000000000" pitchFamily="50" charset="-128"/>
+                <a:ea typeface="HG丸ｺﾞｼｯｸM-PRO" panose="020F0600000000000000" pitchFamily="50" charset="-128"/>
+              </a:rPr>
+              <a:t> </a:t>
+            </a:r>
+            <a:r>
+              <a:rPr lang="en-US" altLang="ja-JP" sz="600" dirty="0" smtClean="0">
+                <a:latin typeface="HG丸ｺﾞｼｯｸM-PRO" panose="020F0600000000000000" pitchFamily="50" charset="-128"/>
+                <a:ea typeface="HG丸ｺﾞｼｯｸM-PRO" panose="020F0600000000000000" pitchFamily="50" charset="-128"/>
+              </a:rPr>
+              <a:t>LED</a:t>
+            </a:r>
+            <a:r>
+              <a:rPr lang="ja-JP" altLang="en-US" sz="600" dirty="0" smtClean="0">
+                <a:latin typeface="HG丸ｺﾞｼｯｸM-PRO" panose="020F0600000000000000" pitchFamily="50" charset="-128"/>
+                <a:ea typeface="HG丸ｺﾞｼｯｸM-PRO" panose="020F0600000000000000" pitchFamily="50" charset="-128"/>
+              </a:rPr>
+              <a:t>の点灯時および消灯時の光センサの値を用いて、外乱光の影響を除去する技術。</a:t>
+            </a:r>
+            <a:endParaRPr kumimoji="1" lang="ja-JP" altLang="en-US" sz="600" dirty="0">
+              <a:latin typeface="HG丸ｺﾞｼｯｸM-PRO" panose="020F0600000000000000" pitchFamily="50" charset="-128"/>
+              <a:ea typeface="HG丸ｺﾞｼｯｸM-PRO" panose="020F0600000000000000" pitchFamily="50" charset="-128"/>
+            </a:endParaRPr>
+          </a:p>
+        </p:txBody>
+      </p:sp>
+      <p:pic>
+        <p:nvPicPr>
+          <p:cNvPr id="18" name="図 17"/>
+          <p:cNvPicPr>
+            <a:picLocks noChangeAspect="1"/>
+          </p:cNvPicPr>
+          <p:nvPr/>
+        </p:nvPicPr>
+        <p:blipFill>
+          <a:blip r:embed="rId3">
+            <a:extLst>
+              <a:ext uri="{28A0092B-C50C-407E-A947-70E740481C1C}">
+                <a14:useLocalDpi xmlns:a14="http://schemas.microsoft.com/office/drawing/2010/main" val="0"/>
+              </a:ext>
+            </a:extLst>
+          </a:blip>
+          <a:stretch>
+            <a:fillRect/>
+          </a:stretch>
+        </p:blipFill>
+        <p:spPr>
+          <a:xfrm>
+            <a:off x="6273135" y="825138"/>
+            <a:ext cx="5758543" cy="4671448"/>
+          </a:xfrm>
+          <a:prstGeom prst="rect">
+            <a:avLst/>
+          </a:prstGeom>
+        </p:spPr>
+      </p:pic>
     </p:spTree>
     <p:extLst>
       <p:ext uri="{BB962C8B-B14F-4D97-AF65-F5344CB8AC3E}">
@@ -11241,14 +9143,7 @@
                 <a:latin typeface="HG丸ｺﾞｼｯｸM-PRO" panose="020F0600000000000000" pitchFamily="50" charset="-128"/>
                 <a:ea typeface="HG丸ｺﾞｼｯｸM-PRO" panose="020F0600000000000000" pitchFamily="50" charset="-128"/>
               </a:rPr>
-              <a:t>線を誤検知したとしても、回転係数を小さく設定することで、機体のブレを最小限に抑えることができる</a:t>
-            </a:r>
-            <a:r>
-              <a:rPr kumimoji="1" lang="ja-JP" altLang="en-US" sz="1050" smtClean="0">
-                <a:latin typeface="HG丸ｺﾞｼｯｸM-PRO" panose="020F0600000000000000" pitchFamily="50" charset="-128"/>
-                <a:ea typeface="HG丸ｺﾞｼｯｸM-PRO" panose="020F0600000000000000" pitchFamily="50" charset="-128"/>
-              </a:rPr>
-              <a:t>。</a:t>
+              <a:t>線を誤検知したとしても、回転係数を小さく設定することで、機体のブレを最小限に抑えることができる。</a:t>
             </a:r>
             <a:endParaRPr lang="en-US" altLang="ja-JP" sz="500" dirty="0">
               <a:latin typeface="HG丸ｺﾞｼｯｸM-PRO" panose="020F0600000000000000" pitchFamily="50" charset="-128"/>
@@ -12078,14 +9973,7 @@
                 <a:latin typeface="HG丸ｺﾞｼｯｸM-PRO" panose="020F0600000000000000" pitchFamily="50" charset="-128"/>
                 <a:ea typeface="HG丸ｺﾞｼｯｸM-PRO" panose="020F0600000000000000" pitchFamily="50" charset="-128"/>
               </a:rPr>
-              <a:t>する</a:t>
-            </a:r>
-            <a:r>
-              <a:rPr kumimoji="1" lang="ja-JP" altLang="en-US" sz="1050" smtClean="0">
-                <a:latin typeface="HG丸ｺﾞｼｯｸM-PRO" panose="020F0600000000000000" pitchFamily="50" charset="-128"/>
-                <a:ea typeface="HG丸ｺﾞｼｯｸM-PRO" panose="020F0600000000000000" pitchFamily="50" charset="-128"/>
-              </a:rPr>
-              <a:t>。</a:t>
+              <a:t>する。</a:t>
             </a:r>
             <a:endParaRPr kumimoji="1" lang="en-US" altLang="ja-JP" sz="1050" dirty="0" smtClean="0">
               <a:latin typeface="HG丸ｺﾞｼｯｸM-PRO" panose="020F0600000000000000" pitchFamily="50" charset="-128"/>
@@ -13144,24 +11032,7 @@
                 <a:latin typeface="HG丸ｺﾞｼｯｸM-PRO" panose="020F0600000000000000" pitchFamily="50" charset="-128"/>
                 <a:ea typeface="HG丸ｺﾞｼｯｸM-PRO" panose="020F0600000000000000" pitchFamily="50" charset="-128"/>
               </a:rPr>
-              <a:t>字曲線</a:t>
-            </a:r>
-            <a:r>
-              <a:rPr lang="ja-JP" altLang="en-US" sz="1050" b="1" u="sng" smtClean="0">
-                <a:solidFill>
-                  <a:srgbClr val="0000CC"/>
-                </a:solidFill>
-                <a:uFill>
-                  <a:solidFill>
-                    <a:schemeClr val="bg1">
-                      <a:lumMod val="50000"/>
-                    </a:schemeClr>
-                  </a:solidFill>
-                </a:uFill>
-                <a:latin typeface="HG丸ｺﾞｼｯｸM-PRO" panose="020F0600000000000000" pitchFamily="50" charset="-128"/>
-                <a:ea typeface="HG丸ｺﾞｼｯｸM-PRO" panose="020F0600000000000000" pitchFamily="50" charset="-128"/>
-              </a:rPr>
-              <a:t>区間では、ライントレースをおこなわず、ショートカットする</a:t>
+              <a:t>字曲線区間では、ライントレースをおこなわず、ショートカットする</a:t>
             </a:r>
             <a:endParaRPr lang="en-US" altLang="ja-JP" sz="1050" b="1" u="sng" smtClean="0">
               <a:solidFill>
@@ -13200,14 +11071,7 @@
                 <a:latin typeface="HG丸ｺﾞｼｯｸM-PRO" panose="020F0600000000000000" pitchFamily="50" charset="-128"/>
                 <a:ea typeface="HG丸ｺﾞｼｯｸM-PRO" panose="020F0600000000000000" pitchFamily="50" charset="-128"/>
               </a:rPr>
-              <a:t>ライントレースをおこなわず、矢印の方向に一直線に進むことでショートカットを図る</a:t>
-            </a:r>
-            <a:r>
-              <a:rPr lang="ja-JP" altLang="en-US" sz="1050" smtClean="0">
-                <a:latin typeface="HG丸ｺﾞｼｯｸM-PRO" panose="020F0600000000000000" pitchFamily="50" charset="-128"/>
-                <a:ea typeface="HG丸ｺﾞｼｯｸM-PRO" panose="020F0600000000000000" pitchFamily="50" charset="-128"/>
-              </a:rPr>
-              <a:t>。</a:t>
+              <a:t>ライントレースをおこなわず、矢印の方向に一直線に進むことでショートカットを図る。</a:t>
             </a:r>
             <a:endParaRPr kumimoji="1" lang="en-US" altLang="ja-JP" sz="1050" dirty="0" smtClean="0">
               <a:latin typeface="HG丸ｺﾞｼｯｸM-PRO" panose="020F0600000000000000" pitchFamily="50" charset="-128"/>
@@ -13285,42 +11149,21 @@
                 <a:latin typeface="HG丸ｺﾞｼｯｸM-PRO" panose="020F0600000000000000" pitchFamily="50" charset="-128"/>
                 <a:ea typeface="HG丸ｺﾞｼｯｸM-PRO" panose="020F0600000000000000" pitchFamily="50" charset="-128"/>
               </a:rPr>
-              <a:t>　自己位置</a:t>
+              <a:t>　自己位置推定</a:t>
+            </a:r>
+            <a:r>
+              <a:rPr lang="ja-JP" altLang="en-US" sz="1050" smtClean="0">
+                <a:latin typeface="HG丸ｺﾞｼｯｸM-PRO" panose="020F0600000000000000" pitchFamily="50" charset="-128"/>
+                <a:ea typeface="HG丸ｺﾞｼｯｸM-PRO" panose="020F0600000000000000" pitchFamily="50" charset="-128"/>
+              </a:rPr>
+              <a:t>により</a:t>
             </a:r>
             <a:r>
               <a:rPr kumimoji="1" lang="ja-JP" altLang="en-US" sz="1050" smtClean="0">
                 <a:latin typeface="HG丸ｺﾞｼｯｸM-PRO" panose="020F0600000000000000" pitchFamily="50" charset="-128"/>
                 <a:ea typeface="HG丸ｺﾞｼｯｸM-PRO" panose="020F0600000000000000" pitchFamily="50" charset="-128"/>
               </a:rPr>
-              <a:t>推定</a:t>
-            </a:r>
-            <a:r>
-              <a:rPr lang="ja-JP" altLang="en-US" sz="1050" smtClean="0">
-                <a:latin typeface="HG丸ｺﾞｼｯｸM-PRO" panose="020F0600000000000000" pitchFamily="50" charset="-128"/>
-                <a:ea typeface="HG丸ｺﾞｼｯｸM-PRO" panose="020F0600000000000000" pitchFamily="50" charset="-128"/>
-              </a:rPr>
-              <a:t>により</a:t>
-            </a:r>
-            <a:r>
-              <a:rPr kumimoji="1" lang="ja-JP" altLang="en-US" sz="1050" smtClean="0">
-                <a:latin typeface="HG丸ｺﾞｼｯｸM-PRO" panose="020F0600000000000000" pitchFamily="50" charset="-128"/>
-                <a:ea typeface="HG丸ｺﾞｼｯｸM-PRO" panose="020F0600000000000000" pitchFamily="50" charset="-128"/>
-              </a:rPr>
-              <a:t>、</a:t>
-            </a:r>
-            <a:r>
-              <a:rPr kumimoji="1" lang="ja-JP" altLang="en-US" sz="1050" smtClean="0">
-                <a:latin typeface="HG丸ｺﾞｼｯｸM-PRO" panose="020F0600000000000000" pitchFamily="50" charset="-128"/>
-                <a:ea typeface="HG丸ｺﾞｼｯｸM-PRO" panose="020F0600000000000000" pitchFamily="50" charset="-128"/>
-              </a:rPr>
-              <a:t>ゆるやかな曲線</a:t>
-            </a:r>
-            <a:r>
-              <a:rPr kumimoji="1" lang="ja-JP" altLang="en-US" sz="1050" smtClean="0">
-                <a:latin typeface="HG丸ｺﾞｼｯｸM-PRO" panose="020F0600000000000000" pitchFamily="50" charset="-128"/>
-                <a:ea typeface="HG丸ｺﾞｼｯｸM-PRO" panose="020F0600000000000000" pitchFamily="50" charset="-128"/>
-              </a:rPr>
-              <a:t>区間、またはきつい曲線区間にいることを検知したら、曲線区間の曲率に最適な回転係数を使用する。</a:t>
+              <a:t>、ゆるやかな曲線区間、またはきつい曲線区間にいることを検知したら、曲線区間の曲率に最適な回転係数を使用する。</a:t>
             </a:r>
             <a:endParaRPr kumimoji="1" lang="en-US" altLang="ja-JP" sz="1050" dirty="0" smtClean="0">
               <a:latin typeface="HG丸ｺﾞｼｯｸM-PRO" panose="020F0600000000000000" pitchFamily="50" charset="-128"/>

</xml_diff>

<commit_message>
refs #180 changed page1,2
</commit_message>
<xml_diff>
--- a/docs/design/Deliverable/cliffedge_No130_model2015.pptx
+++ b/docs/design/Deliverable/cliffedge_No130_model2015.pptx
@@ -132,7 +132,7 @@
 
 <file path=ppt/commentAuthors.xml><?xml version="1.0" encoding="utf-8"?>
 <p:cmAuthorLst xmlns:a="http://schemas.openxmlformats.org/drawingml/2006/main" xmlns:r="http://schemas.openxmlformats.org/officeDocument/2006/relationships" xmlns:p="http://schemas.openxmlformats.org/presentationml/2006/main">
-  <p:cmAuthor id="1" name="Tomita Naoki" initials="TN" lastIdx="19" clrIdx="0">
+  <p:cmAuthor id="1" name="Tomita Naoki" initials="TN" lastIdx="21" clrIdx="0">
     <p:extLst>
       <p:ext uri="{19B8F6BF-5375-455C-9EA6-DF929625EA0E}">
         <p15:presenceInfo xmlns:p15="http://schemas.microsoft.com/office/powerpoint/2012/main" userId="S-1-5-21-2190579883-2944289640-774129622-259220" providerId="AD"/>
@@ -500,11 +500,11 @@
           <c:showPercent val="0"/>
           <c:showBubbleSize val="0"/>
         </c:dLbls>
-        <c:axId val="249463008"/>
-        <c:axId val="249463400"/>
+        <c:axId val="478867040"/>
+        <c:axId val="478867432"/>
       </c:scatterChart>
       <c:valAx>
-        <c:axId val="249463008"/>
+        <c:axId val="478867040"/>
         <c:scaling>
           <c:orientation val="minMax"/>
           <c:max val="800"/>
@@ -526,12 +526,12 @@
             <a:endParaRPr lang="ja-JP"/>
           </a:p>
         </c:txPr>
-        <c:crossAx val="249463400"/>
+        <c:crossAx val="478867432"/>
         <c:crosses val="autoZero"/>
         <c:crossBetween val="midCat"/>
       </c:valAx>
       <c:valAx>
-        <c:axId val="249463400"/>
+        <c:axId val="478867432"/>
         <c:scaling>
           <c:orientation val="minMax"/>
         </c:scaling>
@@ -552,7 +552,7 @@
             <a:endParaRPr lang="ja-JP"/>
           </a:p>
         </c:txPr>
-        <c:crossAx val="249463008"/>
+        <c:crossAx val="478867040"/>
         <c:crosses val="autoZero"/>
         <c:crossBetween val="midCat"/>
       </c:valAx>
@@ -597,12 +597,34 @@
       </p:ext>
     </p:extLst>
   </p:cm>
+  <p:cm authorId="1" dt="2015-07-23T12:07:12.502" idx="20">
+    <p:pos x="7482" y="3644"/>
+    <p:text>スペースを広げて、ミスユースケースの表を作った。</p:text>
+    <p:extLst>
+      <p:ext uri="{C676402C-5697-4E1C-873F-D02D1690AC5C}">
+        <p15:threadingInfo xmlns:p15="http://schemas.microsoft.com/office/powerpoint/2012/main" timeZoneBias="-540">
+          <p15:parentCm authorId="1" idx="3"/>
+        </p15:threadingInfo>
+      </p:ext>
+    </p:extLst>
+  </p:cm>
   <p:cm authorId="1" dt="2015-07-15T12:12:16.907" idx="4">
     <p:pos x="227" y="4103"/>
     <p:text>これは、どっちかを採用します。</p:text>
     <p:extLst>
       <p:ext uri="{C676402C-5697-4E1C-873F-D02D1690AC5C}">
         <p15:threadingInfo xmlns:p15="http://schemas.microsoft.com/office/powerpoint/2012/main" timeZoneBias="-540"/>
+      </p:ext>
+    </p:extLst>
+  </p:cm>
+  <p:cm authorId="1" dt="2015-07-23T12:07:25.049" idx="21">
+    <p:pos x="227" y="4239"/>
+    <p:text>自動スタート準備は無理。</p:text>
+    <p:extLst>
+      <p:ext uri="{C676402C-5697-4E1C-873F-D02D1690AC5C}">
+        <p15:threadingInfo xmlns:p15="http://schemas.microsoft.com/office/powerpoint/2012/main" timeZoneBias="-540">
+          <p15:parentCm authorId="1" idx="4"/>
+        </p15:threadingInfo>
       </p:ext>
     </p:extLst>
   </p:cm>
@@ -839,7 +861,7 @@
           <a:p>
             <a:fld id="{20DEA7AF-5BE1-40D9-B563-34B581AF3C5C}" type="datetimeFigureOut">
               <a:rPr kumimoji="1" lang="ja-JP" altLang="en-US" smtClean="0"/>
-              <a:t>2015/7/22</a:t>
+              <a:t>2015/7/23</a:t>
             </a:fld>
             <a:endParaRPr kumimoji="1" lang="ja-JP" altLang="en-US"/>
           </a:p>
@@ -1404,7 +1426,7 @@
           <a:p>
             <a:fld id="{41079119-3171-4BC9-A6EB-D7FA4532BD2E}" type="datetimeFigureOut">
               <a:rPr kumimoji="1" lang="ja-JP" altLang="en-US" smtClean="0"/>
-              <a:t>2015/7/22</a:t>
+              <a:t>2015/7/23</a:t>
             </a:fld>
             <a:endParaRPr kumimoji="1" lang="ja-JP" altLang="en-US"/>
           </a:p>
@@ -1606,7 +1628,7 @@
           <a:p>
             <a:fld id="{41079119-3171-4BC9-A6EB-D7FA4532BD2E}" type="datetimeFigureOut">
               <a:rPr kumimoji="1" lang="ja-JP" altLang="en-US" smtClean="0"/>
-              <a:t>2015/7/22</a:t>
+              <a:t>2015/7/23</a:t>
             </a:fld>
             <a:endParaRPr kumimoji="1" lang="ja-JP" altLang="en-US"/>
           </a:p>
@@ -1818,7 +1840,7 @@
           <a:p>
             <a:fld id="{41079119-3171-4BC9-A6EB-D7FA4532BD2E}" type="datetimeFigureOut">
               <a:rPr kumimoji="1" lang="ja-JP" altLang="en-US" smtClean="0"/>
-              <a:t>2015/7/22</a:t>
+              <a:t>2015/7/23</a:t>
             </a:fld>
             <a:endParaRPr kumimoji="1" lang="ja-JP" altLang="en-US"/>
           </a:p>
@@ -2020,7 +2042,7 @@
           <a:p>
             <a:fld id="{41079119-3171-4BC9-A6EB-D7FA4532BD2E}" type="datetimeFigureOut">
               <a:rPr kumimoji="1" lang="ja-JP" altLang="en-US" smtClean="0"/>
-              <a:t>2015/7/22</a:t>
+              <a:t>2015/7/23</a:t>
             </a:fld>
             <a:endParaRPr kumimoji="1" lang="ja-JP" altLang="en-US"/>
           </a:p>
@@ -2266,7 +2288,7 @@
           <a:p>
             <a:fld id="{41079119-3171-4BC9-A6EB-D7FA4532BD2E}" type="datetimeFigureOut">
               <a:rPr kumimoji="1" lang="ja-JP" altLang="en-US" smtClean="0"/>
-              <a:t>2015/7/22</a:t>
+              <a:t>2015/7/23</a:t>
             </a:fld>
             <a:endParaRPr kumimoji="1" lang="ja-JP" altLang="en-US"/>
           </a:p>
@@ -2618,7 +2640,7 @@
           <a:p>
             <a:fld id="{41079119-3171-4BC9-A6EB-D7FA4532BD2E}" type="datetimeFigureOut">
               <a:rPr kumimoji="1" lang="ja-JP" altLang="en-US" smtClean="0"/>
-              <a:t>2015/7/22</a:t>
+              <a:t>2015/7/23</a:t>
             </a:fld>
             <a:endParaRPr kumimoji="1" lang="ja-JP" altLang="en-US"/>
           </a:p>
@@ -3109,7 +3131,7 @@
           <a:p>
             <a:fld id="{41079119-3171-4BC9-A6EB-D7FA4532BD2E}" type="datetimeFigureOut">
               <a:rPr kumimoji="1" lang="ja-JP" altLang="en-US" smtClean="0"/>
-              <a:t>2015/7/22</a:t>
+              <a:t>2015/7/23</a:t>
             </a:fld>
             <a:endParaRPr kumimoji="1" lang="ja-JP" altLang="en-US"/>
           </a:p>
@@ -3227,7 +3249,7 @@
           <a:p>
             <a:fld id="{41079119-3171-4BC9-A6EB-D7FA4532BD2E}" type="datetimeFigureOut">
               <a:rPr kumimoji="1" lang="ja-JP" altLang="en-US" smtClean="0"/>
-              <a:t>2015/7/22</a:t>
+              <a:t>2015/7/23</a:t>
             </a:fld>
             <a:endParaRPr kumimoji="1" lang="ja-JP" altLang="en-US"/>
           </a:p>
@@ -3322,7 +3344,7 @@
           <a:p>
             <a:fld id="{41079119-3171-4BC9-A6EB-D7FA4532BD2E}" type="datetimeFigureOut">
               <a:rPr kumimoji="1" lang="ja-JP" altLang="en-US" smtClean="0"/>
-              <a:t>2015/7/22</a:t>
+              <a:t>2015/7/23</a:t>
             </a:fld>
             <a:endParaRPr kumimoji="1" lang="ja-JP" altLang="en-US"/>
           </a:p>
@@ -3631,7 +3653,7 @@
           <a:p>
             <a:fld id="{41079119-3171-4BC9-A6EB-D7FA4532BD2E}" type="datetimeFigureOut">
               <a:rPr kumimoji="1" lang="ja-JP" altLang="en-US" smtClean="0"/>
-              <a:t>2015/7/22</a:t>
+              <a:t>2015/7/23</a:t>
             </a:fld>
             <a:endParaRPr kumimoji="1" lang="ja-JP" altLang="en-US"/>
           </a:p>
@@ -3884,7 +3906,7 @@
           <a:p>
             <a:fld id="{41079119-3171-4BC9-A6EB-D7FA4532BD2E}" type="datetimeFigureOut">
               <a:rPr kumimoji="1" lang="ja-JP" altLang="en-US" smtClean="0"/>
-              <a:t>2015/7/22</a:t>
+              <a:t>2015/7/23</a:t>
             </a:fld>
             <a:endParaRPr kumimoji="1" lang="ja-JP" altLang="en-US"/>
           </a:p>
@@ -4129,7 +4151,7 @@
           <a:p>
             <a:fld id="{41079119-3171-4BC9-A6EB-D7FA4532BD2E}" type="datetimeFigureOut">
               <a:rPr kumimoji="1" lang="ja-JP" altLang="en-US" smtClean="0"/>
-              <a:t>2015/7/22</a:t>
+              <a:t>2015/7/23</a:t>
             </a:fld>
             <a:endParaRPr kumimoji="1" lang="ja-JP" altLang="en-US"/>
           </a:p>
@@ -5556,11 +5578,11 @@
           <a:p>
             <a:pPr marL="177800"/>
             <a:r>
-              <a:rPr lang="ja-JP" altLang="en-US" sz="1050">
-                <a:latin typeface="HG丸ｺﾞｼｯｸM-PRO" panose="020F0600000000000000" pitchFamily="50" charset="-128"/>
-                <a:ea typeface="HG丸ｺﾞｼｯｸM-PRO" panose="020F0600000000000000" pitchFamily="50" charset="-128"/>
-              </a:rPr>
-              <a:t>スタート</a:t>
+              <a:rPr lang="ja-JP" altLang="en-US" sz="1050" smtClean="0">
+                <a:latin typeface="HG丸ｺﾞｼｯｸM-PRO" panose="020F0600000000000000" pitchFamily="50" charset="-128"/>
+                <a:ea typeface="HG丸ｺﾞｼｯｸM-PRO" panose="020F0600000000000000" pitchFamily="50" charset="-128"/>
+              </a:rPr>
+              <a:t>　スタート</a:t>
             </a:r>
             <a:r>
               <a:rPr lang="ja-JP" altLang="en-US" sz="1050" smtClean="0">
@@ -5581,7 +5603,14 @@
                 <a:latin typeface="HG丸ｺﾞｼｯｸM-PRO" panose="020F0600000000000000" pitchFamily="50" charset="-128"/>
                 <a:ea typeface="HG丸ｺﾞｼｯｸM-PRO" panose="020F0600000000000000" pitchFamily="50" charset="-128"/>
               </a:rPr>
-              <a:t>これにより、ポイントが高くなり、難所攻略にかけられる時間を格段に増やすことができる。</a:t>
+              <a:t>　これ</a:t>
+            </a:r>
+            <a:r>
+              <a:rPr kumimoji="1" lang="ja-JP" altLang="en-US" sz="1050" smtClean="0">
+                <a:latin typeface="HG丸ｺﾞｼｯｸM-PRO" panose="020F0600000000000000" pitchFamily="50" charset="-128"/>
+                <a:ea typeface="HG丸ｺﾞｼｯｸM-PRO" panose="020F0600000000000000" pitchFamily="50" charset="-128"/>
+              </a:rPr>
+              <a:t>により、ポイントが高くなり、難所攻略にかけられる時間を格段に増やすことができる。</a:t>
             </a:r>
             <a:endParaRPr kumimoji="1" lang="ja-JP" altLang="en-US" sz="1050" dirty="0">
               <a:latin typeface="HG丸ｺﾞｼｯｸM-PRO" panose="020F0600000000000000" pitchFamily="50" charset="-128"/>
@@ -5683,7 +5712,14 @@
                 <a:latin typeface="HG丸ｺﾞｼｯｸM-PRO" panose="020F0600000000000000" pitchFamily="50" charset="-128"/>
                 <a:ea typeface="HG丸ｺﾞｼｯｸM-PRO" panose="020F0600000000000000" pitchFamily="50" charset="-128"/>
               </a:rPr>
-              <a:t>昨年、走行体をコースに設置する際、位置がずれてしまったことにより、スタート直後にコースアウトしてしまった。安全にスタートを切れるようにすることで、リタイアを避けたい。</a:t>
+              <a:t>　昨年</a:t>
+            </a:r>
+            <a:r>
+              <a:rPr lang="ja-JP" altLang="en-US" sz="1050" smtClean="0">
+                <a:latin typeface="HG丸ｺﾞｼｯｸM-PRO" panose="020F0600000000000000" pitchFamily="50" charset="-128"/>
+                <a:ea typeface="HG丸ｺﾞｼｯｸM-PRO" panose="020F0600000000000000" pitchFamily="50" charset="-128"/>
+              </a:rPr>
+              <a:t>、走行体をコースに設置する際、位置がずれてしまったことにより、スタート直後にコースアウトしてしまった。安全にスタートを切れるようにすることで、リタイアを避けたい。</a:t>
             </a:r>
             <a:endParaRPr kumimoji="1" lang="ja-JP" altLang="en-US" sz="1050" dirty="0">
               <a:latin typeface="HG丸ｺﾞｼｯｸM-PRO" panose="020F0600000000000000" pitchFamily="50" charset="-128"/>
@@ -5939,14 +5975,7 @@
                 <a:latin typeface="HG丸ｺﾞｼｯｸM-PRO" panose="020F0600000000000000" pitchFamily="50" charset="-128"/>
                 <a:ea typeface="HG丸ｺﾞｼｯｸM-PRO" panose="020F0600000000000000" pitchFamily="50" charset="-128"/>
               </a:rPr>
-              <a:t>ステート</a:t>
-            </a:r>
-            <a:r>
-              <a:rPr lang="ja-JP" altLang="en-US" sz="1050">
-                <a:latin typeface="HG丸ｺﾞｼｯｸM-PRO" panose="020F0600000000000000" pitchFamily="50" charset="-128"/>
-                <a:ea typeface="HG丸ｺﾞｼｯｸM-PRO" panose="020F0600000000000000" pitchFamily="50" charset="-128"/>
-              </a:rPr>
-              <a:t>マシン</a:t>
+              <a:t>　ステートマシン</a:t>
             </a:r>
             <a:r>
               <a:rPr lang="ja-JP" altLang="en-US" sz="1050" smtClean="0">
@@ -6609,11 +6638,18 @@
           <a:p>
             <a:pPr marL="177800"/>
             <a:r>
+              <a:rPr lang="ja-JP" altLang="en-US" sz="1050" smtClean="0">
+                <a:latin typeface="HG丸ｺﾞｼｯｸM-PRO" panose="020F0600000000000000" pitchFamily="50" charset="-128"/>
+                <a:ea typeface="HG丸ｺﾞｼｯｸM-PRO" panose="020F0600000000000000" pitchFamily="50" charset="-128"/>
+              </a:rPr>
+              <a:t>　走行体が</a:t>
+            </a:r>
+            <a:r>
               <a:rPr lang="ja-JP" altLang="en-US" sz="1050" dirty="0" smtClean="0">
                 <a:latin typeface="HG丸ｺﾞｼｯｸM-PRO" panose="020F0600000000000000" pitchFamily="50" charset="-128"/>
                 <a:ea typeface="HG丸ｺﾞｼｯｸM-PRO" panose="020F0600000000000000" pitchFamily="50" charset="-128"/>
               </a:rPr>
-              <a:t>機体が転倒したら、速やかにすべてのモーターを停止させる。</a:t>
+              <a:t>転倒したら、速やかにすべてのモーターを停止させる。</a:t>
             </a:r>
             <a:endParaRPr kumimoji="1" lang="ja-JP" altLang="en-US" sz="1050" dirty="0">
               <a:latin typeface="HG丸ｺﾞｼｯｸM-PRO" panose="020F0600000000000000" pitchFamily="50" charset="-128"/>
@@ -6657,14 +6693,7 @@
                 <a:latin typeface="HG丸ｺﾞｼｯｸM-PRO" panose="020F0600000000000000" pitchFamily="50" charset="-128"/>
                 <a:ea typeface="HG丸ｺﾞｼｯｸM-PRO" panose="020F0600000000000000" pitchFamily="50" charset="-128"/>
               </a:rPr>
-              <a:t>ため</a:t>
-            </a:r>
-            <a:r>
-              <a:rPr lang="ja-JP" altLang="en-US" sz="1050" smtClean="0">
-                <a:latin typeface="HG丸ｺﾞｼｯｸM-PRO" panose="020F0600000000000000" pitchFamily="50" charset="-128"/>
-                <a:ea typeface="HG丸ｺﾞｼｯｸM-PRO" panose="020F0600000000000000" pitchFamily="50" charset="-128"/>
-              </a:rPr>
-              <a:t>に</a:t>
+              <a:t>ために</a:t>
             </a:r>
             <a:endParaRPr lang="en-US" altLang="ja-JP" sz="1050">
               <a:latin typeface="HG丸ｺﾞｼｯｸM-PRO" panose="020F0600000000000000" pitchFamily="50" charset="-128"/>
@@ -7082,14 +7111,14 @@
           <p:nvPr>
             <p:extLst>
               <p:ext uri="{D42A27DB-BD31-4B8C-83A1-F6EECF244321}">
-                <p14:modId xmlns:p14="http://schemas.microsoft.com/office/powerpoint/2010/main" val="3667208940"/>
+                <p14:modId xmlns:p14="http://schemas.microsoft.com/office/powerpoint/2010/main" val="891172522"/>
               </p:ext>
             </p:extLst>
           </p:nvPr>
         </p:nvGraphicFramePr>
         <p:xfrm>
-          <a:off x="5793624" y="5508033"/>
-          <a:ext cx="6874436" cy="2702830"/>
+          <a:off x="5793624" y="5450883"/>
+          <a:ext cx="6874436" cy="4034060"/>
         </p:xfrm>
         <a:graphic>
           <a:graphicData uri="http://schemas.openxmlformats.org/drawingml/2006/table">
@@ -7108,15 +7137,19 @@
                     <a:bodyPr/>
                     <a:lstStyle/>
                     <a:p>
-                      <a:pPr algn="ctr"/>
+                      <a:pPr algn="ctr">
+                        <a:lnSpc>
+                          <a:spcPct val="100000"/>
+                        </a:lnSpc>
+                      </a:pPr>
                       <a:r>
-                        <a:rPr kumimoji="1" lang="ja-JP" altLang="en-US" sz="900" smtClean="0">
+                        <a:rPr kumimoji="1" lang="ja-JP" altLang="en-US" sz="900" kern="0" spc="0" baseline="0" smtClean="0">
                           <a:latin typeface="HG丸ｺﾞｼｯｸM-PRO" panose="020F0600000000000000" pitchFamily="50" charset="-128"/>
                           <a:ea typeface="HG丸ｺﾞｼｯｸM-PRO" panose="020F0600000000000000" pitchFamily="50" charset="-128"/>
                         </a:rPr>
                         <a:t>リスク因子</a:t>
                       </a:r>
-                      <a:endParaRPr kumimoji="1" lang="ja-JP" altLang="en-US" sz="900">
+                      <a:endParaRPr kumimoji="1" lang="ja-JP" altLang="en-US" sz="900" kern="0" spc="0" baseline="0">
                         <a:latin typeface="HG丸ｺﾞｼｯｸM-PRO" panose="020F0600000000000000" pitchFamily="50" charset="-128"/>
                         <a:ea typeface="HG丸ｺﾞｼｯｸM-PRO" panose="020F0600000000000000" pitchFamily="50" charset="-128"/>
                       </a:endParaRPr>
@@ -7129,15 +7162,19 @@
                     <a:bodyPr/>
                     <a:lstStyle/>
                     <a:p>
-                      <a:pPr algn="ctr"/>
+                      <a:pPr algn="ctr">
+                        <a:lnSpc>
+                          <a:spcPct val="100000"/>
+                        </a:lnSpc>
+                      </a:pPr>
                       <a:r>
-                        <a:rPr kumimoji="1" lang="ja-JP" altLang="en-US" sz="900" smtClean="0">
+                        <a:rPr kumimoji="1" lang="ja-JP" altLang="en-US" sz="900" kern="0" spc="0" baseline="0" smtClean="0">
                           <a:latin typeface="HG丸ｺﾞｼｯｸM-PRO" panose="020F0600000000000000" pitchFamily="50" charset="-128"/>
                           <a:ea typeface="HG丸ｺﾞｼｯｸM-PRO" panose="020F0600000000000000" pitchFamily="50" charset="-128"/>
                         </a:rPr>
                         <a:t>脅威の内容</a:t>
                       </a:r>
-                      <a:endParaRPr kumimoji="1" lang="ja-JP" altLang="en-US" sz="900">
+                      <a:endParaRPr kumimoji="1" lang="ja-JP" altLang="en-US" sz="900" kern="0" spc="0" baseline="0">
                         <a:latin typeface="HG丸ｺﾞｼｯｸM-PRO" panose="020F0600000000000000" pitchFamily="50" charset="-128"/>
                         <a:ea typeface="HG丸ｺﾞｼｯｸM-PRO" panose="020F0600000000000000" pitchFamily="50" charset="-128"/>
                       </a:endParaRPr>
@@ -7150,15 +7187,19 @@
                     <a:bodyPr/>
                     <a:lstStyle/>
                     <a:p>
-                      <a:pPr algn="ctr"/>
+                      <a:pPr algn="ctr">
+                        <a:lnSpc>
+                          <a:spcPct val="100000"/>
+                        </a:lnSpc>
+                      </a:pPr>
                       <a:r>
-                        <a:rPr kumimoji="1" lang="ja-JP" altLang="en-US" sz="900" smtClean="0">
+                        <a:rPr kumimoji="1" lang="ja-JP" altLang="en-US" sz="900" kern="0" spc="0" baseline="0" smtClean="0">
                           <a:latin typeface="HG丸ｺﾞｼｯｸM-PRO" panose="020F0600000000000000" pitchFamily="50" charset="-128"/>
                           <a:ea typeface="HG丸ｺﾞｼｯｸM-PRO" panose="020F0600000000000000" pitchFamily="50" charset="-128"/>
                         </a:rPr>
                         <a:t>緩和策</a:t>
                       </a:r>
-                      <a:endParaRPr kumimoji="1" lang="ja-JP" altLang="en-US" sz="900">
+                      <a:endParaRPr kumimoji="1" lang="ja-JP" altLang="en-US" sz="900" kern="0" spc="0" baseline="0">
                         <a:latin typeface="HG丸ｺﾞｼｯｸM-PRO" panose="020F0600000000000000" pitchFamily="50" charset="-128"/>
                         <a:ea typeface="HG丸ｺﾞｼｯｸM-PRO" panose="020F0600000000000000" pitchFamily="50" charset="-128"/>
                       </a:endParaRPr>
@@ -7173,29 +7214,37 @@
                     <a:bodyPr/>
                     <a:lstStyle/>
                     <a:p>
-                      <a:pPr algn="just"/>
+                      <a:pPr algn="just">
+                        <a:lnSpc>
+                          <a:spcPct val="100000"/>
+                        </a:lnSpc>
+                      </a:pPr>
                       <a:r>
-                        <a:rPr kumimoji="1" lang="ja-JP" altLang="en-US" sz="900" smtClean="0">
+                        <a:rPr kumimoji="1" lang="ja-JP" altLang="en-US" sz="900" kern="0" spc="0" baseline="0" smtClean="0">
                           <a:latin typeface="HG丸ｺﾞｼｯｸM-PRO" panose="020F0600000000000000" pitchFamily="50" charset="-128"/>
                           <a:ea typeface="HG丸ｺﾞｼｯｸM-PRO" panose="020F0600000000000000" pitchFamily="50" charset="-128"/>
                         </a:rPr>
                         <a:t>不適切な</a:t>
                       </a:r>
-                      <a:endParaRPr kumimoji="1" lang="en-US" altLang="ja-JP" sz="900" smtClean="0">
+                      <a:endParaRPr kumimoji="1" lang="en-US" altLang="ja-JP" sz="900" kern="0" spc="0" baseline="0" smtClean="0">
                         <a:latin typeface="HG丸ｺﾞｼｯｸM-PRO" panose="020F0600000000000000" pitchFamily="50" charset="-128"/>
                         <a:ea typeface="HG丸ｺﾞｼｯｸM-PRO" panose="020F0600000000000000" pitchFamily="50" charset="-128"/>
                       </a:endParaRPr>
                     </a:p>
                     <a:p>
-                      <a:pPr algn="just"/>
+                      <a:pPr algn="just">
+                        <a:lnSpc>
+                          <a:spcPct val="100000"/>
+                        </a:lnSpc>
+                      </a:pPr>
                       <a:r>
-                        <a:rPr kumimoji="1" lang="ja-JP" altLang="en-US" sz="900" smtClean="0">
+                        <a:rPr kumimoji="1" lang="ja-JP" altLang="en-US" sz="900" kern="0" spc="0" baseline="0" smtClean="0">
                           <a:latin typeface="HG丸ｺﾞｼｯｸM-PRO" panose="020F0600000000000000" pitchFamily="50" charset="-128"/>
                           <a:ea typeface="HG丸ｺﾞｼｯｸM-PRO" panose="020F0600000000000000" pitchFamily="50" charset="-128"/>
                         </a:rPr>
                         <a:t>走行体の配置</a:t>
                       </a:r>
-                      <a:endParaRPr kumimoji="1" lang="ja-JP" altLang="en-US" sz="900">
+                      <a:endParaRPr kumimoji="1" lang="ja-JP" altLang="en-US" sz="900" kern="0" spc="0" baseline="0">
                         <a:latin typeface="HG丸ｺﾞｼｯｸM-PRO" panose="020F0600000000000000" pitchFamily="50" charset="-128"/>
                         <a:ea typeface="HG丸ｺﾞｼｯｸM-PRO" panose="020F0600000000000000" pitchFamily="50" charset="-128"/>
                       </a:endParaRPr>
@@ -7208,15 +7257,19 @@
                     <a:bodyPr/>
                     <a:lstStyle/>
                     <a:p>
-                      <a:pPr algn="just"/>
+                      <a:pPr algn="just">
+                        <a:lnSpc>
+                          <a:spcPct val="100000"/>
+                        </a:lnSpc>
+                      </a:pPr>
                       <a:r>
-                        <a:rPr kumimoji="1" lang="ja-JP" altLang="en-US" sz="900" smtClean="0">
+                        <a:rPr kumimoji="1" lang="ja-JP" altLang="en-US" sz="900" kern="0" spc="0" baseline="0" smtClean="0">
                           <a:latin typeface="HG丸ｺﾞｼｯｸM-PRO" panose="020F0600000000000000" pitchFamily="50" charset="-128"/>
                           <a:ea typeface="HG丸ｺﾞｼｯｸM-PRO" panose="020F0600000000000000" pitchFamily="50" charset="-128"/>
                         </a:rPr>
                         <a:t>いつもと違う環境でスタート位置に走行体を配置しようとして、置こうと思っていたところに置けず、スタート時にラインを見失ってしまう。</a:t>
                       </a:r>
-                      <a:endParaRPr kumimoji="1" lang="ja-JP" altLang="en-US" sz="900">
+                      <a:endParaRPr kumimoji="1" lang="ja-JP" altLang="en-US" sz="900" kern="0" spc="0" baseline="0">
                         <a:latin typeface="HG丸ｺﾞｼｯｸM-PRO" panose="020F0600000000000000" pitchFamily="50" charset="-128"/>
                         <a:ea typeface="HG丸ｺﾞｼｯｸM-PRO" panose="020F0600000000000000" pitchFamily="50" charset="-128"/>
                       </a:endParaRPr>
@@ -7229,15 +7282,19 @@
                     <a:bodyPr/>
                     <a:lstStyle/>
                     <a:p>
-                      <a:pPr algn="just"/>
+                      <a:pPr algn="just">
+                        <a:lnSpc>
+                          <a:spcPct val="100000"/>
+                        </a:lnSpc>
+                      </a:pPr>
                       <a:r>
-                        <a:rPr kumimoji="1" lang="ja-JP" altLang="en-US" sz="900" smtClean="0">
+                        <a:rPr kumimoji="1" lang="ja-JP" altLang="en-US" sz="900" kern="0" spc="0" baseline="0" smtClean="0">
                           <a:latin typeface="HG丸ｺﾞｼｯｸM-PRO" panose="020F0600000000000000" pitchFamily="50" charset="-128"/>
                           <a:ea typeface="HG丸ｺﾞｼｯｸM-PRO" panose="020F0600000000000000" pitchFamily="50" charset="-128"/>
                         </a:rPr>
                         <a:t>走行体自身が、スタート位置として適切な場所にいるかを検知して、競技者に知らせる。</a:t>
                       </a:r>
-                      <a:endParaRPr kumimoji="1" lang="ja-JP" altLang="en-US" sz="900">
+                      <a:endParaRPr kumimoji="1" lang="ja-JP" altLang="en-US" sz="900" kern="0" spc="0" baseline="0">
                         <a:latin typeface="HG丸ｺﾞｼｯｸM-PRO" panose="020F0600000000000000" pitchFamily="50" charset="-128"/>
                         <a:ea typeface="HG丸ｺﾞｼｯｸM-PRO" panose="020F0600000000000000" pitchFamily="50" charset="-128"/>
                       </a:endParaRPr>
@@ -7252,36 +7309,44 @@
                     <a:bodyPr/>
                     <a:lstStyle/>
                     <a:p>
-                      <a:pPr algn="just"/>
+                      <a:pPr algn="just">
+                        <a:lnSpc>
+                          <a:spcPct val="100000"/>
+                        </a:lnSpc>
+                      </a:pPr>
                       <a:r>
-                        <a:rPr kumimoji="1" lang="en-US" altLang="ja-JP" sz="900" smtClean="0">
+                        <a:rPr kumimoji="1" lang="en-US" altLang="ja-JP" sz="900" kern="0" spc="0" baseline="0" smtClean="0">
                           <a:latin typeface="HG丸ｺﾞｼｯｸM-PRO" panose="020F0600000000000000" pitchFamily="50" charset="-128"/>
                           <a:ea typeface="HG丸ｺﾞｼｯｸM-PRO" panose="020F0600000000000000" pitchFamily="50" charset="-128"/>
                         </a:rPr>
                         <a:t>PC/</a:t>
                       </a:r>
                       <a:r>
-                        <a:rPr kumimoji="1" lang="ja-JP" altLang="en-US" sz="900" smtClean="0">
+                        <a:rPr kumimoji="1" lang="ja-JP" altLang="en-US" sz="900" kern="0" spc="0" baseline="0" smtClean="0">
                           <a:latin typeface="HG丸ｺﾞｼｯｸM-PRO" panose="020F0600000000000000" pitchFamily="50" charset="-128"/>
                           <a:ea typeface="HG丸ｺﾞｼｯｸM-PRO" panose="020F0600000000000000" pitchFamily="50" charset="-128"/>
                         </a:rPr>
                         <a:t>無線機器の</a:t>
                       </a:r>
-                      <a:endParaRPr kumimoji="1" lang="en-US" altLang="ja-JP" sz="900" smtClean="0">
+                      <a:endParaRPr kumimoji="1" lang="en-US" altLang="ja-JP" sz="900" kern="0" spc="0" baseline="0" smtClean="0">
                         <a:latin typeface="HG丸ｺﾞｼｯｸM-PRO" panose="020F0600000000000000" pitchFamily="50" charset="-128"/>
                         <a:ea typeface="HG丸ｺﾞｼｯｸM-PRO" panose="020F0600000000000000" pitchFamily="50" charset="-128"/>
                       </a:endParaRPr>
                     </a:p>
                     <a:p>
-                      <a:pPr algn="just"/>
+                      <a:pPr algn="just">
+                        <a:lnSpc>
+                          <a:spcPct val="100000"/>
+                        </a:lnSpc>
+                      </a:pPr>
                       <a:r>
-                        <a:rPr kumimoji="1" lang="ja-JP" altLang="en-US" sz="900" smtClean="0">
+                        <a:rPr kumimoji="1" lang="ja-JP" altLang="en-US" sz="900" kern="0" spc="0" baseline="0" smtClean="0">
                           <a:latin typeface="HG丸ｺﾞｼｯｸM-PRO" panose="020F0600000000000000" pitchFamily="50" charset="-128"/>
                           <a:ea typeface="HG丸ｺﾞｼｯｸM-PRO" panose="020F0600000000000000" pitchFamily="50" charset="-128"/>
                         </a:rPr>
                         <a:t>不具合</a:t>
                       </a:r>
-                      <a:endParaRPr kumimoji="1" lang="ja-JP" altLang="en-US" sz="900">
+                      <a:endParaRPr kumimoji="1" lang="ja-JP" altLang="en-US" sz="900" kern="0" spc="0" baseline="0">
                         <a:latin typeface="HG丸ｺﾞｼｯｸM-PRO" panose="020F0600000000000000" pitchFamily="50" charset="-128"/>
                         <a:ea typeface="HG丸ｺﾞｼｯｸM-PRO" panose="020F0600000000000000" pitchFamily="50" charset="-128"/>
                       </a:endParaRPr>
@@ -7294,22 +7359,26 @@
                     <a:bodyPr/>
                     <a:lstStyle/>
                     <a:p>
-                      <a:pPr algn="just"/>
+                      <a:pPr algn="just">
+                        <a:lnSpc>
+                          <a:spcPct val="100000"/>
+                        </a:lnSpc>
+                      </a:pPr>
                       <a:r>
-                        <a:rPr kumimoji="1" lang="en-US" altLang="ja-JP" sz="900" smtClean="0">
+                        <a:rPr kumimoji="1" lang="en-US" altLang="ja-JP" sz="900" kern="0" spc="0" baseline="0" smtClean="0">
                           <a:latin typeface="HG丸ｺﾞｼｯｸM-PRO" panose="020F0600000000000000" pitchFamily="50" charset="-128"/>
                           <a:ea typeface="HG丸ｺﾞｼｯｸM-PRO" panose="020F0600000000000000" pitchFamily="50" charset="-128"/>
                         </a:rPr>
                         <a:t>Bluetooth</a:t>
                       </a:r>
                       <a:r>
-                        <a:rPr kumimoji="1" lang="ja-JP" altLang="en-US" sz="900" smtClean="0">
+                        <a:rPr kumimoji="1" lang="ja-JP" altLang="en-US" sz="900" kern="0" spc="0" baseline="0" smtClean="0">
                           <a:latin typeface="HG丸ｺﾞｼｯｸM-PRO" panose="020F0600000000000000" pitchFamily="50" charset="-128"/>
                           <a:ea typeface="HG丸ｺﾞｼｯｸM-PRO" panose="020F0600000000000000" pitchFamily="50" charset="-128"/>
                         </a:rPr>
                         <a:t>通信ができず、リモートスタートできなくなる。</a:t>
                       </a:r>
-                      <a:endParaRPr kumimoji="1" lang="ja-JP" altLang="en-US" sz="900">
+                      <a:endParaRPr kumimoji="1" lang="ja-JP" altLang="en-US" sz="900" kern="0" spc="0" baseline="0">
                         <a:latin typeface="HG丸ｺﾞｼｯｸM-PRO" panose="020F0600000000000000" pitchFamily="50" charset="-128"/>
                         <a:ea typeface="HG丸ｺﾞｼｯｸM-PRO" panose="020F0600000000000000" pitchFamily="50" charset="-128"/>
                       </a:endParaRPr>
@@ -7322,15 +7391,19 @@
                     <a:bodyPr/>
                     <a:lstStyle/>
                     <a:p>
-                      <a:pPr algn="just"/>
+                      <a:pPr algn="just">
+                        <a:lnSpc>
+                          <a:spcPct val="100000"/>
+                        </a:lnSpc>
+                      </a:pPr>
                       <a:r>
-                        <a:rPr kumimoji="1" lang="ja-JP" altLang="en-US" sz="900" smtClean="0">
+                        <a:rPr kumimoji="1" lang="ja-JP" altLang="en-US" sz="900" kern="0" spc="0" baseline="0" smtClean="0">
                           <a:latin typeface="HG丸ｺﾞｼｯｸM-PRO" panose="020F0600000000000000" pitchFamily="50" charset="-128"/>
                           <a:ea typeface="HG丸ｺﾞｼｯｸM-PRO" panose="020F0600000000000000" pitchFamily="50" charset="-128"/>
                         </a:rPr>
                         <a:t>タッチセンサーを使用して、手動スタートを可能にする。</a:t>
                       </a:r>
-                      <a:endParaRPr kumimoji="1" lang="ja-JP" altLang="en-US" sz="900">
+                      <a:endParaRPr kumimoji="1" lang="ja-JP" altLang="en-US" sz="900" kern="0" spc="0" baseline="0">
                         <a:latin typeface="HG丸ｺﾞｼｯｸM-PRO" panose="020F0600000000000000" pitchFamily="50" charset="-128"/>
                         <a:ea typeface="HG丸ｺﾞｼｯｸM-PRO" panose="020F0600000000000000" pitchFamily="50" charset="-128"/>
                       </a:endParaRPr>
@@ -7345,15 +7418,19 @@
                     <a:bodyPr/>
                     <a:lstStyle/>
                     <a:p>
-                      <a:pPr algn="just"/>
+                      <a:pPr algn="just">
+                        <a:lnSpc>
+                          <a:spcPct val="100000"/>
+                        </a:lnSpc>
+                      </a:pPr>
                       <a:r>
-                        <a:rPr kumimoji="1" lang="ja-JP" altLang="en-US" sz="900" smtClean="0">
+                        <a:rPr kumimoji="1" lang="ja-JP" altLang="en-US" sz="900" kern="0" spc="0" baseline="0" smtClean="0">
                           <a:latin typeface="HG丸ｺﾞｼｯｸM-PRO" panose="020F0600000000000000" pitchFamily="50" charset="-128"/>
                           <a:ea typeface="HG丸ｺﾞｼｯｸM-PRO" panose="020F0600000000000000" pitchFamily="50" charset="-128"/>
                         </a:rPr>
                         <a:t>急カーブ</a:t>
                       </a:r>
-                      <a:endParaRPr kumimoji="1" lang="ja-JP" altLang="en-US" sz="900">
+                      <a:endParaRPr kumimoji="1" lang="ja-JP" altLang="en-US" sz="900" kern="0" spc="0" baseline="0">
                         <a:latin typeface="HG丸ｺﾞｼｯｸM-PRO" panose="020F0600000000000000" pitchFamily="50" charset="-128"/>
                         <a:ea typeface="HG丸ｺﾞｼｯｸM-PRO" panose="020F0600000000000000" pitchFamily="50" charset="-128"/>
                       </a:endParaRPr>
@@ -7366,15 +7443,19 @@
                     <a:bodyPr/>
                     <a:lstStyle/>
                     <a:p>
-                      <a:pPr algn="just"/>
+                      <a:pPr algn="just">
+                        <a:lnSpc>
+                          <a:spcPct val="100000"/>
+                        </a:lnSpc>
+                      </a:pPr>
                       <a:r>
-                        <a:rPr kumimoji="1" lang="ja-JP" altLang="en-US" sz="900" smtClean="0">
+                        <a:rPr kumimoji="1" lang="ja-JP" altLang="en-US" sz="900" kern="0" spc="0" baseline="0" smtClean="0">
                           <a:latin typeface="HG丸ｺﾞｼｯｸM-PRO" panose="020F0600000000000000" pitchFamily="50" charset="-128"/>
                           <a:ea typeface="HG丸ｺﾞｼｯｸM-PRO" panose="020F0600000000000000" pitchFamily="50" charset="-128"/>
                         </a:rPr>
                         <a:t>曲がりきれずコースアウトする。</a:t>
                       </a:r>
-                      <a:endParaRPr kumimoji="1" lang="en-US" altLang="ja-JP" sz="900" smtClean="0">
+                      <a:endParaRPr kumimoji="1" lang="en-US" altLang="ja-JP" sz="900" kern="0" spc="0" baseline="0" smtClean="0">
                         <a:latin typeface="HG丸ｺﾞｼｯｸM-PRO" panose="020F0600000000000000" pitchFamily="50" charset="-128"/>
                         <a:ea typeface="HG丸ｺﾞｼｯｸM-PRO" panose="020F0600000000000000" pitchFamily="50" charset="-128"/>
                       </a:endParaRPr>
@@ -7387,15 +7468,19 @@
                     <a:bodyPr/>
                     <a:lstStyle/>
                     <a:p>
-                      <a:pPr algn="just"/>
+                      <a:pPr algn="just">
+                        <a:lnSpc>
+                          <a:spcPct val="100000"/>
+                        </a:lnSpc>
+                      </a:pPr>
                       <a:r>
-                        <a:rPr kumimoji="1" lang="ja-JP" altLang="en-US" sz="900" smtClean="0">
+                        <a:rPr kumimoji="1" lang="ja-JP" altLang="en-US" sz="900" kern="0" spc="0" baseline="0" smtClean="0">
                           <a:latin typeface="HG丸ｺﾞｼｯｸM-PRO" panose="020F0600000000000000" pitchFamily="50" charset="-128"/>
                           <a:ea typeface="HG丸ｺﾞｼｯｸM-PRO" panose="020F0600000000000000" pitchFamily="50" charset="-128"/>
                         </a:rPr>
                         <a:t>自己位置推定により、カーブを検出し、曲率に合わせて左右のモーターの速度を調節し、ロスのない走行を行う。</a:t>
                       </a:r>
-                      <a:endParaRPr kumimoji="1" lang="ja-JP" altLang="en-US" sz="900">
+                      <a:endParaRPr kumimoji="1" lang="ja-JP" altLang="en-US" sz="900" kern="0" spc="0" baseline="0">
                         <a:latin typeface="HG丸ｺﾞｼｯｸM-PRO" panose="020F0600000000000000" pitchFamily="50" charset="-128"/>
                         <a:ea typeface="HG丸ｺﾞｼｯｸM-PRO" panose="020F0600000000000000" pitchFamily="50" charset="-128"/>
                       </a:endParaRPr>
@@ -7410,29 +7495,37 @@
                     <a:bodyPr/>
                     <a:lstStyle/>
                     <a:p>
-                      <a:pPr algn="just"/>
+                      <a:pPr algn="just">
+                        <a:lnSpc>
+                          <a:spcPct val="100000"/>
+                        </a:lnSpc>
+                      </a:pPr>
                       <a:r>
-                        <a:rPr kumimoji="1" lang="ja-JP" altLang="en-US" sz="900" smtClean="0">
+                        <a:rPr kumimoji="1" lang="ja-JP" altLang="en-US" sz="900" kern="0" spc="0" baseline="0" smtClean="0">
                           <a:latin typeface="HG丸ｺﾞｼｯｸM-PRO" panose="020F0600000000000000" pitchFamily="50" charset="-128"/>
                           <a:ea typeface="HG丸ｺﾞｼｯｸM-PRO" panose="020F0600000000000000" pitchFamily="50" charset="-128"/>
                         </a:rPr>
                         <a:t>走行体・</a:t>
                       </a:r>
-                      <a:endParaRPr kumimoji="1" lang="en-US" altLang="ja-JP" sz="900" smtClean="0">
+                      <a:endParaRPr kumimoji="1" lang="en-US" altLang="ja-JP" sz="900" kern="0" spc="0" baseline="0" smtClean="0">
                         <a:latin typeface="HG丸ｺﾞｼｯｸM-PRO" panose="020F0600000000000000" pitchFamily="50" charset="-128"/>
                         <a:ea typeface="HG丸ｺﾞｼｯｸM-PRO" panose="020F0600000000000000" pitchFamily="50" charset="-128"/>
                       </a:endParaRPr>
                     </a:p>
                     <a:p>
-                      <a:pPr algn="just"/>
+                      <a:pPr algn="just">
+                        <a:lnSpc>
+                          <a:spcPct val="100000"/>
+                        </a:lnSpc>
+                      </a:pPr>
                       <a:r>
-                        <a:rPr kumimoji="1" lang="ja-JP" altLang="en-US" sz="900" smtClean="0">
+                        <a:rPr kumimoji="1" lang="ja-JP" altLang="en-US" sz="900" kern="0" spc="0" baseline="0" smtClean="0">
                           <a:latin typeface="HG丸ｺﾞｼｯｸM-PRO" panose="020F0600000000000000" pitchFamily="50" charset="-128"/>
                           <a:ea typeface="HG丸ｺﾞｼｯｸM-PRO" panose="020F0600000000000000" pitchFamily="50" charset="-128"/>
                         </a:rPr>
                         <a:t>部品の個体差</a:t>
                       </a:r>
-                      <a:endParaRPr kumimoji="1" lang="ja-JP" altLang="en-US" sz="900">
+                      <a:endParaRPr kumimoji="1" lang="ja-JP" altLang="en-US" sz="900" kern="0" spc="0" baseline="0">
                         <a:latin typeface="HG丸ｺﾞｼｯｸM-PRO" panose="020F0600000000000000" pitchFamily="50" charset="-128"/>
                         <a:ea typeface="HG丸ｺﾞｼｯｸM-PRO" panose="020F0600000000000000" pitchFamily="50" charset="-128"/>
                       </a:endParaRPr>
@@ -7445,29 +7538,37 @@
                     <a:bodyPr/>
                     <a:lstStyle/>
                     <a:p>
-                      <a:pPr algn="just"/>
+                      <a:pPr algn="just">
+                        <a:lnSpc>
+                          <a:spcPct val="100000"/>
+                        </a:lnSpc>
+                      </a:pPr>
                       <a:r>
-                        <a:rPr kumimoji="1" lang="ja-JP" altLang="en-US" sz="900" smtClean="0">
+                        <a:rPr kumimoji="1" lang="ja-JP" altLang="en-US" sz="900" kern="0" spc="0" baseline="0" smtClean="0">
                           <a:latin typeface="HG丸ｺﾞｼｯｸM-PRO" panose="020F0600000000000000" pitchFamily="50" charset="-128"/>
                           <a:ea typeface="HG丸ｺﾞｼｯｸM-PRO" panose="020F0600000000000000" pitchFamily="50" charset="-128"/>
                         </a:rPr>
                         <a:t>光センサの値がずれる。</a:t>
                       </a:r>
-                      <a:endParaRPr kumimoji="1" lang="en-US" altLang="ja-JP" sz="900" smtClean="0">
+                      <a:endParaRPr kumimoji="1" lang="en-US" altLang="ja-JP" sz="900" kern="0" spc="0" baseline="0" smtClean="0">
                         <a:latin typeface="HG丸ｺﾞｼｯｸM-PRO" panose="020F0600000000000000" pitchFamily="50" charset="-128"/>
                         <a:ea typeface="HG丸ｺﾞｼｯｸM-PRO" panose="020F0600000000000000" pitchFamily="50" charset="-128"/>
                       </a:endParaRPr>
                     </a:p>
                     <a:p>
-                      <a:pPr algn="just"/>
+                      <a:pPr algn="just">
+                        <a:lnSpc>
+                          <a:spcPct val="100000"/>
+                        </a:lnSpc>
+                      </a:pPr>
                       <a:r>
-                        <a:rPr kumimoji="1" lang="ja-JP" altLang="en-US" sz="900" smtClean="0">
+                        <a:rPr kumimoji="1" lang="ja-JP" altLang="en-US" sz="900" kern="0" spc="0" baseline="0" smtClean="0">
                           <a:latin typeface="HG丸ｺﾞｼｯｸM-PRO" panose="020F0600000000000000" pitchFamily="50" charset="-128"/>
                           <a:ea typeface="HG丸ｺﾞｼｯｸM-PRO" panose="020F0600000000000000" pitchFamily="50" charset="-128"/>
                         </a:rPr>
                         <a:t>左右のモーターの出力が一致しないため、まっすぐ走りたくても、ずれた方向に進んでしまう。</a:t>
                       </a:r>
-                      <a:endParaRPr kumimoji="1" lang="en-US" altLang="ja-JP" sz="900" smtClean="0">
+                      <a:endParaRPr kumimoji="1" lang="en-US" altLang="ja-JP" sz="900" kern="0" spc="0" baseline="0" smtClean="0">
                         <a:latin typeface="HG丸ｺﾞｼｯｸM-PRO" panose="020F0600000000000000" pitchFamily="50" charset="-128"/>
                         <a:ea typeface="HG丸ｺﾞｼｯｸM-PRO" panose="020F0600000000000000" pitchFamily="50" charset="-128"/>
                       </a:endParaRPr>
@@ -7480,15 +7581,19 @@
                     <a:bodyPr/>
                     <a:lstStyle/>
                     <a:p>
-                      <a:pPr algn="just"/>
+                      <a:pPr algn="just">
+                        <a:lnSpc>
+                          <a:spcPct val="100000"/>
+                        </a:lnSpc>
+                      </a:pPr>
                       <a:r>
-                        <a:rPr kumimoji="1" lang="ja-JP" altLang="en-US" sz="900" smtClean="0">
+                        <a:rPr kumimoji="1" lang="ja-JP" altLang="en-US" sz="900" kern="0" spc="0" baseline="0" smtClean="0">
                           <a:latin typeface="HG丸ｺﾞｼｯｸM-PRO" panose="020F0600000000000000" pitchFamily="50" charset="-128"/>
                           <a:ea typeface="HG丸ｺﾞｼｯｸM-PRO" panose="020F0600000000000000" pitchFamily="50" charset="-128"/>
                         </a:rPr>
                         <a:t>事前のキャリブレーションで、センサー、モーターの個体値を取得し、それをもとに補正する。</a:t>
                       </a:r>
-                      <a:endParaRPr kumimoji="1" lang="ja-JP" altLang="en-US" sz="900">
+                      <a:endParaRPr kumimoji="1" lang="ja-JP" altLang="en-US" sz="900" kern="0" spc="0" baseline="0">
                         <a:latin typeface="HG丸ｺﾞｼｯｸM-PRO" panose="020F0600000000000000" pitchFamily="50" charset="-128"/>
                         <a:ea typeface="HG丸ｺﾞｼｯｸM-PRO" panose="020F0600000000000000" pitchFamily="50" charset="-128"/>
                       </a:endParaRPr>
@@ -7503,15 +7608,19 @@
                     <a:bodyPr/>
                     <a:lstStyle/>
                     <a:p>
-                      <a:pPr algn="just"/>
+                      <a:pPr algn="just">
+                        <a:lnSpc>
+                          <a:spcPct val="100000"/>
+                        </a:lnSpc>
+                      </a:pPr>
                       <a:r>
-                        <a:rPr kumimoji="1" lang="ja-JP" altLang="en-US" sz="900" smtClean="0">
+                        <a:rPr kumimoji="1" lang="ja-JP" altLang="en-US" sz="900" kern="0" spc="0" baseline="0" smtClean="0">
                           <a:latin typeface="HG丸ｺﾞｼｯｸM-PRO" panose="020F0600000000000000" pitchFamily="50" charset="-128"/>
                           <a:ea typeface="HG丸ｺﾞｼｯｸM-PRO" panose="020F0600000000000000" pitchFamily="50" charset="-128"/>
                         </a:rPr>
                         <a:t>速度の出しすぎ</a:t>
                       </a:r>
-                      <a:endParaRPr kumimoji="1" lang="ja-JP" altLang="en-US" sz="900">
+                      <a:endParaRPr kumimoji="1" lang="ja-JP" altLang="en-US" sz="900" kern="0" spc="0" baseline="0">
                         <a:latin typeface="HG丸ｺﾞｼｯｸM-PRO" panose="020F0600000000000000" pitchFamily="50" charset="-128"/>
                         <a:ea typeface="HG丸ｺﾞｼｯｸM-PRO" panose="020F0600000000000000" pitchFamily="50" charset="-128"/>
                       </a:endParaRPr>
@@ -7524,29 +7633,37 @@
                     <a:bodyPr/>
                     <a:lstStyle/>
                     <a:p>
-                      <a:pPr algn="just"/>
+                      <a:pPr algn="just">
+                        <a:lnSpc>
+                          <a:spcPct val="100000"/>
+                        </a:lnSpc>
+                      </a:pPr>
                       <a:r>
-                        <a:rPr kumimoji="1" lang="ja-JP" altLang="en-US" sz="900" smtClean="0">
+                        <a:rPr kumimoji="1" lang="ja-JP" altLang="en-US" sz="900" kern="0" spc="0" baseline="0" smtClean="0">
                           <a:latin typeface="HG丸ｺﾞｼｯｸM-PRO" panose="020F0600000000000000" pitchFamily="50" charset="-128"/>
                           <a:ea typeface="HG丸ｺﾞｼｯｸM-PRO" panose="020F0600000000000000" pitchFamily="50" charset="-128"/>
                         </a:rPr>
                         <a:t>曲がりきれずコースアウトする。</a:t>
                       </a:r>
-                      <a:endParaRPr kumimoji="1" lang="en-US" altLang="ja-JP" sz="900" smtClean="0">
+                      <a:endParaRPr kumimoji="1" lang="en-US" altLang="ja-JP" sz="900" kern="0" spc="0" baseline="0" smtClean="0">
                         <a:latin typeface="HG丸ｺﾞｼｯｸM-PRO" panose="020F0600000000000000" pitchFamily="50" charset="-128"/>
                         <a:ea typeface="HG丸ｺﾞｼｯｸM-PRO" panose="020F0600000000000000" pitchFamily="50" charset="-128"/>
                       </a:endParaRPr>
                     </a:p>
                     <a:p>
-                      <a:pPr algn="just"/>
+                      <a:pPr algn="just">
+                        <a:lnSpc>
+                          <a:spcPct val="100000"/>
+                        </a:lnSpc>
+                      </a:pPr>
                       <a:r>
-                        <a:rPr kumimoji="1" lang="ja-JP" altLang="en-US" sz="900" smtClean="0">
+                        <a:rPr kumimoji="1" lang="ja-JP" altLang="en-US" sz="900" kern="0" spc="0" baseline="0" smtClean="0">
                           <a:latin typeface="HG丸ｺﾞｼｯｸM-PRO" panose="020F0600000000000000" pitchFamily="50" charset="-128"/>
                           <a:ea typeface="HG丸ｺﾞｼｯｸM-PRO" panose="020F0600000000000000" pitchFamily="50" charset="-128"/>
                         </a:rPr>
                         <a:t>光センサがノイズを拾ったときに、大きく反応してしまう。</a:t>
                       </a:r>
-                      <a:endParaRPr kumimoji="1" lang="ja-JP" altLang="en-US" sz="900">
+                      <a:endParaRPr kumimoji="1" lang="ja-JP" altLang="en-US" sz="900" kern="0" spc="0" baseline="0">
                         <a:latin typeface="HG丸ｺﾞｼｯｸM-PRO" panose="020F0600000000000000" pitchFamily="50" charset="-128"/>
                         <a:ea typeface="HG丸ｺﾞｼｯｸM-PRO" panose="020F0600000000000000" pitchFamily="50" charset="-128"/>
                       </a:endParaRPr>
@@ -7559,43 +7676,312 @@
                     <a:bodyPr/>
                     <a:lstStyle/>
                     <a:p>
-                      <a:pPr algn="just"/>
+                      <a:pPr algn="just">
+                        <a:lnSpc>
+                          <a:spcPct val="100000"/>
+                        </a:lnSpc>
+                      </a:pPr>
                       <a:r>
-                        <a:rPr kumimoji="1" lang="ja-JP" altLang="en-US" sz="900" smtClean="0">
+                        <a:rPr kumimoji="1" lang="ja-JP" altLang="en-US" sz="900" kern="0" spc="0" baseline="0" smtClean="0">
                           <a:latin typeface="HG丸ｺﾞｼｯｸM-PRO" panose="020F0600000000000000" pitchFamily="50" charset="-128"/>
                           <a:ea typeface="HG丸ｺﾞｼｯｸM-PRO" panose="020F0600000000000000" pitchFamily="50" charset="-128"/>
                         </a:rPr>
                         <a:t>自己位置推定により、走行体のいる位置を検知し、コースの形に合わせて速度、</a:t>
                       </a:r>
                       <a:r>
-                        <a:rPr kumimoji="1" lang="en-US" altLang="ja-JP" sz="900" smtClean="0">
+                        <a:rPr kumimoji="1" lang="en-US" altLang="ja-JP" sz="900" kern="0" spc="0" baseline="0" smtClean="0">
                           <a:latin typeface="HG丸ｺﾞｼｯｸM-PRO" panose="020F0600000000000000" pitchFamily="50" charset="-128"/>
                           <a:ea typeface="HG丸ｺﾞｼｯｸM-PRO" panose="020F0600000000000000" pitchFamily="50" charset="-128"/>
                         </a:rPr>
                         <a:t>PID</a:t>
                       </a:r>
                       <a:r>
-                        <a:rPr kumimoji="1" lang="ja-JP" altLang="en-US" sz="900" smtClean="0">
+                        <a:rPr kumimoji="1" lang="ja-JP" altLang="en-US" sz="900" kern="0" spc="0" baseline="0" smtClean="0">
                           <a:latin typeface="HG丸ｺﾞｼｯｸM-PRO" panose="020F0600000000000000" pitchFamily="50" charset="-128"/>
                           <a:ea typeface="HG丸ｺﾞｼｯｸM-PRO" panose="020F0600000000000000" pitchFamily="50" charset="-128"/>
                         </a:rPr>
                         <a:t>値を調整する。</a:t>
                       </a:r>
-                      <a:endParaRPr kumimoji="1" lang="en-US" altLang="ja-JP" sz="900" smtClean="0">
+                      <a:endParaRPr kumimoji="1" lang="en-US" altLang="ja-JP" sz="900" kern="0" spc="0" baseline="0" smtClean="0">
                         <a:latin typeface="HG丸ｺﾞｼｯｸM-PRO" panose="020F0600000000000000" pitchFamily="50" charset="-128"/>
                         <a:ea typeface="HG丸ｺﾞｼｯｸM-PRO" panose="020F0600000000000000" pitchFamily="50" charset="-128"/>
                       </a:endParaRPr>
                     </a:p>
                     <a:p>
-                      <a:pPr algn="just"/>
+                      <a:pPr algn="just">
+                        <a:lnSpc>
+                          <a:spcPct val="100000"/>
+                        </a:lnSpc>
+                      </a:pPr>
                       <a:r>
-                        <a:rPr kumimoji="1" lang="ja-JP" altLang="en-US" sz="900" smtClean="0">
+                        <a:rPr kumimoji="1" lang="ja-JP" altLang="en-US" sz="900" kern="0" spc="0" baseline="0" smtClean="0">
                           <a:latin typeface="HG丸ｺﾞｼｯｸM-PRO" panose="020F0600000000000000" pitchFamily="50" charset="-128"/>
                           <a:ea typeface="HG丸ｺﾞｼｯｸM-PRO" panose="020F0600000000000000" pitchFamily="50" charset="-128"/>
                         </a:rPr>
                         <a:t>ローパスフィルターを用いて、ノイズを軽減する。</a:t>
                       </a:r>
-                      <a:endParaRPr kumimoji="1" lang="en-US" altLang="ja-JP" sz="900" smtClean="0">
+                      <a:endParaRPr kumimoji="1" lang="en-US" altLang="ja-JP" sz="900" kern="0" spc="0" baseline="0" smtClean="0">
+                        <a:latin typeface="HG丸ｺﾞｼｯｸM-PRO" panose="020F0600000000000000" pitchFamily="50" charset="-128"/>
+                        <a:ea typeface="HG丸ｺﾞｼｯｸM-PRO" panose="020F0600000000000000" pitchFamily="50" charset="-128"/>
+                      </a:endParaRPr>
+                    </a:p>
+                  </a:txBody>
+                  <a:tcPr anchor="ctr"/>
+                </a:tc>
+              </a:tr>
+              <a:tr h="325390">
+                <a:tc>
+                  <a:txBody>
+                    <a:bodyPr/>
+                    <a:lstStyle/>
+                    <a:p>
+                      <a:pPr algn="just">
+                        <a:lnSpc>
+                          <a:spcPct val="100000"/>
+                        </a:lnSpc>
+                      </a:pPr>
+                      <a:r>
+                        <a:rPr kumimoji="1" lang="ja-JP" altLang="en-US" sz="900" kern="0" spc="0" baseline="0" smtClean="0">
+                          <a:latin typeface="HG丸ｺﾞｼｯｸM-PRO" panose="020F0600000000000000" pitchFamily="50" charset="-128"/>
+                          <a:ea typeface="HG丸ｺﾞｼｯｸM-PRO" panose="020F0600000000000000" pitchFamily="50" charset="-128"/>
+                        </a:rPr>
+                        <a:t>外乱光</a:t>
+                      </a:r>
+                      <a:endParaRPr kumimoji="1" lang="ja-JP" altLang="en-US" sz="900" kern="0" spc="0" baseline="0">
+                        <a:latin typeface="HG丸ｺﾞｼｯｸM-PRO" panose="020F0600000000000000" pitchFamily="50" charset="-128"/>
+                        <a:ea typeface="HG丸ｺﾞｼｯｸM-PRO" panose="020F0600000000000000" pitchFamily="50" charset="-128"/>
+                      </a:endParaRPr>
+                    </a:p>
+                  </a:txBody>
+                  <a:tcPr anchor="ctr"/>
+                </a:tc>
+                <a:tc>
+                  <a:txBody>
+                    <a:bodyPr/>
+                    <a:lstStyle/>
+                    <a:p>
+                      <a:pPr algn="just">
+                        <a:lnSpc>
+                          <a:spcPct val="100000"/>
+                        </a:lnSpc>
+                      </a:pPr>
+                      <a:r>
+                        <a:rPr kumimoji="1" lang="ja-JP" altLang="en-US" sz="900" kern="0" spc="0" baseline="0" smtClean="0">
+                          <a:latin typeface="HG丸ｺﾞｼｯｸM-PRO" panose="020F0600000000000000" pitchFamily="50" charset="-128"/>
+                          <a:ea typeface="HG丸ｺﾞｼｯｸM-PRO" panose="020F0600000000000000" pitchFamily="50" charset="-128"/>
+                        </a:rPr>
+                        <a:t>光センサの値がぶれる。</a:t>
+                      </a:r>
+                      <a:endParaRPr kumimoji="1" lang="en-US" altLang="ja-JP" sz="900" kern="0" spc="0" baseline="0" smtClean="0">
+                        <a:latin typeface="HG丸ｺﾞｼｯｸM-PRO" panose="020F0600000000000000" pitchFamily="50" charset="-128"/>
+                        <a:ea typeface="HG丸ｺﾞｼｯｸM-PRO" panose="020F0600000000000000" pitchFamily="50" charset="-128"/>
+                      </a:endParaRPr>
+                    </a:p>
+                  </a:txBody>
+                  <a:tcPr anchor="ctr"/>
+                </a:tc>
+                <a:tc>
+                  <a:txBody>
+                    <a:bodyPr/>
+                    <a:lstStyle/>
+                    <a:p>
+                      <a:pPr algn="just">
+                        <a:lnSpc>
+                          <a:spcPct val="100000"/>
+                        </a:lnSpc>
+                      </a:pPr>
+                      <a:r>
+                        <a:rPr kumimoji="1" lang="ja-JP" altLang="en-US" sz="900" kern="0" spc="0" baseline="0" smtClean="0">
+                          <a:latin typeface="HG丸ｺﾞｼｯｸM-PRO" panose="020F0600000000000000" pitchFamily="50" charset="-128"/>
+                          <a:ea typeface="HG丸ｺﾞｼｯｸM-PRO" panose="020F0600000000000000" pitchFamily="50" charset="-128"/>
+                        </a:rPr>
+                        <a:t>まいまい式で外乱光の影響をキャンセルする</a:t>
+                      </a:r>
+                      <a:endParaRPr kumimoji="1" lang="en-US" altLang="ja-JP" sz="900" kern="0" spc="0" baseline="0" smtClean="0">
+                        <a:latin typeface="HG丸ｺﾞｼｯｸM-PRO" panose="020F0600000000000000" pitchFamily="50" charset="-128"/>
+                        <a:ea typeface="HG丸ｺﾞｼｯｸM-PRO" panose="020F0600000000000000" pitchFamily="50" charset="-128"/>
+                      </a:endParaRPr>
+                    </a:p>
+                  </a:txBody>
+                  <a:tcPr anchor="ctr"/>
+                </a:tc>
+              </a:tr>
+              <a:tr h="325390">
+                <a:tc>
+                  <a:txBody>
+                    <a:bodyPr/>
+                    <a:lstStyle/>
+                    <a:p>
+                      <a:pPr algn="just">
+                        <a:lnSpc>
+                          <a:spcPct val="100000"/>
+                        </a:lnSpc>
+                      </a:pPr>
+                      <a:r>
+                        <a:rPr kumimoji="1" lang="ja-JP" altLang="en-US" sz="900" kern="0" spc="0" baseline="0" smtClean="0">
+                          <a:latin typeface="HG丸ｺﾞｼｯｸM-PRO" panose="020F0600000000000000" pitchFamily="50" charset="-128"/>
+                          <a:ea typeface="HG丸ｺﾞｼｯｸM-PRO" panose="020F0600000000000000" pitchFamily="50" charset="-128"/>
+                        </a:rPr>
+                        <a:t>コースのゆがみ</a:t>
+                      </a:r>
+                      <a:endParaRPr kumimoji="1" lang="ja-JP" altLang="en-US" sz="900" kern="0" spc="0" baseline="0">
+                        <a:latin typeface="HG丸ｺﾞｼｯｸM-PRO" panose="020F0600000000000000" pitchFamily="50" charset="-128"/>
+                        <a:ea typeface="HG丸ｺﾞｼｯｸM-PRO" panose="020F0600000000000000" pitchFamily="50" charset="-128"/>
+                      </a:endParaRPr>
+                    </a:p>
+                  </a:txBody>
+                  <a:tcPr anchor="ctr"/>
+                </a:tc>
+                <a:tc>
+                  <a:txBody>
+                    <a:bodyPr/>
+                    <a:lstStyle/>
+                    <a:p>
+                      <a:pPr algn="just">
+                        <a:lnSpc>
+                          <a:spcPct val="100000"/>
+                        </a:lnSpc>
+                      </a:pPr>
+                      <a:r>
+                        <a:rPr kumimoji="1" lang="ja-JP" altLang="en-US" sz="900" kern="0" spc="0" baseline="0" smtClean="0">
+                          <a:latin typeface="HG丸ｺﾞｼｯｸM-PRO" panose="020F0600000000000000" pitchFamily="50" charset="-128"/>
+                          <a:ea typeface="HG丸ｺﾞｼｯｸM-PRO" panose="020F0600000000000000" pitchFamily="50" charset="-128"/>
+                        </a:rPr>
+                        <a:t>コースの形がゆがんでしまった場合に、自己位置推定で想定している座標がずれてしまう。</a:t>
+                      </a:r>
+                      <a:endParaRPr kumimoji="1" lang="en-US" altLang="ja-JP" sz="900" kern="0" spc="0" baseline="0" smtClean="0">
+                        <a:latin typeface="HG丸ｺﾞｼｯｸM-PRO" panose="020F0600000000000000" pitchFamily="50" charset="-128"/>
+                        <a:ea typeface="HG丸ｺﾞｼｯｸM-PRO" panose="020F0600000000000000" pitchFamily="50" charset="-128"/>
+                      </a:endParaRPr>
+                    </a:p>
+                  </a:txBody>
+                  <a:tcPr anchor="ctr"/>
+                </a:tc>
+                <a:tc>
+                  <a:txBody>
+                    <a:bodyPr/>
+                    <a:lstStyle/>
+                    <a:p>
+                      <a:pPr algn="just">
+                        <a:lnSpc>
+                          <a:spcPct val="100000"/>
+                        </a:lnSpc>
+                      </a:pPr>
+                      <a:r>
+                        <a:rPr kumimoji="1" lang="ja-JP" altLang="en-US" sz="900" kern="0" spc="0" baseline="0" smtClean="0">
+                          <a:latin typeface="HG丸ｺﾞｼｯｸM-PRO" panose="020F0600000000000000" pitchFamily="50" charset="-128"/>
+                          <a:ea typeface="HG丸ｺﾞｼｯｸM-PRO" panose="020F0600000000000000" pitchFamily="50" charset="-128"/>
+                        </a:rPr>
+                        <a:t>ラインの曲率の変化などから、コースのどのあたりを走行しているか推定し、自己位置推定で持っている現在の座標を補正する</a:t>
+                      </a:r>
+                      <a:endParaRPr kumimoji="1" lang="en-US" altLang="ja-JP" sz="900" kern="0" spc="0" baseline="0" smtClean="0">
+                        <a:latin typeface="HG丸ｺﾞｼｯｸM-PRO" panose="020F0600000000000000" pitchFamily="50" charset="-128"/>
+                        <a:ea typeface="HG丸ｺﾞｼｯｸM-PRO" panose="020F0600000000000000" pitchFamily="50" charset="-128"/>
+                      </a:endParaRPr>
+                    </a:p>
+                  </a:txBody>
+                  <a:tcPr anchor="ctr"/>
+                </a:tc>
+              </a:tr>
+              <a:tr h="325390">
+                <a:tc>
+                  <a:txBody>
+                    <a:bodyPr/>
+                    <a:lstStyle/>
+                    <a:p>
+                      <a:pPr algn="just">
+                        <a:lnSpc>
+                          <a:spcPct val="100000"/>
+                        </a:lnSpc>
+                      </a:pPr>
+                      <a:r>
+                        <a:rPr kumimoji="1" lang="ja-JP" altLang="en-US" sz="900" kern="0" spc="0" baseline="0" smtClean="0">
+                          <a:latin typeface="HG丸ｺﾞｼｯｸM-PRO" panose="020F0600000000000000" pitchFamily="50" charset="-128"/>
+                          <a:ea typeface="HG丸ｺﾞｼｯｸM-PRO" panose="020F0600000000000000" pitchFamily="50" charset="-128"/>
+                        </a:rPr>
+                        <a:t>タイヤの</a:t>
+                      </a:r>
+                      <a:endParaRPr kumimoji="1" lang="en-US" altLang="ja-JP" sz="900" kern="0" spc="0" baseline="0" smtClean="0">
+                        <a:latin typeface="HG丸ｺﾞｼｯｸM-PRO" panose="020F0600000000000000" pitchFamily="50" charset="-128"/>
+                        <a:ea typeface="HG丸ｺﾞｼｯｸM-PRO" panose="020F0600000000000000" pitchFamily="50" charset="-128"/>
+                      </a:endParaRPr>
+                    </a:p>
+                    <a:p>
+                      <a:pPr algn="just">
+                        <a:lnSpc>
+                          <a:spcPct val="100000"/>
+                        </a:lnSpc>
+                      </a:pPr>
+                      <a:r>
+                        <a:rPr kumimoji="1" lang="ja-JP" altLang="en-US" sz="900" kern="0" spc="0" baseline="0" smtClean="0">
+                          <a:latin typeface="HG丸ｺﾞｼｯｸM-PRO" panose="020F0600000000000000" pitchFamily="50" charset="-128"/>
+                          <a:ea typeface="HG丸ｺﾞｼｯｸM-PRO" panose="020F0600000000000000" pitchFamily="50" charset="-128"/>
+                        </a:rPr>
+                        <a:t>スリップ</a:t>
+                      </a:r>
+                      <a:endParaRPr kumimoji="1" lang="ja-JP" altLang="en-US" sz="900" kern="0" spc="0" baseline="0">
+                        <a:latin typeface="HG丸ｺﾞｼｯｸM-PRO" panose="020F0600000000000000" pitchFamily="50" charset="-128"/>
+                        <a:ea typeface="HG丸ｺﾞｼｯｸM-PRO" panose="020F0600000000000000" pitchFamily="50" charset="-128"/>
+                      </a:endParaRPr>
+                    </a:p>
+                  </a:txBody>
+                  <a:tcPr anchor="ctr"/>
+                </a:tc>
+                <a:tc>
+                  <a:txBody>
+                    <a:bodyPr/>
+                    <a:lstStyle/>
+                    <a:p>
+                      <a:pPr algn="just">
+                        <a:lnSpc>
+                          <a:spcPct val="100000"/>
+                        </a:lnSpc>
+                      </a:pPr>
+                      <a:r>
+                        <a:rPr kumimoji="1" lang="ja-JP" altLang="en-US" sz="900" kern="0" spc="0" baseline="0" smtClean="0">
+                          <a:latin typeface="HG丸ｺﾞｼｯｸM-PRO" panose="020F0600000000000000" pitchFamily="50" charset="-128"/>
+                          <a:ea typeface="HG丸ｺﾞｼｯｸM-PRO" panose="020F0600000000000000" pitchFamily="50" charset="-128"/>
+                        </a:rPr>
+                        <a:t>タイヤがスリップしてしまった場合に、自己位置推定で想定している座標がずれてしまう。</a:t>
+                      </a:r>
+                      <a:endParaRPr kumimoji="1" lang="en-US" altLang="ja-JP" sz="900" kern="0" spc="0" baseline="0" smtClean="0">
+                        <a:latin typeface="HG丸ｺﾞｼｯｸM-PRO" panose="020F0600000000000000" pitchFamily="50" charset="-128"/>
+                        <a:ea typeface="HG丸ｺﾞｼｯｸM-PRO" panose="020F0600000000000000" pitchFamily="50" charset="-128"/>
+                      </a:endParaRPr>
+                    </a:p>
+                  </a:txBody>
+                  <a:tcPr anchor="ctr"/>
+                </a:tc>
+                <a:tc>
+                  <a:txBody>
+                    <a:bodyPr/>
+                    <a:lstStyle/>
+                    <a:p>
+                      <a:pPr marL="0" marR="0" indent="0" algn="just" defTabSz="1279544" rtl="0" eaLnBrk="1" fontAlgn="auto" latinLnBrk="0" hangingPunct="1">
+                        <a:lnSpc>
+                          <a:spcPct val="100000"/>
+                        </a:lnSpc>
+                        <a:spcBef>
+                          <a:spcPts val="0"/>
+                        </a:spcBef>
+                        <a:spcAft>
+                          <a:spcPts val="0"/>
+                        </a:spcAft>
+                        <a:buClrTx/>
+                        <a:buSzTx/>
+                        <a:buFontTx/>
+                        <a:buNone/>
+                        <a:tabLst/>
+                        <a:defRPr/>
+                      </a:pPr>
+                      <a:r>
+                        <a:rPr kumimoji="1" lang="ja-JP" altLang="en-US" sz="900" kern="0" spc="0" baseline="0" smtClean="0">
+                          <a:latin typeface="HG丸ｺﾞｼｯｸM-PRO" panose="020F0600000000000000" pitchFamily="50" charset="-128"/>
+                          <a:ea typeface="HG丸ｺﾞｼｯｸM-PRO" panose="020F0600000000000000" pitchFamily="50" charset="-128"/>
+                        </a:rPr>
+                        <a:t>ラインの曲率の変化などから、コースのどのあたりを走行しているか推定し、自己位置推定で持っている現在の座標を補正する</a:t>
+                      </a:r>
+                      <a:endParaRPr kumimoji="1" lang="en-US" altLang="ja-JP" sz="900" kern="0" spc="0" baseline="0" smtClean="0">
                         <a:latin typeface="HG丸ｺﾞｼｯｸM-PRO" panose="020F0600000000000000" pitchFamily="50" charset="-128"/>
                         <a:ea typeface="HG丸ｺﾞｼｯｸM-PRO" panose="020F0600000000000000" pitchFamily="50" charset="-128"/>
                       </a:endParaRPr>
@@ -7616,7 +8002,7 @@
         </p:nvSpPr>
         <p:spPr>
           <a:xfrm>
-            <a:off x="9242760" y="9365223"/>
+            <a:off x="9242760" y="9441423"/>
             <a:ext cx="3606543" cy="165036"/>
           </a:xfrm>
           <a:prstGeom prst="rect">
@@ -9784,6 +10170,57 @@
           </a:p>
         </p:txBody>
       </p:sp>
+      <p:sp>
+        <p:nvSpPr>
+          <p:cNvPr id="81" name="正方形/長方形 80"/>
+          <p:cNvSpPr/>
+          <p:nvPr/>
+        </p:nvSpPr>
+        <p:spPr>
+          <a:xfrm>
+            <a:off x="6508844" y="7697644"/>
+            <a:ext cx="6292756" cy="1906500"/>
+          </a:xfrm>
+          <a:prstGeom prst="rect">
+            <a:avLst/>
+          </a:prstGeom>
+          <a:solidFill>
+            <a:schemeClr val="bg1"/>
+          </a:solidFill>
+          <a:ln w="19050">
+            <a:solidFill>
+              <a:schemeClr val="accent3">
+                <a:lumMod val="75000"/>
+              </a:schemeClr>
+            </a:solidFill>
+          </a:ln>
+          <a:effectLst/>
+        </p:spPr>
+        <p:style>
+          <a:lnRef idx="1">
+            <a:schemeClr val="accent6"/>
+          </a:lnRef>
+          <a:fillRef idx="2">
+            <a:schemeClr val="accent6"/>
+          </a:fillRef>
+          <a:effectRef idx="1">
+            <a:schemeClr val="accent6"/>
+          </a:effectRef>
+          <a:fontRef idx="minor">
+            <a:schemeClr val="dk1"/>
+          </a:fontRef>
+        </p:style>
+        <p:txBody>
+          <a:bodyPr lIns="91428" tIns="45714" rIns="91428" bIns="45714" rtlCol="0" anchor="ctr"/>
+          <a:lstStyle/>
+          <a:p>
+            <a:endParaRPr kumimoji="1" lang="ja-JP" altLang="en-US" sz="2400" dirty="0">
+              <a:latin typeface="HG丸ｺﾞｼｯｸM-PRO" panose="020F0600000000000000" pitchFamily="50" charset="-128"/>
+              <a:ea typeface="HG丸ｺﾞｼｯｸM-PRO" panose="020F0600000000000000" pitchFamily="50" charset="-128"/>
+            </a:endParaRPr>
+          </a:p>
+        </p:txBody>
+      </p:sp>
       <p:grpSp>
         <p:nvGrpSpPr>
           <p:cNvPr id="200" name="グループ化 199"/>
@@ -9792,7 +10229,7 @@
         </p:nvGrpSpPr>
         <p:grpSpPr>
           <a:xfrm>
-            <a:off x="6508844" y="5090641"/>
+            <a:off x="6508823" y="5077746"/>
             <a:ext cx="2035836" cy="289332"/>
             <a:chOff x="108961" y="835133"/>
             <a:chExt cx="775390" cy="289332"/>
@@ -9905,7 +10342,7 @@
         </p:nvSpPr>
         <p:spPr>
           <a:xfrm>
-            <a:off x="6738625" y="5505596"/>
+            <a:off x="6738625" y="5442096"/>
             <a:ext cx="5487848" cy="654025"/>
           </a:xfrm>
           <a:prstGeom prst="rect">
@@ -10726,7 +11163,7 @@
           <p:nvPr>
             <p:extLst>
               <p:ext uri="{D42A27DB-BD31-4B8C-83A1-F6EECF244321}">
-                <p14:modId xmlns:p14="http://schemas.microsoft.com/office/powerpoint/2010/main" val="99457353"/>
+                <p14:modId xmlns:p14="http://schemas.microsoft.com/office/powerpoint/2010/main" val="2729692445"/>
               </p:ext>
             </p:extLst>
           </p:nvPr>
@@ -10768,6 +11205,7 @@
                       <a:endParaRPr kumimoji="1" lang="en-US" altLang="ja-JP" sz="1200" smtClean="0"/>
                     </a:p>
                     <a:p>
+                      <a:pPr lvl="0"/>
                       <a:r>
                         <a:rPr kumimoji="1" lang="ja-JP" altLang="en-US" sz="1200" smtClean="0"/>
                         <a:t>なるべく回転係数を小さくしてライントレースを使って最高速度で走行する。</a:t>
@@ -10952,7 +11390,7 @@
         </p:nvSpPr>
         <p:spPr>
           <a:xfrm>
-            <a:off x="6748988" y="6225153"/>
+            <a:off x="6748988" y="6161653"/>
             <a:ext cx="5910934" cy="654025"/>
           </a:xfrm>
           <a:prstGeom prst="rect">
@@ -11088,7 +11526,7 @@
         </p:nvSpPr>
         <p:spPr>
           <a:xfrm>
-            <a:off x="6758307" y="6930140"/>
+            <a:off x="6758307" y="6866640"/>
             <a:ext cx="5921297" cy="654025"/>
           </a:xfrm>
           <a:prstGeom prst="rect">
@@ -11326,6 +11764,232 @@
           </a:p>
         </p:txBody>
       </p:sp>
+      <p:grpSp>
+        <p:nvGrpSpPr>
+          <p:cNvPr id="70" name="グループ化 69"/>
+          <p:cNvGrpSpPr/>
+          <p:nvPr/>
+        </p:nvGrpSpPr>
+        <p:grpSpPr>
+          <a:xfrm>
+            <a:off x="6508823" y="7697644"/>
+            <a:ext cx="2035836" cy="289332"/>
+            <a:chOff x="108961" y="835133"/>
+            <a:chExt cx="775390" cy="289332"/>
+          </a:xfrm>
+        </p:grpSpPr>
+        <p:sp>
+          <p:nvSpPr>
+            <p:cNvPr id="73" name="正方形/長方形 72"/>
+            <p:cNvSpPr/>
+            <p:nvPr/>
+          </p:nvSpPr>
+          <p:spPr>
+            <a:xfrm>
+              <a:off x="108961" y="835133"/>
+              <a:ext cx="775390" cy="289332"/>
+            </a:xfrm>
+            <a:prstGeom prst="rect">
+              <a:avLst/>
+            </a:prstGeom>
+            <a:ln w="19050">
+              <a:solidFill>
+                <a:schemeClr val="accent3">
+                  <a:lumMod val="75000"/>
+                </a:schemeClr>
+              </a:solidFill>
+            </a:ln>
+          </p:spPr>
+          <p:style>
+            <a:lnRef idx="1">
+              <a:schemeClr val="accent3"/>
+            </a:lnRef>
+            <a:fillRef idx="2">
+              <a:schemeClr val="accent3"/>
+            </a:fillRef>
+            <a:effectRef idx="1">
+              <a:schemeClr val="accent3"/>
+            </a:effectRef>
+            <a:fontRef idx="minor">
+              <a:schemeClr val="dk1"/>
+            </a:fontRef>
+          </p:style>
+          <p:txBody>
+            <a:bodyPr lIns="91428" tIns="45714" rIns="91428" bIns="45714" rtlCol="0" anchor="ctr"/>
+            <a:lstStyle/>
+            <a:p>
+              <a:pPr algn="ctr"/>
+              <a:endParaRPr kumimoji="1" lang="ja-JP" altLang="en-US" sz="2400" dirty="0">
+                <a:latin typeface="HG丸ｺﾞｼｯｸM-PRO" panose="020F0600000000000000" pitchFamily="50" charset="-128"/>
+                <a:ea typeface="HG丸ｺﾞｼｯｸM-PRO" panose="020F0600000000000000" pitchFamily="50" charset="-128"/>
+              </a:endParaRPr>
+            </a:p>
+          </p:txBody>
+        </p:sp>
+        <p:sp>
+          <p:nvSpPr>
+            <p:cNvPr id="80" name="テキスト ボックス 79"/>
+            <p:cNvSpPr txBox="1"/>
+            <p:nvPr/>
+          </p:nvSpPr>
+          <p:spPr>
+            <a:xfrm>
+              <a:off x="113109" y="878200"/>
+              <a:ext cx="738386" cy="215444"/>
+            </a:xfrm>
+            <a:prstGeom prst="rect">
+              <a:avLst/>
+            </a:prstGeom>
+            <a:noFill/>
+          </p:spPr>
+          <p:txBody>
+            <a:bodyPr wrap="square" lIns="0" tIns="0" rIns="0" bIns="0" rtlCol="0">
+              <a:spAutoFit/>
+            </a:bodyPr>
+            <a:lstStyle/>
+            <a:p>
+              <a:r>
+                <a:rPr lang="ja-JP" altLang="en-US" sz="1400" smtClean="0">
+                  <a:latin typeface="HG丸ｺﾞｼｯｸM-PRO" panose="020F0600000000000000" pitchFamily="50" charset="-128"/>
+                  <a:ea typeface="HG丸ｺﾞｼｯｸM-PRO" panose="020F0600000000000000" pitchFamily="50" charset="-128"/>
+                </a:rPr>
+                <a:t>　</a:t>
+              </a:r>
+              <a:r>
+                <a:rPr lang="en-US" altLang="ja-JP" sz="1400" smtClean="0">
+                  <a:latin typeface="HG丸ｺﾞｼｯｸM-PRO" panose="020F0600000000000000" pitchFamily="50" charset="-128"/>
+                  <a:ea typeface="HG丸ｺﾞｼｯｸM-PRO" panose="020F0600000000000000" pitchFamily="50" charset="-128"/>
+                </a:rPr>
+                <a:t>2.4</a:t>
+              </a:r>
+              <a:r>
+                <a:rPr lang="ja-JP" altLang="en-US" sz="1400" smtClean="0">
+                  <a:latin typeface="HG丸ｺﾞｼｯｸM-PRO" panose="020F0600000000000000" pitchFamily="50" charset="-128"/>
+                  <a:ea typeface="HG丸ｺﾞｼｯｸM-PRO" panose="020F0600000000000000" pitchFamily="50" charset="-128"/>
+                </a:rPr>
+                <a:t> スタートの</a:t>
+              </a:r>
+              <a:r>
+                <a:rPr lang="ja-JP" altLang="en-US" sz="1400" dirty="0" smtClean="0">
+                  <a:latin typeface="HG丸ｺﾞｼｯｸM-PRO" panose="020F0600000000000000" pitchFamily="50" charset="-128"/>
+                  <a:ea typeface="HG丸ｺﾞｼｯｸM-PRO" panose="020F0600000000000000" pitchFamily="50" charset="-128"/>
+                </a:rPr>
+                <a:t>戦略</a:t>
+              </a:r>
+              <a:endParaRPr kumimoji="1" lang="ja-JP" altLang="en-US" sz="1400" dirty="0">
+                <a:latin typeface="HG丸ｺﾞｼｯｸM-PRO" panose="020F0600000000000000" pitchFamily="50" charset="-128"/>
+                <a:ea typeface="HG丸ｺﾞｼｯｸM-PRO" panose="020F0600000000000000" pitchFamily="50" charset="-128"/>
+              </a:endParaRPr>
+            </a:p>
+          </p:txBody>
+        </p:sp>
+      </p:grpSp>
+      <p:sp>
+        <p:nvSpPr>
+          <p:cNvPr id="82" name="テキスト ボックス 81"/>
+          <p:cNvSpPr txBox="1"/>
+          <p:nvPr/>
+        </p:nvSpPr>
+        <p:spPr>
+          <a:xfrm>
+            <a:off x="6747372" y="8232231"/>
+            <a:ext cx="5921297" cy="815608"/>
+          </a:xfrm>
+          <a:prstGeom prst="rect">
+            <a:avLst/>
+          </a:prstGeom>
+          <a:noFill/>
+        </p:spPr>
+        <p:txBody>
+          <a:bodyPr wrap="square" rtlCol="0">
+            <a:spAutoFit/>
+          </a:bodyPr>
+          <a:lstStyle/>
+          <a:p>
+            <a:r>
+              <a:rPr lang="ja-JP" altLang="en-US" sz="1050" b="1" u="sng" smtClean="0">
+                <a:solidFill>
+                  <a:srgbClr val="0000CC"/>
+                </a:solidFill>
+                <a:uFill>
+                  <a:solidFill>
+                    <a:schemeClr val="bg1">
+                      <a:lumMod val="50000"/>
+                    </a:schemeClr>
+                  </a:solidFill>
+                </a:uFill>
+                <a:latin typeface="HG丸ｺﾞｼｯｸM-PRO" panose="020F0600000000000000" pitchFamily="50" charset="-128"/>
+                <a:ea typeface="HG丸ｺﾞｼｯｸM-PRO" panose="020F0600000000000000" pitchFamily="50" charset="-128"/>
+              </a:rPr>
+              <a:t>スタート時の左右のふらつきをなくすため、ライントレースをしない</a:t>
+            </a:r>
+            <a:endParaRPr lang="en-US" altLang="ja-JP" sz="1050" b="1" u="sng" smtClean="0">
+              <a:solidFill>
+                <a:srgbClr val="0000CC"/>
+              </a:solidFill>
+              <a:uFill>
+                <a:solidFill>
+                  <a:schemeClr val="bg1">
+                    <a:lumMod val="50000"/>
+                  </a:schemeClr>
+                </a:solidFill>
+              </a:uFill>
+              <a:latin typeface="HG丸ｺﾞｼｯｸM-PRO" panose="020F0600000000000000" pitchFamily="50" charset="-128"/>
+              <a:ea typeface="HG丸ｺﾞｼｯｸM-PRO" panose="020F0600000000000000" pitchFamily="50" charset="-128"/>
+            </a:endParaRPr>
+          </a:p>
+          <a:p>
+            <a:endParaRPr lang="en-US" altLang="ja-JP" sz="500" u="sng" smtClean="0">
+              <a:solidFill>
+                <a:srgbClr val="0066FF"/>
+              </a:solidFill>
+              <a:latin typeface="HG丸ｺﾞｼｯｸM-PRO" panose="020F0600000000000000" pitchFamily="50" charset="-128"/>
+              <a:ea typeface="HG丸ｺﾞｼｯｸM-PRO" panose="020F0600000000000000" pitchFamily="50" charset="-128"/>
+            </a:endParaRPr>
+          </a:p>
+          <a:p>
+            <a:r>
+              <a:rPr kumimoji="1" lang="ja-JP" altLang="en-US" sz="1050" smtClean="0">
+                <a:latin typeface="HG丸ｺﾞｼｯｸM-PRO" panose="020F0600000000000000" pitchFamily="50" charset="-128"/>
+                <a:ea typeface="HG丸ｺﾞｼｯｸM-PRO" panose="020F0600000000000000" pitchFamily="50" charset="-128"/>
+              </a:rPr>
+              <a:t>　</a:t>
+            </a:r>
+            <a:r>
+              <a:rPr kumimoji="1" lang="ja-JP" altLang="en-US" sz="1050" smtClean="0">
+                <a:latin typeface="HG丸ｺﾞｼｯｸM-PRO" panose="020F0600000000000000" pitchFamily="50" charset="-128"/>
+                <a:ea typeface="HG丸ｺﾞｼｯｸM-PRO" panose="020F0600000000000000" pitchFamily="50" charset="-128"/>
+              </a:rPr>
+              <a:t>スタート直後、速度が遅いときにライントレースを行うと、トレースしている位置の色によって左右に大きくふらついてしまう。ふらつきを抑えるため、強制的に左右のモーターに</a:t>
+            </a:r>
+            <a:r>
+              <a:rPr lang="ja-JP" altLang="en-US" sz="1050" smtClean="0">
+                <a:latin typeface="HG丸ｺﾞｼｯｸM-PRO" panose="020F0600000000000000" pitchFamily="50" charset="-128"/>
+                <a:ea typeface="HG丸ｺﾞｼｯｸM-PRO" panose="020F0600000000000000" pitchFamily="50" charset="-128"/>
+              </a:rPr>
+              <a:t>同じ</a:t>
+            </a:r>
+            <a:r>
+              <a:rPr lang="en-US" altLang="ja-JP" sz="1050" smtClean="0">
+                <a:latin typeface="HG丸ｺﾞｼｯｸM-PRO" panose="020F0600000000000000" pitchFamily="50" charset="-128"/>
+                <a:ea typeface="HG丸ｺﾞｼｯｸM-PRO" panose="020F0600000000000000" pitchFamily="50" charset="-128"/>
+              </a:rPr>
+              <a:t>PWM</a:t>
+            </a:r>
+            <a:r>
+              <a:rPr lang="ja-JP" altLang="en-US" sz="1050" smtClean="0">
+                <a:latin typeface="HG丸ｺﾞｼｯｸM-PRO" panose="020F0600000000000000" pitchFamily="50" charset="-128"/>
+                <a:ea typeface="HG丸ｺﾞｼｯｸM-PRO" panose="020F0600000000000000" pitchFamily="50" charset="-128"/>
+              </a:rPr>
+              <a:t>値を印加し、直線走行させる。</a:t>
+            </a:r>
+            <a:endParaRPr kumimoji="1" lang="en-US" altLang="ja-JP" sz="1050" dirty="0" smtClean="0">
+              <a:latin typeface="HG丸ｺﾞｼｯｸM-PRO" panose="020F0600000000000000" pitchFamily="50" charset="-128"/>
+              <a:ea typeface="HG丸ｺﾞｼｯｸM-PRO" panose="020F0600000000000000" pitchFamily="50" charset="-128"/>
+            </a:endParaRPr>
+          </a:p>
+        </p:txBody>
+      </p:sp>
     </p:spTree>
     <p:extLst>
       <p:ext uri="{BB962C8B-B14F-4D97-AF65-F5344CB8AC3E}">
@@ -11336,6 +12000,13 @@
   <p:clrMapOvr>
     <a:masterClrMapping/>
   </p:clrMapOvr>
+  <p:timing>
+    <p:tnLst>
+      <p:par>
+        <p:cTn id="1" dur="indefinite" restart="never" nodeType="tmRoot"/>
+      </p:par>
+    </p:tnLst>
+  </p:timing>
 </p:sld>
 </file>
 
@@ -15402,6 +16073,13 @@
   <p:clrMapOvr>
     <a:masterClrMapping/>
   </p:clrMapOvr>
+  <p:timing>
+    <p:tnLst>
+      <p:par>
+        <p:cTn id="1" dur="indefinite" restart="never" nodeType="tmRoot"/>
+      </p:par>
+    </p:tnLst>
+  </p:timing>
 </p:sld>
 </file>
 

</xml_diff>

<commit_message>
refs #180 added state machine 図
</commit_message>
<xml_diff>
--- a/docs/design/Deliverable/cliffedge_No130_model2015.pptx
+++ b/docs/design/Deliverable/cliffedge_No130_model2015.pptx
@@ -500,11 +500,11 @@
           <c:showPercent val="0"/>
           <c:showBubbleSize val="0"/>
         </c:dLbls>
-        <c:axId val="478867040"/>
-        <c:axId val="478867432"/>
+        <c:axId val="377720688"/>
+        <c:axId val="377721080"/>
       </c:scatterChart>
       <c:valAx>
-        <c:axId val="478867040"/>
+        <c:axId val="377720688"/>
         <c:scaling>
           <c:orientation val="minMax"/>
           <c:max val="800"/>
@@ -526,12 +526,12 @@
             <a:endParaRPr lang="ja-JP"/>
           </a:p>
         </c:txPr>
-        <c:crossAx val="478867432"/>
+        <c:crossAx val="377721080"/>
         <c:crosses val="autoZero"/>
         <c:crossBetween val="midCat"/>
       </c:valAx>
       <c:valAx>
-        <c:axId val="478867432"/>
+        <c:axId val="377721080"/>
         <c:scaling>
           <c:orientation val="minMax"/>
         </c:scaling>
@@ -552,7 +552,7 @@
             <a:endParaRPr lang="ja-JP"/>
           </a:p>
         </c:txPr>
-        <c:crossAx val="478867040"/>
+        <c:crossAx val="377720688"/>
         <c:crosses val="autoZero"/>
         <c:crossBetween val="midCat"/>
       </c:valAx>
@@ -685,38 +685,6 @@
 
 <file path=ppt/comments/comment3.xml><?xml version="1.0" encoding="utf-8"?>
 <p:cmLst xmlns:a="http://schemas.openxmlformats.org/drawingml/2006/main" xmlns:r="http://schemas.openxmlformats.org/officeDocument/2006/relationships" xmlns:p="http://schemas.openxmlformats.org/presentationml/2006/main">
-  <p:cm authorId="1" dt="2015-07-16T19:21:47.968" idx="9">
-    <p:pos x="222" y="1692"/>
-    <p:text>ここにもう一つ、何かを書きたい。</p:text>
-    <p:extLst>
-      <p:ext uri="{C676402C-5697-4E1C-873F-D02D1690AC5C}">
-        <p15:threadingInfo xmlns:p15="http://schemas.microsoft.com/office/powerpoint/2012/main" timeZoneBias="-540"/>
-      </p:ext>
-    </p:extLst>
-  </p:cm>
-  <p:cm authorId="1" dt="2015-07-16T19:26:08.576" idx="10">
-    <p:pos x="6742" y="2326"/>
-    <p:text>ここは、地雷探知機メソッドを使用する場合は、別の書き方がよいです。</p:text>
-    <p:extLst>
-      <p:ext uri="{C676402C-5697-4E1C-873F-D02D1690AC5C}">
-        <p15:threadingInfo xmlns:p15="http://schemas.microsoft.com/office/powerpoint/2012/main" timeZoneBias="-540"/>
-      </p:ext>
-    </p:extLst>
-  </p:cm>
-  <p:cm authorId="1" dt="2015-07-16T19:37:26.545" idx="17">
-    <p:pos x="6506" y="834"/>
-    <p:text>このパッケージ構成のウリを書く。</p:text>
-    <p:extLst>
-      <p:ext uri="{C676402C-5697-4E1C-873F-D02D1690AC5C}">
-        <p15:threadingInfo xmlns:p15="http://schemas.microsoft.com/office/powerpoint/2012/main" timeZoneBias="-540"/>
-      </p:ext>
-    </p:extLst>
-  </p:cm>
-</p:cmLst>
-</file>
-
-<file path=ppt/comments/comment4.xml><?xml version="1.0" encoding="utf-8"?>
-<p:cmLst xmlns:a="http://schemas.openxmlformats.org/drawingml/2006/main" xmlns:r="http://schemas.openxmlformats.org/officeDocument/2006/relationships" xmlns:p="http://schemas.openxmlformats.org/presentationml/2006/main">
   <p:cm authorId="1" dt="2015-07-16T19:31:14.114" idx="15">
     <p:pos x="257" y="31"/>
     <p:text>ここでは次のような情報を書く。
@@ -732,7 +700,7 @@
 </p:cmLst>
 </file>
 
-<file path=ppt/comments/comment5.xml><?xml version="1.0" encoding="utf-8"?>
+<file path=ppt/comments/comment4.xml><?xml version="1.0" encoding="utf-8"?>
 <p:cmLst xmlns:a="http://schemas.openxmlformats.org/drawingml/2006/main" xmlns:r="http://schemas.openxmlformats.org/officeDocument/2006/relationships" xmlns:p="http://schemas.openxmlformats.org/presentationml/2006/main">
   <p:cm authorId="1" dt="2015-07-16T19:29:50.375" idx="11">
     <p:pos x="1626" y="1436"/>
@@ -861,7 +829,7 @@
           <a:p>
             <a:fld id="{20DEA7AF-5BE1-40D9-B563-34B581AF3C5C}" type="datetimeFigureOut">
               <a:rPr kumimoji="1" lang="ja-JP" altLang="en-US" smtClean="0"/>
-              <a:t>2015/7/23</a:t>
+              <a:t>2015/7/24</a:t>
             </a:fld>
             <a:endParaRPr kumimoji="1" lang="ja-JP" altLang="en-US"/>
           </a:p>
@@ -1426,7 +1394,7 @@
           <a:p>
             <a:fld id="{41079119-3171-4BC9-A6EB-D7FA4532BD2E}" type="datetimeFigureOut">
               <a:rPr kumimoji="1" lang="ja-JP" altLang="en-US" smtClean="0"/>
-              <a:t>2015/7/23</a:t>
+              <a:t>2015/7/24</a:t>
             </a:fld>
             <a:endParaRPr kumimoji="1" lang="ja-JP" altLang="en-US"/>
           </a:p>
@@ -1628,7 +1596,7 @@
           <a:p>
             <a:fld id="{41079119-3171-4BC9-A6EB-D7FA4532BD2E}" type="datetimeFigureOut">
               <a:rPr kumimoji="1" lang="ja-JP" altLang="en-US" smtClean="0"/>
-              <a:t>2015/7/23</a:t>
+              <a:t>2015/7/24</a:t>
             </a:fld>
             <a:endParaRPr kumimoji="1" lang="ja-JP" altLang="en-US"/>
           </a:p>
@@ -1840,7 +1808,7 @@
           <a:p>
             <a:fld id="{41079119-3171-4BC9-A6EB-D7FA4532BD2E}" type="datetimeFigureOut">
               <a:rPr kumimoji="1" lang="ja-JP" altLang="en-US" smtClean="0"/>
-              <a:t>2015/7/23</a:t>
+              <a:t>2015/7/24</a:t>
             </a:fld>
             <a:endParaRPr kumimoji="1" lang="ja-JP" altLang="en-US"/>
           </a:p>
@@ -2042,7 +2010,7 @@
           <a:p>
             <a:fld id="{41079119-3171-4BC9-A6EB-D7FA4532BD2E}" type="datetimeFigureOut">
               <a:rPr kumimoji="1" lang="ja-JP" altLang="en-US" smtClean="0"/>
-              <a:t>2015/7/23</a:t>
+              <a:t>2015/7/24</a:t>
             </a:fld>
             <a:endParaRPr kumimoji="1" lang="ja-JP" altLang="en-US"/>
           </a:p>
@@ -2288,7 +2256,7 @@
           <a:p>
             <a:fld id="{41079119-3171-4BC9-A6EB-D7FA4532BD2E}" type="datetimeFigureOut">
               <a:rPr kumimoji="1" lang="ja-JP" altLang="en-US" smtClean="0"/>
-              <a:t>2015/7/23</a:t>
+              <a:t>2015/7/24</a:t>
             </a:fld>
             <a:endParaRPr kumimoji="1" lang="ja-JP" altLang="en-US"/>
           </a:p>
@@ -2640,7 +2608,7 @@
           <a:p>
             <a:fld id="{41079119-3171-4BC9-A6EB-D7FA4532BD2E}" type="datetimeFigureOut">
               <a:rPr kumimoji="1" lang="ja-JP" altLang="en-US" smtClean="0"/>
-              <a:t>2015/7/23</a:t>
+              <a:t>2015/7/24</a:t>
             </a:fld>
             <a:endParaRPr kumimoji="1" lang="ja-JP" altLang="en-US"/>
           </a:p>
@@ -3131,7 +3099,7 @@
           <a:p>
             <a:fld id="{41079119-3171-4BC9-A6EB-D7FA4532BD2E}" type="datetimeFigureOut">
               <a:rPr kumimoji="1" lang="ja-JP" altLang="en-US" smtClean="0"/>
-              <a:t>2015/7/23</a:t>
+              <a:t>2015/7/24</a:t>
             </a:fld>
             <a:endParaRPr kumimoji="1" lang="ja-JP" altLang="en-US"/>
           </a:p>
@@ -3249,7 +3217,7 @@
           <a:p>
             <a:fld id="{41079119-3171-4BC9-A6EB-D7FA4532BD2E}" type="datetimeFigureOut">
               <a:rPr kumimoji="1" lang="ja-JP" altLang="en-US" smtClean="0"/>
-              <a:t>2015/7/23</a:t>
+              <a:t>2015/7/24</a:t>
             </a:fld>
             <a:endParaRPr kumimoji="1" lang="ja-JP" altLang="en-US"/>
           </a:p>
@@ -3344,7 +3312,7 @@
           <a:p>
             <a:fld id="{41079119-3171-4BC9-A6EB-D7FA4532BD2E}" type="datetimeFigureOut">
               <a:rPr kumimoji="1" lang="ja-JP" altLang="en-US" smtClean="0"/>
-              <a:t>2015/7/23</a:t>
+              <a:t>2015/7/24</a:t>
             </a:fld>
             <a:endParaRPr kumimoji="1" lang="ja-JP" altLang="en-US"/>
           </a:p>
@@ -3653,7 +3621,7 @@
           <a:p>
             <a:fld id="{41079119-3171-4BC9-A6EB-D7FA4532BD2E}" type="datetimeFigureOut">
               <a:rPr kumimoji="1" lang="ja-JP" altLang="en-US" smtClean="0"/>
-              <a:t>2015/7/23</a:t>
+              <a:t>2015/7/24</a:t>
             </a:fld>
             <a:endParaRPr kumimoji="1" lang="ja-JP" altLang="en-US"/>
           </a:p>
@@ -3906,7 +3874,7 @@
           <a:p>
             <a:fld id="{41079119-3171-4BC9-A6EB-D7FA4532BD2E}" type="datetimeFigureOut">
               <a:rPr kumimoji="1" lang="ja-JP" altLang="en-US" smtClean="0"/>
-              <a:t>2015/7/23</a:t>
+              <a:t>2015/7/24</a:t>
             </a:fld>
             <a:endParaRPr kumimoji="1" lang="ja-JP" altLang="en-US"/>
           </a:p>
@@ -4151,7 +4119,7 @@
           <a:p>
             <a:fld id="{41079119-3171-4BC9-A6EB-D7FA4532BD2E}" type="datetimeFigureOut">
               <a:rPr kumimoji="1" lang="ja-JP" altLang="en-US" smtClean="0"/>
-              <a:t>2015/7/23</a:t>
+              <a:t>2015/7/24</a:t>
             </a:fld>
             <a:endParaRPr kumimoji="1" lang="ja-JP" altLang="en-US"/>
           </a:p>
@@ -5582,14 +5550,7 @@
                 <a:latin typeface="HG丸ｺﾞｼｯｸM-PRO" panose="020F0600000000000000" pitchFamily="50" charset="-128"/>
                 <a:ea typeface="HG丸ｺﾞｼｯｸM-PRO" panose="020F0600000000000000" pitchFamily="50" charset="-128"/>
               </a:rPr>
-              <a:t>　スタート</a:t>
-            </a:r>
-            <a:r>
-              <a:rPr lang="ja-JP" altLang="en-US" sz="1050" smtClean="0">
-                <a:latin typeface="HG丸ｺﾞｼｯｸM-PRO" panose="020F0600000000000000" pitchFamily="50" charset="-128"/>
-                <a:ea typeface="HG丸ｺﾞｼｯｸM-PRO" panose="020F0600000000000000" pitchFamily="50" charset="-128"/>
-              </a:rPr>
-              <a:t>からゴールまでの道のりをなるべく早く駆け抜ける。</a:t>
+              <a:t>　スタートからゴールまでの道のりをなるべく早く駆け抜ける。</a:t>
             </a:r>
             <a:endParaRPr lang="en-US" altLang="ja-JP" sz="1050" smtClean="0">
               <a:latin typeface="HG丸ｺﾞｼｯｸM-PRO" panose="020F0600000000000000" pitchFamily="50" charset="-128"/>
@@ -5603,14 +5564,7 @@
                 <a:latin typeface="HG丸ｺﾞｼｯｸM-PRO" panose="020F0600000000000000" pitchFamily="50" charset="-128"/>
                 <a:ea typeface="HG丸ｺﾞｼｯｸM-PRO" panose="020F0600000000000000" pitchFamily="50" charset="-128"/>
               </a:rPr>
-              <a:t>　これ</a:t>
-            </a:r>
-            <a:r>
-              <a:rPr kumimoji="1" lang="ja-JP" altLang="en-US" sz="1050" smtClean="0">
-                <a:latin typeface="HG丸ｺﾞｼｯｸM-PRO" panose="020F0600000000000000" pitchFamily="50" charset="-128"/>
-                <a:ea typeface="HG丸ｺﾞｼｯｸM-PRO" panose="020F0600000000000000" pitchFamily="50" charset="-128"/>
-              </a:rPr>
-              <a:t>により、ポイントが高くなり、難所攻略にかけられる時間を格段に増やすことができる。</a:t>
+              <a:t>　これにより、ポイントが高くなり、難所攻略にかけられる時間を格段に増やすことができる。</a:t>
             </a:r>
             <a:endParaRPr kumimoji="1" lang="ja-JP" altLang="en-US" sz="1050" dirty="0">
               <a:latin typeface="HG丸ｺﾞｼｯｸM-PRO" panose="020F0600000000000000" pitchFamily="50" charset="-128"/>
@@ -5712,14 +5666,7 @@
                 <a:latin typeface="HG丸ｺﾞｼｯｸM-PRO" panose="020F0600000000000000" pitchFamily="50" charset="-128"/>
                 <a:ea typeface="HG丸ｺﾞｼｯｸM-PRO" panose="020F0600000000000000" pitchFamily="50" charset="-128"/>
               </a:rPr>
-              <a:t>　昨年</a:t>
-            </a:r>
-            <a:r>
-              <a:rPr lang="ja-JP" altLang="en-US" sz="1050" smtClean="0">
-                <a:latin typeface="HG丸ｺﾞｼｯｸM-PRO" panose="020F0600000000000000" pitchFamily="50" charset="-128"/>
-                <a:ea typeface="HG丸ｺﾞｼｯｸM-PRO" panose="020F0600000000000000" pitchFamily="50" charset="-128"/>
-              </a:rPr>
-              <a:t>、走行体をコースに設置する際、位置がずれてしまったことにより、スタート直後にコースアウトしてしまった。安全にスタートを切れるようにすることで、リタイアを避けたい。</a:t>
+              <a:t>　昨年、走行体をコースに設置する際、位置がずれてしまったことにより、スタート直後にコースアウトしてしまった。安全にスタートを切れるようにすることで、リタイアを避けたい。</a:t>
             </a:r>
             <a:endParaRPr kumimoji="1" lang="ja-JP" altLang="en-US" sz="1050" dirty="0">
               <a:latin typeface="HG丸ｺﾞｼｯｸM-PRO" panose="020F0600000000000000" pitchFamily="50" charset="-128"/>
@@ -5975,14 +5922,7 @@
                 <a:latin typeface="HG丸ｺﾞｼｯｸM-PRO" panose="020F0600000000000000" pitchFamily="50" charset="-128"/>
                 <a:ea typeface="HG丸ｺﾞｼｯｸM-PRO" panose="020F0600000000000000" pitchFamily="50" charset="-128"/>
               </a:rPr>
-              <a:t>　ステートマシン</a:t>
-            </a:r>
-            <a:r>
-              <a:rPr lang="ja-JP" altLang="en-US" sz="1050" smtClean="0">
-                <a:latin typeface="HG丸ｺﾞｼｯｸM-PRO" panose="020F0600000000000000" pitchFamily="50" charset="-128"/>
-                <a:ea typeface="HG丸ｺﾞｼｯｸM-PRO" panose="020F0600000000000000" pitchFamily="50" charset="-128"/>
-              </a:rPr>
-              <a:t>を利用して振る舞いを記述することで、モデル図を簡単にわかりやすくする。</a:t>
+              <a:t>　ステートマシンを利用して振る舞いを記述することで、モデル図を簡単にわかりやすくする。</a:t>
             </a:r>
             <a:endParaRPr kumimoji="1" lang="ja-JP" altLang="en-US" sz="1050" dirty="0">
               <a:latin typeface="HG丸ｺﾞｼｯｸM-PRO" panose="020F0600000000000000" pitchFamily="50" charset="-128"/>
@@ -11953,14 +11893,7 @@
                 <a:latin typeface="HG丸ｺﾞｼｯｸM-PRO" panose="020F0600000000000000" pitchFamily="50" charset="-128"/>
                 <a:ea typeface="HG丸ｺﾞｼｯｸM-PRO" panose="020F0600000000000000" pitchFamily="50" charset="-128"/>
               </a:rPr>
-              <a:t>　</a:t>
-            </a:r>
-            <a:r>
-              <a:rPr kumimoji="1" lang="ja-JP" altLang="en-US" sz="1050" smtClean="0">
-                <a:latin typeface="HG丸ｺﾞｼｯｸM-PRO" panose="020F0600000000000000" pitchFamily="50" charset="-128"/>
-                <a:ea typeface="HG丸ｺﾞｼｯｸM-PRO" panose="020F0600000000000000" pitchFamily="50" charset="-128"/>
-              </a:rPr>
-              <a:t>スタート直後、速度が遅いときにライントレースを行うと、トレースしている位置の色によって左右に大きくふらついてしまう。ふらつきを抑えるため、強制的に左右のモーターに</a:t>
+              <a:t>　スタート直後、速度が遅いときにライントレースを行うと、トレースしている位置の色によって左右に大きくふらついてしまう。ふらつきを抑えるため、強制的に左右のモーターに</a:t>
             </a:r>
             <a:r>
               <a:rPr lang="ja-JP" altLang="en-US" sz="1050" smtClean="0">
@@ -12129,57 +12062,6 @@
           </a:p>
         </p:txBody>
       </p:sp>
-      <p:sp>
-        <p:nvSpPr>
-          <p:cNvPr id="289" name="正方形/長方形 288"/>
-          <p:cNvSpPr/>
-          <p:nvPr/>
-        </p:nvSpPr>
-        <p:spPr>
-          <a:xfrm>
-            <a:off x="4317588" y="533668"/>
-            <a:ext cx="8484012" cy="4220731"/>
-          </a:xfrm>
-          <a:prstGeom prst="rect">
-            <a:avLst/>
-          </a:prstGeom>
-          <a:solidFill>
-            <a:schemeClr val="bg1"/>
-          </a:solidFill>
-          <a:ln w="19050">
-            <a:solidFill>
-              <a:schemeClr val="accent3">
-                <a:lumMod val="75000"/>
-              </a:schemeClr>
-            </a:solidFill>
-          </a:ln>
-          <a:effectLst/>
-        </p:spPr>
-        <p:style>
-          <a:lnRef idx="1">
-            <a:schemeClr val="accent6"/>
-          </a:lnRef>
-          <a:fillRef idx="2">
-            <a:schemeClr val="accent6"/>
-          </a:fillRef>
-          <a:effectRef idx="1">
-            <a:schemeClr val="accent6"/>
-          </a:effectRef>
-          <a:fontRef idx="minor">
-            <a:schemeClr val="dk1"/>
-          </a:fontRef>
-        </p:style>
-        <p:txBody>
-          <a:bodyPr lIns="91428" tIns="45714" rIns="91428" bIns="45714" rtlCol="0" anchor="ctr"/>
-          <a:lstStyle/>
-          <a:p>
-            <a:endParaRPr kumimoji="1" lang="ja-JP" altLang="en-US" sz="2400" dirty="0">
-              <a:latin typeface="HG丸ｺﾞｼｯｸM-PRO" panose="020F0600000000000000" pitchFamily="50" charset="-128"/>
-              <a:ea typeface="HG丸ｺﾞｼｯｸM-PRO" panose="020F0600000000000000" pitchFamily="50" charset="-128"/>
-            </a:endParaRPr>
-          </a:p>
-        </p:txBody>
-      </p:sp>
       <p:grpSp>
         <p:nvGrpSpPr>
           <p:cNvPr id="704" name="グループ化 703"/>
@@ -12632,8 +12514,8 @@
         </p:nvSpPr>
         <p:spPr>
           <a:xfrm>
-            <a:off x="0" y="533668"/>
-            <a:ext cx="4315748" cy="4220731"/>
+            <a:off x="1" y="546368"/>
+            <a:ext cx="4657724" cy="4333607"/>
           </a:xfrm>
           <a:prstGeom prst="rect">
             <a:avLst/>
@@ -12683,7 +12565,7 @@
         </p:nvGrpSpPr>
         <p:grpSpPr>
           <a:xfrm>
-            <a:off x="-763" y="533668"/>
+            <a:off x="-763" y="546368"/>
             <a:ext cx="1436548" cy="289332"/>
             <a:chOff x="108962" y="840157"/>
             <a:chExt cx="1234201" cy="289332"/>
@@ -12767,351 +12649,33 @@
                 <a:t>　</a:t>
               </a:r>
               <a:r>
-                <a:rPr lang="en-US" altLang="ja-JP" sz="1400" dirty="0">
+                <a:rPr lang="en-US" altLang="ja-JP" sz="1400">
                   <a:latin typeface="HG丸ｺﾞｼｯｸM-PRO" panose="020F0600000000000000" pitchFamily="50" charset="-128"/>
                   <a:ea typeface="HG丸ｺﾞｼｯｸM-PRO" panose="020F0600000000000000" pitchFamily="50" charset="-128"/>
                 </a:rPr>
                 <a:t>3</a:t>
               </a:r>
               <a:r>
-                <a:rPr lang="en-US" altLang="ja-JP" sz="1400" dirty="0" smtClean="0">
+                <a:rPr lang="en-US" altLang="ja-JP" sz="1400" smtClean="0">
                   <a:latin typeface="HG丸ｺﾞｼｯｸM-PRO" panose="020F0600000000000000" pitchFamily="50" charset="-128"/>
                   <a:ea typeface="HG丸ｺﾞｼｯｸM-PRO" panose="020F0600000000000000" pitchFamily="50" charset="-128"/>
                 </a:rPr>
                 <a:t>.1</a:t>
               </a:r>
               <a:r>
-                <a:rPr lang="ja-JP" altLang="en-US" sz="1400" dirty="0" smtClean="0">
+                <a:rPr lang="ja-JP" altLang="en-US" sz="1400" smtClean="0">
                   <a:latin typeface="HG丸ｺﾞｼｯｸM-PRO" panose="020F0600000000000000" pitchFamily="50" charset="-128"/>
                   <a:ea typeface="HG丸ｺﾞｼｯｸM-PRO" panose="020F0600000000000000" pitchFamily="50" charset="-128"/>
                 </a:rPr>
-                <a:t> 設計方針　</a:t>
+                <a:t> </a:t>
               </a:r>
-              <a:endParaRPr kumimoji="1" lang="ja-JP" altLang="en-US" sz="1400" dirty="0">
-                <a:latin typeface="HG丸ｺﾞｼｯｸM-PRO" panose="020F0600000000000000" pitchFamily="50" charset="-128"/>
-                <a:ea typeface="HG丸ｺﾞｼｯｸM-PRO" panose="020F0600000000000000" pitchFamily="50" charset="-128"/>
-              </a:endParaRPr>
-            </a:p>
-          </p:txBody>
-        </p:sp>
-      </p:grpSp>
-      <p:sp>
-        <p:nvSpPr>
-          <p:cNvPr id="71" name="テキスト ボックス 70"/>
-          <p:cNvSpPr txBox="1"/>
-          <p:nvPr/>
-        </p:nvSpPr>
-        <p:spPr>
-          <a:xfrm>
-            <a:off x="65665" y="1144182"/>
-            <a:ext cx="4240371" cy="1215717"/>
-          </a:xfrm>
-          <a:prstGeom prst="rect">
-            <a:avLst/>
-          </a:prstGeom>
-          <a:noFill/>
-        </p:spPr>
-        <p:txBody>
-          <a:bodyPr wrap="square" rtlCol="0">
-            <a:spAutoFit/>
-          </a:bodyPr>
-          <a:lstStyle/>
-          <a:p>
-            <a:r>
-              <a:rPr lang="ja-JP" altLang="en-US" sz="1050" b="1" u="sng" smtClean="0">
-                <a:solidFill>
-                  <a:srgbClr val="0000CC"/>
-                </a:solidFill>
-                <a:uFill>
-                  <a:solidFill>
-                    <a:schemeClr val="bg1">
-                      <a:lumMod val="50000"/>
-                    </a:schemeClr>
-                  </a:solidFill>
-                </a:uFill>
-                <a:latin typeface="HG丸ｺﾞｼｯｸM-PRO" panose="020F0600000000000000" pitchFamily="50" charset="-128"/>
-                <a:ea typeface="HG丸ｺﾞｼｯｸM-PRO" panose="020F0600000000000000" pitchFamily="50" charset="-128"/>
-              </a:rPr>
-              <a:t>走行</a:t>
-            </a:r>
-            <a:r>
-              <a:rPr lang="ja-JP" altLang="en-US" sz="1050" b="1" u="sng" dirty="0" smtClean="0">
-                <a:solidFill>
-                  <a:srgbClr val="0000CC"/>
-                </a:solidFill>
-                <a:uFill>
-                  <a:solidFill>
-                    <a:schemeClr val="bg1">
-                      <a:lumMod val="50000"/>
-                    </a:schemeClr>
-                  </a:solidFill>
-                </a:uFill>
-                <a:latin typeface="HG丸ｺﾞｼｯｸM-PRO" panose="020F0600000000000000" pitchFamily="50" charset="-128"/>
-                <a:ea typeface="HG丸ｺﾞｼｯｸM-PRO" panose="020F0600000000000000" pitchFamily="50" charset="-128"/>
-              </a:rPr>
-              <a:t>戦略の記述の容易化</a:t>
-            </a:r>
-            <a:endParaRPr lang="en-US" altLang="ja-JP" sz="1050" b="1" u="sng" dirty="0" smtClean="0">
-              <a:solidFill>
-                <a:srgbClr val="0000CC"/>
-              </a:solidFill>
-              <a:uFill>
-                <a:solidFill>
-                  <a:schemeClr val="bg1">
-                    <a:lumMod val="50000"/>
-                  </a:schemeClr>
-                </a:solidFill>
-              </a:uFill>
-              <a:latin typeface="HG丸ｺﾞｼｯｸM-PRO" panose="020F0600000000000000" pitchFamily="50" charset="-128"/>
-              <a:ea typeface="HG丸ｺﾞｼｯｸM-PRO" panose="020F0600000000000000" pitchFamily="50" charset="-128"/>
-            </a:endParaRPr>
-          </a:p>
-          <a:p>
-            <a:endParaRPr lang="en-US" altLang="ja-JP" sz="500" i="1" u="sng" dirty="0" smtClean="0">
-              <a:latin typeface="HG丸ｺﾞｼｯｸM-PRO" panose="020F0600000000000000" pitchFamily="50" charset="-128"/>
-              <a:ea typeface="HG丸ｺﾞｼｯｸM-PRO" panose="020F0600000000000000" pitchFamily="50" charset="-128"/>
-            </a:endParaRPr>
-          </a:p>
-          <a:p>
-            <a:pPr marL="180975"/>
-            <a:r>
-              <a:rPr lang="ja-JP" altLang="en-US" sz="1050" b="1" dirty="0" smtClean="0">
-                <a:latin typeface="HG丸ｺﾞｼｯｸM-PRO" panose="020F0600000000000000" pitchFamily="50" charset="-128"/>
-                <a:ea typeface="HG丸ｺﾞｼｯｸM-PRO" panose="020F0600000000000000" pitchFamily="50" charset="-128"/>
-              </a:rPr>
-              <a:t>走行方法</a:t>
-            </a:r>
-            <a:r>
-              <a:rPr lang="ja-JP" altLang="en-US" sz="1050" dirty="0" smtClean="0">
-                <a:latin typeface="HG丸ｺﾞｼｯｸM-PRO" panose="020F0600000000000000" pitchFamily="50" charset="-128"/>
-                <a:ea typeface="HG丸ｺﾞｼｯｸM-PRO" panose="020F0600000000000000" pitchFamily="50" charset="-128"/>
-              </a:rPr>
-              <a:t>と</a:t>
-            </a:r>
-            <a:r>
-              <a:rPr lang="ja-JP" altLang="en-US" sz="1050" b="1" dirty="0">
-                <a:latin typeface="HG丸ｺﾞｼｯｸM-PRO" panose="020F0600000000000000" pitchFamily="50" charset="-128"/>
-                <a:ea typeface="HG丸ｺﾞｼｯｸM-PRO" panose="020F0600000000000000" pitchFamily="50" charset="-128"/>
-              </a:rPr>
-              <a:t>切換え</a:t>
-            </a:r>
-            <a:r>
-              <a:rPr lang="ja-JP" altLang="en-US" sz="1050" b="1" dirty="0" smtClean="0">
-                <a:latin typeface="HG丸ｺﾞｼｯｸM-PRO" panose="020F0600000000000000" pitchFamily="50" charset="-128"/>
-                <a:ea typeface="HG丸ｺﾞｼｯｸM-PRO" panose="020F0600000000000000" pitchFamily="50" charset="-128"/>
-              </a:rPr>
-              <a:t>条件</a:t>
-            </a:r>
-            <a:r>
-              <a:rPr lang="ja-JP" altLang="en-US" sz="1050" dirty="0" smtClean="0">
-                <a:latin typeface="HG丸ｺﾞｼｯｸM-PRO" panose="020F0600000000000000" pitchFamily="50" charset="-128"/>
-                <a:ea typeface="HG丸ｺﾞｼｯｸM-PRO" panose="020F0600000000000000" pitchFamily="50" charset="-128"/>
-              </a:rPr>
-              <a:t>からなる</a:t>
-            </a:r>
-            <a:r>
-              <a:rPr lang="ja-JP" altLang="en-US" sz="1050" b="1" dirty="0" smtClean="0">
-                <a:latin typeface="HG丸ｺﾞｼｯｸM-PRO" panose="020F0600000000000000" pitchFamily="50" charset="-128"/>
-                <a:ea typeface="HG丸ｺﾞｼｯｸM-PRO" panose="020F0600000000000000" pitchFamily="50" charset="-128"/>
-              </a:rPr>
-              <a:t>走行戦術</a:t>
-            </a:r>
-            <a:r>
-              <a:rPr lang="ja-JP" altLang="en-US" sz="1050" dirty="0" smtClean="0">
-                <a:latin typeface="HG丸ｺﾞｼｯｸM-PRO" panose="020F0600000000000000" pitchFamily="50" charset="-128"/>
-                <a:ea typeface="HG丸ｺﾞｼｯｸM-PRO" panose="020F0600000000000000" pitchFamily="50" charset="-128"/>
-              </a:rPr>
-              <a:t>の組合せによって</a:t>
-            </a:r>
-            <a:endParaRPr lang="en-US" altLang="ja-JP" sz="1050" dirty="0" smtClean="0">
-              <a:latin typeface="HG丸ｺﾞｼｯｸM-PRO" panose="020F0600000000000000" pitchFamily="50" charset="-128"/>
-              <a:ea typeface="HG丸ｺﾞｼｯｸM-PRO" panose="020F0600000000000000" pitchFamily="50" charset="-128"/>
-            </a:endParaRPr>
-          </a:p>
-          <a:p>
-            <a:pPr marL="180975"/>
-            <a:r>
-              <a:rPr lang="ja-JP" altLang="en-US" sz="1050" b="1" dirty="0" smtClean="0">
-                <a:latin typeface="HG丸ｺﾞｼｯｸM-PRO" panose="020F0600000000000000" pitchFamily="50" charset="-128"/>
-                <a:ea typeface="HG丸ｺﾞｼｯｸM-PRO" panose="020F0600000000000000" pitchFamily="50" charset="-128"/>
-              </a:rPr>
-              <a:t>走行戦略</a:t>
-            </a:r>
-            <a:r>
-              <a:rPr lang="ja-JP" altLang="en-US" sz="1050" dirty="0" smtClean="0">
-                <a:latin typeface="HG丸ｺﾞｼｯｸM-PRO" panose="020F0600000000000000" pitchFamily="50" charset="-128"/>
-                <a:ea typeface="HG丸ｺﾞｼｯｸM-PRO" panose="020F0600000000000000" pitchFamily="50" charset="-128"/>
-              </a:rPr>
-              <a:t>を記述する。</a:t>
-            </a:r>
-            <a:endParaRPr lang="en-US" altLang="ja-JP" sz="1050" dirty="0" smtClean="0">
-              <a:latin typeface="HG丸ｺﾞｼｯｸM-PRO" panose="020F0600000000000000" pitchFamily="50" charset="-128"/>
-              <a:ea typeface="HG丸ｺﾞｼｯｸM-PRO" panose="020F0600000000000000" pitchFamily="50" charset="-128"/>
-            </a:endParaRPr>
-          </a:p>
-          <a:p>
-            <a:pPr marL="176213" indent="4763"/>
-            <a:endParaRPr lang="en-US" altLang="ja-JP" sz="500" dirty="0">
-              <a:latin typeface="HG丸ｺﾞｼｯｸM-PRO" panose="020F0600000000000000" pitchFamily="50" charset="-128"/>
-              <a:ea typeface="HG丸ｺﾞｼｯｸM-PRO" panose="020F0600000000000000" pitchFamily="50" charset="-128"/>
-            </a:endParaRPr>
-          </a:p>
-          <a:p>
-            <a:pPr marL="176213" indent="268288"/>
-            <a:r>
-              <a:rPr lang="ja-JP" altLang="en-US" sz="1050" dirty="0" smtClean="0">
-                <a:latin typeface="HG丸ｺﾞｼｯｸM-PRO" panose="020F0600000000000000" pitchFamily="50" charset="-128"/>
-                <a:ea typeface="HG丸ｺﾞｼｯｸM-PRO" panose="020F0600000000000000" pitchFamily="50" charset="-128"/>
-              </a:rPr>
-              <a:t>・走行戦略の変更が容易。</a:t>
-            </a:r>
-            <a:endParaRPr lang="en-US" altLang="ja-JP" sz="1050" dirty="0" smtClean="0">
-              <a:latin typeface="HG丸ｺﾞｼｯｸM-PRO" panose="020F0600000000000000" pitchFamily="50" charset="-128"/>
-              <a:ea typeface="HG丸ｺﾞｼｯｸM-PRO" panose="020F0600000000000000" pitchFamily="50" charset="-128"/>
-            </a:endParaRPr>
-          </a:p>
-          <a:p>
-            <a:pPr marL="180975" indent="263525"/>
-            <a:r>
-              <a:rPr lang="ja-JP" altLang="en-US" sz="1050" dirty="0" smtClean="0">
-                <a:latin typeface="HG丸ｺﾞｼｯｸM-PRO" panose="020F0600000000000000" pitchFamily="50" charset="-128"/>
-                <a:ea typeface="HG丸ｺﾞｼｯｸM-PRO" panose="020F0600000000000000" pitchFamily="50" charset="-128"/>
-              </a:rPr>
-              <a:t>・正常系、</a:t>
-            </a:r>
-            <a:r>
-              <a:rPr lang="ja-JP" altLang="en-US" sz="1050" smtClean="0">
-                <a:latin typeface="HG丸ｺﾞｼｯｸM-PRO" panose="020F0600000000000000" pitchFamily="50" charset="-128"/>
-                <a:ea typeface="HG丸ｺﾞｼｯｸM-PRO" panose="020F0600000000000000" pitchFamily="50" charset="-128"/>
-              </a:rPr>
-              <a:t>異常系を</a:t>
-            </a:r>
-            <a:r>
-              <a:rPr lang="ja-JP" altLang="en-US" sz="1050" dirty="0" smtClean="0">
-                <a:latin typeface="HG丸ｺﾞｼｯｸM-PRO" panose="020F0600000000000000" pitchFamily="50" charset="-128"/>
-                <a:ea typeface="HG丸ｺﾞｼｯｸM-PRO" panose="020F0600000000000000" pitchFamily="50" charset="-128"/>
-              </a:rPr>
-              <a:t>共通の方式で記述</a:t>
-            </a:r>
-            <a:r>
-              <a:rPr lang="ja-JP" altLang="en-US" sz="1050" smtClean="0">
-                <a:latin typeface="HG丸ｺﾞｼｯｸM-PRO" panose="020F0600000000000000" pitchFamily="50" charset="-128"/>
-                <a:ea typeface="HG丸ｺﾞｼｯｸM-PRO" panose="020F0600000000000000" pitchFamily="50" charset="-128"/>
-              </a:rPr>
-              <a:t>可能。</a:t>
-            </a:r>
-            <a:endParaRPr lang="en-US" altLang="ja-JP" sz="1050" dirty="0" smtClean="0">
-              <a:latin typeface="HG丸ｺﾞｼｯｸM-PRO" panose="020F0600000000000000" pitchFamily="50" charset="-128"/>
-              <a:ea typeface="HG丸ｺﾞｼｯｸM-PRO" panose="020F0600000000000000" pitchFamily="50" charset="-128"/>
-            </a:endParaRPr>
-          </a:p>
-          <a:p>
-            <a:pPr marL="180975" indent="263525"/>
-            <a:r>
-              <a:rPr lang="ja-JP" altLang="en-US" sz="1050" dirty="0" smtClean="0">
-                <a:latin typeface="HG丸ｺﾞｼｯｸM-PRO" panose="020F0600000000000000" pitchFamily="50" charset="-128"/>
-                <a:ea typeface="HG丸ｺﾞｼｯｸM-PRO" panose="020F0600000000000000" pitchFamily="50" charset="-128"/>
-              </a:rPr>
-              <a:t>・走行方法および切換え条件の再利用が</a:t>
-            </a:r>
-            <a:r>
-              <a:rPr lang="ja-JP" altLang="en-US" sz="1050" smtClean="0">
-                <a:latin typeface="HG丸ｺﾞｼｯｸM-PRO" panose="020F0600000000000000" pitchFamily="50" charset="-128"/>
-                <a:ea typeface="HG丸ｺﾞｼｯｸM-PRO" panose="020F0600000000000000" pitchFamily="50" charset="-128"/>
-              </a:rPr>
-              <a:t>可能。</a:t>
-            </a:r>
-            <a:endParaRPr lang="en-US" altLang="ja-JP" sz="1050" smtClean="0">
-              <a:latin typeface="HG丸ｺﾞｼｯｸM-PRO" panose="020F0600000000000000" pitchFamily="50" charset="-128"/>
-              <a:ea typeface="HG丸ｺﾞｼｯｸM-PRO" panose="020F0600000000000000" pitchFamily="50" charset="-128"/>
-            </a:endParaRPr>
-          </a:p>
-        </p:txBody>
-      </p:sp>
-      <p:grpSp>
-        <p:nvGrpSpPr>
-          <p:cNvPr id="129" name="グループ化 128"/>
-          <p:cNvGrpSpPr/>
-          <p:nvPr/>
-        </p:nvGrpSpPr>
-        <p:grpSpPr>
-          <a:xfrm>
-            <a:off x="4317588" y="533668"/>
-            <a:ext cx="1993567" cy="289332"/>
-            <a:chOff x="66017" y="3239209"/>
-            <a:chExt cx="1993567" cy="289332"/>
-          </a:xfrm>
-        </p:grpSpPr>
-        <p:sp>
-          <p:nvSpPr>
-            <p:cNvPr id="291" name="正方形/長方形 290"/>
-            <p:cNvSpPr/>
-            <p:nvPr/>
-          </p:nvSpPr>
-          <p:spPr>
-            <a:xfrm>
-              <a:off x="66017" y="3239209"/>
-              <a:ext cx="1993566" cy="289332"/>
-            </a:xfrm>
-            <a:prstGeom prst="rect">
-              <a:avLst/>
-            </a:prstGeom>
-            <a:ln w="19050">
-              <a:solidFill>
-                <a:schemeClr val="accent3">
-                  <a:lumMod val="75000"/>
-                </a:schemeClr>
-              </a:solidFill>
-            </a:ln>
-          </p:spPr>
-          <p:style>
-            <a:lnRef idx="1">
-              <a:schemeClr val="accent3"/>
-            </a:lnRef>
-            <a:fillRef idx="2">
-              <a:schemeClr val="accent3"/>
-            </a:fillRef>
-            <a:effectRef idx="1">
-              <a:schemeClr val="accent3"/>
-            </a:effectRef>
-            <a:fontRef idx="minor">
-              <a:schemeClr val="dk1"/>
-            </a:fontRef>
-          </p:style>
-          <p:txBody>
-            <a:bodyPr lIns="91428" tIns="45714" rIns="91428" bIns="45714" rtlCol="0" anchor="ctr"/>
-            <a:lstStyle/>
-            <a:p>
-              <a:pPr algn="ctr"/>
-              <a:endParaRPr kumimoji="1" lang="ja-JP" altLang="en-US" sz="2400" dirty="0">
-                <a:latin typeface="HG丸ｺﾞｼｯｸM-PRO" panose="020F0600000000000000" pitchFamily="50" charset="-128"/>
-                <a:ea typeface="HG丸ｺﾞｼｯｸM-PRO" panose="020F0600000000000000" pitchFamily="50" charset="-128"/>
-              </a:endParaRPr>
-            </a:p>
-          </p:txBody>
-        </p:sp>
-        <p:sp>
-          <p:nvSpPr>
-            <p:cNvPr id="292" name="テキスト ボックス 291"/>
-            <p:cNvSpPr txBox="1"/>
-            <p:nvPr/>
-          </p:nvSpPr>
-          <p:spPr>
-            <a:xfrm>
-              <a:off x="72740" y="3265376"/>
-              <a:ext cx="1986844" cy="215444"/>
-            </a:xfrm>
-            <a:prstGeom prst="rect">
-              <a:avLst/>
-            </a:prstGeom>
-            <a:noFill/>
-          </p:spPr>
-          <p:txBody>
-            <a:bodyPr wrap="square" lIns="0" tIns="0" rIns="0" bIns="0" rtlCol="0">
-              <a:spAutoFit/>
-            </a:bodyPr>
-            <a:lstStyle/>
-            <a:p>
+              <a:r>
+                <a:rPr lang="ja-JP" altLang="en-US" sz="1400" smtClean="0">
+                  <a:latin typeface="HG丸ｺﾞｼｯｸM-PRO" panose="020F0600000000000000" pitchFamily="50" charset="-128"/>
+                  <a:ea typeface="HG丸ｺﾞｼｯｸM-PRO" panose="020F0600000000000000" pitchFamily="50" charset="-128"/>
+                </a:rPr>
+                <a:t>状態設計</a:t>
+              </a:r>
               <a:r>
                 <a:rPr lang="ja-JP" altLang="en-US" sz="1400" dirty="0" smtClean="0">
                   <a:latin typeface="HG丸ｺﾞｼｯｸM-PRO" panose="020F0600000000000000" pitchFamily="50" charset="-128"/>
@@ -13119,27 +12683,6 @@
                 </a:rPr>
                 <a:t>　</a:t>
               </a:r>
-              <a:r>
-                <a:rPr lang="en-US" altLang="ja-JP" sz="1400" dirty="0">
-                  <a:latin typeface="HG丸ｺﾞｼｯｸM-PRO" panose="020F0600000000000000" pitchFamily="50" charset="-128"/>
-                  <a:ea typeface="HG丸ｺﾞｼｯｸM-PRO" panose="020F0600000000000000" pitchFamily="50" charset="-128"/>
-                </a:rPr>
-                <a:t>3</a:t>
-              </a:r>
-              <a:r>
-                <a:rPr lang="en-US" altLang="ja-JP" sz="1400" dirty="0" smtClean="0">
-                  <a:latin typeface="HG丸ｺﾞｼｯｸM-PRO" panose="020F0600000000000000" pitchFamily="50" charset="-128"/>
-                  <a:ea typeface="HG丸ｺﾞｼｯｸM-PRO" panose="020F0600000000000000" pitchFamily="50" charset="-128"/>
-                </a:rPr>
-                <a:t>.2</a:t>
-              </a:r>
-              <a:r>
-                <a:rPr lang="ja-JP" altLang="en-US" sz="1400" dirty="0" smtClean="0">
-                  <a:latin typeface="HG丸ｺﾞｼｯｸM-PRO" panose="020F0600000000000000" pitchFamily="50" charset="-128"/>
-                  <a:ea typeface="HG丸ｺﾞｼｯｸM-PRO" panose="020F0600000000000000" pitchFamily="50" charset="-128"/>
-                </a:rPr>
-                <a:t> パッケージ構成　</a:t>
-              </a:r>
               <a:endParaRPr kumimoji="1" lang="ja-JP" altLang="en-US" sz="1400" dirty="0">
                 <a:latin typeface="HG丸ｺﾞｼｯｸM-PRO" panose="020F0600000000000000" pitchFamily="50" charset="-128"/>
                 <a:ea typeface="HG丸ｺﾞｼｯｸM-PRO" panose="020F0600000000000000" pitchFamily="50" charset="-128"/>
@@ -13148,1343 +12691,6 @@
           </p:txBody>
         </p:sp>
       </p:grpSp>
-      <p:sp>
-        <p:nvSpPr>
-          <p:cNvPr id="294" name="右矢印 293"/>
-          <p:cNvSpPr/>
-          <p:nvPr/>
-        </p:nvSpPr>
-        <p:spPr>
-          <a:xfrm>
-            <a:off x="415936" y="1836790"/>
-            <a:ext cx="159860" cy="143057"/>
-          </a:xfrm>
-          <a:prstGeom prst="rightArrow">
-            <a:avLst/>
-          </a:prstGeom>
-          <a:solidFill>
-            <a:schemeClr val="tx2">
-              <a:lumMod val="60000"/>
-              <a:lumOff val="40000"/>
-            </a:schemeClr>
-          </a:solidFill>
-          <a:ln w="9525">
-            <a:solidFill>
-              <a:schemeClr val="tx1"/>
-            </a:solidFill>
-          </a:ln>
-          <a:effectLst/>
-        </p:spPr>
-        <p:style>
-          <a:lnRef idx="1">
-            <a:schemeClr val="accent6"/>
-          </a:lnRef>
-          <a:fillRef idx="2">
-            <a:schemeClr val="accent6"/>
-          </a:fillRef>
-          <a:effectRef idx="1">
-            <a:schemeClr val="accent6"/>
-          </a:effectRef>
-          <a:fontRef idx="minor">
-            <a:schemeClr val="dk1"/>
-          </a:fontRef>
-        </p:style>
-        <p:txBody>
-          <a:bodyPr lIns="91428" tIns="45714" rIns="91428" bIns="45714" rtlCol="0" anchor="ctr"/>
-          <a:lstStyle/>
-          <a:p>
-            <a:pPr algn="ctr"/>
-            <a:endParaRPr kumimoji="1" lang="ja-JP" altLang="en-US" sz="2400" dirty="0">
-              <a:latin typeface="HG丸ｺﾞｼｯｸM-PRO" panose="020F0600000000000000" pitchFamily="50" charset="-128"/>
-              <a:ea typeface="HG丸ｺﾞｼｯｸM-PRO" panose="020F0600000000000000" pitchFamily="50" charset="-128"/>
-            </a:endParaRPr>
-          </a:p>
-        </p:txBody>
-      </p:sp>
-      <p:sp>
-        <p:nvSpPr>
-          <p:cNvPr id="146" name="テキスト ボックス 145"/>
-          <p:cNvSpPr txBox="1"/>
-          <p:nvPr/>
-        </p:nvSpPr>
-        <p:spPr>
-          <a:xfrm>
-            <a:off x="175783" y="3991898"/>
-            <a:ext cx="640166" cy="195814"/>
-          </a:xfrm>
-          <a:prstGeom prst="rect">
-            <a:avLst/>
-          </a:prstGeom>
-          <a:noFill/>
-        </p:spPr>
-        <p:txBody>
-          <a:bodyPr wrap="none" lIns="36000" tIns="36000" rIns="36000" bIns="36000" rtlCol="0">
-            <a:spAutoFit/>
-          </a:bodyPr>
-          <a:lstStyle/>
-          <a:p>
-            <a:r>
-              <a:rPr kumimoji="1" lang="en-US" altLang="ja-JP" sz="800" b="1" dirty="0" smtClean="0">
-                <a:latin typeface="HG丸ｺﾞｼｯｸM-PRO" panose="020F0600000000000000" pitchFamily="50" charset="-128"/>
-                <a:ea typeface="HG丸ｺﾞｼｯｸM-PRO" panose="020F0600000000000000" pitchFamily="50" charset="-128"/>
-              </a:rPr>
-              <a:t>&lt;</a:t>
-            </a:r>
-            <a:r>
-              <a:rPr kumimoji="1" lang="ja-JP" altLang="en-US" sz="800" b="1" dirty="0" smtClean="0">
-                <a:latin typeface="HG丸ｺﾞｼｯｸM-PRO" panose="020F0600000000000000" pitchFamily="50" charset="-128"/>
-                <a:ea typeface="HG丸ｺﾞｼｯｸM-PRO" panose="020F0600000000000000" pitchFamily="50" charset="-128"/>
-              </a:rPr>
-              <a:t> 走行戦略 </a:t>
-            </a:r>
-            <a:r>
-              <a:rPr kumimoji="1" lang="en-US" altLang="ja-JP" sz="800" b="1" dirty="0" smtClean="0">
-                <a:latin typeface="HG丸ｺﾞｼｯｸM-PRO" panose="020F0600000000000000" pitchFamily="50" charset="-128"/>
-                <a:ea typeface="HG丸ｺﾞｼｯｸM-PRO" panose="020F0600000000000000" pitchFamily="50" charset="-128"/>
-              </a:rPr>
-              <a:t>&gt;</a:t>
-            </a:r>
-            <a:endParaRPr kumimoji="1" lang="ja-JP" altLang="en-US" sz="600" b="1" dirty="0">
-              <a:latin typeface="HG丸ｺﾞｼｯｸM-PRO" panose="020F0600000000000000" pitchFamily="50" charset="-128"/>
-              <a:ea typeface="HG丸ｺﾞｼｯｸM-PRO" panose="020F0600000000000000" pitchFamily="50" charset="-128"/>
-            </a:endParaRPr>
-          </a:p>
-        </p:txBody>
-      </p:sp>
-      <p:cxnSp>
-        <p:nvCxnSpPr>
-          <p:cNvPr id="148" name="直線矢印コネクタ 147"/>
-          <p:cNvCxnSpPr/>
-          <p:nvPr/>
-        </p:nvCxnSpPr>
-        <p:spPr>
-          <a:xfrm>
-            <a:off x="2943279" y="4277518"/>
-            <a:ext cx="180000" cy="0"/>
-          </a:xfrm>
-          <a:prstGeom prst="straightConnector1">
-            <a:avLst/>
-          </a:prstGeom>
-          <a:ln>
-            <a:solidFill>
-              <a:schemeClr val="tx1"/>
-            </a:solidFill>
-            <a:tailEnd type="triangle" w="sm" len="sm"/>
-          </a:ln>
-        </p:spPr>
-        <p:style>
-          <a:lnRef idx="1">
-            <a:schemeClr val="accent1"/>
-          </a:lnRef>
-          <a:fillRef idx="0">
-            <a:schemeClr val="accent1"/>
-          </a:fillRef>
-          <a:effectRef idx="0">
-            <a:schemeClr val="accent1"/>
-          </a:effectRef>
-          <a:fontRef idx="minor">
-            <a:schemeClr val="tx1"/>
-          </a:fontRef>
-        </p:style>
-      </p:cxnSp>
-      <p:sp>
-        <p:nvSpPr>
-          <p:cNvPr id="160" name="テキスト ボックス 159"/>
-          <p:cNvSpPr txBox="1"/>
-          <p:nvPr/>
-        </p:nvSpPr>
-        <p:spPr>
-          <a:xfrm>
-            <a:off x="3136734" y="4187478"/>
-            <a:ext cx="996033" cy="165036"/>
-          </a:xfrm>
-          <a:prstGeom prst="rect">
-            <a:avLst/>
-          </a:prstGeom>
-          <a:noFill/>
-        </p:spPr>
-        <p:txBody>
-          <a:bodyPr wrap="none" lIns="36000" tIns="36000" rIns="36000" bIns="36000" rtlCol="0">
-            <a:spAutoFit/>
-          </a:bodyPr>
-          <a:lstStyle/>
-          <a:p>
-            <a:r>
-              <a:rPr kumimoji="1" lang="ja-JP" altLang="en-US" sz="600" dirty="0" smtClean="0">
-                <a:latin typeface="HG丸ｺﾞｼｯｸM-PRO" panose="020F0600000000000000" pitchFamily="50" charset="-128"/>
-                <a:ea typeface="HG丸ｺﾞｼｯｸM-PRO" panose="020F0600000000000000" pitchFamily="50" charset="-128"/>
-              </a:rPr>
-              <a:t>終了条件を満たさない場合</a:t>
-            </a:r>
-            <a:endParaRPr kumimoji="1" lang="ja-JP" altLang="en-US" sz="600" dirty="0">
-              <a:latin typeface="HG丸ｺﾞｼｯｸM-PRO" panose="020F0600000000000000" pitchFamily="50" charset="-128"/>
-              <a:ea typeface="HG丸ｺﾞｼｯｸM-PRO" panose="020F0600000000000000" pitchFamily="50" charset="-128"/>
-            </a:endParaRPr>
-          </a:p>
-        </p:txBody>
-      </p:sp>
-      <p:sp>
-        <p:nvSpPr>
-          <p:cNvPr id="412" name="テキスト ボックス 411"/>
-          <p:cNvSpPr txBox="1"/>
-          <p:nvPr/>
-        </p:nvSpPr>
-        <p:spPr>
-          <a:xfrm>
-            <a:off x="3136734" y="4302442"/>
-            <a:ext cx="842145" cy="165036"/>
-          </a:xfrm>
-          <a:prstGeom prst="rect">
-            <a:avLst/>
-          </a:prstGeom>
-          <a:noFill/>
-        </p:spPr>
-        <p:txBody>
-          <a:bodyPr wrap="none" lIns="36000" tIns="36000" rIns="36000" bIns="36000" rtlCol="0">
-            <a:spAutoFit/>
-          </a:bodyPr>
-          <a:lstStyle/>
-          <a:p>
-            <a:r>
-              <a:rPr kumimoji="1" lang="ja-JP" altLang="en-US" sz="600" dirty="0" smtClean="0">
-                <a:latin typeface="HG丸ｺﾞｼｯｸM-PRO" panose="020F0600000000000000" pitchFamily="50" charset="-128"/>
-                <a:ea typeface="HG丸ｺﾞｼｯｸM-PRO" panose="020F0600000000000000" pitchFamily="50" charset="-128"/>
-              </a:rPr>
-              <a:t>終了条件を満たす場合</a:t>
-            </a:r>
-            <a:endParaRPr kumimoji="1" lang="ja-JP" altLang="en-US" sz="600" dirty="0">
-              <a:latin typeface="HG丸ｺﾞｼｯｸM-PRO" panose="020F0600000000000000" pitchFamily="50" charset="-128"/>
-              <a:ea typeface="HG丸ｺﾞｼｯｸM-PRO" panose="020F0600000000000000" pitchFamily="50" charset="-128"/>
-            </a:endParaRPr>
-          </a:p>
-        </p:txBody>
-      </p:sp>
-      <p:sp>
-        <p:nvSpPr>
-          <p:cNvPr id="417" name="円弧 416"/>
-          <p:cNvSpPr/>
-          <p:nvPr/>
-        </p:nvSpPr>
-        <p:spPr>
-          <a:xfrm flipH="1" flipV="1">
-            <a:off x="717960" y="4222156"/>
-            <a:ext cx="168992" cy="233593"/>
-          </a:xfrm>
-          <a:prstGeom prst="arc">
-            <a:avLst>
-              <a:gd name="adj1" fmla="val 21434236"/>
-              <a:gd name="adj2" fmla="val 11863775"/>
-            </a:avLst>
-          </a:prstGeom>
-          <a:ln w="9525">
-            <a:solidFill>
-              <a:schemeClr val="tx1"/>
-            </a:solidFill>
-            <a:prstDash val="sysDash"/>
-            <a:headEnd type="none" w="med" len="med"/>
-            <a:tailEnd type="triangle" w="med" len="sm"/>
-          </a:ln>
-        </p:spPr>
-        <p:style>
-          <a:lnRef idx="1">
-            <a:schemeClr val="accent1"/>
-          </a:lnRef>
-          <a:fillRef idx="0">
-            <a:schemeClr val="accent1"/>
-          </a:fillRef>
-          <a:effectRef idx="0">
-            <a:schemeClr val="accent1"/>
-          </a:effectRef>
-          <a:fontRef idx="minor">
-            <a:schemeClr val="tx1"/>
-          </a:fontRef>
-        </p:style>
-        <p:txBody>
-          <a:bodyPr rtlCol="0" anchor="ctr"/>
-          <a:lstStyle/>
-          <a:p>
-            <a:pPr algn="ctr"/>
-            <a:endParaRPr kumimoji="1" lang="ja-JP" altLang="en-US" dirty="0"/>
-          </a:p>
-        </p:txBody>
-      </p:sp>
-      <p:cxnSp>
-        <p:nvCxnSpPr>
-          <p:cNvPr id="429" name="直線矢印コネクタ 428"/>
-          <p:cNvCxnSpPr/>
-          <p:nvPr/>
-        </p:nvCxnSpPr>
-        <p:spPr>
-          <a:xfrm>
-            <a:off x="2943879" y="4383856"/>
-            <a:ext cx="180000" cy="0"/>
-          </a:xfrm>
-          <a:prstGeom prst="straightConnector1">
-            <a:avLst/>
-          </a:prstGeom>
-          <a:ln>
-            <a:solidFill>
-              <a:schemeClr val="tx1"/>
-            </a:solidFill>
-            <a:prstDash val="sysDash"/>
-            <a:tailEnd type="triangle" w="sm" len="sm"/>
-          </a:ln>
-        </p:spPr>
-        <p:style>
-          <a:lnRef idx="1">
-            <a:schemeClr val="accent1"/>
-          </a:lnRef>
-          <a:fillRef idx="0">
-            <a:schemeClr val="accent1"/>
-          </a:fillRef>
-          <a:effectRef idx="0">
-            <a:schemeClr val="accent1"/>
-          </a:effectRef>
-          <a:fontRef idx="minor">
-            <a:schemeClr val="tx1"/>
-          </a:fontRef>
-        </p:style>
-      </p:cxnSp>
-      <p:sp>
-        <p:nvSpPr>
-          <p:cNvPr id="431" name="テキスト ボックス 430"/>
-          <p:cNvSpPr txBox="1"/>
-          <p:nvPr/>
-        </p:nvSpPr>
-        <p:spPr>
-          <a:xfrm>
-            <a:off x="1055180" y="3978095"/>
-            <a:ext cx="380480" cy="165036"/>
-          </a:xfrm>
-          <a:prstGeom prst="rect">
-            <a:avLst/>
-          </a:prstGeom>
-          <a:noFill/>
-        </p:spPr>
-        <p:txBody>
-          <a:bodyPr wrap="none" lIns="36000" tIns="36000" rIns="36000" bIns="36000" rtlCol="0">
-            <a:spAutoFit/>
-          </a:bodyPr>
-          <a:lstStyle/>
-          <a:p>
-            <a:r>
-              <a:rPr kumimoji="1" lang="ja-JP" altLang="en-US" sz="600" dirty="0" smtClean="0">
-                <a:latin typeface="HG丸ｺﾞｼｯｸM-PRO" panose="020F0600000000000000" pitchFamily="50" charset="-128"/>
-                <a:ea typeface="HG丸ｺﾞｼｯｸM-PRO" panose="020F0600000000000000" pitchFamily="50" charset="-128"/>
-              </a:rPr>
-              <a:t>走行戦術</a:t>
-            </a:r>
-            <a:endParaRPr kumimoji="1" lang="ja-JP" altLang="en-US" sz="600" dirty="0">
-              <a:latin typeface="HG丸ｺﾞｼｯｸM-PRO" panose="020F0600000000000000" pitchFamily="50" charset="-128"/>
-              <a:ea typeface="HG丸ｺﾞｼｯｸM-PRO" panose="020F0600000000000000" pitchFamily="50" charset="-128"/>
-            </a:endParaRPr>
-          </a:p>
-        </p:txBody>
-      </p:sp>
-      <p:sp>
-        <p:nvSpPr>
-          <p:cNvPr id="432" name="テキスト ボックス 431"/>
-          <p:cNvSpPr txBox="1"/>
-          <p:nvPr/>
-        </p:nvSpPr>
-        <p:spPr>
-          <a:xfrm>
-            <a:off x="1910974" y="3978095"/>
-            <a:ext cx="380480" cy="165036"/>
-          </a:xfrm>
-          <a:prstGeom prst="rect">
-            <a:avLst/>
-          </a:prstGeom>
-          <a:noFill/>
-        </p:spPr>
-        <p:txBody>
-          <a:bodyPr wrap="none" lIns="36000" tIns="36000" rIns="36000" bIns="36000" rtlCol="0">
-            <a:spAutoFit/>
-          </a:bodyPr>
-          <a:lstStyle/>
-          <a:p>
-            <a:r>
-              <a:rPr kumimoji="1" lang="ja-JP" altLang="en-US" sz="600" dirty="0" smtClean="0">
-                <a:latin typeface="HG丸ｺﾞｼｯｸM-PRO" panose="020F0600000000000000" pitchFamily="50" charset="-128"/>
-                <a:ea typeface="HG丸ｺﾞｼｯｸM-PRO" panose="020F0600000000000000" pitchFamily="50" charset="-128"/>
-              </a:rPr>
-              <a:t>走行戦術</a:t>
-            </a:r>
-            <a:endParaRPr kumimoji="1" lang="ja-JP" altLang="en-US" sz="600" dirty="0">
-              <a:latin typeface="HG丸ｺﾞｼｯｸM-PRO" panose="020F0600000000000000" pitchFamily="50" charset="-128"/>
-              <a:ea typeface="HG丸ｺﾞｼｯｸM-PRO" panose="020F0600000000000000" pitchFamily="50" charset="-128"/>
-            </a:endParaRPr>
-          </a:p>
-        </p:txBody>
-      </p:sp>
-      <p:sp>
-        <p:nvSpPr>
-          <p:cNvPr id="1060" name="テキスト ボックス 1059"/>
-          <p:cNvSpPr txBox="1"/>
-          <p:nvPr/>
-        </p:nvSpPr>
-        <p:spPr>
-          <a:xfrm>
-            <a:off x="8346907" y="1750773"/>
-            <a:ext cx="4318985" cy="795978"/>
-          </a:xfrm>
-          <a:prstGeom prst="rect">
-            <a:avLst/>
-          </a:prstGeom>
-          <a:noFill/>
-        </p:spPr>
-        <p:txBody>
-          <a:bodyPr wrap="square" lIns="36000" tIns="36000" rIns="36000" bIns="36000" rtlCol="0">
-            <a:spAutoFit/>
-          </a:bodyPr>
-          <a:lstStyle/>
-          <a:p>
-            <a:r>
-              <a:rPr lang="ja-JP" altLang="en-US" sz="1050" b="1" u="sng" dirty="0">
-                <a:solidFill>
-                  <a:srgbClr val="0000CC"/>
-                </a:solidFill>
-                <a:uFill>
-                  <a:solidFill>
-                    <a:schemeClr val="bg1">
-                      <a:lumMod val="50000"/>
-                    </a:schemeClr>
-                  </a:solidFill>
-                </a:uFill>
-                <a:latin typeface="HG丸ｺﾞｼｯｸM-PRO" panose="020F0600000000000000" pitchFamily="50" charset="-128"/>
-                <a:ea typeface="HG丸ｺﾞｼｯｸM-PRO" panose="020F0600000000000000" pitchFamily="50" charset="-128"/>
-              </a:rPr>
-              <a:t>参照</a:t>
-            </a:r>
-            <a:r>
-              <a:rPr kumimoji="1" lang="ja-JP" altLang="en-US" sz="1050" b="1" u="sng" dirty="0" smtClean="0">
-                <a:solidFill>
-                  <a:srgbClr val="0000CC"/>
-                </a:solidFill>
-                <a:uFill>
-                  <a:solidFill>
-                    <a:schemeClr val="bg1">
-                      <a:lumMod val="50000"/>
-                    </a:schemeClr>
-                  </a:solidFill>
-                </a:uFill>
-                <a:latin typeface="HG丸ｺﾞｼｯｸM-PRO" panose="020F0600000000000000" pitchFamily="50" charset="-128"/>
-                <a:ea typeface="HG丸ｺﾞｼｯｸM-PRO" panose="020F0600000000000000" pitchFamily="50" charset="-128"/>
-              </a:rPr>
-              <a:t>ルートの一本化による</a:t>
-            </a:r>
-            <a:r>
-              <a:rPr lang="ja-JP" altLang="en-US" sz="1050" b="1" u="sng" dirty="0">
-                <a:solidFill>
-                  <a:srgbClr val="0000CC"/>
-                </a:solidFill>
-                <a:uFill>
-                  <a:solidFill>
-                    <a:schemeClr val="bg1">
-                      <a:lumMod val="50000"/>
-                    </a:schemeClr>
-                  </a:solidFill>
-                </a:uFill>
-                <a:latin typeface="HG丸ｺﾞｼｯｸM-PRO" panose="020F0600000000000000" pitchFamily="50" charset="-128"/>
-                <a:ea typeface="HG丸ｺﾞｼｯｸM-PRO" panose="020F0600000000000000" pitchFamily="50" charset="-128"/>
-              </a:rPr>
-              <a:t>カプセル化</a:t>
-            </a:r>
-            <a:endParaRPr kumimoji="1" lang="en-US" altLang="ja-JP" sz="1050" b="1" u="sng" dirty="0" smtClean="0">
-              <a:solidFill>
-                <a:srgbClr val="0000CC"/>
-              </a:solidFill>
-              <a:uFill>
-                <a:solidFill>
-                  <a:schemeClr val="bg1">
-                    <a:lumMod val="50000"/>
-                  </a:schemeClr>
-                </a:solidFill>
-              </a:uFill>
-              <a:latin typeface="HG丸ｺﾞｼｯｸM-PRO" panose="020F0600000000000000" pitchFamily="50" charset="-128"/>
-              <a:ea typeface="HG丸ｺﾞｼｯｸM-PRO" panose="020F0600000000000000" pitchFamily="50" charset="-128"/>
-            </a:endParaRPr>
-          </a:p>
-          <a:p>
-            <a:endParaRPr lang="en-US" altLang="ja-JP" sz="500" dirty="0" smtClean="0">
-              <a:uFill>
-                <a:solidFill>
-                  <a:schemeClr val="bg1">
-                    <a:lumMod val="50000"/>
-                  </a:schemeClr>
-                </a:solidFill>
-              </a:uFill>
-            </a:endParaRPr>
-          </a:p>
-          <a:p>
-            <a:pPr marL="88900"/>
-            <a:r>
-              <a:rPr lang="ja-JP" altLang="en-US" sz="1050" dirty="0" smtClean="0">
-                <a:uFill>
-                  <a:solidFill>
-                    <a:schemeClr val="bg1">
-                      <a:lumMod val="50000"/>
-                    </a:schemeClr>
-                  </a:solidFill>
-                </a:uFill>
-                <a:latin typeface="HG丸ｺﾞｼｯｸM-PRO" panose="020F0600000000000000" pitchFamily="50" charset="-128"/>
-                <a:ea typeface="HG丸ｺﾞｼｯｸM-PRO" panose="020F0600000000000000" pitchFamily="50" charset="-128"/>
-              </a:rPr>
-              <a:t>パッケージの外部からのその機能を利用</a:t>
-            </a:r>
-            <a:r>
-              <a:rPr lang="ja-JP" altLang="en-US" sz="1050" dirty="0">
-                <a:uFill>
-                  <a:solidFill>
-                    <a:schemeClr val="bg1">
-                      <a:lumMod val="50000"/>
-                    </a:schemeClr>
-                  </a:solidFill>
-                </a:uFill>
-                <a:latin typeface="HG丸ｺﾞｼｯｸM-PRO" panose="020F0600000000000000" pitchFamily="50" charset="-128"/>
-                <a:ea typeface="HG丸ｺﾞｼｯｸM-PRO" panose="020F0600000000000000" pitchFamily="50" charset="-128"/>
-              </a:rPr>
-              <a:t>するには</a:t>
-            </a:r>
-            <a:r>
-              <a:rPr lang="ja-JP" altLang="en-US" sz="1050" dirty="0" smtClean="0">
-                <a:uFill>
-                  <a:solidFill>
-                    <a:schemeClr val="bg1">
-                      <a:lumMod val="50000"/>
-                    </a:schemeClr>
-                  </a:solidFill>
-                </a:uFill>
-                <a:latin typeface="HG丸ｺﾞｼｯｸM-PRO" panose="020F0600000000000000" pitchFamily="50" charset="-128"/>
-                <a:ea typeface="HG丸ｺﾞｼｯｸM-PRO" panose="020F0600000000000000" pitchFamily="50" charset="-128"/>
-              </a:rPr>
-              <a:t>、その</a:t>
-            </a:r>
-            <a:r>
-              <a:rPr lang="ja-JP" altLang="en-US" sz="1050" b="1" dirty="0" smtClean="0">
-                <a:uFill>
-                  <a:solidFill>
-                    <a:schemeClr val="bg1">
-                      <a:lumMod val="50000"/>
-                    </a:schemeClr>
-                  </a:solidFill>
-                </a:uFill>
-                <a:latin typeface="HG丸ｺﾞｼｯｸM-PRO" panose="020F0600000000000000" pitchFamily="50" charset="-128"/>
-                <a:ea typeface="HG丸ｺﾞｼｯｸM-PRO" panose="020F0600000000000000" pitchFamily="50" charset="-128"/>
-              </a:rPr>
-              <a:t>特定かつ唯一のインターフェ</a:t>
-            </a:r>
-            <a:r>
-              <a:rPr lang="ja-JP" altLang="en-US" sz="1050" dirty="0" smtClean="0">
-                <a:uFill>
-                  <a:solidFill>
-                    <a:schemeClr val="bg1">
-                      <a:lumMod val="50000"/>
-                    </a:schemeClr>
-                  </a:solidFill>
-                </a:uFill>
-                <a:latin typeface="HG丸ｺﾞｼｯｸM-PRO" panose="020F0600000000000000" pitchFamily="50" charset="-128"/>
-                <a:ea typeface="HG丸ｺﾞｼｯｸM-PRO" panose="020F0600000000000000" pitchFamily="50" charset="-128"/>
-              </a:rPr>
-              <a:t>ース （以後、</a:t>
-            </a:r>
-            <a:r>
-              <a:rPr lang="ja-JP" altLang="en-US" sz="1050" dirty="0" smtClean="0">
-                <a:solidFill>
-                  <a:srgbClr val="FF0000"/>
-                </a:solidFill>
-                <a:uFill>
-                  <a:solidFill>
-                    <a:schemeClr val="bg1">
-                      <a:lumMod val="50000"/>
-                    </a:schemeClr>
-                  </a:solidFill>
-                </a:uFill>
-                <a:latin typeface="HG丸ｺﾞｼｯｸM-PRO" panose="020F0600000000000000" pitchFamily="50" charset="-128"/>
-                <a:ea typeface="HG丸ｺﾞｼｯｸM-PRO" panose="020F0600000000000000" pitchFamily="50" charset="-128"/>
-              </a:rPr>
-              <a:t>ルート</a:t>
-            </a:r>
-            <a:r>
-              <a:rPr lang="ja-JP" altLang="en-US" sz="1050" dirty="0" smtClean="0">
-                <a:uFill>
-                  <a:solidFill>
-                    <a:schemeClr val="bg1">
-                      <a:lumMod val="50000"/>
-                    </a:schemeClr>
-                  </a:solidFill>
-                </a:uFill>
-                <a:latin typeface="HG丸ｺﾞｼｯｸM-PRO" panose="020F0600000000000000" pitchFamily="50" charset="-128"/>
-                <a:ea typeface="HG丸ｺﾞｼｯｸM-PRO" panose="020F0600000000000000" pitchFamily="50" charset="-128"/>
-              </a:rPr>
-              <a:t>と呼称）を介して行う。これにより、パッケージ内部の変更が外部へ及ぼす影響を低減させる。</a:t>
-            </a:r>
-            <a:endParaRPr lang="en-US" altLang="ja-JP" sz="1050" dirty="0">
-              <a:uFill>
-                <a:solidFill>
-                  <a:schemeClr val="bg1">
-                    <a:lumMod val="50000"/>
-                  </a:schemeClr>
-                </a:solidFill>
-              </a:uFill>
-              <a:latin typeface="HG丸ｺﾞｼｯｸM-PRO" panose="020F0600000000000000" pitchFamily="50" charset="-128"/>
-              <a:ea typeface="HG丸ｺﾞｼｯｸM-PRO" panose="020F0600000000000000" pitchFamily="50" charset="-128"/>
-            </a:endParaRPr>
-          </a:p>
-        </p:txBody>
-      </p:sp>
-      <p:sp>
-        <p:nvSpPr>
-          <p:cNvPr id="565" name="テキスト ボックス 564"/>
-          <p:cNvSpPr txBox="1"/>
-          <p:nvPr/>
-        </p:nvSpPr>
-        <p:spPr>
-          <a:xfrm>
-            <a:off x="8346907" y="1273939"/>
-            <a:ext cx="4223735" cy="472813"/>
-          </a:xfrm>
-          <a:prstGeom prst="rect">
-            <a:avLst/>
-          </a:prstGeom>
-          <a:noFill/>
-        </p:spPr>
-        <p:txBody>
-          <a:bodyPr wrap="square" lIns="36000" tIns="36000" rIns="36000" bIns="36000" rtlCol="0">
-            <a:spAutoFit/>
-          </a:bodyPr>
-          <a:lstStyle/>
-          <a:p>
-            <a:r>
-              <a:rPr kumimoji="1" lang="ja-JP" altLang="en-US" sz="1050" b="1" u="sng" dirty="0" smtClean="0">
-                <a:solidFill>
-                  <a:srgbClr val="0000CC"/>
-                </a:solidFill>
-                <a:uFill>
-                  <a:solidFill>
-                    <a:schemeClr val="bg1">
-                      <a:lumMod val="50000"/>
-                    </a:schemeClr>
-                  </a:solidFill>
-                </a:uFill>
-                <a:latin typeface="HG丸ｺﾞｼｯｸM-PRO" panose="020F0600000000000000" pitchFamily="50" charset="-128"/>
-                <a:ea typeface="HG丸ｺﾞｼｯｸM-PRO" panose="020F0600000000000000" pitchFamily="50" charset="-128"/>
-              </a:rPr>
-              <a:t>パッケージ化による責務の明確化</a:t>
-            </a:r>
-            <a:endParaRPr kumimoji="1" lang="en-US" altLang="ja-JP" sz="1050" b="1" u="sng" dirty="0" smtClean="0">
-              <a:solidFill>
-                <a:srgbClr val="0000CC"/>
-              </a:solidFill>
-              <a:uFill>
-                <a:solidFill>
-                  <a:schemeClr val="bg1">
-                    <a:lumMod val="50000"/>
-                  </a:schemeClr>
-                </a:solidFill>
-              </a:uFill>
-              <a:latin typeface="HG丸ｺﾞｼｯｸM-PRO" panose="020F0600000000000000" pitchFamily="50" charset="-128"/>
-              <a:ea typeface="HG丸ｺﾞｼｯｸM-PRO" panose="020F0600000000000000" pitchFamily="50" charset="-128"/>
-            </a:endParaRPr>
-          </a:p>
-          <a:p>
-            <a:pPr marL="88900"/>
-            <a:endParaRPr lang="en-US" altLang="ja-JP" sz="500" dirty="0">
-              <a:uFill>
-                <a:solidFill>
-                  <a:schemeClr val="bg1">
-                    <a:lumMod val="50000"/>
-                  </a:schemeClr>
-                </a:solidFill>
-              </a:uFill>
-            </a:endParaRPr>
-          </a:p>
-          <a:p>
-            <a:pPr marL="88900"/>
-            <a:r>
-              <a:rPr lang="ja-JP" altLang="en-US" sz="1050" dirty="0">
-                <a:uFill>
-                  <a:solidFill>
-                    <a:schemeClr val="bg1">
-                      <a:lumMod val="50000"/>
-                    </a:schemeClr>
-                  </a:solidFill>
-                </a:uFill>
-                <a:latin typeface="HG丸ｺﾞｼｯｸM-PRO" panose="020F0600000000000000" pitchFamily="50" charset="-128"/>
-                <a:ea typeface="HG丸ｺﾞｼｯｸM-PRO" panose="020F0600000000000000" pitchFamily="50" charset="-128"/>
-              </a:rPr>
-              <a:t>類似</a:t>
-            </a:r>
-            <a:r>
-              <a:rPr lang="ja-JP" altLang="en-US" sz="1050" dirty="0" smtClean="0">
-                <a:uFill>
-                  <a:solidFill>
-                    <a:schemeClr val="bg1">
-                      <a:lumMod val="50000"/>
-                    </a:schemeClr>
-                  </a:solidFill>
-                </a:uFill>
-                <a:latin typeface="HG丸ｺﾞｼｯｸM-PRO" panose="020F0600000000000000" pitchFamily="50" charset="-128"/>
-                <a:ea typeface="HG丸ｺﾞｼｯｸM-PRO" panose="020F0600000000000000" pitchFamily="50" charset="-128"/>
-              </a:rPr>
-              <a:t>する機能をパッケージにまとめ、それらの責務を明確化する。</a:t>
-            </a:r>
-            <a:endParaRPr lang="en-US" altLang="ja-JP" sz="1050" dirty="0">
-              <a:uFill>
-                <a:solidFill>
-                  <a:schemeClr val="bg1">
-                    <a:lumMod val="50000"/>
-                  </a:schemeClr>
-                </a:solidFill>
-              </a:uFill>
-              <a:latin typeface="HG丸ｺﾞｼｯｸM-PRO" panose="020F0600000000000000" pitchFamily="50" charset="-128"/>
-              <a:ea typeface="HG丸ｺﾞｼｯｸM-PRO" panose="020F0600000000000000" pitchFamily="50" charset="-128"/>
-            </a:endParaRPr>
-          </a:p>
-        </p:txBody>
-      </p:sp>
-      <p:sp>
-        <p:nvSpPr>
-          <p:cNvPr id="577" name="テキスト ボックス 576"/>
-          <p:cNvSpPr txBox="1"/>
-          <p:nvPr/>
-        </p:nvSpPr>
-        <p:spPr>
-          <a:xfrm>
-            <a:off x="8346907" y="635524"/>
-            <a:ext cx="4289053" cy="634395"/>
-          </a:xfrm>
-          <a:prstGeom prst="rect">
-            <a:avLst/>
-          </a:prstGeom>
-          <a:noFill/>
-        </p:spPr>
-        <p:txBody>
-          <a:bodyPr wrap="square" lIns="36000" tIns="36000" rIns="36000" bIns="36000" rtlCol="0">
-            <a:spAutoFit/>
-          </a:bodyPr>
-          <a:lstStyle/>
-          <a:p>
-            <a:r>
-              <a:rPr lang="ja-JP" altLang="en-US" sz="1050" b="1" u="sng" dirty="0" smtClean="0">
-                <a:solidFill>
-                  <a:srgbClr val="0000CC"/>
-                </a:solidFill>
-                <a:uFill>
-                  <a:solidFill>
-                    <a:schemeClr val="bg1">
-                      <a:lumMod val="50000"/>
-                    </a:schemeClr>
-                  </a:solidFill>
-                </a:uFill>
-                <a:latin typeface="HG丸ｺﾞｼｯｸM-PRO" panose="020F0600000000000000" pitchFamily="50" charset="-128"/>
-                <a:ea typeface="HG丸ｺﾞｼｯｸM-PRO" panose="020F0600000000000000" pitchFamily="50" charset="-128"/>
-              </a:rPr>
-              <a:t>階層化による関心事の分離</a:t>
-            </a:r>
-            <a:endParaRPr kumimoji="1" lang="en-US" altLang="ja-JP" sz="1050" b="1" u="sng" dirty="0" smtClean="0">
-              <a:solidFill>
-                <a:srgbClr val="0000CC"/>
-              </a:solidFill>
-              <a:uFill>
-                <a:solidFill>
-                  <a:schemeClr val="bg1">
-                    <a:lumMod val="50000"/>
-                  </a:schemeClr>
-                </a:solidFill>
-              </a:uFill>
-              <a:latin typeface="HG丸ｺﾞｼｯｸM-PRO" panose="020F0600000000000000" pitchFamily="50" charset="-128"/>
-              <a:ea typeface="HG丸ｺﾞｼｯｸM-PRO" panose="020F0600000000000000" pitchFamily="50" charset="-128"/>
-            </a:endParaRPr>
-          </a:p>
-          <a:p>
-            <a:pPr marL="88900"/>
-            <a:endParaRPr lang="en-US" altLang="ja-JP" sz="500" dirty="0">
-              <a:uFill>
-                <a:solidFill>
-                  <a:schemeClr val="bg1">
-                    <a:lumMod val="50000"/>
-                  </a:schemeClr>
-                </a:solidFill>
-              </a:uFill>
-            </a:endParaRPr>
-          </a:p>
-          <a:p>
-            <a:pPr marL="88900"/>
-            <a:r>
-              <a:rPr lang="ja-JP" altLang="en-US" sz="1050" dirty="0">
-                <a:uFill>
-                  <a:solidFill>
-                    <a:schemeClr val="bg1">
-                      <a:lumMod val="50000"/>
-                    </a:schemeClr>
-                  </a:solidFill>
-                </a:uFill>
-                <a:latin typeface="HG丸ｺﾞｼｯｸM-PRO" panose="020F0600000000000000" pitchFamily="50" charset="-128"/>
-                <a:ea typeface="HG丸ｺﾞｼｯｸM-PRO" panose="020F0600000000000000" pitchFamily="50" charset="-128"/>
-              </a:rPr>
-              <a:t>ソフトウェア</a:t>
-            </a:r>
-            <a:r>
-              <a:rPr lang="ja-JP" altLang="en-US" sz="1050" dirty="0" smtClean="0">
-                <a:uFill>
-                  <a:solidFill>
-                    <a:schemeClr val="bg1">
-                      <a:lumMod val="50000"/>
-                    </a:schemeClr>
-                  </a:solidFill>
-                </a:uFill>
-                <a:latin typeface="HG丸ｺﾞｼｯｸM-PRO" panose="020F0600000000000000" pitchFamily="50" charset="-128"/>
-                <a:ea typeface="HG丸ｺﾞｼｯｸM-PRO" panose="020F0600000000000000" pitchFamily="50" charset="-128"/>
-              </a:rPr>
-              <a:t>を関心事に応じて階層分割することによって、各層の設計をその関心事に集中して行うことができる。</a:t>
-            </a:r>
-            <a:endParaRPr lang="en-US" altLang="ja-JP" sz="1050" dirty="0">
-              <a:uFill>
-                <a:solidFill>
-                  <a:schemeClr val="bg1">
-                    <a:lumMod val="50000"/>
-                  </a:schemeClr>
-                </a:solidFill>
-              </a:uFill>
-              <a:latin typeface="HG丸ｺﾞｼｯｸM-PRO" panose="020F0600000000000000" pitchFamily="50" charset="-128"/>
-              <a:ea typeface="HG丸ｺﾞｼｯｸM-PRO" panose="020F0600000000000000" pitchFamily="50" charset="-128"/>
-            </a:endParaRPr>
-          </a:p>
-        </p:txBody>
-      </p:sp>
-      <p:sp>
-        <p:nvSpPr>
-          <p:cNvPr id="632" name="正方形/長方形 631"/>
-          <p:cNvSpPr/>
-          <p:nvPr/>
-        </p:nvSpPr>
-        <p:spPr>
-          <a:xfrm>
-            <a:off x="994927" y="4124529"/>
-            <a:ext cx="485239" cy="167467"/>
-          </a:xfrm>
-          <a:prstGeom prst="rect">
-            <a:avLst/>
-          </a:prstGeom>
-          <a:solidFill>
-            <a:srgbClr val="CCCCFF"/>
-          </a:solidFill>
-          <a:ln w="12700">
-            <a:solidFill>
-              <a:schemeClr val="tx1"/>
-            </a:solidFill>
-          </a:ln>
-          <a:effectLst/>
-        </p:spPr>
-        <p:style>
-          <a:lnRef idx="1">
-            <a:schemeClr val="accent6"/>
-          </a:lnRef>
-          <a:fillRef idx="2">
-            <a:schemeClr val="accent6"/>
-          </a:fillRef>
-          <a:effectRef idx="1">
-            <a:schemeClr val="accent6"/>
-          </a:effectRef>
-          <a:fontRef idx="minor">
-            <a:schemeClr val="dk1"/>
-          </a:fontRef>
-        </p:style>
-        <p:txBody>
-          <a:bodyPr lIns="36000" tIns="36000" rIns="36000" bIns="36000" rtlCol="0" anchor="ctr"/>
-          <a:lstStyle/>
-          <a:p>
-            <a:pPr algn="ctr"/>
-            <a:r>
-              <a:rPr kumimoji="1" lang="ja-JP" altLang="en-US" sz="600" dirty="0" smtClean="0">
-                <a:latin typeface="HG丸ｺﾞｼｯｸM-PRO" panose="020F0600000000000000" pitchFamily="50" charset="-128"/>
-                <a:ea typeface="HG丸ｺﾞｼｯｸM-PRO" panose="020F0600000000000000" pitchFamily="50" charset="-128"/>
-              </a:rPr>
-              <a:t>走行方法</a:t>
-            </a:r>
-            <a:endParaRPr kumimoji="1" lang="ja-JP" altLang="en-US" sz="600" dirty="0">
-              <a:latin typeface="HG丸ｺﾞｼｯｸM-PRO" panose="020F0600000000000000" pitchFamily="50" charset="-128"/>
-              <a:ea typeface="HG丸ｺﾞｼｯｸM-PRO" panose="020F0600000000000000" pitchFamily="50" charset="-128"/>
-            </a:endParaRPr>
-          </a:p>
-        </p:txBody>
-      </p:sp>
-      <p:sp>
-        <p:nvSpPr>
-          <p:cNvPr id="633" name="正方形/長方形 632"/>
-          <p:cNvSpPr/>
-          <p:nvPr/>
-        </p:nvSpPr>
-        <p:spPr>
-          <a:xfrm>
-            <a:off x="994927" y="4354767"/>
-            <a:ext cx="485240" cy="169200"/>
-          </a:xfrm>
-          <a:prstGeom prst="rect">
-            <a:avLst/>
-          </a:prstGeom>
-          <a:solidFill>
-            <a:srgbClr val="FFCCCC"/>
-          </a:solidFill>
-          <a:ln w="12700">
-            <a:solidFill>
-              <a:schemeClr val="tx1"/>
-            </a:solidFill>
-          </a:ln>
-          <a:effectLst/>
-        </p:spPr>
-        <p:style>
-          <a:lnRef idx="1">
-            <a:schemeClr val="accent6"/>
-          </a:lnRef>
-          <a:fillRef idx="2">
-            <a:schemeClr val="accent6"/>
-          </a:fillRef>
-          <a:effectRef idx="1">
-            <a:schemeClr val="accent6"/>
-          </a:effectRef>
-          <a:fontRef idx="minor">
-            <a:schemeClr val="dk1"/>
-          </a:fontRef>
-        </p:style>
-        <p:txBody>
-          <a:bodyPr lIns="36000" tIns="36000" rIns="36000" bIns="36000" rtlCol="0" anchor="ctr"/>
-          <a:lstStyle/>
-          <a:p>
-            <a:pPr algn="ctr"/>
-            <a:r>
-              <a:rPr lang="ja-JP" altLang="en-US" sz="600" dirty="0" smtClean="0">
-                <a:latin typeface="HG丸ｺﾞｼｯｸM-PRO" panose="020F0600000000000000" pitchFamily="50" charset="-128"/>
-                <a:ea typeface="HG丸ｺﾞｼｯｸM-PRO" panose="020F0600000000000000" pitchFamily="50" charset="-128"/>
-              </a:rPr>
-              <a:t>切換え</a:t>
-            </a:r>
-            <a:r>
-              <a:rPr kumimoji="1" lang="ja-JP" altLang="en-US" sz="600" dirty="0" smtClean="0">
-                <a:latin typeface="HG丸ｺﾞｼｯｸM-PRO" panose="020F0600000000000000" pitchFamily="50" charset="-128"/>
-                <a:ea typeface="HG丸ｺﾞｼｯｸM-PRO" panose="020F0600000000000000" pitchFamily="50" charset="-128"/>
-              </a:rPr>
-              <a:t>条件</a:t>
-            </a:r>
-            <a:endParaRPr kumimoji="1" lang="ja-JP" altLang="en-US" sz="600" dirty="0">
-              <a:latin typeface="HG丸ｺﾞｼｯｸM-PRO" panose="020F0600000000000000" pitchFamily="50" charset="-128"/>
-              <a:ea typeface="HG丸ｺﾞｼｯｸM-PRO" panose="020F0600000000000000" pitchFamily="50" charset="-128"/>
-            </a:endParaRPr>
-          </a:p>
-        </p:txBody>
-      </p:sp>
-      <p:sp>
-        <p:nvSpPr>
-          <p:cNvPr id="634" name="円弧 633"/>
-          <p:cNvSpPr/>
-          <p:nvPr/>
-        </p:nvSpPr>
-        <p:spPr>
-          <a:xfrm flipH="1">
-            <a:off x="882270" y="4208496"/>
-            <a:ext cx="177970" cy="230278"/>
-          </a:xfrm>
-          <a:prstGeom prst="arc">
-            <a:avLst>
-              <a:gd name="adj1" fmla="val 16083125"/>
-              <a:gd name="adj2" fmla="val 5812496"/>
-            </a:avLst>
-          </a:prstGeom>
-          <a:ln w="9525">
-            <a:solidFill>
-              <a:schemeClr val="tx1"/>
-            </a:solidFill>
-            <a:headEnd type="none" w="med" len="med"/>
-            <a:tailEnd type="triangle" w="med" len="sm"/>
-          </a:ln>
-        </p:spPr>
-        <p:style>
-          <a:lnRef idx="1">
-            <a:schemeClr val="accent1"/>
-          </a:lnRef>
-          <a:fillRef idx="0">
-            <a:schemeClr val="accent1"/>
-          </a:fillRef>
-          <a:effectRef idx="0">
-            <a:schemeClr val="accent1"/>
-          </a:effectRef>
-          <a:fontRef idx="minor">
-            <a:schemeClr val="tx1"/>
-          </a:fontRef>
-        </p:style>
-        <p:txBody>
-          <a:bodyPr rtlCol="0" anchor="ctr"/>
-          <a:lstStyle/>
-          <a:p>
-            <a:pPr algn="ctr"/>
-            <a:endParaRPr kumimoji="1" lang="ja-JP" altLang="en-US" dirty="0"/>
-          </a:p>
-        </p:txBody>
-      </p:sp>
-      <p:sp>
-        <p:nvSpPr>
-          <p:cNvPr id="635" name="円弧 634"/>
-          <p:cNvSpPr/>
-          <p:nvPr/>
-        </p:nvSpPr>
-        <p:spPr>
-          <a:xfrm flipV="1">
-            <a:off x="1403760" y="4208496"/>
-            <a:ext cx="177970" cy="230278"/>
-          </a:xfrm>
-          <a:prstGeom prst="arc">
-            <a:avLst>
-              <a:gd name="adj1" fmla="val 16083125"/>
-              <a:gd name="adj2" fmla="val 5812496"/>
-            </a:avLst>
-          </a:prstGeom>
-          <a:ln w="9525">
-            <a:solidFill>
-              <a:schemeClr val="tx1"/>
-            </a:solidFill>
-            <a:headEnd type="none" w="med" len="med"/>
-            <a:tailEnd type="triangle" w="med" len="sm"/>
-          </a:ln>
-        </p:spPr>
-        <p:style>
-          <a:lnRef idx="1">
-            <a:schemeClr val="accent1"/>
-          </a:lnRef>
-          <a:fillRef idx="0">
-            <a:schemeClr val="accent1"/>
-          </a:fillRef>
-          <a:effectRef idx="0">
-            <a:schemeClr val="accent1"/>
-          </a:effectRef>
-          <a:fontRef idx="minor">
-            <a:schemeClr val="tx1"/>
-          </a:fontRef>
-        </p:style>
-        <p:txBody>
-          <a:bodyPr rtlCol="0" anchor="ctr"/>
-          <a:lstStyle/>
-          <a:p>
-            <a:pPr algn="ctr"/>
-            <a:endParaRPr kumimoji="1" lang="ja-JP" altLang="en-US" dirty="0"/>
-          </a:p>
-        </p:txBody>
-      </p:sp>
-      <p:sp>
-        <p:nvSpPr>
-          <p:cNvPr id="636" name="円弧 635"/>
-          <p:cNvSpPr/>
-          <p:nvPr/>
-        </p:nvSpPr>
-        <p:spPr>
-          <a:xfrm flipH="1" flipV="1">
-            <a:off x="1583670" y="4224578"/>
-            <a:ext cx="168992" cy="233593"/>
-          </a:xfrm>
-          <a:prstGeom prst="arc">
-            <a:avLst>
-              <a:gd name="adj1" fmla="val 21434236"/>
-              <a:gd name="adj2" fmla="val 11863775"/>
-            </a:avLst>
-          </a:prstGeom>
-          <a:ln w="9525">
-            <a:solidFill>
-              <a:schemeClr val="tx1"/>
-            </a:solidFill>
-            <a:prstDash val="sysDash"/>
-            <a:headEnd type="none" w="med" len="med"/>
-            <a:tailEnd type="triangle" w="med" len="sm"/>
-          </a:ln>
-        </p:spPr>
-        <p:style>
-          <a:lnRef idx="1">
-            <a:schemeClr val="accent1"/>
-          </a:lnRef>
-          <a:fillRef idx="0">
-            <a:schemeClr val="accent1"/>
-          </a:fillRef>
-          <a:effectRef idx="0">
-            <a:schemeClr val="accent1"/>
-          </a:effectRef>
-          <a:fontRef idx="minor">
-            <a:schemeClr val="tx1"/>
-          </a:fontRef>
-        </p:style>
-        <p:txBody>
-          <a:bodyPr rtlCol="0" anchor="ctr"/>
-          <a:lstStyle/>
-          <a:p>
-            <a:pPr algn="ctr"/>
-            <a:endParaRPr kumimoji="1" lang="ja-JP" altLang="en-US" dirty="0"/>
-          </a:p>
-        </p:txBody>
-      </p:sp>
-      <p:sp>
-        <p:nvSpPr>
-          <p:cNvPr id="637" name="正方形/長方形 636"/>
-          <p:cNvSpPr/>
-          <p:nvPr/>
-        </p:nvSpPr>
-        <p:spPr>
-          <a:xfrm>
-            <a:off x="1858215" y="4124529"/>
-            <a:ext cx="485239" cy="167467"/>
-          </a:xfrm>
-          <a:prstGeom prst="rect">
-            <a:avLst/>
-          </a:prstGeom>
-          <a:solidFill>
-            <a:srgbClr val="CCCCFF"/>
-          </a:solidFill>
-          <a:ln w="12700">
-            <a:solidFill>
-              <a:schemeClr val="tx1"/>
-            </a:solidFill>
-          </a:ln>
-          <a:effectLst/>
-        </p:spPr>
-        <p:style>
-          <a:lnRef idx="1">
-            <a:schemeClr val="accent6"/>
-          </a:lnRef>
-          <a:fillRef idx="2">
-            <a:schemeClr val="accent6"/>
-          </a:fillRef>
-          <a:effectRef idx="1">
-            <a:schemeClr val="accent6"/>
-          </a:effectRef>
-          <a:fontRef idx="minor">
-            <a:schemeClr val="dk1"/>
-          </a:fontRef>
-        </p:style>
-        <p:txBody>
-          <a:bodyPr lIns="36000" tIns="36000" rIns="36000" bIns="36000" rtlCol="0" anchor="ctr"/>
-          <a:lstStyle/>
-          <a:p>
-            <a:pPr algn="ctr"/>
-            <a:r>
-              <a:rPr kumimoji="1" lang="ja-JP" altLang="en-US" sz="600" dirty="0" smtClean="0">
-                <a:latin typeface="HG丸ｺﾞｼｯｸM-PRO" panose="020F0600000000000000" pitchFamily="50" charset="-128"/>
-                <a:ea typeface="HG丸ｺﾞｼｯｸM-PRO" panose="020F0600000000000000" pitchFamily="50" charset="-128"/>
-              </a:rPr>
-              <a:t>走行方法</a:t>
-            </a:r>
-            <a:endParaRPr kumimoji="1" lang="ja-JP" altLang="en-US" sz="600" dirty="0">
-              <a:latin typeface="HG丸ｺﾞｼｯｸM-PRO" panose="020F0600000000000000" pitchFamily="50" charset="-128"/>
-              <a:ea typeface="HG丸ｺﾞｼｯｸM-PRO" panose="020F0600000000000000" pitchFamily="50" charset="-128"/>
-            </a:endParaRPr>
-          </a:p>
-        </p:txBody>
-      </p:sp>
-      <p:sp>
-        <p:nvSpPr>
-          <p:cNvPr id="638" name="正方形/長方形 637"/>
-          <p:cNvSpPr/>
-          <p:nvPr/>
-        </p:nvSpPr>
-        <p:spPr>
-          <a:xfrm>
-            <a:off x="1858215" y="4354767"/>
-            <a:ext cx="485240" cy="169200"/>
-          </a:xfrm>
-          <a:prstGeom prst="rect">
-            <a:avLst/>
-          </a:prstGeom>
-          <a:solidFill>
-            <a:srgbClr val="FFCCCC"/>
-          </a:solidFill>
-          <a:ln w="12700">
-            <a:solidFill>
-              <a:schemeClr val="tx1"/>
-            </a:solidFill>
-          </a:ln>
-          <a:effectLst/>
-        </p:spPr>
-        <p:style>
-          <a:lnRef idx="1">
-            <a:schemeClr val="accent6"/>
-          </a:lnRef>
-          <a:fillRef idx="2">
-            <a:schemeClr val="accent6"/>
-          </a:fillRef>
-          <a:effectRef idx="1">
-            <a:schemeClr val="accent6"/>
-          </a:effectRef>
-          <a:fontRef idx="minor">
-            <a:schemeClr val="dk1"/>
-          </a:fontRef>
-        </p:style>
-        <p:txBody>
-          <a:bodyPr lIns="36000" tIns="36000" rIns="36000" bIns="36000" rtlCol="0" anchor="ctr"/>
-          <a:lstStyle/>
-          <a:p>
-            <a:pPr algn="ctr"/>
-            <a:r>
-              <a:rPr lang="ja-JP" altLang="en-US" sz="600" dirty="0" smtClean="0">
-                <a:latin typeface="HG丸ｺﾞｼｯｸM-PRO" panose="020F0600000000000000" pitchFamily="50" charset="-128"/>
-                <a:ea typeface="HG丸ｺﾞｼｯｸM-PRO" panose="020F0600000000000000" pitchFamily="50" charset="-128"/>
-              </a:rPr>
-              <a:t>切換え</a:t>
-            </a:r>
-            <a:r>
-              <a:rPr kumimoji="1" lang="ja-JP" altLang="en-US" sz="600" dirty="0" smtClean="0">
-                <a:latin typeface="HG丸ｺﾞｼｯｸM-PRO" panose="020F0600000000000000" pitchFamily="50" charset="-128"/>
-                <a:ea typeface="HG丸ｺﾞｼｯｸM-PRO" panose="020F0600000000000000" pitchFamily="50" charset="-128"/>
-              </a:rPr>
-              <a:t>条件</a:t>
-            </a:r>
-            <a:endParaRPr kumimoji="1" lang="ja-JP" altLang="en-US" sz="600" dirty="0">
-              <a:latin typeface="HG丸ｺﾞｼｯｸM-PRO" panose="020F0600000000000000" pitchFamily="50" charset="-128"/>
-              <a:ea typeface="HG丸ｺﾞｼｯｸM-PRO" panose="020F0600000000000000" pitchFamily="50" charset="-128"/>
-            </a:endParaRPr>
-          </a:p>
-        </p:txBody>
-      </p:sp>
-      <p:sp>
-        <p:nvSpPr>
-          <p:cNvPr id="639" name="円弧 638"/>
-          <p:cNvSpPr/>
-          <p:nvPr/>
-        </p:nvSpPr>
-        <p:spPr>
-          <a:xfrm flipH="1">
-            <a:off x="1745558" y="4208496"/>
-            <a:ext cx="177970" cy="230278"/>
-          </a:xfrm>
-          <a:prstGeom prst="arc">
-            <a:avLst>
-              <a:gd name="adj1" fmla="val 16083125"/>
-              <a:gd name="adj2" fmla="val 5812496"/>
-            </a:avLst>
-          </a:prstGeom>
-          <a:ln w="9525">
-            <a:solidFill>
-              <a:schemeClr val="tx1"/>
-            </a:solidFill>
-            <a:headEnd type="none" w="med" len="med"/>
-            <a:tailEnd type="triangle" w="med" len="sm"/>
-          </a:ln>
-        </p:spPr>
-        <p:style>
-          <a:lnRef idx="1">
-            <a:schemeClr val="accent1"/>
-          </a:lnRef>
-          <a:fillRef idx="0">
-            <a:schemeClr val="accent1"/>
-          </a:fillRef>
-          <a:effectRef idx="0">
-            <a:schemeClr val="accent1"/>
-          </a:effectRef>
-          <a:fontRef idx="minor">
-            <a:schemeClr val="tx1"/>
-          </a:fontRef>
-        </p:style>
-        <p:txBody>
-          <a:bodyPr rtlCol="0" anchor="ctr"/>
-          <a:lstStyle/>
-          <a:p>
-            <a:pPr algn="ctr"/>
-            <a:endParaRPr kumimoji="1" lang="ja-JP" altLang="en-US" dirty="0"/>
-          </a:p>
-        </p:txBody>
-      </p:sp>
-      <p:sp>
-        <p:nvSpPr>
-          <p:cNvPr id="640" name="円弧 639"/>
-          <p:cNvSpPr/>
-          <p:nvPr/>
-        </p:nvSpPr>
-        <p:spPr>
-          <a:xfrm flipV="1">
-            <a:off x="2267048" y="4208496"/>
-            <a:ext cx="177970" cy="230278"/>
-          </a:xfrm>
-          <a:prstGeom prst="arc">
-            <a:avLst>
-              <a:gd name="adj1" fmla="val 16083125"/>
-              <a:gd name="adj2" fmla="val 5812496"/>
-            </a:avLst>
-          </a:prstGeom>
-          <a:ln w="9525">
-            <a:solidFill>
-              <a:schemeClr val="tx1"/>
-            </a:solidFill>
-            <a:headEnd type="none" w="med" len="med"/>
-            <a:tailEnd type="triangle" w="med" len="sm"/>
-          </a:ln>
-        </p:spPr>
-        <p:style>
-          <a:lnRef idx="1">
-            <a:schemeClr val="accent1"/>
-          </a:lnRef>
-          <a:fillRef idx="0">
-            <a:schemeClr val="accent1"/>
-          </a:fillRef>
-          <a:effectRef idx="0">
-            <a:schemeClr val="accent1"/>
-          </a:effectRef>
-          <a:fontRef idx="minor">
-            <a:schemeClr val="tx1"/>
-          </a:fontRef>
-        </p:style>
-        <p:txBody>
-          <a:bodyPr rtlCol="0" anchor="ctr"/>
-          <a:lstStyle/>
-          <a:p>
-            <a:pPr algn="ctr"/>
-            <a:endParaRPr kumimoji="1" lang="ja-JP" altLang="en-US" dirty="0"/>
-          </a:p>
-        </p:txBody>
-      </p:sp>
-      <p:sp>
-        <p:nvSpPr>
-          <p:cNvPr id="641" name="円弧 640"/>
-          <p:cNvSpPr/>
-          <p:nvPr/>
-        </p:nvSpPr>
-        <p:spPr>
-          <a:xfrm flipH="1" flipV="1">
-            <a:off x="2446958" y="4224578"/>
-            <a:ext cx="168992" cy="233593"/>
-          </a:xfrm>
-          <a:prstGeom prst="arc">
-            <a:avLst>
-              <a:gd name="adj1" fmla="val 21434236"/>
-              <a:gd name="adj2" fmla="val 11863775"/>
-            </a:avLst>
-          </a:prstGeom>
-          <a:ln w="9525">
-            <a:solidFill>
-              <a:schemeClr val="tx1"/>
-            </a:solidFill>
-            <a:prstDash val="sysDash"/>
-            <a:headEnd type="none" w="med" len="med"/>
-            <a:tailEnd type="triangle" w="med" len="sm"/>
-          </a:ln>
-        </p:spPr>
-        <p:style>
-          <a:lnRef idx="1">
-            <a:schemeClr val="accent1"/>
-          </a:lnRef>
-          <a:fillRef idx="0">
-            <a:schemeClr val="accent1"/>
-          </a:fillRef>
-          <a:effectRef idx="0">
-            <a:schemeClr val="accent1"/>
-          </a:effectRef>
-          <a:fontRef idx="minor">
-            <a:schemeClr val="tx1"/>
-          </a:fontRef>
-        </p:style>
-        <p:txBody>
-          <a:bodyPr rtlCol="0" anchor="ctr"/>
-          <a:lstStyle/>
-          <a:p>
-            <a:pPr algn="ctr"/>
-            <a:endParaRPr kumimoji="1" lang="ja-JP" altLang="en-US" dirty="0"/>
-          </a:p>
-        </p:txBody>
-      </p:sp>
       <p:grpSp>
         <p:nvGrpSpPr>
           <p:cNvPr id="658" name="グループ化 657"/>
@@ -15298,78 +13504,6 @@
               </a:rPr>
               <a:t>外部との通信を担う</a:t>
             </a:r>
-          </a:p>
-        </p:txBody>
-      </p:sp>
-      <p:sp>
-        <p:nvSpPr>
-          <p:cNvPr id="750" name="テキスト ボックス 749"/>
-          <p:cNvSpPr txBox="1"/>
-          <p:nvPr/>
-        </p:nvSpPr>
-        <p:spPr>
-          <a:xfrm>
-            <a:off x="421506" y="4258856"/>
-            <a:ext cx="303536" cy="165036"/>
-          </a:xfrm>
-          <a:prstGeom prst="rect">
-            <a:avLst/>
-          </a:prstGeom>
-          <a:noFill/>
-        </p:spPr>
-        <p:txBody>
-          <a:bodyPr wrap="none" lIns="36000" tIns="36000" rIns="36000" bIns="36000" rtlCol="0">
-            <a:spAutoFit/>
-          </a:bodyPr>
-          <a:lstStyle/>
-          <a:p>
-            <a:r>
-              <a:rPr kumimoji="1" lang="ja-JP" altLang="en-US" sz="600" dirty="0" smtClean="0">
-                <a:latin typeface="HG丸ｺﾞｼｯｸM-PRO" panose="020F0600000000000000" pitchFamily="50" charset="-128"/>
-                <a:ea typeface="HG丸ｺﾞｼｯｸM-PRO" panose="020F0600000000000000" pitchFamily="50" charset="-128"/>
-              </a:rPr>
-              <a:t>・・・</a:t>
-            </a:r>
-            <a:endParaRPr kumimoji="1" lang="ja-JP" altLang="en-US" sz="600" dirty="0">
-              <a:latin typeface="HG丸ｺﾞｼｯｸM-PRO" panose="020F0600000000000000" pitchFamily="50" charset="-128"/>
-              <a:ea typeface="HG丸ｺﾞｼｯｸM-PRO" panose="020F0600000000000000" pitchFamily="50" charset="-128"/>
-            </a:endParaRPr>
-          </a:p>
-        </p:txBody>
-      </p:sp>
-      <p:sp>
-        <p:nvSpPr>
-          <p:cNvPr id="751" name="テキスト ボックス 750"/>
-          <p:cNvSpPr txBox="1"/>
-          <p:nvPr/>
-        </p:nvSpPr>
-        <p:spPr>
-          <a:xfrm>
-            <a:off x="2605906" y="4258856"/>
-            <a:ext cx="303536" cy="165036"/>
-          </a:xfrm>
-          <a:prstGeom prst="rect">
-            <a:avLst/>
-          </a:prstGeom>
-          <a:noFill/>
-        </p:spPr>
-        <p:txBody>
-          <a:bodyPr wrap="none" lIns="36000" tIns="36000" rIns="36000" bIns="36000" rtlCol="0">
-            <a:spAutoFit/>
-          </a:bodyPr>
-          <a:lstStyle/>
-          <a:p>
-            <a:r>
-              <a:rPr kumimoji="1" lang="ja-JP" altLang="en-US" sz="600" dirty="0" smtClean="0">
-                <a:latin typeface="HG丸ｺﾞｼｯｸM-PRO" panose="020F0600000000000000" pitchFamily="50" charset="-128"/>
-                <a:ea typeface="HG丸ｺﾞｼｯｸM-PRO" panose="020F0600000000000000" pitchFamily="50" charset="-128"/>
-              </a:rPr>
-              <a:t>・・・</a:t>
-            </a:r>
-            <a:endParaRPr kumimoji="1" lang="ja-JP" altLang="en-US" sz="600" dirty="0">
-              <a:latin typeface="HG丸ｺﾞｼｯｸM-PRO" panose="020F0600000000000000" pitchFamily="50" charset="-128"/>
-              <a:ea typeface="HG丸ｺﾞｼｯｸM-PRO" panose="020F0600000000000000" pitchFamily="50" charset="-128"/>
-            </a:endParaRPr>
           </a:p>
         </p:txBody>
       </p:sp>
@@ -15553,516 +13687,34 @@
       </p:sp>
       <p:pic>
         <p:nvPicPr>
-          <p:cNvPr id="26" name="図 25"/>
+          <p:cNvPr id="5" name="図 4"/>
           <p:cNvPicPr>
             <a:picLocks noChangeAspect="1"/>
           </p:cNvPicPr>
           <p:nvPr/>
         </p:nvPicPr>
         <p:blipFill>
-          <a:blip r:embed="rId5"/>
+          <a:blip r:embed="rId5">
+            <a:extLst>
+              <a:ext uri="{28A0092B-C50C-407E-A947-70E740481C1C}">
+                <a14:useLocalDpi xmlns:a14="http://schemas.microsoft.com/office/drawing/2010/main" val="0"/>
+              </a:ext>
+            </a:extLst>
+          </a:blip>
           <a:stretch>
             <a:fillRect/>
           </a:stretch>
         </p:blipFill>
         <p:spPr>
           <a:xfrm>
-            <a:off x="4431139" y="1067336"/>
-            <a:ext cx="3833996" cy="3432231"/>
+            <a:off x="65665" y="894666"/>
+            <a:ext cx="4498463" cy="3890497"/>
           </a:xfrm>
           <a:prstGeom prst="rect">
             <a:avLst/>
           </a:prstGeom>
         </p:spPr>
       </p:pic>
-      <p:graphicFrame>
-        <p:nvGraphicFramePr>
-          <p:cNvPr id="27" name="表 26"/>
-          <p:cNvGraphicFramePr>
-            <a:graphicFrameLocks noGrp="1"/>
-          </p:cNvGraphicFramePr>
-          <p:nvPr>
-            <p:extLst>
-              <p:ext uri="{D42A27DB-BD31-4B8C-83A1-F6EECF244321}">
-                <p14:modId xmlns:p14="http://schemas.microsoft.com/office/powerpoint/2010/main" val="3035673342"/>
-              </p:ext>
-            </p:extLst>
-          </p:nvPr>
-        </p:nvGraphicFramePr>
-        <p:xfrm>
-          <a:off x="7724775" y="2614993"/>
-          <a:ext cx="4974060" cy="1950720"/>
-        </p:xfrm>
-        <a:graphic>
-          <a:graphicData uri="http://schemas.openxmlformats.org/drawingml/2006/table">
-            <a:tbl>
-              <a:tblPr firstRow="1" bandRow="1">
-                <a:tableStyleId>{00A15C55-8517-42AA-B614-E9B94910E393}</a:tableStyleId>
-              </a:tblPr>
-              <a:tblGrid>
-                <a:gridCol w="1409700"/>
-                <a:gridCol w="3564360"/>
-              </a:tblGrid>
-              <a:tr h="0">
-                <a:tc>
-                  <a:txBody>
-                    <a:bodyPr/>
-                    <a:lstStyle/>
-                    <a:p>
-                      <a:pPr algn="ctr"/>
-                      <a:r>
-                        <a:rPr kumimoji="1" lang="ja-JP" altLang="en-US" sz="1000" smtClean="0">
-                          <a:latin typeface="+mn-lt"/>
-                          <a:ea typeface="+mn-ea"/>
-                          <a:cs typeface="+mn-cs"/>
-                        </a:rPr>
-                        <a:t>パッケージ名</a:t>
-                      </a:r>
-                      <a:endParaRPr kumimoji="1" lang="ja-JP" altLang="en-US" sz="1000">
-                        <a:latin typeface="HG丸ｺﾞｼｯｸM-PRO" panose="020F0600000000000000" pitchFamily="50" charset="-128"/>
-                        <a:ea typeface="HG丸ｺﾞｼｯｸM-PRO" panose="020F0600000000000000" pitchFamily="50" charset="-128"/>
-                        <a:cs typeface="メイリオ" panose="020B0604030504040204" pitchFamily="50" charset="-128"/>
-                      </a:endParaRPr>
-                    </a:p>
-                  </a:txBody>
-                  <a:tcPr/>
-                </a:tc>
-                <a:tc>
-                  <a:txBody>
-                    <a:bodyPr/>
-                    <a:lstStyle/>
-                    <a:p>
-                      <a:pPr algn="ctr"/>
-                      <a:r>
-                        <a:rPr kumimoji="1" lang="ja-JP" altLang="en-US" sz="1000" smtClean="0">
-                          <a:latin typeface="HG丸ｺﾞｼｯｸM-PRO" panose="020F0600000000000000" pitchFamily="50" charset="-128"/>
-                          <a:ea typeface="HG丸ｺﾞｼｯｸM-PRO" panose="020F0600000000000000" pitchFamily="50" charset="-128"/>
-                          <a:cs typeface="メイリオ" panose="020B0604030504040204" pitchFamily="50" charset="-128"/>
-                        </a:rPr>
-                        <a:t>機能</a:t>
-                      </a:r>
-                      <a:endParaRPr kumimoji="1" lang="ja-JP" altLang="en-US" sz="1000">
-                        <a:latin typeface="HG丸ｺﾞｼｯｸM-PRO" panose="020F0600000000000000" pitchFamily="50" charset="-128"/>
-                        <a:ea typeface="HG丸ｺﾞｼｯｸM-PRO" panose="020F0600000000000000" pitchFamily="50" charset="-128"/>
-                        <a:cs typeface="メイリオ" panose="020B0604030504040204" pitchFamily="50" charset="-128"/>
-                      </a:endParaRPr>
-                    </a:p>
-                  </a:txBody>
-                  <a:tcPr/>
-                </a:tc>
-              </a:tr>
-              <a:tr h="0">
-                <a:tc>
-                  <a:txBody>
-                    <a:bodyPr/>
-                    <a:lstStyle/>
-                    <a:p>
-                      <a:r>
-                        <a:rPr kumimoji="1" lang="ja-JP" altLang="en-US" sz="1000" smtClean="0">
-                          <a:latin typeface="HG丸ｺﾞｼｯｸM-PRO" panose="020F0600000000000000" pitchFamily="50" charset="-128"/>
-                          <a:ea typeface="HG丸ｺﾞｼｯｸM-PRO" panose="020F0600000000000000" pitchFamily="50" charset="-128"/>
-                          <a:cs typeface="メイリオ" panose="020B0604030504040204" pitchFamily="50" charset="-128"/>
-                        </a:rPr>
-                        <a:t>アプリケーション</a:t>
-                      </a:r>
-                      <a:endParaRPr kumimoji="1" lang="ja-JP" altLang="en-US" sz="1000">
-                        <a:latin typeface="HG丸ｺﾞｼｯｸM-PRO" panose="020F0600000000000000" pitchFamily="50" charset="-128"/>
-                        <a:ea typeface="HG丸ｺﾞｼｯｸM-PRO" panose="020F0600000000000000" pitchFamily="50" charset="-128"/>
-                        <a:cs typeface="メイリオ" panose="020B0604030504040204" pitchFamily="50" charset="-128"/>
-                      </a:endParaRPr>
-                    </a:p>
-                  </a:txBody>
-                  <a:tcPr/>
-                </a:tc>
-                <a:tc>
-                  <a:txBody>
-                    <a:bodyPr/>
-                    <a:lstStyle/>
-                    <a:p>
-                      <a:r>
-                        <a:rPr kumimoji="1" lang="ja-JP" altLang="en-US" sz="1000" smtClean="0">
-                          <a:latin typeface="HG丸ｺﾞｼｯｸM-PRO" panose="020F0600000000000000" pitchFamily="50" charset="-128"/>
-                          <a:ea typeface="HG丸ｺﾞｼｯｸM-PRO" panose="020F0600000000000000" pitchFamily="50" charset="-128"/>
-                          <a:cs typeface="メイリオ" panose="020B0604030504040204" pitchFamily="50" charset="-128"/>
-                        </a:rPr>
-                        <a:t>各パッケージが持つ機能を呼び出し、使用する。</a:t>
-                      </a:r>
-                      <a:endParaRPr kumimoji="1" lang="ja-JP" altLang="en-US" sz="1000">
-                        <a:latin typeface="HG丸ｺﾞｼｯｸM-PRO" panose="020F0600000000000000" pitchFamily="50" charset="-128"/>
-                        <a:ea typeface="HG丸ｺﾞｼｯｸM-PRO" panose="020F0600000000000000" pitchFamily="50" charset="-128"/>
-                        <a:cs typeface="メイリオ" panose="020B0604030504040204" pitchFamily="50" charset="-128"/>
-                      </a:endParaRPr>
-                    </a:p>
-                  </a:txBody>
-                  <a:tcPr/>
-                </a:tc>
-              </a:tr>
-              <a:tr h="0">
-                <a:tc>
-                  <a:txBody>
-                    <a:bodyPr/>
-                    <a:lstStyle/>
-                    <a:p>
-                      <a:r>
-                        <a:rPr kumimoji="1" lang="ja-JP" altLang="en-US" sz="1000" smtClean="0">
-                          <a:latin typeface="HG丸ｺﾞｼｯｸM-PRO" panose="020F0600000000000000" pitchFamily="50" charset="-128"/>
-                          <a:ea typeface="HG丸ｺﾞｼｯｸM-PRO" panose="020F0600000000000000" pitchFamily="50" charset="-128"/>
-                          <a:cs typeface="メイリオ" panose="020B0604030504040204" pitchFamily="50" charset="-128"/>
-                        </a:rPr>
-                        <a:t>キャリブレーション</a:t>
-                      </a:r>
-                      <a:endParaRPr kumimoji="1" lang="ja-JP" altLang="en-US" sz="1000">
-                        <a:latin typeface="HG丸ｺﾞｼｯｸM-PRO" panose="020F0600000000000000" pitchFamily="50" charset="-128"/>
-                        <a:ea typeface="HG丸ｺﾞｼｯｸM-PRO" panose="020F0600000000000000" pitchFamily="50" charset="-128"/>
-                        <a:cs typeface="メイリオ" panose="020B0604030504040204" pitchFamily="50" charset="-128"/>
-                      </a:endParaRPr>
-                    </a:p>
-                  </a:txBody>
-                  <a:tcPr/>
-                </a:tc>
-                <a:tc>
-                  <a:txBody>
-                    <a:bodyPr/>
-                    <a:lstStyle/>
-                    <a:p>
-                      <a:r>
-                        <a:rPr kumimoji="1" lang="ja-JP" altLang="en-US" sz="1000" smtClean="0">
-                          <a:latin typeface="HG丸ｺﾞｼｯｸM-PRO" panose="020F0600000000000000" pitchFamily="50" charset="-128"/>
-                          <a:ea typeface="HG丸ｺﾞｼｯｸM-PRO" panose="020F0600000000000000" pitchFamily="50" charset="-128"/>
-                          <a:cs typeface="メイリオ" panose="020B0604030504040204" pitchFamily="50" charset="-128"/>
-                        </a:rPr>
-                        <a:t>コース上の値を簡単に取得し保存できる機能を持つ</a:t>
-                      </a:r>
-                      <a:endParaRPr kumimoji="1" lang="ja-JP" altLang="en-US" sz="1000">
-                        <a:latin typeface="HG丸ｺﾞｼｯｸM-PRO" panose="020F0600000000000000" pitchFamily="50" charset="-128"/>
-                        <a:ea typeface="HG丸ｺﾞｼｯｸM-PRO" panose="020F0600000000000000" pitchFamily="50" charset="-128"/>
-                        <a:cs typeface="メイリオ" panose="020B0604030504040204" pitchFamily="50" charset="-128"/>
-                      </a:endParaRPr>
-                    </a:p>
-                  </a:txBody>
-                  <a:tcPr/>
-                </a:tc>
-              </a:tr>
-              <a:tr h="0">
-                <a:tc>
-                  <a:txBody>
-                    <a:bodyPr/>
-                    <a:lstStyle/>
-                    <a:p>
-                      <a:r>
-                        <a:rPr kumimoji="1" lang="ja-JP" altLang="en-US" sz="1000" smtClean="0">
-                          <a:latin typeface="HG丸ｺﾞｼｯｸM-PRO" panose="020F0600000000000000" pitchFamily="50" charset="-128"/>
-                          <a:ea typeface="HG丸ｺﾞｼｯｸM-PRO" panose="020F0600000000000000" pitchFamily="50" charset="-128"/>
-                          <a:cs typeface="メイリオ" panose="020B0604030504040204" pitchFamily="50" charset="-128"/>
-                        </a:rPr>
-                        <a:t>走行戦略実施</a:t>
-                      </a:r>
-                      <a:endParaRPr kumimoji="1" lang="ja-JP" altLang="en-US" sz="1000">
-                        <a:latin typeface="HG丸ｺﾞｼｯｸM-PRO" panose="020F0600000000000000" pitchFamily="50" charset="-128"/>
-                        <a:ea typeface="HG丸ｺﾞｼｯｸM-PRO" panose="020F0600000000000000" pitchFamily="50" charset="-128"/>
-                        <a:cs typeface="メイリオ" panose="020B0604030504040204" pitchFamily="50" charset="-128"/>
-                      </a:endParaRPr>
-                    </a:p>
-                  </a:txBody>
-                  <a:tcPr/>
-                </a:tc>
-                <a:tc>
-                  <a:txBody>
-                    <a:bodyPr/>
-                    <a:lstStyle/>
-                    <a:p>
-                      <a:r>
-                        <a:rPr kumimoji="1" lang="ja-JP" altLang="en-US" sz="1000" smtClean="0">
-                          <a:latin typeface="HG丸ｺﾞｼｯｸM-PRO" panose="020F0600000000000000" pitchFamily="50" charset="-128"/>
-                          <a:ea typeface="HG丸ｺﾞｼｯｸM-PRO" panose="020F0600000000000000" pitchFamily="50" charset="-128"/>
-                          <a:cs typeface="メイリオ" panose="020B0604030504040204" pitchFamily="50" charset="-128"/>
-                        </a:rPr>
-                        <a:t>走行戦略が作成した戦略を実行する</a:t>
-                      </a:r>
-                      <a:endParaRPr kumimoji="1" lang="ja-JP" altLang="en-US" sz="1000">
-                        <a:latin typeface="HG丸ｺﾞｼｯｸM-PRO" panose="020F0600000000000000" pitchFamily="50" charset="-128"/>
-                        <a:ea typeface="HG丸ｺﾞｼｯｸM-PRO" panose="020F0600000000000000" pitchFamily="50" charset="-128"/>
-                        <a:cs typeface="メイリオ" panose="020B0604030504040204" pitchFamily="50" charset="-128"/>
-                      </a:endParaRPr>
-                    </a:p>
-                  </a:txBody>
-                  <a:tcPr/>
-                </a:tc>
-              </a:tr>
-              <a:tr h="0">
-                <a:tc>
-                  <a:txBody>
-                    <a:bodyPr/>
-                    <a:lstStyle/>
-                    <a:p>
-                      <a:r>
-                        <a:rPr kumimoji="1" lang="ja-JP" altLang="en-US" sz="1000" smtClean="0">
-                          <a:latin typeface="HG丸ｺﾞｼｯｸM-PRO" panose="020F0600000000000000" pitchFamily="50" charset="-128"/>
-                          <a:ea typeface="HG丸ｺﾞｼｯｸM-PRO" panose="020F0600000000000000" pitchFamily="50" charset="-128"/>
-                          <a:cs typeface="メイリオ" panose="020B0604030504040204" pitchFamily="50" charset="-128"/>
-                        </a:rPr>
-                        <a:t>走行準備</a:t>
-                      </a:r>
-                      <a:endParaRPr kumimoji="1" lang="ja-JP" altLang="en-US" sz="1000">
-                        <a:latin typeface="HG丸ｺﾞｼｯｸM-PRO" panose="020F0600000000000000" pitchFamily="50" charset="-128"/>
-                        <a:ea typeface="HG丸ｺﾞｼｯｸM-PRO" panose="020F0600000000000000" pitchFamily="50" charset="-128"/>
-                        <a:cs typeface="メイリオ" panose="020B0604030504040204" pitchFamily="50" charset="-128"/>
-                      </a:endParaRPr>
-                    </a:p>
-                  </a:txBody>
-                  <a:tcPr/>
-                </a:tc>
-                <a:tc>
-                  <a:txBody>
-                    <a:bodyPr/>
-                    <a:lstStyle/>
-                    <a:p>
-                      <a:r>
-                        <a:rPr kumimoji="1" lang="ja-JP" altLang="en-US" sz="1000" smtClean="0">
-                          <a:latin typeface="HG丸ｺﾞｼｯｸM-PRO" panose="020F0600000000000000" pitchFamily="50" charset="-128"/>
-                          <a:ea typeface="HG丸ｺﾞｼｯｸM-PRO" panose="020F0600000000000000" pitchFamily="50" charset="-128"/>
-                          <a:cs typeface="メイリオ" panose="020B0604030504040204" pitchFamily="50" charset="-128"/>
-                        </a:rPr>
-                        <a:t>走行体をスタート位置に自動的に配置する機能を持つ</a:t>
-                      </a:r>
-                      <a:endParaRPr kumimoji="1" lang="ja-JP" altLang="en-US" sz="1000">
-                        <a:latin typeface="HG丸ｺﾞｼｯｸM-PRO" panose="020F0600000000000000" pitchFamily="50" charset="-128"/>
-                        <a:ea typeface="HG丸ｺﾞｼｯｸM-PRO" panose="020F0600000000000000" pitchFamily="50" charset="-128"/>
-                        <a:cs typeface="メイリオ" panose="020B0604030504040204" pitchFamily="50" charset="-128"/>
-                      </a:endParaRPr>
-                    </a:p>
-                  </a:txBody>
-                  <a:tcPr/>
-                </a:tc>
-              </a:tr>
-              <a:tr h="0">
-                <a:tc>
-                  <a:txBody>
-                    <a:bodyPr/>
-                    <a:lstStyle/>
-                    <a:p>
-                      <a:r>
-                        <a:rPr kumimoji="1" lang="ja-JP" altLang="en-US" sz="1000" smtClean="0">
-                          <a:latin typeface="HG丸ｺﾞｼｯｸM-PRO" panose="020F0600000000000000" pitchFamily="50" charset="-128"/>
-                          <a:ea typeface="HG丸ｺﾞｼｯｸM-PRO" panose="020F0600000000000000" pitchFamily="50" charset="-128"/>
-                          <a:cs typeface="メイリオ" panose="020B0604030504040204" pitchFamily="50" charset="-128"/>
-                        </a:rPr>
-                        <a:t>走行戦略作成</a:t>
-                      </a:r>
-                      <a:endParaRPr kumimoji="1" lang="ja-JP" altLang="en-US" sz="1000">
-                        <a:latin typeface="HG丸ｺﾞｼｯｸM-PRO" panose="020F0600000000000000" pitchFamily="50" charset="-128"/>
-                        <a:ea typeface="HG丸ｺﾞｼｯｸM-PRO" panose="020F0600000000000000" pitchFamily="50" charset="-128"/>
-                        <a:cs typeface="メイリオ" panose="020B0604030504040204" pitchFamily="50" charset="-128"/>
-                      </a:endParaRPr>
-                    </a:p>
-                  </a:txBody>
-                  <a:tcPr/>
-                </a:tc>
-                <a:tc>
-                  <a:txBody>
-                    <a:bodyPr/>
-                    <a:lstStyle/>
-                    <a:p>
-                      <a:r>
-                        <a:rPr kumimoji="1" lang="ja-JP" altLang="en-US" sz="1000" smtClean="0">
-                          <a:latin typeface="HG丸ｺﾞｼｯｸM-PRO" panose="020F0600000000000000" pitchFamily="50" charset="-128"/>
-                          <a:ea typeface="HG丸ｺﾞｼｯｸM-PRO" panose="020F0600000000000000" pitchFamily="50" charset="-128"/>
-                          <a:cs typeface="メイリオ" panose="020B0604030504040204" pitchFamily="50" charset="-128"/>
-                        </a:rPr>
-                        <a:t>走行戦略を作成し、保持する。</a:t>
-                      </a:r>
-                      <a:endParaRPr kumimoji="1" lang="ja-JP" altLang="en-US" sz="1000">
-                        <a:latin typeface="HG丸ｺﾞｼｯｸM-PRO" panose="020F0600000000000000" pitchFamily="50" charset="-128"/>
-                        <a:ea typeface="HG丸ｺﾞｼｯｸM-PRO" panose="020F0600000000000000" pitchFamily="50" charset="-128"/>
-                        <a:cs typeface="メイリオ" panose="020B0604030504040204" pitchFamily="50" charset="-128"/>
-                      </a:endParaRPr>
-                    </a:p>
-                  </a:txBody>
-                  <a:tcPr/>
-                </a:tc>
-              </a:tr>
-              <a:tr h="0">
-                <a:tc>
-                  <a:txBody>
-                    <a:bodyPr/>
-                    <a:lstStyle/>
-                    <a:p>
-                      <a:r>
-                        <a:rPr kumimoji="1" lang="ja-JP" altLang="en-US" sz="1000" smtClean="0">
-                          <a:latin typeface="HG丸ｺﾞｼｯｸM-PRO" panose="020F0600000000000000" pitchFamily="50" charset="-128"/>
-                          <a:ea typeface="HG丸ｺﾞｼｯｸM-PRO" panose="020F0600000000000000" pitchFamily="50" charset="-128"/>
-                          <a:cs typeface="メイリオ" panose="020B0604030504040204" pitchFamily="50" charset="-128"/>
-                        </a:rPr>
-                        <a:t>機体操作</a:t>
-                      </a:r>
-                      <a:endParaRPr kumimoji="1" lang="ja-JP" altLang="en-US" sz="1000">
-                        <a:latin typeface="HG丸ｺﾞｼｯｸM-PRO" panose="020F0600000000000000" pitchFamily="50" charset="-128"/>
-                        <a:ea typeface="HG丸ｺﾞｼｯｸM-PRO" panose="020F0600000000000000" pitchFamily="50" charset="-128"/>
-                        <a:cs typeface="メイリオ" panose="020B0604030504040204" pitchFamily="50" charset="-128"/>
-                      </a:endParaRPr>
-                    </a:p>
-                  </a:txBody>
-                  <a:tcPr/>
-                </a:tc>
-                <a:tc>
-                  <a:txBody>
-                    <a:bodyPr/>
-                    <a:lstStyle/>
-                    <a:p>
-                      <a:r>
-                        <a:rPr kumimoji="1" lang="ja-JP" altLang="en-US" sz="1000" smtClean="0">
-                          <a:latin typeface="HG丸ｺﾞｼｯｸM-PRO" panose="020F0600000000000000" pitchFamily="50" charset="-128"/>
-                          <a:ea typeface="HG丸ｺﾞｼｯｸM-PRO" panose="020F0600000000000000" pitchFamily="50" charset="-128"/>
-                          <a:cs typeface="メイリオ" panose="020B0604030504040204" pitchFamily="50" charset="-128"/>
-                        </a:rPr>
-                        <a:t>走行体を動作させるためのインターフェースを持つ</a:t>
-                      </a:r>
-                      <a:endParaRPr kumimoji="1" lang="ja-JP" altLang="en-US" sz="1000">
-                        <a:latin typeface="HG丸ｺﾞｼｯｸM-PRO" panose="020F0600000000000000" pitchFamily="50" charset="-128"/>
-                        <a:ea typeface="HG丸ｺﾞｼｯｸM-PRO" panose="020F0600000000000000" pitchFamily="50" charset="-128"/>
-                        <a:cs typeface="メイリオ" panose="020B0604030504040204" pitchFamily="50" charset="-128"/>
-                      </a:endParaRPr>
-                    </a:p>
-                  </a:txBody>
-                  <a:tcPr/>
-                </a:tc>
-              </a:tr>
-              <a:tr h="0">
-                <a:tc>
-                  <a:txBody>
-                    <a:bodyPr/>
-                    <a:lstStyle/>
-                    <a:p>
-                      <a:r>
-                        <a:rPr kumimoji="1" lang="ja-JP" altLang="en-US" sz="1000" smtClean="0">
-                          <a:latin typeface="HG丸ｺﾞｼｯｸM-PRO" panose="020F0600000000000000" pitchFamily="50" charset="-128"/>
-                          <a:ea typeface="HG丸ｺﾞｼｯｸM-PRO" panose="020F0600000000000000" pitchFamily="50" charset="-128"/>
-                          <a:cs typeface="メイリオ" panose="020B0604030504040204" pitchFamily="50" charset="-128"/>
-                        </a:rPr>
-                        <a:t>機体情報</a:t>
-                      </a:r>
-                      <a:endParaRPr kumimoji="1" lang="ja-JP" altLang="en-US" sz="1000">
-                        <a:latin typeface="HG丸ｺﾞｼｯｸM-PRO" panose="020F0600000000000000" pitchFamily="50" charset="-128"/>
-                        <a:ea typeface="HG丸ｺﾞｼｯｸM-PRO" panose="020F0600000000000000" pitchFamily="50" charset="-128"/>
-                        <a:cs typeface="メイリオ" panose="020B0604030504040204" pitchFamily="50" charset="-128"/>
-                      </a:endParaRPr>
-                    </a:p>
-                  </a:txBody>
-                  <a:tcPr/>
-                </a:tc>
-                <a:tc>
-                  <a:txBody>
-                    <a:bodyPr/>
-                    <a:lstStyle/>
-                    <a:p>
-                      <a:r>
-                        <a:rPr kumimoji="1" lang="ja-JP" altLang="en-US" sz="1000" smtClean="0">
-                          <a:latin typeface="HG丸ｺﾞｼｯｸM-PRO" panose="020F0600000000000000" pitchFamily="50" charset="-128"/>
-                          <a:ea typeface="HG丸ｺﾞｼｯｸM-PRO" panose="020F0600000000000000" pitchFamily="50" charset="-128"/>
-                          <a:cs typeface="メイリオ" panose="020B0604030504040204" pitchFamily="50" charset="-128"/>
-                        </a:rPr>
-                        <a:t>走行体のセンサー情報を使いやすい形に変換し、提供する</a:t>
-                      </a:r>
-                      <a:endParaRPr kumimoji="1" lang="ja-JP" altLang="en-US" sz="1000">
-                        <a:latin typeface="HG丸ｺﾞｼｯｸM-PRO" panose="020F0600000000000000" pitchFamily="50" charset="-128"/>
-                        <a:ea typeface="HG丸ｺﾞｼｯｸM-PRO" panose="020F0600000000000000" pitchFamily="50" charset="-128"/>
-                        <a:cs typeface="メイリオ" panose="020B0604030504040204" pitchFamily="50" charset="-128"/>
-                      </a:endParaRPr>
-                    </a:p>
-                  </a:txBody>
-                  <a:tcPr/>
-                </a:tc>
-              </a:tr>
-            </a:tbl>
-          </a:graphicData>
-        </a:graphic>
-      </p:graphicFrame>
-      <p:sp>
-        <p:nvSpPr>
-          <p:cNvPr id="166" name="テキスト ボックス 165"/>
-          <p:cNvSpPr txBox="1"/>
-          <p:nvPr/>
-        </p:nvSpPr>
-        <p:spPr>
-          <a:xfrm>
-            <a:off x="37301" y="2413432"/>
-            <a:ext cx="4240371" cy="492443"/>
-          </a:xfrm>
-          <a:prstGeom prst="rect">
-            <a:avLst/>
-          </a:prstGeom>
-          <a:noFill/>
-        </p:spPr>
-        <p:txBody>
-          <a:bodyPr wrap="square" rtlCol="0">
-            <a:spAutoFit/>
-          </a:bodyPr>
-          <a:lstStyle/>
-          <a:p>
-            <a:r>
-              <a:rPr lang="ja-JP" altLang="en-US" sz="1050" b="1" u="sng" smtClean="0">
-                <a:solidFill>
-                  <a:srgbClr val="0000CC"/>
-                </a:solidFill>
-                <a:uFill>
-                  <a:solidFill>
-                    <a:schemeClr val="bg1">
-                      <a:lumMod val="50000"/>
-                    </a:schemeClr>
-                  </a:solidFill>
-                </a:uFill>
-                <a:latin typeface="HG丸ｺﾞｼｯｸM-PRO" panose="020F0600000000000000" pitchFamily="50" charset="-128"/>
-                <a:ea typeface="HG丸ｺﾞｼｯｸM-PRO" panose="020F0600000000000000" pitchFamily="50" charset="-128"/>
-              </a:rPr>
-              <a:t>走行</a:t>
-            </a:r>
-            <a:r>
-              <a:rPr lang="ja-JP" altLang="en-US" sz="1050" b="1" u="sng" dirty="0" smtClean="0">
-                <a:solidFill>
-                  <a:srgbClr val="0000CC"/>
-                </a:solidFill>
-                <a:uFill>
-                  <a:solidFill>
-                    <a:schemeClr val="bg1">
-                      <a:lumMod val="50000"/>
-                    </a:schemeClr>
-                  </a:solidFill>
-                </a:uFill>
-                <a:latin typeface="HG丸ｺﾞｼｯｸM-PRO" panose="020F0600000000000000" pitchFamily="50" charset="-128"/>
-                <a:ea typeface="HG丸ｺﾞｼｯｸM-PRO" panose="020F0600000000000000" pitchFamily="50" charset="-128"/>
-              </a:rPr>
-              <a:t>戦略の記述の容易化</a:t>
-            </a:r>
-            <a:endParaRPr lang="en-US" altLang="ja-JP" sz="1050" b="1" u="sng" dirty="0" smtClean="0">
-              <a:solidFill>
-                <a:srgbClr val="0000CC"/>
-              </a:solidFill>
-              <a:uFill>
-                <a:solidFill>
-                  <a:schemeClr val="bg1">
-                    <a:lumMod val="50000"/>
-                  </a:schemeClr>
-                </a:solidFill>
-              </a:uFill>
-              <a:latin typeface="HG丸ｺﾞｼｯｸM-PRO" panose="020F0600000000000000" pitchFamily="50" charset="-128"/>
-              <a:ea typeface="HG丸ｺﾞｼｯｸM-PRO" panose="020F0600000000000000" pitchFamily="50" charset="-128"/>
-            </a:endParaRPr>
-          </a:p>
-          <a:p>
-            <a:endParaRPr lang="en-US" altLang="ja-JP" sz="500" i="1" u="sng" dirty="0" smtClean="0">
-              <a:latin typeface="HG丸ｺﾞｼｯｸM-PRO" panose="020F0600000000000000" pitchFamily="50" charset="-128"/>
-              <a:ea typeface="HG丸ｺﾞｼｯｸM-PRO" panose="020F0600000000000000" pitchFamily="50" charset="-128"/>
-            </a:endParaRPr>
-          </a:p>
-          <a:p>
-            <a:pPr marL="180975"/>
-            <a:endParaRPr lang="ja-JP" altLang="en-US" sz="1050" b="1" dirty="0" smtClean="0">
-              <a:latin typeface="HG丸ｺﾞｼｯｸM-PRO" panose="020F0600000000000000" pitchFamily="50" charset="-128"/>
-              <a:ea typeface="HG丸ｺﾞｼｯｸM-PRO" panose="020F0600000000000000" pitchFamily="50" charset="-128"/>
-            </a:endParaRPr>
-          </a:p>
-        </p:txBody>
-      </p:sp>
     </p:spTree>
     <p:extLst>
       <p:ext uri="{BB962C8B-B14F-4D97-AF65-F5344CB8AC3E}">

</xml_diff>

<commit_message>
refs #180 Added How to calibrate of LightSensor.
</commit_message>
<xml_diff>
--- a/docs/design/Deliverable/cliffedge_No130_model2015.pptx
+++ b/docs/design/Deliverable/cliffedge_No130_model2015.pptx
@@ -142,431 +142,6 @@
 </p:cmAuthorLst>
 </file>
 
-<file path=ppt/charts/chart1.xml><?xml version="1.0" encoding="utf-8"?>
-<c:chartSpace xmlns:c="http://schemas.openxmlformats.org/drawingml/2006/chart" xmlns:a="http://schemas.openxmlformats.org/drawingml/2006/main" xmlns:r="http://schemas.openxmlformats.org/officeDocument/2006/relationships">
-  <c:date1904 val="0"/>
-  <c:lang val="ja-JP"/>
-  <c:roundedCorners val="0"/>
-  <mc:AlternateContent xmlns:mc="http://schemas.openxmlformats.org/markup-compatibility/2006">
-    <mc:Choice xmlns:c14="http://schemas.microsoft.com/office/drawing/2007/8/2/chart" Requires="c14">
-      <c14:style val="102"/>
-    </mc:Choice>
-    <mc:Fallback>
-      <c:style val="2"/>
-    </mc:Fallback>
-  </mc:AlternateContent>
-  <c:chart>
-    <c:autoTitleDeleted val="0"/>
-    <c:plotArea>
-      <c:layout/>
-      <c:scatterChart>
-        <c:scatterStyle val="lineMarker"/>
-        <c:varyColors val="0"/>
-        <c:ser>
-          <c:idx val="0"/>
-          <c:order val="0"/>
-          <c:tx>
-            <c:strRef>
-              <c:f>Sheet1!$D$1</c:f>
-              <c:strCache>
-                <c:ptCount val="1"/>
-                <c:pt idx="0">
-                  <c:v>強光</c:v>
-                </c:pt>
-              </c:strCache>
-            </c:strRef>
-          </c:tx>
-          <c:spPr>
-            <a:ln>
-              <a:solidFill>
-                <a:srgbClr val="FF0000"/>
-              </a:solidFill>
-            </a:ln>
-          </c:spPr>
-          <c:marker>
-            <c:symbol val="none"/>
-          </c:marker>
-          <c:xVal>
-            <c:numRef>
-              <c:f>Sheet1!$D$2:$D$12</c:f>
-              <c:numCache>
-                <c:formatCode>General</c:formatCode>
-                <c:ptCount val="11"/>
-                <c:pt idx="0">
-                  <c:v>481</c:v>
-                </c:pt>
-                <c:pt idx="1">
-                  <c:v>493</c:v>
-                </c:pt>
-                <c:pt idx="2">
-                  <c:v>516</c:v>
-                </c:pt>
-                <c:pt idx="3">
-                  <c:v>535</c:v>
-                </c:pt>
-                <c:pt idx="4">
-                  <c:v>553</c:v>
-                </c:pt>
-                <c:pt idx="5">
-                  <c:v>573</c:v>
-                </c:pt>
-                <c:pt idx="6">
-                  <c:v>600</c:v>
-                </c:pt>
-                <c:pt idx="7">
-                  <c:v>617</c:v>
-                </c:pt>
-                <c:pt idx="8">
-                  <c:v>647</c:v>
-                </c:pt>
-                <c:pt idx="9">
-                  <c:v>681</c:v>
-                </c:pt>
-                <c:pt idx="10">
-                  <c:v>703</c:v>
-                </c:pt>
-              </c:numCache>
-            </c:numRef>
-          </c:xVal>
-          <c:yVal>
-            <c:numRef>
-              <c:f>Sheet1!$A$2:$A$12</c:f>
-              <c:numCache>
-                <c:formatCode>General</c:formatCode>
-                <c:ptCount val="11"/>
-                <c:pt idx="0">
-                  <c:v>0</c:v>
-                </c:pt>
-                <c:pt idx="1">
-                  <c:v>10</c:v>
-                </c:pt>
-                <c:pt idx="2">
-                  <c:v>20</c:v>
-                </c:pt>
-                <c:pt idx="3">
-                  <c:v>30</c:v>
-                </c:pt>
-                <c:pt idx="4">
-                  <c:v>40</c:v>
-                </c:pt>
-                <c:pt idx="5">
-                  <c:v>50</c:v>
-                </c:pt>
-                <c:pt idx="6">
-                  <c:v>60</c:v>
-                </c:pt>
-                <c:pt idx="7">
-                  <c:v>70</c:v>
-                </c:pt>
-                <c:pt idx="8">
-                  <c:v>80</c:v>
-                </c:pt>
-                <c:pt idx="9">
-                  <c:v>90</c:v>
-                </c:pt>
-                <c:pt idx="10">
-                  <c:v>100</c:v>
-                </c:pt>
-              </c:numCache>
-            </c:numRef>
-          </c:yVal>
-          <c:smooth val="0"/>
-        </c:ser>
-        <c:ser>
-          <c:idx val="1"/>
-          <c:order val="1"/>
-          <c:tx>
-            <c:strRef>
-              <c:f>Sheet1!$B$1</c:f>
-              <c:strCache>
-                <c:ptCount val="1"/>
-                <c:pt idx="0">
-                  <c:v>暗黒</c:v>
-                </c:pt>
-              </c:strCache>
-            </c:strRef>
-          </c:tx>
-          <c:spPr>
-            <a:ln>
-              <a:solidFill>
-                <a:srgbClr val="0066FF"/>
-              </a:solidFill>
-            </a:ln>
-          </c:spPr>
-          <c:marker>
-            <c:symbol val="none"/>
-          </c:marker>
-          <c:xVal>
-            <c:numRef>
-              <c:f>Sheet1!$B$2:$B$12</c:f>
-              <c:numCache>
-                <c:formatCode>General</c:formatCode>
-                <c:ptCount val="11"/>
-                <c:pt idx="0">
-                  <c:v>433</c:v>
-                </c:pt>
-                <c:pt idx="1">
-                  <c:v>442</c:v>
-                </c:pt>
-                <c:pt idx="2">
-                  <c:v>463</c:v>
-                </c:pt>
-                <c:pt idx="3">
-                  <c:v>481</c:v>
-                </c:pt>
-                <c:pt idx="4">
-                  <c:v>499</c:v>
-                </c:pt>
-                <c:pt idx="5">
-                  <c:v>523</c:v>
-                </c:pt>
-                <c:pt idx="6">
-                  <c:v>551</c:v>
-                </c:pt>
-                <c:pt idx="7">
-                  <c:v>567</c:v>
-                </c:pt>
-                <c:pt idx="8">
-                  <c:v>594</c:v>
-                </c:pt>
-                <c:pt idx="9">
-                  <c:v>627</c:v>
-                </c:pt>
-                <c:pt idx="10">
-                  <c:v>652</c:v>
-                </c:pt>
-              </c:numCache>
-            </c:numRef>
-          </c:xVal>
-          <c:yVal>
-            <c:numRef>
-              <c:f>Sheet1!$A$2:$A$12</c:f>
-              <c:numCache>
-                <c:formatCode>General</c:formatCode>
-                <c:ptCount val="11"/>
-                <c:pt idx="0">
-                  <c:v>0</c:v>
-                </c:pt>
-                <c:pt idx="1">
-                  <c:v>10</c:v>
-                </c:pt>
-                <c:pt idx="2">
-                  <c:v>20</c:v>
-                </c:pt>
-                <c:pt idx="3">
-                  <c:v>30</c:v>
-                </c:pt>
-                <c:pt idx="4">
-                  <c:v>40</c:v>
-                </c:pt>
-                <c:pt idx="5">
-                  <c:v>50</c:v>
-                </c:pt>
-                <c:pt idx="6">
-                  <c:v>60</c:v>
-                </c:pt>
-                <c:pt idx="7">
-                  <c:v>70</c:v>
-                </c:pt>
-                <c:pt idx="8">
-                  <c:v>80</c:v>
-                </c:pt>
-                <c:pt idx="9">
-                  <c:v>90</c:v>
-                </c:pt>
-                <c:pt idx="10">
-                  <c:v>100</c:v>
-                </c:pt>
-              </c:numCache>
-            </c:numRef>
-          </c:yVal>
-          <c:smooth val="0"/>
-        </c:ser>
-        <c:ser>
-          <c:idx val="2"/>
-          <c:order val="2"/>
-          <c:tx>
-            <c:strRef>
-              <c:f>Sheet1!$C$1</c:f>
-              <c:strCache>
-                <c:ptCount val="1"/>
-                <c:pt idx="0">
-                  <c:v>室内</c:v>
-                </c:pt>
-              </c:strCache>
-            </c:strRef>
-          </c:tx>
-          <c:spPr>
-            <a:ln>
-              <a:solidFill>
-                <a:srgbClr val="FFCC00"/>
-              </a:solidFill>
-            </a:ln>
-          </c:spPr>
-          <c:marker>
-            <c:symbol val="none"/>
-          </c:marker>
-          <c:xVal>
-            <c:numRef>
-              <c:f>Sheet1!$C$2:$C$12</c:f>
-              <c:numCache>
-                <c:formatCode>General</c:formatCode>
-                <c:ptCount val="11"/>
-                <c:pt idx="0">
-                  <c:v>452</c:v>
-                </c:pt>
-                <c:pt idx="1">
-                  <c:v>465</c:v>
-                </c:pt>
-                <c:pt idx="2">
-                  <c:v>488</c:v>
-                </c:pt>
-                <c:pt idx="3">
-                  <c:v>510</c:v>
-                </c:pt>
-                <c:pt idx="4">
-                  <c:v>527</c:v>
-                </c:pt>
-                <c:pt idx="5">
-                  <c:v>545</c:v>
-                </c:pt>
-                <c:pt idx="6">
-                  <c:v>574</c:v>
-                </c:pt>
-                <c:pt idx="7">
-                  <c:v>592</c:v>
-                </c:pt>
-                <c:pt idx="8">
-                  <c:v>617</c:v>
-                </c:pt>
-                <c:pt idx="9">
-                  <c:v>652</c:v>
-                </c:pt>
-                <c:pt idx="10">
-                  <c:v>677</c:v>
-                </c:pt>
-              </c:numCache>
-            </c:numRef>
-          </c:xVal>
-          <c:yVal>
-            <c:numRef>
-              <c:f>Sheet1!$A$2:$A$12</c:f>
-              <c:numCache>
-                <c:formatCode>General</c:formatCode>
-                <c:ptCount val="11"/>
-                <c:pt idx="0">
-                  <c:v>0</c:v>
-                </c:pt>
-                <c:pt idx="1">
-                  <c:v>10</c:v>
-                </c:pt>
-                <c:pt idx="2">
-                  <c:v>20</c:v>
-                </c:pt>
-                <c:pt idx="3">
-                  <c:v>30</c:v>
-                </c:pt>
-                <c:pt idx="4">
-                  <c:v>40</c:v>
-                </c:pt>
-                <c:pt idx="5">
-                  <c:v>50</c:v>
-                </c:pt>
-                <c:pt idx="6">
-                  <c:v>60</c:v>
-                </c:pt>
-                <c:pt idx="7">
-                  <c:v>70</c:v>
-                </c:pt>
-                <c:pt idx="8">
-                  <c:v>80</c:v>
-                </c:pt>
-                <c:pt idx="9">
-                  <c:v>90</c:v>
-                </c:pt>
-                <c:pt idx="10">
-                  <c:v>100</c:v>
-                </c:pt>
-              </c:numCache>
-            </c:numRef>
-          </c:yVal>
-          <c:smooth val="0"/>
-        </c:ser>
-        <c:dLbls>
-          <c:showLegendKey val="0"/>
-          <c:showVal val="0"/>
-          <c:showCatName val="0"/>
-          <c:showSerName val="0"/>
-          <c:showPercent val="0"/>
-          <c:showBubbleSize val="0"/>
-        </c:dLbls>
-        <c:axId val="377720688"/>
-        <c:axId val="377721080"/>
-      </c:scatterChart>
-      <c:valAx>
-        <c:axId val="377720688"/>
-        <c:scaling>
-          <c:orientation val="minMax"/>
-          <c:max val="800"/>
-          <c:min val="400"/>
-        </c:scaling>
-        <c:delete val="0"/>
-        <c:axPos val="b"/>
-        <c:numFmt formatCode="General" sourceLinked="1"/>
-        <c:majorTickMark val="out"/>
-        <c:minorTickMark val="none"/>
-        <c:tickLblPos val="nextTo"/>
-        <c:txPr>
-          <a:bodyPr/>
-          <a:lstStyle/>
-          <a:p>
-            <a:pPr>
-              <a:defRPr sz="800" baseline="0"/>
-            </a:pPr>
-            <a:endParaRPr lang="ja-JP"/>
-          </a:p>
-        </c:txPr>
-        <c:crossAx val="377721080"/>
-        <c:crosses val="autoZero"/>
-        <c:crossBetween val="midCat"/>
-      </c:valAx>
-      <c:valAx>
-        <c:axId val="377721080"/>
-        <c:scaling>
-          <c:orientation val="minMax"/>
-        </c:scaling>
-        <c:delete val="0"/>
-        <c:axPos val="l"/>
-        <c:majorGridlines/>
-        <c:numFmt formatCode="General" sourceLinked="1"/>
-        <c:majorTickMark val="out"/>
-        <c:minorTickMark val="none"/>
-        <c:tickLblPos val="nextTo"/>
-        <c:txPr>
-          <a:bodyPr/>
-          <a:lstStyle/>
-          <a:p>
-            <a:pPr>
-              <a:defRPr sz="800" baseline="0"/>
-            </a:pPr>
-            <a:endParaRPr lang="ja-JP"/>
-          </a:p>
-        </c:txPr>
-        <c:crossAx val="377720688"/>
-        <c:crosses val="autoZero"/>
-        <c:crossBetween val="midCat"/>
-      </c:valAx>
-    </c:plotArea>
-    <c:plotVisOnly val="1"/>
-    <c:dispBlanksAs val="gap"/>
-    <c:showDLblsOverMax val="0"/>
-  </c:chart>
-  <c:externalData r:id="rId1">
-    <c:autoUpdate val="0"/>
-  </c:externalData>
-</c:chartSpace>
-</file>
-
 <file path=ppt/comments/comment1.xml><?xml version="1.0" encoding="utf-8"?>
 <p:cmLst xmlns:a="http://schemas.openxmlformats.org/drawingml/2006/main" xmlns:r="http://schemas.openxmlformats.org/officeDocument/2006/relationships" xmlns:p="http://schemas.openxmlformats.org/presentationml/2006/main">
   <p:cm authorId="1" dt="2015-07-15T11:58:35.852" idx="1">
@@ -705,15 +280,6 @@
   <p:cm authorId="1" dt="2015-07-16T19:29:50.375" idx="11">
     <p:pos x="1626" y="1436"/>
     <p:text>ここのデータを取り直したい。</p:text>
-    <p:extLst>
-      <p:ext uri="{C676402C-5697-4E1C-873F-D02D1690AC5C}">
-        <p15:threadingInfo xmlns:p15="http://schemas.microsoft.com/office/powerpoint/2012/main" timeZoneBias="-540"/>
-      </p:ext>
-    </p:extLst>
-  </p:cm>
-  <p:cm authorId="1" dt="2015-07-16T19:30:11.909" idx="13">
-    <p:pos x="6494" y="621"/>
-    <p:text>これも取り直そう</p:text>
     <p:extLst>
       <p:ext uri="{C676402C-5697-4E1C-873F-D02D1690AC5C}">
         <p15:threadingInfo xmlns:p15="http://schemas.microsoft.com/office/powerpoint/2012/main" timeZoneBias="-540"/>
@@ -12667,14 +12233,7 @@
                   <a:latin typeface="HG丸ｺﾞｼｯｸM-PRO" panose="020F0600000000000000" pitchFamily="50" charset="-128"/>
                   <a:ea typeface="HG丸ｺﾞｼｯｸM-PRO" panose="020F0600000000000000" pitchFamily="50" charset="-128"/>
                 </a:rPr>
-                <a:t> </a:t>
-              </a:r>
-              <a:r>
-                <a:rPr lang="ja-JP" altLang="en-US" sz="1400" smtClean="0">
-                  <a:latin typeface="HG丸ｺﾞｼｯｸM-PRO" panose="020F0600000000000000" pitchFamily="50" charset="-128"/>
-                  <a:ea typeface="HG丸ｺﾞｼｯｸM-PRO" panose="020F0600000000000000" pitchFamily="50" charset="-128"/>
-                </a:rPr>
-                <a:t>状態設計</a:t>
+                <a:t> 状態設計</a:t>
               </a:r>
               <a:r>
                 <a:rPr lang="ja-JP" altLang="en-US" sz="1400" dirty="0" smtClean="0">
@@ -18000,9 +17559,9 @@
         <p:grpSpPr>
           <a:xfrm>
             <a:off x="5026671" y="546376"/>
-            <a:ext cx="3202931" cy="289332"/>
+            <a:ext cx="4025379" cy="473954"/>
             <a:chOff x="108961" y="835133"/>
-            <a:chExt cx="705349" cy="289332"/>
+            <a:chExt cx="705349" cy="473954"/>
           </a:xfrm>
         </p:grpSpPr>
         <p:sp>
@@ -18062,7 +17621,7 @@
           <p:spPr>
             <a:xfrm>
               <a:off x="113109" y="878200"/>
-              <a:ext cx="686862" cy="215444"/>
+              <a:ext cx="686862" cy="430887"/>
             </a:xfrm>
             <a:prstGeom prst="rect">
               <a:avLst/>
@@ -18097,18 +17656,32 @@
                 <a:t> </a:t>
               </a:r>
               <a:r>
-                <a:rPr lang="en-US" altLang="ja-JP" sz="1400" dirty="0" smtClean="0">
+                <a:rPr lang="en-US" altLang="ja-JP" sz="1400" smtClean="0">
                   <a:latin typeface="HG丸ｺﾞｼｯｸM-PRO" panose="020F0600000000000000" pitchFamily="50" charset="-128"/>
                   <a:ea typeface="HG丸ｺﾞｼｯｸM-PRO" panose="020F0600000000000000" pitchFamily="50" charset="-128"/>
                 </a:rPr>
                 <a:t>3</a:t>
               </a:r>
               <a:r>
-                <a:rPr lang="ja-JP" altLang="en-US" sz="1400" dirty="0" smtClean="0">
+                <a:rPr lang="ja-JP" altLang="en-US" sz="1400" smtClean="0">
                   <a:latin typeface="HG丸ｺﾞｼｯｸM-PRO" panose="020F0600000000000000" pitchFamily="50" charset="-128"/>
                   <a:ea typeface="HG丸ｺﾞｼｯｸM-PRO" panose="020F0600000000000000" pitchFamily="50" charset="-128"/>
                 </a:rPr>
-                <a:t> 光センサのキャリブレーション</a:t>
+                <a:t> </a:t>
+              </a:r>
+              <a:r>
+                <a:rPr lang="ja-JP" altLang="en-US" sz="1400" smtClean="0">
+                  <a:latin typeface="HG丸ｺﾞｼｯｸM-PRO" panose="020F0600000000000000" pitchFamily="50" charset="-128"/>
+                  <a:ea typeface="HG丸ｺﾞｼｯｸM-PRO" panose="020F0600000000000000" pitchFamily="50" charset="-128"/>
+                </a:rPr>
+                <a:t>最適な</a:t>
+              </a:r>
+              <a:r>
+                <a:rPr lang="ja-JP" altLang="en-US" sz="1400" smtClean="0">
+                  <a:latin typeface="HG丸ｺﾞｼｯｸM-PRO" panose="020F0600000000000000" pitchFamily="50" charset="-128"/>
+                  <a:ea typeface="HG丸ｺﾞｼｯｸM-PRO" panose="020F0600000000000000" pitchFamily="50" charset="-128"/>
+                </a:rPr>
+                <a:t>スタート位置を競技者に知らせる</a:t>
               </a:r>
               <a:endParaRPr kumimoji="1" lang="ja-JP" altLang="en-US" sz="1400" dirty="0">
                 <a:latin typeface="HG丸ｺﾞｼｯｸM-PRO" panose="020F0600000000000000" pitchFamily="50" charset="-128"/>
@@ -18153,126 +17726,6 @@
           </a:fontRef>
         </p:style>
       </p:cxnSp>
-      <p:sp>
-        <p:nvSpPr>
-          <p:cNvPr id="161" name="テキスト ボックス 160"/>
-          <p:cNvSpPr txBox="1"/>
-          <p:nvPr/>
-        </p:nvSpPr>
-        <p:spPr>
-          <a:xfrm>
-            <a:off x="5125535" y="1180067"/>
-            <a:ext cx="3694108" cy="577069"/>
-          </a:xfrm>
-          <a:prstGeom prst="rect">
-            <a:avLst/>
-          </a:prstGeom>
-          <a:noFill/>
-        </p:spPr>
-        <p:txBody>
-          <a:bodyPr wrap="square" lIns="91428" tIns="45714" rIns="91428" bIns="45714" rtlCol="0">
-            <a:spAutoFit/>
-          </a:bodyPr>
-          <a:lstStyle/>
-          <a:p>
-            <a:r>
-              <a:rPr lang="ja-JP" altLang="en-US" sz="1050" dirty="0" smtClean="0">
-                <a:latin typeface="HG丸ｺﾞｼｯｸM-PRO" panose="020F0600000000000000" pitchFamily="50" charset="-128"/>
-                <a:ea typeface="HG丸ｺﾞｼｯｸM-PRO" panose="020F0600000000000000" pitchFamily="50" charset="-128"/>
-              </a:rPr>
-              <a:t>光センサの入力</a:t>
-            </a:r>
-            <a:r>
-              <a:rPr lang="en-US" altLang="ja-JP" sz="1050" dirty="0" smtClean="0">
-                <a:latin typeface="HG丸ｺﾞｼｯｸM-PRO" panose="020F0600000000000000" pitchFamily="50" charset="-128"/>
-                <a:ea typeface="HG丸ｺﾞｼｯｸM-PRO" panose="020F0600000000000000" pitchFamily="50" charset="-128"/>
-              </a:rPr>
-              <a:t>-</a:t>
-            </a:r>
-            <a:r>
-              <a:rPr lang="ja-JP" altLang="en-US" sz="1050" dirty="0" smtClean="0">
-                <a:latin typeface="HG丸ｺﾞｼｯｸM-PRO" panose="020F0600000000000000" pitchFamily="50" charset="-128"/>
-                <a:ea typeface="HG丸ｺﾞｼｯｸM-PRO" panose="020F0600000000000000" pitchFamily="50" charset="-128"/>
-              </a:rPr>
-              <a:t>出力の非線形性および個体差を補正す</a:t>
-            </a:r>
-            <a:r>
-              <a:rPr lang="ja-JP" altLang="en-US" sz="1050" dirty="0">
-                <a:latin typeface="HG丸ｺﾞｼｯｸM-PRO" panose="020F0600000000000000" pitchFamily="50" charset="-128"/>
-                <a:ea typeface="HG丸ｺﾞｼｯｸM-PRO" panose="020F0600000000000000" pitchFamily="50" charset="-128"/>
-              </a:rPr>
-              <a:t>るため</a:t>
-            </a:r>
-            <a:r>
-              <a:rPr lang="ja-JP" altLang="en-US" sz="1050" dirty="0" smtClean="0">
-                <a:latin typeface="HG丸ｺﾞｼｯｸM-PRO" panose="020F0600000000000000" pitchFamily="50" charset="-128"/>
-                <a:ea typeface="HG丸ｺﾞｼｯｸM-PRO" panose="020F0600000000000000" pitchFamily="50" charset="-128"/>
-              </a:rPr>
-              <a:t>に、黒色の濃度 </a:t>
-            </a:r>
-            <a:r>
-              <a:rPr lang="en-US" altLang="ja-JP" sz="1050" dirty="0" smtClean="0">
-                <a:latin typeface="HG丸ｺﾞｼｯｸM-PRO" panose="020F0600000000000000" pitchFamily="50" charset="-128"/>
-                <a:ea typeface="HG丸ｺﾞｼｯｸM-PRO" panose="020F0600000000000000" pitchFamily="50" charset="-128"/>
-              </a:rPr>
-              <a:t>0</a:t>
-            </a:r>
-            <a:r>
-              <a:rPr lang="ja-JP" altLang="en-US" sz="1050" dirty="0" smtClean="0">
-                <a:latin typeface="HG丸ｺﾞｼｯｸM-PRO" panose="020F0600000000000000" pitchFamily="50" charset="-128"/>
-                <a:ea typeface="HG丸ｺﾞｼｯｸM-PRO" panose="020F0600000000000000" pitchFamily="50" charset="-128"/>
-              </a:rPr>
-              <a:t> </a:t>
-            </a:r>
-            <a:r>
-              <a:rPr lang="ja-JP" altLang="en-US" sz="1050" dirty="0">
-                <a:latin typeface="HG丸ｺﾞｼｯｸM-PRO" panose="020F0600000000000000" pitchFamily="50" charset="-128"/>
-                <a:ea typeface="HG丸ｺﾞｼｯｸM-PRO" panose="020F0600000000000000" pitchFamily="50" charset="-128"/>
-              </a:rPr>
-              <a:t>から</a:t>
-            </a:r>
-            <a:r>
-              <a:rPr lang="en-US" altLang="ja-JP" sz="1050" dirty="0" smtClean="0">
-                <a:latin typeface="HG丸ｺﾞｼｯｸM-PRO" panose="020F0600000000000000" pitchFamily="50" charset="-128"/>
-                <a:ea typeface="HG丸ｺﾞｼｯｸM-PRO" panose="020F0600000000000000" pitchFamily="50" charset="-128"/>
-              </a:rPr>
-              <a:t>100</a:t>
-            </a:r>
-            <a:r>
-              <a:rPr lang="ja-JP" altLang="en-US" sz="1050" dirty="0" smtClean="0">
-                <a:latin typeface="HG丸ｺﾞｼｯｸM-PRO" panose="020F0600000000000000" pitchFamily="50" charset="-128"/>
-                <a:ea typeface="HG丸ｺﾞｼｯｸM-PRO" panose="020F0600000000000000" pitchFamily="50" charset="-128"/>
-              </a:rPr>
-              <a:t> </a:t>
-            </a:r>
-            <a:r>
-              <a:rPr lang="en-US" altLang="ja-JP" sz="1050" dirty="0" smtClean="0">
-                <a:latin typeface="HG丸ｺﾞｼｯｸM-PRO" panose="020F0600000000000000" pitchFamily="50" charset="-128"/>
-                <a:ea typeface="HG丸ｺﾞｼｯｸM-PRO" panose="020F0600000000000000" pitchFamily="50" charset="-128"/>
-              </a:rPr>
-              <a:t>%</a:t>
-            </a:r>
-            <a:r>
-              <a:rPr lang="ja-JP" altLang="en-US" sz="1050" dirty="0">
-                <a:latin typeface="HG丸ｺﾞｼｯｸM-PRO" panose="020F0600000000000000" pitchFamily="50" charset="-128"/>
-                <a:ea typeface="HG丸ｺﾞｼｯｸM-PRO" panose="020F0600000000000000" pitchFamily="50" charset="-128"/>
-              </a:rPr>
-              <a:t>の</a:t>
-            </a:r>
-            <a:r>
-              <a:rPr lang="ja-JP" altLang="en-US" sz="1050" dirty="0" smtClean="0">
-                <a:latin typeface="HG丸ｺﾞｼｯｸM-PRO" panose="020F0600000000000000" pitchFamily="50" charset="-128"/>
-                <a:ea typeface="HG丸ｺﾞｼｯｸM-PRO" panose="020F0600000000000000" pitchFamily="50" charset="-128"/>
-              </a:rPr>
-              <a:t>カラーチャートを作成し、補正を行った。 </a:t>
-            </a:r>
-            <a:endParaRPr lang="ja-JP" altLang="en-US" sz="1050" dirty="0">
-              <a:latin typeface="HG丸ｺﾞｼｯｸM-PRO" panose="020F0600000000000000" pitchFamily="50" charset="-128"/>
-              <a:ea typeface="HG丸ｺﾞｼｯｸM-PRO" panose="020F0600000000000000" pitchFamily="50" charset="-128"/>
-            </a:endParaRPr>
-          </a:p>
-        </p:txBody>
-      </p:sp>
       <p:grpSp>
         <p:nvGrpSpPr>
           <p:cNvPr id="3080" name="グループ化 3079"/>
@@ -20169,1073 +19622,6 @@
           </a:p>
         </p:txBody>
       </p:sp>
-      <p:graphicFrame>
-        <p:nvGraphicFramePr>
-          <p:cNvPr id="200" name="グラフ 199"/>
-          <p:cNvGraphicFramePr>
-            <a:graphicFrameLocks/>
-          </p:cNvGraphicFramePr>
-          <p:nvPr>
-            <p:extLst>
-              <p:ext uri="{D42A27DB-BD31-4B8C-83A1-F6EECF244321}">
-                <p14:modId xmlns:p14="http://schemas.microsoft.com/office/powerpoint/2010/main" val="3237237178"/>
-              </p:ext>
-            </p:extLst>
-          </p:nvPr>
-        </p:nvGraphicFramePr>
-        <p:xfrm>
-          <a:off x="9029892" y="935890"/>
-          <a:ext cx="3555014" cy="2452889"/>
-        </p:xfrm>
-        <a:graphic>
-          <a:graphicData uri="http://schemas.openxmlformats.org/drawingml/2006/chart">
-            <c:chart xmlns:c="http://schemas.openxmlformats.org/drawingml/2006/chart" xmlns:r="http://schemas.openxmlformats.org/officeDocument/2006/relationships" r:id="rId3"/>
-          </a:graphicData>
-        </a:graphic>
-      </p:graphicFrame>
-      <p:grpSp>
-        <p:nvGrpSpPr>
-          <p:cNvPr id="3085" name="グループ化 3084"/>
-          <p:cNvGrpSpPr/>
-          <p:nvPr/>
-        </p:nvGrpSpPr>
-        <p:grpSpPr>
-          <a:xfrm>
-            <a:off x="11716839" y="1461524"/>
-            <a:ext cx="577024" cy="552739"/>
-            <a:chOff x="9094918" y="1780311"/>
-            <a:chExt cx="577024" cy="552739"/>
-          </a:xfrm>
-        </p:grpSpPr>
-        <p:sp>
-          <p:nvSpPr>
-            <p:cNvPr id="3084" name="正方形/長方形 3083"/>
-            <p:cNvSpPr/>
-            <p:nvPr/>
-          </p:nvSpPr>
-          <p:spPr>
-            <a:xfrm>
-              <a:off x="9094918" y="1780311"/>
-              <a:ext cx="540470" cy="552739"/>
-            </a:xfrm>
-            <a:prstGeom prst="rect">
-              <a:avLst/>
-            </a:prstGeom>
-            <a:solidFill>
-              <a:schemeClr val="bg1"/>
-            </a:solidFill>
-            <a:ln w="6350">
-              <a:solidFill>
-                <a:schemeClr val="tx1"/>
-              </a:solidFill>
-            </a:ln>
-            <a:effectLst/>
-          </p:spPr>
-          <p:style>
-            <a:lnRef idx="1">
-              <a:schemeClr val="accent6"/>
-            </a:lnRef>
-            <a:fillRef idx="2">
-              <a:schemeClr val="accent6"/>
-            </a:fillRef>
-            <a:effectRef idx="1">
-              <a:schemeClr val="accent6"/>
-            </a:effectRef>
-            <a:fontRef idx="minor">
-              <a:schemeClr val="dk1"/>
-            </a:fontRef>
-          </p:style>
-          <p:txBody>
-            <a:bodyPr lIns="91428" tIns="45714" rIns="91428" bIns="45714" rtlCol="0" anchor="ctr"/>
-            <a:lstStyle/>
-            <a:p>
-              <a:pPr algn="ctr"/>
-              <a:endParaRPr kumimoji="1" lang="ja-JP" altLang="en-US" sz="2400" dirty="0">
-                <a:latin typeface="HG丸ｺﾞｼｯｸM-PRO" panose="020F0600000000000000" pitchFamily="50" charset="-128"/>
-                <a:ea typeface="HG丸ｺﾞｼｯｸM-PRO" panose="020F0600000000000000" pitchFamily="50" charset="-128"/>
-              </a:endParaRPr>
-            </a:p>
-          </p:txBody>
-        </p:sp>
-        <p:cxnSp>
-          <p:nvCxnSpPr>
-            <p:cNvPr id="201" name="直線コネクタ 200"/>
-            <p:cNvCxnSpPr/>
-            <p:nvPr/>
-          </p:nvCxnSpPr>
-          <p:spPr>
-            <a:xfrm>
-              <a:off x="9126722" y="1888033"/>
-              <a:ext cx="180000" cy="0"/>
-            </a:xfrm>
-            <a:prstGeom prst="line">
-              <a:avLst/>
-            </a:prstGeom>
-            <a:ln w="28575">
-              <a:solidFill>
-                <a:srgbClr val="0066FF"/>
-              </a:solidFill>
-            </a:ln>
-          </p:spPr>
-          <p:style>
-            <a:lnRef idx="1">
-              <a:schemeClr val="accent1"/>
-            </a:lnRef>
-            <a:fillRef idx="0">
-              <a:schemeClr val="accent1"/>
-            </a:fillRef>
-            <a:effectRef idx="0">
-              <a:schemeClr val="accent1"/>
-            </a:effectRef>
-            <a:fontRef idx="minor">
-              <a:schemeClr val="tx1"/>
-            </a:fontRef>
-          </p:style>
-        </p:cxnSp>
-        <p:cxnSp>
-          <p:nvCxnSpPr>
-            <p:cNvPr id="202" name="直線コネクタ 201"/>
-            <p:cNvCxnSpPr/>
-            <p:nvPr/>
-          </p:nvCxnSpPr>
-          <p:spPr>
-            <a:xfrm>
-              <a:off x="9131131" y="2049059"/>
-              <a:ext cx="180000" cy="0"/>
-            </a:xfrm>
-            <a:prstGeom prst="line">
-              <a:avLst/>
-            </a:prstGeom>
-            <a:ln w="28575">
-              <a:solidFill>
-                <a:srgbClr val="FFCC00"/>
-              </a:solidFill>
-            </a:ln>
-          </p:spPr>
-          <p:style>
-            <a:lnRef idx="1">
-              <a:schemeClr val="accent1"/>
-            </a:lnRef>
-            <a:fillRef idx="0">
-              <a:schemeClr val="accent1"/>
-            </a:fillRef>
-            <a:effectRef idx="0">
-              <a:schemeClr val="accent1"/>
-            </a:effectRef>
-            <a:fontRef idx="minor">
-              <a:schemeClr val="tx1"/>
-            </a:fontRef>
-          </p:style>
-        </p:cxnSp>
-        <p:cxnSp>
-          <p:nvCxnSpPr>
-            <p:cNvPr id="203" name="直線コネクタ 202"/>
-            <p:cNvCxnSpPr/>
-            <p:nvPr/>
-          </p:nvCxnSpPr>
-          <p:spPr>
-            <a:xfrm>
-              <a:off x="9126723" y="2217377"/>
-              <a:ext cx="180000" cy="0"/>
-            </a:xfrm>
-            <a:prstGeom prst="line">
-              <a:avLst/>
-            </a:prstGeom>
-            <a:ln w="28575">
-              <a:solidFill>
-                <a:srgbClr val="FF0000"/>
-              </a:solidFill>
-            </a:ln>
-          </p:spPr>
-          <p:style>
-            <a:lnRef idx="1">
-              <a:schemeClr val="accent1"/>
-            </a:lnRef>
-            <a:fillRef idx="0">
-              <a:schemeClr val="accent1"/>
-            </a:fillRef>
-            <a:effectRef idx="0">
-              <a:schemeClr val="accent1"/>
-            </a:effectRef>
-            <a:fontRef idx="minor">
-              <a:schemeClr val="tx1"/>
-            </a:fontRef>
-          </p:style>
-        </p:cxnSp>
-        <p:sp>
-          <p:nvSpPr>
-            <p:cNvPr id="204" name="テキスト ボックス 203"/>
-            <p:cNvSpPr txBox="1"/>
-            <p:nvPr/>
-          </p:nvSpPr>
-          <p:spPr>
-            <a:xfrm>
-              <a:off x="9281751" y="1941337"/>
-              <a:ext cx="389850" cy="215444"/>
-            </a:xfrm>
-            <a:prstGeom prst="rect">
-              <a:avLst/>
-            </a:prstGeom>
-            <a:noFill/>
-          </p:spPr>
-          <p:txBody>
-            <a:bodyPr wrap="none" rtlCol="0">
-              <a:spAutoFit/>
-            </a:bodyPr>
-            <a:lstStyle/>
-            <a:p>
-              <a:r>
-                <a:rPr lang="ja-JP" altLang="en-US" sz="800" dirty="0">
-                  <a:latin typeface="HG丸ｺﾞｼｯｸM-PRO" panose="020F0600000000000000" pitchFamily="50" charset="-128"/>
-                  <a:ea typeface="HG丸ｺﾞｼｯｸM-PRO" panose="020F0600000000000000" pitchFamily="50" charset="-128"/>
-                </a:rPr>
-                <a:t>室内</a:t>
-              </a:r>
-              <a:endParaRPr kumimoji="1" lang="ja-JP" altLang="en-US" sz="800" dirty="0">
-                <a:latin typeface="HG丸ｺﾞｼｯｸM-PRO" panose="020F0600000000000000" pitchFamily="50" charset="-128"/>
-                <a:ea typeface="HG丸ｺﾞｼｯｸM-PRO" panose="020F0600000000000000" pitchFamily="50" charset="-128"/>
-              </a:endParaRPr>
-            </a:p>
-          </p:txBody>
-        </p:sp>
-        <p:sp>
-          <p:nvSpPr>
-            <p:cNvPr id="205" name="テキスト ボックス 204"/>
-            <p:cNvSpPr txBox="1"/>
-            <p:nvPr/>
-          </p:nvSpPr>
-          <p:spPr>
-            <a:xfrm>
-              <a:off x="9282092" y="1780311"/>
-              <a:ext cx="389850" cy="215444"/>
-            </a:xfrm>
-            <a:prstGeom prst="rect">
-              <a:avLst/>
-            </a:prstGeom>
-            <a:noFill/>
-          </p:spPr>
-          <p:txBody>
-            <a:bodyPr wrap="none" rtlCol="0">
-              <a:spAutoFit/>
-            </a:bodyPr>
-            <a:lstStyle/>
-            <a:p>
-              <a:r>
-                <a:rPr lang="ja-JP" altLang="en-US" sz="800" dirty="0" smtClean="0">
-                  <a:latin typeface="HG丸ｺﾞｼｯｸM-PRO" panose="020F0600000000000000" pitchFamily="50" charset="-128"/>
-                  <a:ea typeface="HG丸ｺﾞｼｯｸM-PRO" panose="020F0600000000000000" pitchFamily="50" charset="-128"/>
-                </a:rPr>
-                <a:t>暗黒</a:t>
-              </a:r>
-              <a:endParaRPr kumimoji="1" lang="ja-JP" altLang="en-US" sz="800" dirty="0">
-                <a:latin typeface="HG丸ｺﾞｼｯｸM-PRO" panose="020F0600000000000000" pitchFamily="50" charset="-128"/>
-                <a:ea typeface="HG丸ｺﾞｼｯｸM-PRO" panose="020F0600000000000000" pitchFamily="50" charset="-128"/>
-              </a:endParaRPr>
-            </a:p>
-          </p:txBody>
-        </p:sp>
-        <p:sp>
-          <p:nvSpPr>
-            <p:cNvPr id="206" name="テキスト ボックス 205"/>
-            <p:cNvSpPr txBox="1"/>
-            <p:nvPr/>
-          </p:nvSpPr>
-          <p:spPr>
-            <a:xfrm>
-              <a:off x="9277342" y="2117606"/>
-              <a:ext cx="389850" cy="215444"/>
-            </a:xfrm>
-            <a:prstGeom prst="rect">
-              <a:avLst/>
-            </a:prstGeom>
-            <a:noFill/>
-          </p:spPr>
-          <p:txBody>
-            <a:bodyPr wrap="none" rtlCol="0">
-              <a:spAutoFit/>
-            </a:bodyPr>
-            <a:lstStyle/>
-            <a:p>
-              <a:r>
-                <a:rPr kumimoji="1" lang="ja-JP" altLang="en-US" sz="800" dirty="0" smtClean="0">
-                  <a:latin typeface="HG丸ｺﾞｼｯｸM-PRO" panose="020F0600000000000000" pitchFamily="50" charset="-128"/>
-                  <a:ea typeface="HG丸ｺﾞｼｯｸM-PRO" panose="020F0600000000000000" pitchFamily="50" charset="-128"/>
-                </a:rPr>
-                <a:t>強光</a:t>
-              </a:r>
-              <a:endParaRPr kumimoji="1" lang="ja-JP" altLang="en-US" sz="800" dirty="0">
-                <a:latin typeface="HG丸ｺﾞｼｯｸM-PRO" panose="020F0600000000000000" pitchFamily="50" charset="-128"/>
-                <a:ea typeface="HG丸ｺﾞｼｯｸM-PRO" panose="020F0600000000000000" pitchFamily="50" charset="-128"/>
-              </a:endParaRPr>
-            </a:p>
-          </p:txBody>
-        </p:sp>
-      </p:grpSp>
-      <p:sp>
-        <p:nvSpPr>
-          <p:cNvPr id="3086" name="正方形/長方形 3085"/>
-          <p:cNvSpPr/>
-          <p:nvPr/>
-        </p:nvSpPr>
-        <p:spPr>
-          <a:xfrm>
-            <a:off x="8892795" y="937681"/>
-            <a:ext cx="3651250" cy="2583513"/>
-          </a:xfrm>
-          <a:prstGeom prst="rect">
-            <a:avLst/>
-          </a:prstGeom>
-          <a:noFill/>
-          <a:ln w="9525">
-            <a:solidFill>
-              <a:schemeClr val="tx1"/>
-            </a:solidFill>
-          </a:ln>
-          <a:effectLst/>
-        </p:spPr>
-        <p:style>
-          <a:lnRef idx="1">
-            <a:schemeClr val="accent6"/>
-          </a:lnRef>
-          <a:fillRef idx="2">
-            <a:schemeClr val="accent6"/>
-          </a:fillRef>
-          <a:effectRef idx="1">
-            <a:schemeClr val="accent6"/>
-          </a:effectRef>
-          <a:fontRef idx="minor">
-            <a:schemeClr val="dk1"/>
-          </a:fontRef>
-        </p:style>
-        <p:txBody>
-          <a:bodyPr lIns="91428" tIns="45714" rIns="91428" bIns="45714" rtlCol="0" anchor="ctr"/>
-          <a:lstStyle/>
-          <a:p>
-            <a:pPr algn="ctr"/>
-            <a:endParaRPr kumimoji="1" lang="ja-JP" altLang="en-US" sz="2400" dirty="0">
-              <a:latin typeface="HG丸ｺﾞｼｯｸM-PRO" panose="020F0600000000000000" pitchFamily="50" charset="-128"/>
-              <a:ea typeface="HG丸ｺﾞｼｯｸM-PRO" panose="020F0600000000000000" pitchFamily="50" charset="-128"/>
-            </a:endParaRPr>
-          </a:p>
-        </p:txBody>
-      </p:sp>
-      <p:sp>
-        <p:nvSpPr>
-          <p:cNvPr id="210" name="テキスト ボックス 209"/>
-          <p:cNvSpPr txBox="1"/>
-          <p:nvPr/>
-        </p:nvSpPr>
-        <p:spPr>
-          <a:xfrm rot="16200000">
-            <a:off x="8366485" y="1779874"/>
-            <a:ext cx="1382110" cy="215444"/>
-          </a:xfrm>
-          <a:prstGeom prst="rect">
-            <a:avLst/>
-          </a:prstGeom>
-          <a:noFill/>
-        </p:spPr>
-        <p:txBody>
-          <a:bodyPr wrap="none" rtlCol="0">
-            <a:spAutoFit/>
-          </a:bodyPr>
-          <a:lstStyle/>
-          <a:p>
-            <a:r>
-              <a:rPr kumimoji="1" lang="ja-JP" altLang="en-US" sz="800" dirty="0" smtClean="0">
-                <a:latin typeface="HG丸ｺﾞｼｯｸM-PRO" panose="020F0600000000000000" pitchFamily="50" charset="-128"/>
-                <a:ea typeface="HG丸ｺﾞｼｯｸM-PRO" panose="020F0600000000000000" pitchFamily="50" charset="-128"/>
-              </a:rPr>
-              <a:t>カラーチャートの濃度</a:t>
-            </a:r>
-            <a:r>
-              <a:rPr kumimoji="1" lang="en-US" altLang="ja-JP" sz="800" dirty="0" smtClean="0">
-                <a:latin typeface="HG丸ｺﾞｼｯｸM-PRO" panose="020F0600000000000000" pitchFamily="50" charset="-128"/>
-                <a:ea typeface="HG丸ｺﾞｼｯｸM-PRO" panose="020F0600000000000000" pitchFamily="50" charset="-128"/>
-              </a:rPr>
-              <a:t>(%)</a:t>
-            </a:r>
-            <a:endParaRPr kumimoji="1" lang="ja-JP" altLang="en-US" sz="800" dirty="0">
-              <a:latin typeface="HG丸ｺﾞｼｯｸM-PRO" panose="020F0600000000000000" pitchFamily="50" charset="-128"/>
-              <a:ea typeface="HG丸ｺﾞｼｯｸM-PRO" panose="020F0600000000000000" pitchFamily="50" charset="-128"/>
-            </a:endParaRPr>
-          </a:p>
-        </p:txBody>
-      </p:sp>
-      <p:sp>
-        <p:nvSpPr>
-          <p:cNvPr id="211" name="テキスト ボックス 210"/>
-          <p:cNvSpPr txBox="1"/>
-          <p:nvPr/>
-        </p:nvSpPr>
-        <p:spPr>
-          <a:xfrm>
-            <a:off x="9797335" y="1162080"/>
-            <a:ext cx="1149921" cy="349702"/>
-          </a:xfrm>
-          <a:prstGeom prst="rect">
-            <a:avLst/>
-          </a:prstGeom>
-          <a:solidFill>
-            <a:schemeClr val="tx2">
-              <a:lumMod val="20000"/>
-              <a:lumOff val="80000"/>
-            </a:schemeClr>
-          </a:solidFill>
-        </p:spPr>
-        <p:txBody>
-          <a:bodyPr wrap="none" lIns="36000" tIns="36000" rIns="36000" bIns="36000" rtlCol="0">
-            <a:spAutoFit/>
-          </a:bodyPr>
-          <a:lstStyle/>
-          <a:p>
-            <a:r>
-              <a:rPr kumimoji="1" lang="en-US" altLang="ja-JP" sz="600" dirty="0" smtClean="0">
-                <a:latin typeface="HG丸ｺﾞｼｯｸM-PRO" panose="020F0600000000000000" pitchFamily="50" charset="-128"/>
-                <a:ea typeface="HG丸ｺﾞｼｯｸM-PRO" panose="020F0600000000000000" pitchFamily="50" charset="-128"/>
-              </a:rPr>
-              <a:t>40</a:t>
-            </a:r>
-            <a:r>
-              <a:rPr kumimoji="1" lang="ja-JP" altLang="en-US" sz="600" dirty="0" smtClean="0">
-                <a:latin typeface="HG丸ｺﾞｼｯｸM-PRO" panose="020F0600000000000000" pitchFamily="50" charset="-128"/>
-                <a:ea typeface="HG丸ｺﾞｼｯｸM-PRO" panose="020F0600000000000000" pitchFamily="50" charset="-128"/>
-              </a:rPr>
-              <a:t>～</a:t>
-            </a:r>
-            <a:r>
-              <a:rPr kumimoji="1" lang="en-US" altLang="ja-JP" sz="600" dirty="0" smtClean="0">
-                <a:latin typeface="HG丸ｺﾞｼｯｸM-PRO" panose="020F0600000000000000" pitchFamily="50" charset="-128"/>
-                <a:ea typeface="HG丸ｺﾞｼｯｸM-PRO" panose="020F0600000000000000" pitchFamily="50" charset="-128"/>
-              </a:rPr>
-              <a:t>60%</a:t>
-            </a:r>
-            <a:r>
-              <a:rPr kumimoji="1" lang="ja-JP" altLang="en-US" sz="600" dirty="0" smtClean="0">
-                <a:latin typeface="HG丸ｺﾞｼｯｸM-PRO" panose="020F0600000000000000" pitchFamily="50" charset="-128"/>
-                <a:ea typeface="HG丸ｺﾞｼｯｸM-PRO" panose="020F0600000000000000" pitchFamily="50" charset="-128"/>
-              </a:rPr>
-              <a:t>のセンサ値の差</a:t>
-            </a:r>
-            <a:r>
-              <a:rPr lang="ja-JP" altLang="en-US" sz="600" dirty="0" smtClean="0">
-                <a:latin typeface="HG丸ｺﾞｼｯｸM-PRO" panose="020F0600000000000000" pitchFamily="50" charset="-128"/>
-                <a:ea typeface="HG丸ｺﾞｼｯｸM-PRO" panose="020F0600000000000000" pitchFamily="50" charset="-128"/>
-              </a:rPr>
-              <a:t> </a:t>
-            </a:r>
-            <a:endParaRPr lang="en-US" altLang="ja-JP" sz="600" dirty="0" smtClean="0">
-              <a:latin typeface="HG丸ｺﾞｼｯｸM-PRO" panose="020F0600000000000000" pitchFamily="50" charset="-128"/>
-              <a:ea typeface="HG丸ｺﾞｼｯｸM-PRO" panose="020F0600000000000000" pitchFamily="50" charset="-128"/>
-            </a:endParaRPr>
-          </a:p>
-          <a:p>
-            <a:r>
-              <a:rPr lang="ja-JP" altLang="en-US" sz="600" dirty="0">
-                <a:latin typeface="HG丸ｺﾞｼｯｸM-PRO" panose="020F0600000000000000" pitchFamily="50" charset="-128"/>
-                <a:ea typeface="HG丸ｺﾞｼｯｸM-PRO" panose="020F0600000000000000" pitchFamily="50" charset="-128"/>
-              </a:rPr>
-              <a:t>　</a:t>
-            </a:r>
-            <a:r>
-              <a:rPr lang="en-US" altLang="ja-JP" sz="600" dirty="0" smtClean="0">
-                <a:latin typeface="HG丸ｺﾞｼｯｸM-PRO" panose="020F0600000000000000" pitchFamily="50" charset="-128"/>
-                <a:ea typeface="HG丸ｺﾞｼｯｸM-PRO" panose="020F0600000000000000" pitchFamily="50" charset="-128"/>
-              </a:rPr>
-              <a:t>&gt;</a:t>
-            </a:r>
-            <a:r>
-              <a:rPr lang="ja-JP" altLang="en-US" sz="600" dirty="0" smtClean="0">
-                <a:latin typeface="HG丸ｺﾞｼｯｸM-PRO" panose="020F0600000000000000" pitchFamily="50" charset="-128"/>
-                <a:ea typeface="HG丸ｺﾞｼｯｸM-PRO" panose="020F0600000000000000" pitchFamily="50" charset="-128"/>
-              </a:rPr>
-              <a:t> </a:t>
-            </a:r>
-            <a:r>
-              <a:rPr lang="en-US" altLang="ja-JP" sz="600" dirty="0" smtClean="0">
-                <a:latin typeface="HG丸ｺﾞｼｯｸM-PRO" panose="020F0600000000000000" pitchFamily="50" charset="-128"/>
-                <a:ea typeface="HG丸ｺﾞｼｯｸM-PRO" panose="020F0600000000000000" pitchFamily="50" charset="-128"/>
-              </a:rPr>
-              <a:t>60</a:t>
-            </a:r>
-            <a:r>
-              <a:rPr lang="ja-JP" altLang="en-US" sz="600" dirty="0" smtClean="0">
-                <a:latin typeface="HG丸ｺﾞｼｯｸM-PRO" panose="020F0600000000000000" pitchFamily="50" charset="-128"/>
-                <a:ea typeface="HG丸ｺﾞｼｯｸM-PRO" panose="020F0600000000000000" pitchFamily="50" charset="-128"/>
-              </a:rPr>
-              <a:t> ～ </a:t>
-            </a:r>
-            <a:r>
-              <a:rPr lang="en-US" altLang="ja-JP" sz="600" dirty="0" smtClean="0">
-                <a:latin typeface="HG丸ｺﾞｼｯｸM-PRO" panose="020F0600000000000000" pitchFamily="50" charset="-128"/>
-                <a:ea typeface="HG丸ｺﾞｼｯｸM-PRO" panose="020F0600000000000000" pitchFamily="50" charset="-128"/>
-              </a:rPr>
-              <a:t>80</a:t>
-            </a:r>
-            <a:r>
-              <a:rPr lang="ja-JP" altLang="en-US" sz="600" dirty="0" smtClean="0">
-                <a:latin typeface="HG丸ｺﾞｼｯｸM-PRO" panose="020F0600000000000000" pitchFamily="50" charset="-128"/>
-                <a:ea typeface="HG丸ｺﾞｼｯｸM-PRO" panose="020F0600000000000000" pitchFamily="50" charset="-128"/>
-              </a:rPr>
-              <a:t> </a:t>
-            </a:r>
-            <a:r>
-              <a:rPr lang="en-US" altLang="ja-JP" sz="600" dirty="0" smtClean="0">
-                <a:latin typeface="HG丸ｺﾞｼｯｸM-PRO" panose="020F0600000000000000" pitchFamily="50" charset="-128"/>
-                <a:ea typeface="HG丸ｺﾞｼｯｸM-PRO" panose="020F0600000000000000" pitchFamily="50" charset="-128"/>
-              </a:rPr>
-              <a:t>%</a:t>
-            </a:r>
-            <a:r>
-              <a:rPr lang="ja-JP" altLang="en-US" sz="600" dirty="0">
-                <a:latin typeface="HG丸ｺﾞｼｯｸM-PRO" panose="020F0600000000000000" pitchFamily="50" charset="-128"/>
-                <a:ea typeface="HG丸ｺﾞｼｯｸM-PRO" panose="020F0600000000000000" pitchFamily="50" charset="-128"/>
-              </a:rPr>
-              <a:t>センサ値の差</a:t>
-            </a:r>
-            <a:endParaRPr lang="en-US" altLang="ja-JP" sz="600" dirty="0" smtClean="0">
-              <a:latin typeface="HG丸ｺﾞｼｯｸM-PRO" panose="020F0600000000000000" pitchFamily="50" charset="-128"/>
-              <a:ea typeface="HG丸ｺﾞｼｯｸM-PRO" panose="020F0600000000000000" pitchFamily="50" charset="-128"/>
-            </a:endParaRPr>
-          </a:p>
-          <a:p>
-            <a:r>
-              <a:rPr kumimoji="1" lang="ja-JP" altLang="en-US" sz="600" dirty="0" smtClean="0">
-                <a:latin typeface="HG丸ｺﾞｼｯｸM-PRO" panose="020F0600000000000000" pitchFamily="50" charset="-128"/>
-                <a:ea typeface="HG丸ｺﾞｼｯｸM-PRO" panose="020F0600000000000000" pitchFamily="50" charset="-128"/>
-              </a:rPr>
-              <a:t> ⇒ 光センサの応答の非線形性 </a:t>
-            </a:r>
-            <a:endParaRPr kumimoji="1" lang="ja-JP" altLang="en-US" sz="600" dirty="0">
-              <a:latin typeface="HG丸ｺﾞｼｯｸM-PRO" panose="020F0600000000000000" pitchFamily="50" charset="-128"/>
-              <a:ea typeface="HG丸ｺﾞｼｯｸM-PRO" panose="020F0600000000000000" pitchFamily="50" charset="-128"/>
-            </a:endParaRPr>
-          </a:p>
-        </p:txBody>
-      </p:sp>
-      <p:cxnSp>
-        <p:nvCxnSpPr>
-          <p:cNvPr id="217" name="直線矢印コネクタ 216"/>
-          <p:cNvCxnSpPr/>
-          <p:nvPr/>
-        </p:nvCxnSpPr>
-        <p:spPr>
-          <a:xfrm>
-            <a:off x="11187974" y="1473418"/>
-            <a:ext cx="191080" cy="0"/>
-          </a:xfrm>
-          <a:prstGeom prst="straightConnector1">
-            <a:avLst/>
-          </a:prstGeom>
-          <a:ln w="6350">
-            <a:solidFill>
-              <a:srgbClr val="00B050"/>
-            </a:solidFill>
-            <a:headEnd type="triangle" w="sm" len="sm"/>
-            <a:tailEnd type="triangle" w="sm" len="sm"/>
-          </a:ln>
-        </p:spPr>
-        <p:style>
-          <a:lnRef idx="1">
-            <a:schemeClr val="accent1"/>
-          </a:lnRef>
-          <a:fillRef idx="0">
-            <a:schemeClr val="accent1"/>
-          </a:fillRef>
-          <a:effectRef idx="0">
-            <a:schemeClr val="accent1"/>
-          </a:effectRef>
-          <a:fontRef idx="minor">
-            <a:schemeClr val="tx1"/>
-          </a:fontRef>
-        </p:style>
-      </p:cxnSp>
-      <p:cxnSp>
-        <p:nvCxnSpPr>
-          <p:cNvPr id="218" name="直線矢印コネクタ 217"/>
-          <p:cNvCxnSpPr/>
-          <p:nvPr/>
-        </p:nvCxnSpPr>
-        <p:spPr>
-          <a:xfrm>
-            <a:off x="11267688" y="1571345"/>
-            <a:ext cx="218724" cy="0"/>
-          </a:xfrm>
-          <a:prstGeom prst="straightConnector1">
-            <a:avLst/>
-          </a:prstGeom>
-          <a:ln w="6350">
-            <a:solidFill>
-              <a:schemeClr val="tx2">
-                <a:lumMod val="60000"/>
-                <a:lumOff val="40000"/>
-              </a:schemeClr>
-            </a:solidFill>
-            <a:headEnd type="triangle" w="sm" len="sm"/>
-            <a:tailEnd type="triangle" w="sm" len="sm"/>
-          </a:ln>
-        </p:spPr>
-        <p:style>
-          <a:lnRef idx="1">
-            <a:schemeClr val="accent1"/>
-          </a:lnRef>
-          <a:fillRef idx="0">
-            <a:schemeClr val="accent1"/>
-          </a:fillRef>
-          <a:effectRef idx="0">
-            <a:schemeClr val="accent1"/>
-          </a:effectRef>
-          <a:fontRef idx="minor">
-            <a:schemeClr val="tx1"/>
-          </a:fontRef>
-        </p:style>
-      </p:cxnSp>
-      <p:cxnSp>
-        <p:nvCxnSpPr>
-          <p:cNvPr id="223" name="直線矢印コネクタ 222"/>
-          <p:cNvCxnSpPr/>
-          <p:nvPr/>
-        </p:nvCxnSpPr>
-        <p:spPr>
-          <a:xfrm>
-            <a:off x="9958662" y="2632491"/>
-            <a:ext cx="191080" cy="0"/>
-          </a:xfrm>
-          <a:prstGeom prst="straightConnector1">
-            <a:avLst/>
-          </a:prstGeom>
-          <a:ln w="6350">
-            <a:solidFill>
-              <a:srgbClr val="00B050"/>
-            </a:solidFill>
-            <a:headEnd type="triangle" w="sm" len="sm"/>
-            <a:tailEnd type="triangle" w="sm" len="sm"/>
-          </a:ln>
-        </p:spPr>
-        <p:style>
-          <a:lnRef idx="1">
-            <a:schemeClr val="accent1"/>
-          </a:lnRef>
-          <a:fillRef idx="0">
-            <a:schemeClr val="accent1"/>
-          </a:fillRef>
-          <a:effectRef idx="0">
-            <a:schemeClr val="accent1"/>
-          </a:effectRef>
-          <a:fontRef idx="minor">
-            <a:schemeClr val="tx1"/>
-          </a:fontRef>
-        </p:style>
-      </p:cxnSp>
-      <p:cxnSp>
-        <p:nvCxnSpPr>
-          <p:cNvPr id="224" name="直線矢印コネクタ 223"/>
-          <p:cNvCxnSpPr/>
-          <p:nvPr/>
-        </p:nvCxnSpPr>
-        <p:spPr>
-          <a:xfrm>
-            <a:off x="10739650" y="1979451"/>
-            <a:ext cx="218724" cy="0"/>
-          </a:xfrm>
-          <a:prstGeom prst="straightConnector1">
-            <a:avLst/>
-          </a:prstGeom>
-          <a:ln w="6350">
-            <a:solidFill>
-              <a:schemeClr val="tx2">
-                <a:lumMod val="60000"/>
-                <a:lumOff val="40000"/>
-              </a:schemeClr>
-            </a:solidFill>
-            <a:headEnd type="triangle" w="sm" len="sm"/>
-            <a:tailEnd type="triangle" w="sm" len="sm"/>
-          </a:ln>
-        </p:spPr>
-        <p:style>
-          <a:lnRef idx="1">
-            <a:schemeClr val="accent1"/>
-          </a:lnRef>
-          <a:fillRef idx="0">
-            <a:schemeClr val="accent1"/>
-          </a:fillRef>
-          <a:effectRef idx="0">
-            <a:schemeClr val="accent1"/>
-          </a:effectRef>
-          <a:fontRef idx="minor">
-            <a:schemeClr val="tx1"/>
-          </a:fontRef>
-        </p:style>
-      </p:cxnSp>
-      <p:cxnSp>
-        <p:nvCxnSpPr>
-          <p:cNvPr id="225" name="直線矢印コネクタ 224"/>
-          <p:cNvCxnSpPr/>
-          <p:nvPr/>
-        </p:nvCxnSpPr>
-        <p:spPr>
-          <a:xfrm>
-            <a:off x="9913682" y="2875068"/>
-            <a:ext cx="218724" cy="0"/>
-          </a:xfrm>
-          <a:prstGeom prst="straightConnector1">
-            <a:avLst/>
-          </a:prstGeom>
-          <a:ln w="6350">
-            <a:solidFill>
-              <a:schemeClr val="tx2">
-                <a:lumMod val="60000"/>
-                <a:lumOff val="40000"/>
-              </a:schemeClr>
-            </a:solidFill>
-            <a:headEnd type="triangle" w="sm" len="sm"/>
-            <a:tailEnd type="triangle" w="sm" len="sm"/>
-          </a:ln>
-        </p:spPr>
-        <p:style>
-          <a:lnRef idx="1">
-            <a:schemeClr val="accent1"/>
-          </a:lnRef>
-          <a:fillRef idx="0">
-            <a:schemeClr val="accent1"/>
-          </a:fillRef>
-          <a:effectRef idx="0">
-            <a:schemeClr val="accent1"/>
-          </a:effectRef>
-          <a:fontRef idx="minor">
-            <a:schemeClr val="tx1"/>
-          </a:fontRef>
-        </p:style>
-      </p:cxnSp>
-      <p:cxnSp>
-        <p:nvCxnSpPr>
-          <p:cNvPr id="3097" name="直線コネクタ 3096"/>
-          <p:cNvCxnSpPr/>
-          <p:nvPr/>
-        </p:nvCxnSpPr>
-        <p:spPr>
-          <a:xfrm flipV="1">
-            <a:off x="10111311" y="1571345"/>
-            <a:ext cx="0" cy="941889"/>
-          </a:xfrm>
-          <a:prstGeom prst="line">
-            <a:avLst/>
-          </a:prstGeom>
-          <a:ln w="6350">
-            <a:solidFill>
-              <a:schemeClr val="tx1"/>
-            </a:solidFill>
-            <a:prstDash val="dash"/>
-          </a:ln>
-        </p:spPr>
-        <p:style>
-          <a:lnRef idx="1">
-            <a:schemeClr val="accent1"/>
-          </a:lnRef>
-          <a:fillRef idx="0">
-            <a:schemeClr val="accent1"/>
-          </a:fillRef>
-          <a:effectRef idx="0">
-            <a:schemeClr val="accent1"/>
-          </a:effectRef>
-          <a:fontRef idx="minor">
-            <a:schemeClr val="tx1"/>
-          </a:fontRef>
-        </p:style>
-      </p:cxnSp>
-      <p:cxnSp>
-        <p:nvCxnSpPr>
-          <p:cNvPr id="237" name="直線コネクタ 236"/>
-          <p:cNvCxnSpPr/>
-          <p:nvPr/>
-        </p:nvCxnSpPr>
-        <p:spPr>
-          <a:xfrm flipV="1">
-            <a:off x="10499844" y="1571345"/>
-            <a:ext cx="0" cy="744588"/>
-          </a:xfrm>
-          <a:prstGeom prst="line">
-            <a:avLst/>
-          </a:prstGeom>
-          <a:ln w="6350">
-            <a:solidFill>
-              <a:schemeClr val="tx1"/>
-            </a:solidFill>
-            <a:prstDash val="dash"/>
-          </a:ln>
-        </p:spPr>
-        <p:style>
-          <a:lnRef idx="1">
-            <a:schemeClr val="accent1"/>
-          </a:lnRef>
-          <a:fillRef idx="0">
-            <a:schemeClr val="accent1"/>
-          </a:fillRef>
-          <a:effectRef idx="0">
-            <a:schemeClr val="accent1"/>
-          </a:effectRef>
-          <a:fontRef idx="minor">
-            <a:schemeClr val="tx1"/>
-          </a:fontRef>
-        </p:style>
-      </p:cxnSp>
-      <p:cxnSp>
-        <p:nvCxnSpPr>
-          <p:cNvPr id="238" name="直線矢印コネクタ 237"/>
-          <p:cNvCxnSpPr/>
-          <p:nvPr/>
-        </p:nvCxnSpPr>
-        <p:spPr>
-          <a:xfrm>
-            <a:off x="10222986" y="2315933"/>
-            <a:ext cx="191080" cy="0"/>
-          </a:xfrm>
-          <a:prstGeom prst="straightConnector1">
-            <a:avLst/>
-          </a:prstGeom>
-          <a:ln w="6350">
-            <a:solidFill>
-              <a:srgbClr val="00B050"/>
-            </a:solidFill>
-            <a:headEnd type="triangle" w="sm" len="sm"/>
-            <a:tailEnd type="triangle" w="sm" len="sm"/>
-          </a:ln>
-        </p:spPr>
-        <p:style>
-          <a:lnRef idx="1">
-            <a:schemeClr val="accent1"/>
-          </a:lnRef>
-          <a:fillRef idx="0">
-            <a:schemeClr val="accent1"/>
-          </a:fillRef>
-          <a:effectRef idx="0">
-            <a:schemeClr val="accent1"/>
-          </a:effectRef>
-          <a:fontRef idx="minor">
-            <a:schemeClr val="tx1"/>
-          </a:fontRef>
-        </p:style>
-      </p:cxnSp>
-      <p:cxnSp>
-        <p:nvCxnSpPr>
-          <p:cNvPr id="239" name="直線コネクタ 238"/>
-          <p:cNvCxnSpPr/>
-          <p:nvPr/>
-        </p:nvCxnSpPr>
-        <p:spPr>
-          <a:xfrm flipV="1">
-            <a:off x="10808255" y="1571345"/>
-            <a:ext cx="0" cy="261955"/>
-          </a:xfrm>
-          <a:prstGeom prst="line">
-            <a:avLst/>
-          </a:prstGeom>
-          <a:ln w="6350">
-            <a:solidFill>
-              <a:schemeClr val="tx1"/>
-            </a:solidFill>
-            <a:prstDash val="dash"/>
-          </a:ln>
-        </p:spPr>
-        <p:style>
-          <a:lnRef idx="1">
-            <a:schemeClr val="accent1"/>
-          </a:lnRef>
-          <a:fillRef idx="0">
-            <a:schemeClr val="accent1"/>
-          </a:fillRef>
-          <a:effectRef idx="0">
-            <a:schemeClr val="accent1"/>
-          </a:effectRef>
-          <a:fontRef idx="minor">
-            <a:schemeClr val="tx1"/>
-          </a:fontRef>
-        </p:style>
-      </p:cxnSp>
-      <p:cxnSp>
-        <p:nvCxnSpPr>
-          <p:cNvPr id="246" name="直線矢印コネクタ 245"/>
-          <p:cNvCxnSpPr/>
-          <p:nvPr/>
-        </p:nvCxnSpPr>
-        <p:spPr>
-          <a:xfrm>
-            <a:off x="10111311" y="1659361"/>
-            <a:ext cx="388533" cy="0"/>
-          </a:xfrm>
-          <a:prstGeom prst="straightConnector1">
-            <a:avLst/>
-          </a:prstGeom>
-          <a:ln w="6350">
-            <a:solidFill>
-              <a:schemeClr val="tx1">
-                <a:lumMod val="65000"/>
-                <a:lumOff val="35000"/>
-              </a:schemeClr>
-            </a:solidFill>
-            <a:headEnd type="triangle" w="sm" len="sm"/>
-            <a:tailEnd type="triangle" w="sm" len="sm"/>
-          </a:ln>
-        </p:spPr>
-        <p:style>
-          <a:lnRef idx="1">
-            <a:schemeClr val="accent1"/>
-          </a:lnRef>
-          <a:fillRef idx="0">
-            <a:schemeClr val="accent1"/>
-          </a:fillRef>
-          <a:effectRef idx="0">
-            <a:schemeClr val="accent1"/>
-          </a:effectRef>
-          <a:fontRef idx="minor">
-            <a:schemeClr val="tx1"/>
-          </a:fontRef>
-        </p:style>
-      </p:cxnSp>
-      <p:cxnSp>
-        <p:nvCxnSpPr>
-          <p:cNvPr id="249" name="直線矢印コネクタ 248"/>
-          <p:cNvCxnSpPr/>
-          <p:nvPr/>
-        </p:nvCxnSpPr>
-        <p:spPr>
-          <a:xfrm>
-            <a:off x="10499844" y="1659361"/>
-            <a:ext cx="308411" cy="0"/>
-          </a:xfrm>
-          <a:prstGeom prst="straightConnector1">
-            <a:avLst/>
-          </a:prstGeom>
-          <a:ln w="6350">
-            <a:solidFill>
-              <a:schemeClr val="tx1">
-                <a:lumMod val="65000"/>
-                <a:lumOff val="35000"/>
-              </a:schemeClr>
-            </a:solidFill>
-            <a:headEnd type="triangle" w="sm" len="sm"/>
-            <a:tailEnd type="triangle" w="sm" len="sm"/>
-          </a:ln>
-        </p:spPr>
-        <p:style>
-          <a:lnRef idx="1">
-            <a:schemeClr val="accent1"/>
-          </a:lnRef>
-          <a:fillRef idx="0">
-            <a:schemeClr val="accent1"/>
-          </a:fillRef>
-          <a:effectRef idx="0">
-            <a:schemeClr val="accent1"/>
-          </a:effectRef>
-          <a:fontRef idx="minor">
-            <a:schemeClr val="tx1"/>
-          </a:fontRef>
-        </p:style>
-      </p:cxnSp>
-      <p:sp>
-        <p:nvSpPr>
-          <p:cNvPr id="253" name="テキスト ボックス 252"/>
-          <p:cNvSpPr txBox="1"/>
-          <p:nvPr/>
-        </p:nvSpPr>
-        <p:spPr>
-          <a:xfrm>
-            <a:off x="10111311" y="3305750"/>
-            <a:ext cx="1330814" cy="215444"/>
-          </a:xfrm>
-          <a:prstGeom prst="rect">
-            <a:avLst/>
-          </a:prstGeom>
-          <a:noFill/>
-        </p:spPr>
-        <p:txBody>
-          <a:bodyPr wrap="none" rtlCol="0">
-            <a:spAutoFit/>
-          </a:bodyPr>
-          <a:lstStyle/>
-          <a:p>
-            <a:r>
-              <a:rPr lang="ja-JP" altLang="en-US" sz="800" dirty="0" smtClean="0">
-                <a:latin typeface="HG丸ｺﾞｼｯｸM-PRO" panose="020F0600000000000000" pitchFamily="50" charset="-128"/>
-                <a:ea typeface="HG丸ｺﾞｼｯｸM-PRO" panose="020F0600000000000000" pitchFamily="50" charset="-128"/>
-              </a:rPr>
-              <a:t>光センサ値（</a:t>
-            </a:r>
-            <a:r>
-              <a:rPr lang="en-US" altLang="ja-JP" sz="800" dirty="0" smtClean="0">
-                <a:latin typeface="HG丸ｺﾞｼｯｸM-PRO" panose="020F0600000000000000" pitchFamily="50" charset="-128"/>
-                <a:ea typeface="HG丸ｺﾞｼｯｸM-PRO" panose="020F0600000000000000" pitchFamily="50" charset="-128"/>
-              </a:rPr>
-              <a:t>LED</a:t>
-            </a:r>
-            <a:r>
-              <a:rPr lang="ja-JP" altLang="en-US" sz="800" dirty="0" smtClean="0">
-                <a:latin typeface="HG丸ｺﾞｼｯｸM-PRO" panose="020F0600000000000000" pitchFamily="50" charset="-128"/>
-                <a:ea typeface="HG丸ｺﾞｼｯｸM-PRO" panose="020F0600000000000000" pitchFamily="50" charset="-128"/>
-              </a:rPr>
-              <a:t>点灯）</a:t>
-            </a:r>
-            <a:endParaRPr kumimoji="1" lang="ja-JP" altLang="en-US" sz="800" dirty="0">
-              <a:latin typeface="HG丸ｺﾞｼｯｸM-PRO" panose="020F0600000000000000" pitchFamily="50" charset="-128"/>
-              <a:ea typeface="HG丸ｺﾞｼｯｸM-PRO" panose="020F0600000000000000" pitchFamily="50" charset="-128"/>
-            </a:endParaRPr>
-          </a:p>
-        </p:txBody>
-      </p:sp>
-      <p:sp>
-        <p:nvSpPr>
-          <p:cNvPr id="254" name="テキスト ボックス 253"/>
-          <p:cNvSpPr txBox="1"/>
-          <p:nvPr/>
-        </p:nvSpPr>
-        <p:spPr>
-          <a:xfrm>
-            <a:off x="10739650" y="2307725"/>
-            <a:ext cx="1611586" cy="257369"/>
-          </a:xfrm>
-          <a:prstGeom prst="rect">
-            <a:avLst/>
-          </a:prstGeom>
-          <a:solidFill>
-            <a:schemeClr val="tx2">
-              <a:lumMod val="20000"/>
-              <a:lumOff val="80000"/>
-            </a:schemeClr>
-          </a:solidFill>
-        </p:spPr>
-        <p:txBody>
-          <a:bodyPr wrap="none" lIns="36000" tIns="36000" rIns="36000" bIns="36000" rtlCol="0">
-            <a:spAutoFit/>
-          </a:bodyPr>
-          <a:lstStyle/>
-          <a:p>
-            <a:r>
-              <a:rPr lang="ja-JP" altLang="en-US" sz="600" dirty="0" smtClean="0">
-                <a:latin typeface="HG丸ｺﾞｼｯｸM-PRO" panose="020F0600000000000000" pitchFamily="50" charset="-128"/>
-                <a:ea typeface="HG丸ｺﾞｼｯｸM-PRO" panose="020F0600000000000000" pitchFamily="50" charset="-128"/>
-              </a:rPr>
-              <a:t>外乱光の影響は、路面の反射率によらず一定</a:t>
-            </a:r>
-            <a:endParaRPr lang="en-US" altLang="ja-JP" sz="600" dirty="0">
-              <a:latin typeface="HG丸ｺﾞｼｯｸM-PRO" panose="020F0600000000000000" pitchFamily="50" charset="-128"/>
-              <a:ea typeface="HG丸ｺﾞｼｯｸM-PRO" panose="020F0600000000000000" pitchFamily="50" charset="-128"/>
-            </a:endParaRPr>
-          </a:p>
-          <a:p>
-            <a:r>
-              <a:rPr lang="ja-JP" altLang="en-US" sz="600" dirty="0" smtClean="0">
-                <a:latin typeface="HG丸ｺﾞｼｯｸM-PRO" panose="020F0600000000000000" pitchFamily="50" charset="-128"/>
-                <a:ea typeface="HG丸ｺﾞｼｯｸM-PRO" panose="020F0600000000000000" pitchFamily="50" charset="-128"/>
-              </a:rPr>
-              <a:t>⇒ 外乱光の影響は加算的</a:t>
-            </a:r>
-            <a:endParaRPr kumimoji="1" lang="ja-JP" altLang="en-US" sz="600" dirty="0">
-              <a:latin typeface="HG丸ｺﾞｼｯｸM-PRO" panose="020F0600000000000000" pitchFamily="50" charset="-128"/>
-              <a:ea typeface="HG丸ｺﾞｼｯｸM-PRO" panose="020F0600000000000000" pitchFamily="50" charset="-128"/>
-            </a:endParaRPr>
-          </a:p>
-        </p:txBody>
-      </p:sp>
       <p:cxnSp>
         <p:nvCxnSpPr>
           <p:cNvPr id="256" name="直線矢印コネクタ 255"/>
@@ -21256,203 +19642,6 @@
             </a:solidFill>
             <a:prstDash val="sysDash"/>
             <a:tailEnd type="none" w="med" len="sm"/>
-          </a:ln>
-        </p:spPr>
-        <p:style>
-          <a:lnRef idx="1">
-            <a:schemeClr val="accent1"/>
-          </a:lnRef>
-          <a:fillRef idx="0">
-            <a:schemeClr val="accent1"/>
-          </a:fillRef>
-          <a:effectRef idx="0">
-            <a:schemeClr val="accent1"/>
-          </a:effectRef>
-          <a:fontRef idx="minor">
-            <a:schemeClr val="tx1"/>
-          </a:fontRef>
-        </p:style>
-      </p:cxnSp>
-      <p:sp>
-        <p:nvSpPr>
-          <p:cNvPr id="262" name="テキスト ボックス 261"/>
-          <p:cNvSpPr txBox="1"/>
-          <p:nvPr/>
-        </p:nvSpPr>
-        <p:spPr>
-          <a:xfrm>
-            <a:off x="5173177" y="2076267"/>
-            <a:ext cx="3745786" cy="1061817"/>
-          </a:xfrm>
-          <a:prstGeom prst="rect">
-            <a:avLst/>
-          </a:prstGeom>
-          <a:noFill/>
-        </p:spPr>
-        <p:txBody>
-          <a:bodyPr wrap="square" lIns="91428" tIns="45714" rIns="91428" bIns="45714" rtlCol="0">
-            <a:spAutoFit/>
-          </a:bodyPr>
-          <a:lstStyle/>
-          <a:p>
-            <a:r>
-              <a:rPr lang="ja-JP" altLang="en-US" sz="1050" dirty="0">
-                <a:latin typeface="HG丸ｺﾞｼｯｸM-PRO" panose="020F0600000000000000" pitchFamily="50" charset="-128"/>
-                <a:ea typeface="HG丸ｺﾞｼｯｸM-PRO" panose="020F0600000000000000" pitchFamily="50" charset="-128"/>
-              </a:rPr>
-              <a:t>暗黒下（</a:t>
-            </a:r>
-            <a:r>
-              <a:rPr lang="en-US" altLang="ja-JP" sz="1050" dirty="0" smtClean="0">
-                <a:latin typeface="HG丸ｺﾞｼｯｸM-PRO" panose="020F0600000000000000" pitchFamily="50" charset="-128"/>
-                <a:ea typeface="HG丸ｺﾞｼｯｸM-PRO" panose="020F0600000000000000" pitchFamily="50" charset="-128"/>
-              </a:rPr>
-              <a:t>LED</a:t>
-            </a:r>
-            <a:r>
-              <a:rPr lang="ja-JP" altLang="en-US" sz="1050" dirty="0" smtClean="0">
-                <a:latin typeface="HG丸ｺﾞｼｯｸM-PRO" panose="020F0600000000000000" pitchFamily="50" charset="-128"/>
-                <a:ea typeface="HG丸ｺﾞｼｯｸM-PRO" panose="020F0600000000000000" pitchFamily="50" charset="-128"/>
-              </a:rPr>
-              <a:t>の光のみ）で測定した光センサ値</a:t>
-            </a:r>
-            <a:r>
-              <a:rPr lang="ja-JP" altLang="en-US" sz="1050" dirty="0">
-                <a:latin typeface="HG丸ｺﾞｼｯｸM-PRO" panose="020F0600000000000000" pitchFamily="50" charset="-128"/>
-                <a:ea typeface="HG丸ｺﾞｼｯｸM-PRO" panose="020F0600000000000000" pitchFamily="50" charset="-128"/>
-              </a:rPr>
-              <a:t>と</a:t>
-            </a:r>
-            <a:r>
-              <a:rPr lang="ja-JP" altLang="en-US" sz="1050" dirty="0" smtClean="0">
-                <a:latin typeface="HG丸ｺﾞｼｯｸM-PRO" panose="020F0600000000000000" pitchFamily="50" charset="-128"/>
-                <a:ea typeface="HG丸ｺﾞｼｯｸM-PRO" panose="020F0600000000000000" pitchFamily="50" charset="-128"/>
-              </a:rPr>
-              <a:t>カラーチャート濃度のデータから、三次多項式近似直線を求めた。</a:t>
-            </a:r>
-            <a:endParaRPr lang="en-US" altLang="ja-JP" sz="1050" dirty="0" smtClean="0">
-              <a:latin typeface="HG丸ｺﾞｼｯｸM-PRO" panose="020F0600000000000000" pitchFamily="50" charset="-128"/>
-              <a:ea typeface="HG丸ｺﾞｼｯｸM-PRO" panose="020F0600000000000000" pitchFamily="50" charset="-128"/>
-            </a:endParaRPr>
-          </a:p>
-          <a:p>
-            <a:endParaRPr lang="en-US" altLang="ja-JP" sz="1050" dirty="0">
-              <a:latin typeface="HG丸ｺﾞｼｯｸM-PRO" panose="020F0600000000000000" pitchFamily="50" charset="-128"/>
-              <a:ea typeface="HG丸ｺﾞｼｯｸM-PRO" panose="020F0600000000000000" pitchFamily="50" charset="-128"/>
-            </a:endParaRPr>
-          </a:p>
-          <a:p>
-            <a:r>
-              <a:rPr lang="ja-JP" altLang="en-US" sz="1050" dirty="0" smtClean="0">
-                <a:latin typeface="HG丸ｺﾞｼｯｸM-PRO" panose="020F0600000000000000" pitchFamily="50" charset="-128"/>
-                <a:ea typeface="HG丸ｺﾞｼｯｸM-PRO" panose="020F0600000000000000" pitchFamily="50" charset="-128"/>
-              </a:rPr>
-              <a:t>この近似式を用いて、</a:t>
-            </a:r>
-            <a:r>
-              <a:rPr lang="en-US" altLang="ja-JP" sz="1050" dirty="0" smtClean="0">
-                <a:latin typeface="HG丸ｺﾞｼｯｸM-PRO" panose="020F0600000000000000" pitchFamily="50" charset="-128"/>
-                <a:ea typeface="HG丸ｺﾞｼｯｸM-PRO" panose="020F0600000000000000" pitchFamily="50" charset="-128"/>
-              </a:rPr>
-              <a:t>LED</a:t>
-            </a:r>
-            <a:r>
-              <a:rPr lang="ja-JP" altLang="en-US" sz="1050" dirty="0" smtClean="0">
-                <a:latin typeface="HG丸ｺﾞｼｯｸM-PRO" panose="020F0600000000000000" pitchFamily="50" charset="-128"/>
-                <a:ea typeface="HG丸ｺﾞｼｯｸM-PRO" panose="020F0600000000000000" pitchFamily="50" charset="-128"/>
-              </a:rPr>
-              <a:t>の反射光のみの光センサ値（</a:t>
-            </a:r>
-            <a:r>
-              <a:rPr lang="en-US" altLang="ja-JP" sz="1050" dirty="0" smtClean="0">
-                <a:latin typeface="HG丸ｺﾞｼｯｸM-PRO" panose="020F0600000000000000" pitchFamily="50" charset="-128"/>
-                <a:ea typeface="HG丸ｺﾞｼｯｸM-PRO" panose="020F0600000000000000" pitchFamily="50" charset="-128"/>
-              </a:rPr>
-              <a:t>5.2</a:t>
-            </a:r>
-            <a:r>
-              <a:rPr lang="ja-JP" altLang="en-US" sz="1050" dirty="0" smtClean="0">
-                <a:latin typeface="HG丸ｺﾞｼｯｸM-PRO" panose="020F0600000000000000" pitchFamily="50" charset="-128"/>
-                <a:ea typeface="HG丸ｺﾞｼｯｸM-PRO" panose="020F0600000000000000" pitchFamily="50" charset="-128"/>
-              </a:rPr>
-              <a:t>参照）をチャートの濃度に変換することで、ライントレースの目標値</a:t>
-            </a:r>
-            <a:r>
-              <a:rPr lang="en-US" altLang="ja-JP" sz="1050" dirty="0" smtClean="0">
-                <a:latin typeface="HG丸ｺﾞｼｯｸM-PRO" panose="020F0600000000000000" pitchFamily="50" charset="-128"/>
-                <a:ea typeface="HG丸ｺﾞｼｯｸM-PRO" panose="020F0600000000000000" pitchFamily="50" charset="-128"/>
-              </a:rPr>
-              <a:t>(72%)</a:t>
-            </a:r>
-            <a:r>
-              <a:rPr lang="ja-JP" altLang="en-US" sz="1050" dirty="0" smtClean="0">
-                <a:latin typeface="HG丸ｺﾞｼｯｸM-PRO" panose="020F0600000000000000" pitchFamily="50" charset="-128"/>
-                <a:ea typeface="HG丸ｺﾞｼｯｸM-PRO" panose="020F0600000000000000" pitchFamily="50" charset="-128"/>
-              </a:rPr>
-              <a:t>の変更を不要にした。</a:t>
-            </a:r>
-            <a:endParaRPr lang="ja-JP" altLang="en-US" sz="1050" dirty="0">
-              <a:latin typeface="HG丸ｺﾞｼｯｸM-PRO" panose="020F0600000000000000" pitchFamily="50" charset="-128"/>
-              <a:ea typeface="HG丸ｺﾞｼｯｸM-PRO" panose="020F0600000000000000" pitchFamily="50" charset="-128"/>
-            </a:endParaRPr>
-          </a:p>
-        </p:txBody>
-      </p:sp>
-      <p:cxnSp>
-        <p:nvCxnSpPr>
-          <p:cNvPr id="265" name="直線コネクタ 264"/>
-          <p:cNvCxnSpPr/>
-          <p:nvPr/>
-        </p:nvCxnSpPr>
-        <p:spPr>
-          <a:xfrm>
-            <a:off x="9282991" y="1889549"/>
-            <a:ext cx="1102971" cy="0"/>
-          </a:xfrm>
-          <a:prstGeom prst="line">
-            <a:avLst/>
-          </a:prstGeom>
-          <a:ln w="9525">
-            <a:solidFill>
-              <a:srgbClr val="00B050"/>
-            </a:solidFill>
-            <a:prstDash val="sysDash"/>
-          </a:ln>
-        </p:spPr>
-        <p:style>
-          <a:lnRef idx="1">
-            <a:schemeClr val="accent1"/>
-          </a:lnRef>
-          <a:fillRef idx="0">
-            <a:schemeClr val="accent1"/>
-          </a:fillRef>
-          <a:effectRef idx="0">
-            <a:schemeClr val="accent1"/>
-          </a:effectRef>
-          <a:fontRef idx="minor">
-            <a:schemeClr val="tx1"/>
-          </a:fontRef>
-        </p:style>
-      </p:cxnSp>
-      <p:cxnSp>
-        <p:nvCxnSpPr>
-          <p:cNvPr id="272" name="直線コネクタ 271"/>
-          <p:cNvCxnSpPr/>
-          <p:nvPr/>
-        </p:nvCxnSpPr>
-        <p:spPr>
-          <a:xfrm rot="5400000">
-            <a:off x="10291246" y="2393069"/>
-            <a:ext cx="1102971" cy="0"/>
-          </a:xfrm>
-          <a:prstGeom prst="line">
-            <a:avLst/>
-          </a:prstGeom>
-          <a:ln w="9525">
-            <a:solidFill>
-              <a:srgbClr val="00B050"/>
-            </a:solidFill>
-            <a:prstDash val="sysDash"/>
           </a:ln>
         </p:spPr>
         <p:style>
@@ -23445,6 +21634,765 @@
                 <a:ea typeface="HG丸ｺﾞｼｯｸM-PRO" panose="020F0600000000000000" pitchFamily="50" charset="-128"/>
               </a:rPr>
               <a:t>360</a:t>
+            </a:r>
+            <a:endParaRPr lang="ja-JP" altLang="en-US" sz="1050" dirty="0">
+              <a:latin typeface="HG丸ｺﾞｼｯｸM-PRO" panose="020F0600000000000000" pitchFamily="50" charset="-128"/>
+              <a:ea typeface="HG丸ｺﾞｼｯｸM-PRO" panose="020F0600000000000000" pitchFamily="50" charset="-128"/>
+            </a:endParaRPr>
+          </a:p>
+        </p:txBody>
+      </p:sp>
+      <p:sp>
+        <p:nvSpPr>
+          <p:cNvPr id="144" name="テキスト ボックス 143"/>
+          <p:cNvSpPr txBox="1"/>
+          <p:nvPr/>
+        </p:nvSpPr>
+        <p:spPr>
+          <a:xfrm>
+            <a:off x="8665567" y="1269914"/>
+            <a:ext cx="3849943" cy="577069"/>
+          </a:xfrm>
+          <a:prstGeom prst="rect">
+            <a:avLst/>
+          </a:prstGeom>
+          <a:noFill/>
+        </p:spPr>
+        <p:txBody>
+          <a:bodyPr wrap="square" lIns="91428" tIns="45714" rIns="91428" bIns="45714" rtlCol="0">
+            <a:spAutoFit/>
+          </a:bodyPr>
+          <a:lstStyle/>
+          <a:p>
+            <a:r>
+              <a:rPr lang="ja-JP" altLang="en-US" sz="1050" smtClean="0">
+                <a:latin typeface="HG丸ｺﾞｼｯｸM-PRO" panose="020F0600000000000000" pitchFamily="50" charset="-128"/>
+                <a:ea typeface="HG丸ｺﾞｼｯｸM-PRO" panose="020F0600000000000000" pitchFamily="50" charset="-128"/>
+              </a:rPr>
+              <a:t>走行体の光センサーの位置がずれた状態で、コース上に配置してしまうと、スタート時に、大きく左右にぶれてしまい、思った走行ができないことがある。</a:t>
+            </a:r>
+            <a:endParaRPr lang="ja-JP" altLang="en-US" sz="1050" dirty="0">
+              <a:latin typeface="HG丸ｺﾞｼｯｸM-PRO" panose="020F0600000000000000" pitchFamily="50" charset="-128"/>
+              <a:ea typeface="HG丸ｺﾞｼｯｸM-PRO" panose="020F0600000000000000" pitchFamily="50" charset="-128"/>
+            </a:endParaRPr>
+          </a:p>
+        </p:txBody>
+      </p:sp>
+      <p:sp>
+        <p:nvSpPr>
+          <p:cNvPr id="146" name="テキスト ボックス 145"/>
+          <p:cNvSpPr txBox="1"/>
+          <p:nvPr/>
+        </p:nvSpPr>
+        <p:spPr>
+          <a:xfrm>
+            <a:off x="8665567" y="1973257"/>
+            <a:ext cx="3849943" cy="738652"/>
+          </a:xfrm>
+          <a:prstGeom prst="rect">
+            <a:avLst/>
+          </a:prstGeom>
+          <a:noFill/>
+        </p:spPr>
+        <p:txBody>
+          <a:bodyPr wrap="square" lIns="91428" tIns="45714" rIns="91428" bIns="45714" rtlCol="0">
+            <a:spAutoFit/>
+          </a:bodyPr>
+          <a:lstStyle/>
+          <a:p>
+            <a:r>
+              <a:rPr lang="ja-JP" altLang="en-US" sz="1050" smtClean="0">
+                <a:latin typeface="HG丸ｺﾞｼｯｸM-PRO" panose="020F0600000000000000" pitchFamily="50" charset="-128"/>
+                <a:ea typeface="HG丸ｺﾞｼｯｸM-PRO" panose="020F0600000000000000" pitchFamily="50" charset="-128"/>
+              </a:rPr>
+              <a:t>走行体は、現在置かれている位置が、最適なスタート位置かどうかを競技者に知らせるため、音を出す。</a:t>
+            </a:r>
+            <a:endParaRPr lang="en-US" altLang="ja-JP" sz="1050" smtClean="0">
+              <a:latin typeface="HG丸ｺﾞｼｯｸM-PRO" panose="020F0600000000000000" pitchFamily="50" charset="-128"/>
+              <a:ea typeface="HG丸ｺﾞｼｯｸM-PRO" panose="020F0600000000000000" pitchFamily="50" charset="-128"/>
+            </a:endParaRPr>
+          </a:p>
+          <a:p>
+            <a:r>
+              <a:rPr lang="ja-JP" altLang="en-US" sz="1050" smtClean="0">
+                <a:latin typeface="HG丸ｺﾞｼｯｸM-PRO" panose="020F0600000000000000" pitchFamily="50" charset="-128"/>
+                <a:ea typeface="HG丸ｺﾞｼｯｸM-PRO" panose="020F0600000000000000" pitchFamily="50" charset="-128"/>
+              </a:rPr>
+              <a:t>最適な位置にいる場合は</a:t>
+            </a:r>
+            <a:r>
+              <a:rPr lang="en-US" altLang="ja-JP" sz="1050" smtClean="0">
+                <a:latin typeface="HG丸ｺﾞｼｯｸM-PRO" panose="020F0600000000000000" pitchFamily="50" charset="-128"/>
+                <a:ea typeface="HG丸ｺﾞｼｯｸM-PRO" panose="020F0600000000000000" pitchFamily="50" charset="-128"/>
+              </a:rPr>
+              <a:t>Click</a:t>
+            </a:r>
+            <a:r>
+              <a:rPr lang="ja-JP" altLang="en-US" sz="1050" smtClean="0">
+                <a:latin typeface="HG丸ｺﾞｼｯｸM-PRO" panose="020F0600000000000000" pitchFamily="50" charset="-128"/>
+                <a:ea typeface="HG丸ｺﾞｼｯｸM-PRO" panose="020F0600000000000000" pitchFamily="50" charset="-128"/>
+              </a:rPr>
+              <a:t>音、最適でない位置の場合には</a:t>
+            </a:r>
+            <a:r>
+              <a:rPr lang="en-US" altLang="ja-JP" sz="1050" smtClean="0">
+                <a:latin typeface="HG丸ｺﾞｼｯｸM-PRO" panose="020F0600000000000000" pitchFamily="50" charset="-128"/>
+                <a:ea typeface="HG丸ｺﾞｼｯｸM-PRO" panose="020F0600000000000000" pitchFamily="50" charset="-128"/>
+              </a:rPr>
+              <a:t>Beep</a:t>
+            </a:r>
+            <a:r>
+              <a:rPr lang="ja-JP" altLang="en-US" sz="1050" smtClean="0">
+                <a:latin typeface="HG丸ｺﾞｼｯｸM-PRO" panose="020F0600000000000000" pitchFamily="50" charset="-128"/>
+                <a:ea typeface="HG丸ｺﾞｼｯｸM-PRO" panose="020F0600000000000000" pitchFamily="50" charset="-128"/>
+              </a:rPr>
+              <a:t>音を出すことで競技者に知らせる。</a:t>
+            </a:r>
+            <a:endParaRPr lang="ja-JP" altLang="en-US" sz="1050" dirty="0">
+              <a:latin typeface="HG丸ｺﾞｼｯｸM-PRO" panose="020F0600000000000000" pitchFamily="50" charset="-128"/>
+              <a:ea typeface="HG丸ｺﾞｼｯｸM-PRO" panose="020F0600000000000000" pitchFamily="50" charset="-128"/>
+            </a:endParaRPr>
+          </a:p>
+        </p:txBody>
+      </p:sp>
+      <p:cxnSp>
+        <p:nvCxnSpPr>
+          <p:cNvPr id="228" name="直線コネクタ 227"/>
+          <p:cNvCxnSpPr/>
+          <p:nvPr/>
+        </p:nvCxnSpPr>
+        <p:spPr>
+          <a:xfrm>
+            <a:off x="6157893" y="933369"/>
+            <a:ext cx="0" cy="2556771"/>
+          </a:xfrm>
+          <a:prstGeom prst="line">
+            <a:avLst/>
+          </a:prstGeom>
+          <a:ln w="381000">
+            <a:solidFill>
+              <a:schemeClr val="tx1"/>
+            </a:solidFill>
+          </a:ln>
+        </p:spPr>
+        <p:style>
+          <a:lnRef idx="1">
+            <a:schemeClr val="accent1"/>
+          </a:lnRef>
+          <a:fillRef idx="0">
+            <a:schemeClr val="accent1"/>
+          </a:fillRef>
+          <a:effectRef idx="0">
+            <a:schemeClr val="accent1"/>
+          </a:effectRef>
+          <a:fontRef idx="minor">
+            <a:schemeClr val="tx1"/>
+          </a:fontRef>
+        </p:style>
+      </p:cxnSp>
+      <p:grpSp>
+        <p:nvGrpSpPr>
+          <p:cNvPr id="233" name="グループ化 232"/>
+          <p:cNvGrpSpPr/>
+          <p:nvPr/>
+        </p:nvGrpSpPr>
+        <p:grpSpPr>
+          <a:xfrm>
+            <a:off x="5436135" y="1029374"/>
+            <a:ext cx="624349" cy="624349"/>
+            <a:chOff x="6548655" y="1029374"/>
+            <a:chExt cx="624349" cy="624349"/>
+          </a:xfrm>
+        </p:grpSpPr>
+        <p:sp>
+          <p:nvSpPr>
+            <p:cNvPr id="232" name="円/楕円 231"/>
+            <p:cNvSpPr/>
+            <p:nvPr/>
+          </p:nvSpPr>
+          <p:spPr>
+            <a:xfrm>
+              <a:off x="6548655" y="1029374"/>
+              <a:ext cx="624349" cy="624349"/>
+            </a:xfrm>
+            <a:prstGeom prst="ellipse">
+              <a:avLst/>
+            </a:prstGeom>
+            <a:solidFill>
+              <a:srgbClr val="FF5050"/>
+            </a:solidFill>
+            <a:ln w="12700">
+              <a:solidFill>
+                <a:srgbClr val="FF5050"/>
+              </a:solidFill>
+            </a:ln>
+          </p:spPr>
+          <p:style>
+            <a:lnRef idx="1">
+              <a:schemeClr val="accent6"/>
+            </a:lnRef>
+            <a:fillRef idx="2">
+              <a:schemeClr val="accent6"/>
+            </a:fillRef>
+            <a:effectRef idx="1">
+              <a:schemeClr val="accent6"/>
+            </a:effectRef>
+            <a:fontRef idx="minor">
+              <a:schemeClr val="dk1"/>
+            </a:fontRef>
+          </p:style>
+          <p:txBody>
+            <a:bodyPr lIns="91428" tIns="45714" rIns="91428" bIns="45714" rtlCol="0" anchor="ctr"/>
+            <a:lstStyle/>
+            <a:p>
+              <a:pPr algn="ctr"/>
+              <a:endParaRPr kumimoji="1" lang="ja-JP" altLang="en-US" sz="2400" dirty="0">
+                <a:latin typeface="HG丸ｺﾞｼｯｸM-PRO" panose="020F0600000000000000" pitchFamily="50" charset="-128"/>
+                <a:ea typeface="HG丸ｺﾞｼｯｸM-PRO" panose="020F0600000000000000" pitchFamily="50" charset="-128"/>
+              </a:endParaRPr>
+            </a:p>
+          </p:txBody>
+        </p:sp>
+        <p:sp>
+          <p:nvSpPr>
+            <p:cNvPr id="231" name="正方形/長方形 230"/>
+            <p:cNvSpPr/>
+            <p:nvPr/>
+          </p:nvSpPr>
+          <p:spPr>
+            <a:xfrm>
+              <a:off x="6671398" y="1195907"/>
+              <a:ext cx="365732" cy="457686"/>
+            </a:xfrm>
+            <a:prstGeom prst="rect">
+              <a:avLst/>
+            </a:prstGeom>
+            <a:ln/>
+          </p:spPr>
+          <p:style>
+            <a:lnRef idx="2">
+              <a:schemeClr val="dk1"/>
+            </a:lnRef>
+            <a:fillRef idx="1">
+              <a:schemeClr val="lt1"/>
+            </a:fillRef>
+            <a:effectRef idx="0">
+              <a:schemeClr val="dk1"/>
+            </a:effectRef>
+            <a:fontRef idx="minor">
+              <a:schemeClr val="dk1"/>
+            </a:fontRef>
+          </p:style>
+          <p:txBody>
+            <a:bodyPr lIns="91428" tIns="45714" rIns="91428" bIns="45714" rtlCol="0" anchor="ctr"/>
+            <a:lstStyle/>
+            <a:p>
+              <a:pPr algn="ctr"/>
+              <a:endParaRPr kumimoji="1" lang="ja-JP" altLang="en-US" sz="2400" dirty="0">
+                <a:latin typeface="HG丸ｺﾞｼｯｸM-PRO" panose="020F0600000000000000" pitchFamily="50" charset="-128"/>
+                <a:ea typeface="HG丸ｺﾞｼｯｸM-PRO" panose="020F0600000000000000" pitchFamily="50" charset="-128"/>
+              </a:endParaRPr>
+            </a:p>
+          </p:txBody>
+        </p:sp>
+      </p:grpSp>
+      <p:grpSp>
+        <p:nvGrpSpPr>
+          <p:cNvPr id="214" name="グループ化 213"/>
+          <p:cNvGrpSpPr/>
+          <p:nvPr/>
+        </p:nvGrpSpPr>
+        <p:grpSpPr>
+          <a:xfrm>
+            <a:off x="5756089" y="1854544"/>
+            <a:ext cx="624349" cy="624349"/>
+            <a:chOff x="6548655" y="1029374"/>
+            <a:chExt cx="624349" cy="624349"/>
+          </a:xfrm>
+        </p:grpSpPr>
+        <p:sp>
+          <p:nvSpPr>
+            <p:cNvPr id="215" name="円/楕円 214"/>
+            <p:cNvSpPr/>
+            <p:nvPr/>
+          </p:nvSpPr>
+          <p:spPr>
+            <a:xfrm>
+              <a:off x="6548655" y="1029374"/>
+              <a:ext cx="624349" cy="624349"/>
+            </a:xfrm>
+            <a:prstGeom prst="ellipse">
+              <a:avLst/>
+            </a:prstGeom>
+            <a:solidFill>
+              <a:srgbClr val="FF5050"/>
+            </a:solidFill>
+            <a:ln w="12700">
+              <a:solidFill>
+                <a:srgbClr val="FF5050"/>
+              </a:solidFill>
+            </a:ln>
+          </p:spPr>
+          <p:style>
+            <a:lnRef idx="1">
+              <a:schemeClr val="accent6"/>
+            </a:lnRef>
+            <a:fillRef idx="2">
+              <a:schemeClr val="accent6"/>
+            </a:fillRef>
+            <a:effectRef idx="1">
+              <a:schemeClr val="accent6"/>
+            </a:effectRef>
+            <a:fontRef idx="minor">
+              <a:schemeClr val="dk1"/>
+            </a:fontRef>
+          </p:style>
+          <p:txBody>
+            <a:bodyPr lIns="91428" tIns="45714" rIns="91428" bIns="45714" rtlCol="0" anchor="ctr"/>
+            <a:lstStyle/>
+            <a:p>
+              <a:pPr algn="ctr"/>
+              <a:endParaRPr kumimoji="1" lang="ja-JP" altLang="en-US" sz="2400" dirty="0">
+                <a:latin typeface="HG丸ｺﾞｼｯｸM-PRO" panose="020F0600000000000000" pitchFamily="50" charset="-128"/>
+                <a:ea typeface="HG丸ｺﾞｼｯｸM-PRO" panose="020F0600000000000000" pitchFamily="50" charset="-128"/>
+              </a:endParaRPr>
+            </a:p>
+          </p:txBody>
+        </p:sp>
+        <p:sp>
+          <p:nvSpPr>
+            <p:cNvPr id="216" name="正方形/長方形 215"/>
+            <p:cNvSpPr/>
+            <p:nvPr/>
+          </p:nvSpPr>
+          <p:spPr>
+            <a:xfrm>
+              <a:off x="6671398" y="1195907"/>
+              <a:ext cx="365732" cy="457686"/>
+            </a:xfrm>
+            <a:prstGeom prst="rect">
+              <a:avLst/>
+            </a:prstGeom>
+            <a:ln/>
+          </p:spPr>
+          <p:style>
+            <a:lnRef idx="2">
+              <a:schemeClr val="dk1"/>
+            </a:lnRef>
+            <a:fillRef idx="1">
+              <a:schemeClr val="lt1"/>
+            </a:fillRef>
+            <a:effectRef idx="0">
+              <a:schemeClr val="dk1"/>
+            </a:effectRef>
+            <a:fontRef idx="minor">
+              <a:schemeClr val="dk1"/>
+            </a:fontRef>
+          </p:style>
+          <p:txBody>
+            <a:bodyPr lIns="91428" tIns="45714" rIns="91428" bIns="45714" rtlCol="0" anchor="ctr"/>
+            <a:lstStyle/>
+            <a:p>
+              <a:pPr algn="ctr"/>
+              <a:endParaRPr kumimoji="1" lang="ja-JP" altLang="en-US" sz="2400" dirty="0">
+                <a:latin typeface="HG丸ｺﾞｼｯｸM-PRO" panose="020F0600000000000000" pitchFamily="50" charset="-128"/>
+                <a:ea typeface="HG丸ｺﾞｼｯｸM-PRO" panose="020F0600000000000000" pitchFamily="50" charset="-128"/>
+              </a:endParaRPr>
+            </a:p>
+          </p:txBody>
+        </p:sp>
+      </p:grpSp>
+      <p:grpSp>
+        <p:nvGrpSpPr>
+          <p:cNvPr id="219" name="グループ化 218"/>
+          <p:cNvGrpSpPr/>
+          <p:nvPr/>
+        </p:nvGrpSpPr>
+        <p:grpSpPr>
+          <a:xfrm>
+            <a:off x="5642525" y="2753930"/>
+            <a:ext cx="624349" cy="624349"/>
+            <a:chOff x="6548655" y="1029374"/>
+            <a:chExt cx="624349" cy="624349"/>
+          </a:xfrm>
+        </p:grpSpPr>
+        <p:sp>
+          <p:nvSpPr>
+            <p:cNvPr id="220" name="円/楕円 219"/>
+            <p:cNvSpPr/>
+            <p:nvPr/>
+          </p:nvSpPr>
+          <p:spPr>
+            <a:xfrm>
+              <a:off x="6548655" y="1029374"/>
+              <a:ext cx="624349" cy="624349"/>
+            </a:xfrm>
+            <a:prstGeom prst="ellipse">
+              <a:avLst/>
+            </a:prstGeom>
+            <a:solidFill>
+              <a:srgbClr val="FF5050"/>
+            </a:solidFill>
+            <a:ln w="12700">
+              <a:solidFill>
+                <a:srgbClr val="FF5050"/>
+              </a:solidFill>
+            </a:ln>
+          </p:spPr>
+          <p:style>
+            <a:lnRef idx="1">
+              <a:schemeClr val="accent6"/>
+            </a:lnRef>
+            <a:fillRef idx="2">
+              <a:schemeClr val="accent6"/>
+            </a:fillRef>
+            <a:effectRef idx="1">
+              <a:schemeClr val="accent6"/>
+            </a:effectRef>
+            <a:fontRef idx="minor">
+              <a:schemeClr val="dk1"/>
+            </a:fontRef>
+          </p:style>
+          <p:txBody>
+            <a:bodyPr lIns="91428" tIns="45714" rIns="91428" bIns="45714" rtlCol="0" anchor="ctr"/>
+            <a:lstStyle/>
+            <a:p>
+              <a:pPr algn="ctr"/>
+              <a:endParaRPr kumimoji="1" lang="ja-JP" altLang="en-US" sz="2400" dirty="0">
+                <a:latin typeface="HG丸ｺﾞｼｯｸM-PRO" panose="020F0600000000000000" pitchFamily="50" charset="-128"/>
+                <a:ea typeface="HG丸ｺﾞｼｯｸM-PRO" panose="020F0600000000000000" pitchFamily="50" charset="-128"/>
+              </a:endParaRPr>
+            </a:p>
+          </p:txBody>
+        </p:sp>
+        <p:sp>
+          <p:nvSpPr>
+            <p:cNvPr id="221" name="正方形/長方形 220"/>
+            <p:cNvSpPr/>
+            <p:nvPr/>
+          </p:nvSpPr>
+          <p:spPr>
+            <a:xfrm>
+              <a:off x="6671398" y="1195907"/>
+              <a:ext cx="365732" cy="457686"/>
+            </a:xfrm>
+            <a:prstGeom prst="rect">
+              <a:avLst/>
+            </a:prstGeom>
+            <a:ln/>
+          </p:spPr>
+          <p:style>
+            <a:lnRef idx="2">
+              <a:schemeClr val="dk1"/>
+            </a:lnRef>
+            <a:fillRef idx="1">
+              <a:schemeClr val="lt1"/>
+            </a:fillRef>
+            <a:effectRef idx="0">
+              <a:schemeClr val="dk1"/>
+            </a:effectRef>
+            <a:fontRef idx="minor">
+              <a:schemeClr val="dk1"/>
+            </a:fontRef>
+          </p:style>
+          <p:txBody>
+            <a:bodyPr lIns="91428" tIns="45714" rIns="91428" bIns="45714" rtlCol="0" anchor="ctr"/>
+            <a:lstStyle/>
+            <a:p>
+              <a:pPr algn="ctr"/>
+              <a:endParaRPr kumimoji="1" lang="ja-JP" altLang="en-US" sz="2400" dirty="0">
+                <a:latin typeface="HG丸ｺﾞｼｯｸM-PRO" panose="020F0600000000000000" pitchFamily="50" charset="-128"/>
+                <a:ea typeface="HG丸ｺﾞｼｯｸM-PRO" panose="020F0600000000000000" pitchFamily="50" charset="-128"/>
+              </a:endParaRPr>
+            </a:p>
+          </p:txBody>
+        </p:sp>
+      </p:grpSp>
+      <p:sp>
+        <p:nvSpPr>
+          <p:cNvPr id="234" name="角丸四角形吹き出し 233"/>
+          <p:cNvSpPr/>
+          <p:nvPr/>
+        </p:nvSpPr>
+        <p:spPr>
+          <a:xfrm>
+            <a:off x="6794557" y="1036418"/>
+            <a:ext cx="1413450" cy="577069"/>
+          </a:xfrm>
+          <a:prstGeom prst="wedgeRoundRectCallout">
+            <a:avLst>
+              <a:gd name="adj1" fmla="val -100621"/>
+              <a:gd name="adj2" fmla="val 3079"/>
+              <a:gd name="adj3" fmla="val 16667"/>
+            </a:avLst>
+          </a:prstGeom>
+          <a:ln/>
+        </p:spPr>
+        <p:style>
+          <a:lnRef idx="3">
+            <a:schemeClr val="lt1"/>
+          </a:lnRef>
+          <a:fillRef idx="1">
+            <a:schemeClr val="accent5"/>
+          </a:fillRef>
+          <a:effectRef idx="1">
+            <a:schemeClr val="accent5"/>
+          </a:effectRef>
+          <a:fontRef idx="minor">
+            <a:schemeClr val="lt1"/>
+          </a:fontRef>
+        </p:style>
+        <p:txBody>
+          <a:bodyPr lIns="91428" tIns="45714" rIns="91428" bIns="45714" rtlCol="0" anchor="ctr"/>
+          <a:lstStyle/>
+          <a:p>
+            <a:pPr algn="ctr"/>
+            <a:r>
+              <a:rPr kumimoji="1" lang="ja-JP" altLang="en-US" sz="1400" smtClean="0">
+                <a:latin typeface="HG丸ｺﾞｼｯｸM-PRO" panose="020F0600000000000000" pitchFamily="50" charset="-128"/>
+                <a:ea typeface="HG丸ｺﾞｼｯｸM-PRO" panose="020F0600000000000000" pitchFamily="50" charset="-128"/>
+              </a:rPr>
+              <a:t>白に近すぎ</a:t>
+            </a:r>
+            <a:endParaRPr kumimoji="1" lang="en-US" altLang="ja-JP" sz="1400" smtClean="0">
+              <a:latin typeface="HG丸ｺﾞｼｯｸM-PRO" panose="020F0600000000000000" pitchFamily="50" charset="-128"/>
+              <a:ea typeface="HG丸ｺﾞｼｯｸM-PRO" panose="020F0600000000000000" pitchFamily="50" charset="-128"/>
+            </a:endParaRPr>
+          </a:p>
+          <a:p>
+            <a:pPr algn="ctr"/>
+            <a:r>
+              <a:rPr lang="en-US" altLang="ja-JP" sz="1400" smtClean="0">
+                <a:latin typeface="HG丸ｺﾞｼｯｸM-PRO" panose="020F0600000000000000" pitchFamily="50" charset="-128"/>
+                <a:ea typeface="HG丸ｺﾞｼｯｸM-PRO" panose="020F0600000000000000" pitchFamily="50" charset="-128"/>
+              </a:rPr>
+              <a:t>(Beep</a:t>
+            </a:r>
+            <a:r>
+              <a:rPr lang="ja-JP" altLang="en-US" sz="1400" smtClean="0">
+                <a:latin typeface="HG丸ｺﾞｼｯｸM-PRO" panose="020F0600000000000000" pitchFamily="50" charset="-128"/>
+                <a:ea typeface="HG丸ｺﾞｼｯｸM-PRO" panose="020F0600000000000000" pitchFamily="50" charset="-128"/>
+              </a:rPr>
+              <a:t>音</a:t>
+            </a:r>
+            <a:r>
+              <a:rPr lang="en-US" altLang="ja-JP" sz="1400" smtClean="0">
+                <a:latin typeface="HG丸ｺﾞｼｯｸM-PRO" panose="020F0600000000000000" pitchFamily="50" charset="-128"/>
+                <a:ea typeface="HG丸ｺﾞｼｯｸM-PRO" panose="020F0600000000000000" pitchFamily="50" charset="-128"/>
+              </a:rPr>
+              <a:t>)</a:t>
+            </a:r>
+            <a:endParaRPr kumimoji="1" lang="ja-JP" altLang="en-US" sz="1400" dirty="0">
+              <a:latin typeface="HG丸ｺﾞｼｯｸM-PRO" panose="020F0600000000000000" pitchFamily="50" charset="-128"/>
+              <a:ea typeface="HG丸ｺﾞｼｯｸM-PRO" panose="020F0600000000000000" pitchFamily="50" charset="-128"/>
+            </a:endParaRPr>
+          </a:p>
+        </p:txBody>
+      </p:sp>
+      <p:sp>
+        <p:nvSpPr>
+          <p:cNvPr id="222" name="角丸四角形吹き出し 221"/>
+          <p:cNvSpPr/>
+          <p:nvPr/>
+        </p:nvSpPr>
+        <p:spPr>
+          <a:xfrm>
+            <a:off x="6794557" y="1894325"/>
+            <a:ext cx="1413450" cy="577069"/>
+          </a:xfrm>
+          <a:prstGeom prst="wedgeRoundRectCallout">
+            <a:avLst>
+              <a:gd name="adj1" fmla="val -82291"/>
+              <a:gd name="adj2" fmla="val 5720"/>
+              <a:gd name="adj3" fmla="val 16667"/>
+            </a:avLst>
+          </a:prstGeom>
+          <a:ln/>
+        </p:spPr>
+        <p:style>
+          <a:lnRef idx="3">
+            <a:schemeClr val="lt1"/>
+          </a:lnRef>
+          <a:fillRef idx="1">
+            <a:schemeClr val="accent5"/>
+          </a:fillRef>
+          <a:effectRef idx="1">
+            <a:schemeClr val="accent5"/>
+          </a:effectRef>
+          <a:fontRef idx="minor">
+            <a:schemeClr val="lt1"/>
+          </a:fontRef>
+        </p:style>
+        <p:txBody>
+          <a:bodyPr lIns="91428" tIns="45714" rIns="91428" bIns="45714" rtlCol="0" anchor="ctr"/>
+          <a:lstStyle/>
+          <a:p>
+            <a:pPr algn="ctr"/>
+            <a:r>
+              <a:rPr kumimoji="1" lang="ja-JP" altLang="en-US" sz="1400" smtClean="0">
+                <a:latin typeface="HG丸ｺﾞｼｯｸM-PRO" panose="020F0600000000000000" pitchFamily="50" charset="-128"/>
+                <a:ea typeface="HG丸ｺﾞｼｯｸM-PRO" panose="020F0600000000000000" pitchFamily="50" charset="-128"/>
+              </a:rPr>
+              <a:t>黒に近すぎ</a:t>
+            </a:r>
+            <a:endParaRPr kumimoji="1" lang="en-US" altLang="ja-JP" sz="1400" smtClean="0">
+              <a:latin typeface="HG丸ｺﾞｼｯｸM-PRO" panose="020F0600000000000000" pitchFamily="50" charset="-128"/>
+              <a:ea typeface="HG丸ｺﾞｼｯｸM-PRO" panose="020F0600000000000000" pitchFamily="50" charset="-128"/>
+            </a:endParaRPr>
+          </a:p>
+          <a:p>
+            <a:pPr algn="ctr"/>
+            <a:r>
+              <a:rPr lang="en-US" altLang="ja-JP" sz="1400" smtClean="0">
+                <a:latin typeface="HG丸ｺﾞｼｯｸM-PRO" panose="020F0600000000000000" pitchFamily="50" charset="-128"/>
+                <a:ea typeface="HG丸ｺﾞｼｯｸM-PRO" panose="020F0600000000000000" pitchFamily="50" charset="-128"/>
+              </a:rPr>
+              <a:t>(Beep</a:t>
+            </a:r>
+            <a:r>
+              <a:rPr lang="ja-JP" altLang="en-US" sz="1400" smtClean="0">
+                <a:latin typeface="HG丸ｺﾞｼｯｸM-PRO" panose="020F0600000000000000" pitchFamily="50" charset="-128"/>
+                <a:ea typeface="HG丸ｺﾞｼｯｸM-PRO" panose="020F0600000000000000" pitchFamily="50" charset="-128"/>
+              </a:rPr>
+              <a:t>音</a:t>
+            </a:r>
+            <a:r>
+              <a:rPr lang="en-US" altLang="ja-JP" sz="1400" smtClean="0">
+                <a:latin typeface="HG丸ｺﾞｼｯｸM-PRO" panose="020F0600000000000000" pitchFamily="50" charset="-128"/>
+                <a:ea typeface="HG丸ｺﾞｼｯｸM-PRO" panose="020F0600000000000000" pitchFamily="50" charset="-128"/>
+              </a:rPr>
+              <a:t>)</a:t>
+            </a:r>
+            <a:endParaRPr kumimoji="1" lang="ja-JP" altLang="en-US" sz="1400" dirty="0">
+              <a:latin typeface="HG丸ｺﾞｼｯｸM-PRO" panose="020F0600000000000000" pitchFamily="50" charset="-128"/>
+              <a:ea typeface="HG丸ｺﾞｼｯｸM-PRO" panose="020F0600000000000000" pitchFamily="50" charset="-128"/>
+            </a:endParaRPr>
+          </a:p>
+        </p:txBody>
+      </p:sp>
+      <p:sp>
+        <p:nvSpPr>
+          <p:cNvPr id="235" name="角丸四角形吹き出し 234"/>
+          <p:cNvSpPr/>
+          <p:nvPr/>
+        </p:nvSpPr>
+        <p:spPr>
+          <a:xfrm>
+            <a:off x="6794557" y="2759033"/>
+            <a:ext cx="1413450" cy="577069"/>
+          </a:xfrm>
+          <a:prstGeom prst="wedgeRoundRectCallout">
+            <a:avLst>
+              <a:gd name="adj1" fmla="val -91995"/>
+              <a:gd name="adj2" fmla="val 5720"/>
+              <a:gd name="adj3" fmla="val 16667"/>
+            </a:avLst>
+          </a:prstGeom>
+          <a:ln/>
+        </p:spPr>
+        <p:style>
+          <a:lnRef idx="3">
+            <a:schemeClr val="lt1"/>
+          </a:lnRef>
+          <a:fillRef idx="1">
+            <a:schemeClr val="accent5"/>
+          </a:fillRef>
+          <a:effectRef idx="1">
+            <a:schemeClr val="accent5"/>
+          </a:effectRef>
+          <a:fontRef idx="minor">
+            <a:schemeClr val="lt1"/>
+          </a:fontRef>
+        </p:style>
+        <p:txBody>
+          <a:bodyPr lIns="91428" tIns="45714" rIns="91428" bIns="45714" rtlCol="0" anchor="ctr"/>
+          <a:lstStyle/>
+          <a:p>
+            <a:pPr algn="ctr"/>
+            <a:r>
+              <a:rPr kumimoji="1" lang="ja-JP" altLang="en-US" sz="1400" smtClean="0">
+                <a:latin typeface="HG丸ｺﾞｼｯｸM-PRO" panose="020F0600000000000000" pitchFamily="50" charset="-128"/>
+                <a:ea typeface="HG丸ｺﾞｼｯｸM-PRO" panose="020F0600000000000000" pitchFamily="50" charset="-128"/>
+              </a:rPr>
+              <a:t>丁度よい</a:t>
+            </a:r>
+            <a:endParaRPr kumimoji="1" lang="en-US" altLang="ja-JP" sz="1400" smtClean="0">
+              <a:latin typeface="HG丸ｺﾞｼｯｸM-PRO" panose="020F0600000000000000" pitchFamily="50" charset="-128"/>
+              <a:ea typeface="HG丸ｺﾞｼｯｸM-PRO" panose="020F0600000000000000" pitchFamily="50" charset="-128"/>
+            </a:endParaRPr>
+          </a:p>
+          <a:p>
+            <a:pPr algn="ctr"/>
+            <a:r>
+              <a:rPr lang="en-US" altLang="ja-JP" sz="1400" smtClean="0">
+                <a:latin typeface="HG丸ｺﾞｼｯｸM-PRO" panose="020F0600000000000000" pitchFamily="50" charset="-128"/>
+                <a:ea typeface="HG丸ｺﾞｼｯｸM-PRO" panose="020F0600000000000000" pitchFamily="50" charset="-128"/>
+              </a:rPr>
+              <a:t>(Click</a:t>
+            </a:r>
+            <a:r>
+              <a:rPr lang="ja-JP" altLang="en-US" sz="1400" smtClean="0">
+                <a:latin typeface="HG丸ｺﾞｼｯｸM-PRO" panose="020F0600000000000000" pitchFamily="50" charset="-128"/>
+                <a:ea typeface="HG丸ｺﾞｼｯｸM-PRO" panose="020F0600000000000000" pitchFamily="50" charset="-128"/>
+              </a:rPr>
+              <a:t>音</a:t>
+            </a:r>
+            <a:r>
+              <a:rPr lang="en-US" altLang="ja-JP" sz="1400" smtClean="0">
+                <a:latin typeface="HG丸ｺﾞｼｯｸM-PRO" panose="020F0600000000000000" pitchFamily="50" charset="-128"/>
+                <a:ea typeface="HG丸ｺﾞｼｯｸM-PRO" panose="020F0600000000000000" pitchFamily="50" charset="-128"/>
+              </a:rPr>
+              <a:t>)</a:t>
+            </a:r>
+            <a:endParaRPr kumimoji="1" lang="ja-JP" altLang="en-US" sz="1400" dirty="0">
+              <a:latin typeface="HG丸ｺﾞｼｯｸM-PRO" panose="020F0600000000000000" pitchFamily="50" charset="-128"/>
+              <a:ea typeface="HG丸ｺﾞｼｯｸM-PRO" panose="020F0600000000000000" pitchFamily="50" charset="-128"/>
+            </a:endParaRPr>
+          </a:p>
+        </p:txBody>
+      </p:sp>
+      <p:sp>
+        <p:nvSpPr>
+          <p:cNvPr id="236" name="テキスト ボックス 235"/>
+          <p:cNvSpPr txBox="1"/>
+          <p:nvPr/>
+        </p:nvSpPr>
+        <p:spPr>
+          <a:xfrm>
+            <a:off x="8665566" y="2838183"/>
+            <a:ext cx="3849943" cy="415486"/>
+          </a:xfrm>
+          <a:prstGeom prst="rect">
+            <a:avLst/>
+          </a:prstGeom>
+          <a:noFill/>
+        </p:spPr>
+        <p:txBody>
+          <a:bodyPr wrap="square" lIns="91428" tIns="45714" rIns="91428" bIns="45714" rtlCol="0">
+            <a:spAutoFit/>
+          </a:bodyPr>
+          <a:lstStyle/>
+          <a:p>
+            <a:r>
+              <a:rPr lang="ja-JP" altLang="en-US" sz="1050" smtClean="0">
+                <a:latin typeface="HG丸ｺﾞｼｯｸM-PRO" panose="020F0600000000000000" pitchFamily="50" charset="-128"/>
+                <a:ea typeface="HG丸ｺﾞｼｯｸM-PRO" panose="020F0600000000000000" pitchFamily="50" charset="-128"/>
+              </a:rPr>
+              <a:t>丁度よい値と全く同じ輝度が得られる場所に走行体を置くことは難しいので、</a:t>
+            </a:r>
+            <a:r>
+              <a:rPr lang="en-US" altLang="ja-JP" sz="1050" b="1" smtClean="0">
+                <a:latin typeface="HG丸ｺﾞｼｯｸM-PRO" panose="020F0600000000000000" pitchFamily="50" charset="-128"/>
+                <a:ea typeface="HG丸ｺﾞｼｯｸM-PRO" panose="020F0600000000000000" pitchFamily="50" charset="-128"/>
+              </a:rPr>
+              <a:t>±5</a:t>
+            </a:r>
+            <a:r>
+              <a:rPr lang="ja-JP" altLang="en-US" sz="1050" smtClean="0">
+                <a:latin typeface="HG丸ｺﾞｼｯｸM-PRO" panose="020F0600000000000000" pitchFamily="50" charset="-128"/>
+                <a:ea typeface="HG丸ｺﾞｼｯｸM-PRO" panose="020F0600000000000000" pitchFamily="50" charset="-128"/>
+              </a:rPr>
+              <a:t>の値を許容値とした。</a:t>
             </a:r>
             <a:endParaRPr lang="ja-JP" altLang="en-US" sz="1050" dirty="0">
               <a:latin typeface="HG丸ｺﾞｼｯｸM-PRO" panose="020F0600000000000000" pitchFamily="50" charset="-128"/>

</xml_diff>